<commit_message>
working thru model training, need to finish nested k-fold
</commit_message>
<xml_diff>
--- a/slide_deck.pptx
+++ b/slide_deck.pptx
@@ -6,6 +6,7 @@
   </p:sldMasterIdLst>
   <p:sldIdLst>
     <p:sldId id="256" r:id="rId2"/>
+    <p:sldId id="257" r:id="rId3"/>
   </p:sldIdLst>
   <p:sldSz cx="12192000" cy="6858000"/>
   <p:notesSz cx="6858000" cy="9144000"/>
@@ -104,6 +105,11 @@
       </a:defRPr>
     </a:lvl9pPr>
   </p:defaultTextStyle>
+  <p:extLst>
+    <p:ext uri="{EFAFB233-063F-42B5-8137-9DF3F51BA10A}">
+      <p15:sldGuideLst xmlns:p15="http://schemas.microsoft.com/office/powerpoint/2012/main"/>
+    </p:ext>
+  </p:extLst>
 </p:presentation>
 </file>
 
@@ -254,7 +260,7 @@
           <a:p>
             <a:fld id="{05FA5568-B2D1-4251-B1D0-E060DEEAD4E4}" type="datetimeFigureOut">
               <a:rPr lang="en-US" smtClean="0"/>
-              <a:t>10/22/2021</a:t>
+              <a:t>10/23/2021</a:t>
             </a:fld>
             <a:endParaRPr lang="en-US"/>
           </a:p>
@@ -452,7 +458,7 @@
           <a:p>
             <a:fld id="{05FA5568-B2D1-4251-B1D0-E060DEEAD4E4}" type="datetimeFigureOut">
               <a:rPr lang="en-US" smtClean="0"/>
-              <a:t>10/22/2021</a:t>
+              <a:t>10/23/2021</a:t>
             </a:fld>
             <a:endParaRPr lang="en-US"/>
           </a:p>
@@ -660,7 +666,7 @@
           <a:p>
             <a:fld id="{05FA5568-B2D1-4251-B1D0-E060DEEAD4E4}" type="datetimeFigureOut">
               <a:rPr lang="en-US" smtClean="0"/>
-              <a:t>10/22/2021</a:t>
+              <a:t>10/23/2021</a:t>
             </a:fld>
             <a:endParaRPr lang="en-US"/>
           </a:p>
@@ -858,7 +864,7 @@
           <a:p>
             <a:fld id="{05FA5568-B2D1-4251-B1D0-E060DEEAD4E4}" type="datetimeFigureOut">
               <a:rPr lang="en-US" smtClean="0"/>
-              <a:t>10/22/2021</a:t>
+              <a:t>10/23/2021</a:t>
             </a:fld>
             <a:endParaRPr lang="en-US"/>
           </a:p>
@@ -1133,7 +1139,7 @@
           <a:p>
             <a:fld id="{05FA5568-B2D1-4251-B1D0-E060DEEAD4E4}" type="datetimeFigureOut">
               <a:rPr lang="en-US" smtClean="0"/>
-              <a:t>10/22/2021</a:t>
+              <a:t>10/23/2021</a:t>
             </a:fld>
             <a:endParaRPr lang="en-US"/>
           </a:p>
@@ -1398,7 +1404,7 @@
           <a:p>
             <a:fld id="{05FA5568-B2D1-4251-B1D0-E060DEEAD4E4}" type="datetimeFigureOut">
               <a:rPr lang="en-US" smtClean="0"/>
-              <a:t>10/22/2021</a:t>
+              <a:t>10/23/2021</a:t>
             </a:fld>
             <a:endParaRPr lang="en-US"/>
           </a:p>
@@ -1810,7 +1816,7 @@
           <a:p>
             <a:fld id="{05FA5568-B2D1-4251-B1D0-E060DEEAD4E4}" type="datetimeFigureOut">
               <a:rPr lang="en-US" smtClean="0"/>
-              <a:t>10/22/2021</a:t>
+              <a:t>10/23/2021</a:t>
             </a:fld>
             <a:endParaRPr lang="en-US"/>
           </a:p>
@@ -1951,7 +1957,7 @@
           <a:p>
             <a:fld id="{05FA5568-B2D1-4251-B1D0-E060DEEAD4E4}" type="datetimeFigureOut">
               <a:rPr lang="en-US" smtClean="0"/>
-              <a:t>10/22/2021</a:t>
+              <a:t>10/23/2021</a:t>
             </a:fld>
             <a:endParaRPr lang="en-US"/>
           </a:p>
@@ -2064,7 +2070,7 @@
           <a:p>
             <a:fld id="{05FA5568-B2D1-4251-B1D0-E060DEEAD4E4}" type="datetimeFigureOut">
               <a:rPr lang="en-US" smtClean="0"/>
-              <a:t>10/22/2021</a:t>
+              <a:t>10/23/2021</a:t>
             </a:fld>
             <a:endParaRPr lang="en-US"/>
           </a:p>
@@ -2375,7 +2381,7 @@
           <a:p>
             <a:fld id="{05FA5568-B2D1-4251-B1D0-E060DEEAD4E4}" type="datetimeFigureOut">
               <a:rPr lang="en-US" smtClean="0"/>
-              <a:t>10/22/2021</a:t>
+              <a:t>10/23/2021</a:t>
             </a:fld>
             <a:endParaRPr lang="en-US"/>
           </a:p>
@@ -2663,7 +2669,7 @@
           <a:p>
             <a:fld id="{05FA5568-B2D1-4251-B1D0-E060DEEAD4E4}" type="datetimeFigureOut">
               <a:rPr lang="en-US" smtClean="0"/>
-              <a:t>10/22/2021</a:t>
+              <a:t>10/23/2021</a:t>
             </a:fld>
             <a:endParaRPr lang="en-US"/>
           </a:p>
@@ -2904,7 +2910,7 @@
           <a:p>
             <a:fld id="{05FA5568-B2D1-4251-B1D0-E060DEEAD4E4}" type="datetimeFigureOut">
               <a:rPr lang="en-US" smtClean="0"/>
-              <a:t>10/22/2021</a:t>
+              <a:t>10/23/2021</a:t>
             </a:fld>
             <a:endParaRPr lang="en-US"/>
           </a:p>
@@ -3398,6 +3404,128 @@
 </p:sld>
 </file>
 
+<file path=ppt/slides/slide2.xml><?xml version="1.0" encoding="utf-8"?>
+<p:sld xmlns:a="http://schemas.openxmlformats.org/drawingml/2006/main" xmlns:r="http://schemas.openxmlformats.org/officeDocument/2006/relationships" xmlns:p="http://schemas.openxmlformats.org/presentationml/2006/main">
+  <p:cSld>
+    <p:spTree>
+      <p:nvGrpSpPr>
+        <p:cNvPr id="1" name=""/>
+        <p:cNvGrpSpPr/>
+        <p:nvPr/>
+      </p:nvGrpSpPr>
+      <p:grpSpPr>
+        <a:xfrm>
+          <a:off x="0" y="0"/>
+          <a:ext cx="0" cy="0"/>
+          <a:chOff x="0" y="0"/>
+          <a:chExt cx="0" cy="0"/>
+        </a:xfrm>
+      </p:grpSpPr>
+      <p:sp>
+        <p:nvSpPr>
+          <p:cNvPr id="2" name="Title 1">
+            <a:extLst>
+              <a:ext uri="{FF2B5EF4-FFF2-40B4-BE49-F238E27FC236}">
+                <a16:creationId xmlns:a16="http://schemas.microsoft.com/office/drawing/2014/main" id="{3074C960-152A-4E78-A939-1FE90181DF69}"/>
+              </a:ext>
+            </a:extLst>
+          </p:cNvPr>
+          <p:cNvSpPr>
+            <a:spLocks noGrp="1"/>
+          </p:cNvSpPr>
+          <p:nvPr>
+            <p:ph type="title"/>
+          </p:nvPr>
+        </p:nvSpPr>
+        <p:spPr/>
+        <p:txBody>
+          <a:bodyPr/>
+          <a:lstStyle/>
+          <a:p>
+            <a:r>
+              <a:rPr lang="en-US" dirty="0"/>
+              <a:t>Topics</a:t>
+            </a:r>
+          </a:p>
+        </p:txBody>
+      </p:sp>
+      <p:sp>
+        <p:nvSpPr>
+          <p:cNvPr id="3" name="Content Placeholder 2">
+            <a:extLst>
+              <a:ext uri="{FF2B5EF4-FFF2-40B4-BE49-F238E27FC236}">
+                <a16:creationId xmlns:a16="http://schemas.microsoft.com/office/drawing/2014/main" id="{F2204E7E-23B9-493A-BA60-336C2A3A4018}"/>
+              </a:ext>
+            </a:extLst>
+          </p:cNvPr>
+          <p:cNvSpPr>
+            <a:spLocks noGrp="1"/>
+          </p:cNvSpPr>
+          <p:nvPr>
+            <p:ph idx="1"/>
+          </p:nvPr>
+        </p:nvSpPr>
+        <p:spPr/>
+        <p:txBody>
+          <a:bodyPr/>
+          <a:lstStyle/>
+          <a:p>
+            <a:r>
+              <a:rPr lang="en-US" dirty="0"/>
+              <a:t>Problem overview, prototypical types of DS problems</a:t>
+            </a:r>
+          </a:p>
+          <a:p>
+            <a:r>
+              <a:rPr lang="en-US" dirty="0"/>
+              <a:t>Supervised learning, machine has the answers, can learn how to determine the answer from learned experience</a:t>
+            </a:r>
+          </a:p>
+          <a:p>
+            <a:r>
+              <a:rPr lang="en-US" dirty="0"/>
+              <a:t>Data cleaning, feature engineering, encoding</a:t>
+            </a:r>
+          </a:p>
+          <a:p>
+            <a:r>
+              <a:rPr lang="en-US" dirty="0"/>
+              <a:t>EDA, class imbalance, resampling</a:t>
+            </a:r>
+          </a:p>
+          <a:p>
+            <a:r>
+              <a:rPr lang="en-US" dirty="0"/>
+              <a:t>Cross validation, holding out sets</a:t>
+            </a:r>
+          </a:p>
+          <a:p>
+            <a:r>
+              <a:rPr lang="en-US" dirty="0"/>
+              <a:t>Models</a:t>
+            </a:r>
+          </a:p>
+          <a:p>
+            <a:r>
+              <a:rPr lang="en-US" dirty="0"/>
+              <a:t>Results</a:t>
+            </a:r>
+          </a:p>
+        </p:txBody>
+      </p:sp>
+    </p:spTree>
+    <p:extLst>
+      <p:ext uri="{BB962C8B-B14F-4D97-AF65-F5344CB8AC3E}">
+        <p14:creationId xmlns:p14="http://schemas.microsoft.com/office/powerpoint/2010/main" val="3975502519"/>
+      </p:ext>
+    </p:extLst>
+  </p:cSld>
+  <p:clrMapOvr>
+    <a:masterClrMapping/>
+  </p:clrMapOvr>
+</p:sld>
+</file>
+
 <file path=ppt/theme/theme1.xml><?xml version="1.0" encoding="utf-8"?>
 <a:theme xmlns:a="http://schemas.openxmlformats.org/drawingml/2006/main" name="Office Theme">
   <a:themeElements>

</xml_diff>

<commit_message>
made significant progress with slide deck and renamed notebook files
</commit_message>
<xml_diff>
--- a/slide_deck.pptx
+++ b/slide_deck.pptx
@@ -7,6 +7,18 @@
   <p:sldIdLst>
     <p:sldId id="256" r:id="rId2"/>
     <p:sldId id="257" r:id="rId3"/>
+    <p:sldId id="258" r:id="rId4"/>
+    <p:sldId id="259" r:id="rId5"/>
+    <p:sldId id="264" r:id="rId6"/>
+    <p:sldId id="261" r:id="rId7"/>
+    <p:sldId id="260" r:id="rId8"/>
+    <p:sldId id="262" r:id="rId9"/>
+    <p:sldId id="263" r:id="rId10"/>
+    <p:sldId id="265" r:id="rId11"/>
+    <p:sldId id="266" r:id="rId12"/>
+    <p:sldId id="269" r:id="rId13"/>
+    <p:sldId id="267" r:id="rId14"/>
+    <p:sldId id="268" r:id="rId15"/>
   </p:sldIdLst>
   <p:sldSz cx="12192000" cy="6858000"/>
   <p:notesSz cx="6858000" cy="9144000"/>
@@ -3378,9 +3390,12 @@
           <a:bodyPr/>
           <a:lstStyle/>
           <a:p>
-            <a:r>
-              <a:rPr lang="en-US" dirty="0"/>
-              <a:t>Andy Block</a:t>
+            <a:endParaRPr lang="en-US" dirty="0"/>
+          </a:p>
+          <a:p>
+            <a:r>
+              <a:rPr lang="en-US" sz="2600" dirty="0"/>
+              <a:t>By Andy Block</a:t>
             </a:r>
           </a:p>
           <a:p>
@@ -3395,6 +3410,1100 @@
     <p:extLst>
       <p:ext uri="{BB962C8B-B14F-4D97-AF65-F5344CB8AC3E}">
         <p14:creationId xmlns:p14="http://schemas.microsoft.com/office/powerpoint/2010/main" val="2206980097"/>
+      </p:ext>
+    </p:extLst>
+  </p:cSld>
+  <p:clrMapOvr>
+    <a:masterClrMapping/>
+  </p:clrMapOvr>
+</p:sld>
+</file>
+
+<file path=ppt/slides/slide10.xml><?xml version="1.0" encoding="utf-8"?>
+<p:sld xmlns:a="http://schemas.openxmlformats.org/drawingml/2006/main" xmlns:r="http://schemas.openxmlformats.org/officeDocument/2006/relationships" xmlns:p="http://schemas.openxmlformats.org/presentationml/2006/main">
+  <p:cSld>
+    <p:spTree>
+      <p:nvGrpSpPr>
+        <p:cNvPr id="1" name=""/>
+        <p:cNvGrpSpPr/>
+        <p:nvPr/>
+      </p:nvGrpSpPr>
+      <p:grpSpPr>
+        <a:xfrm>
+          <a:off x="0" y="0"/>
+          <a:ext cx="0" cy="0"/>
+          <a:chOff x="0" y="0"/>
+          <a:chExt cx="0" cy="0"/>
+        </a:xfrm>
+      </p:grpSpPr>
+      <p:sp>
+        <p:nvSpPr>
+          <p:cNvPr id="2" name="Title 1">
+            <a:extLst>
+              <a:ext uri="{FF2B5EF4-FFF2-40B4-BE49-F238E27FC236}">
+                <a16:creationId xmlns:a16="http://schemas.microsoft.com/office/drawing/2014/main" id="{21360BA8-EACD-4308-8246-3BC796668913}"/>
+              </a:ext>
+            </a:extLst>
+          </p:cNvPr>
+          <p:cNvSpPr>
+            <a:spLocks noGrp="1"/>
+          </p:cNvSpPr>
+          <p:nvPr>
+            <p:ph type="title"/>
+          </p:nvPr>
+        </p:nvSpPr>
+        <p:spPr/>
+        <p:txBody>
+          <a:bodyPr/>
+          <a:lstStyle/>
+          <a:p>
+            <a:r>
+              <a:rPr lang="en-US" dirty="0"/>
+              <a:t>Class Imbalance and Resampling</a:t>
+            </a:r>
+          </a:p>
+        </p:txBody>
+      </p:sp>
+      <p:sp>
+        <p:nvSpPr>
+          <p:cNvPr id="3" name="Content Placeholder 2">
+            <a:extLst>
+              <a:ext uri="{FF2B5EF4-FFF2-40B4-BE49-F238E27FC236}">
+                <a16:creationId xmlns:a16="http://schemas.microsoft.com/office/drawing/2014/main" id="{4BA42800-6156-4F3F-A810-901C5908E5CE}"/>
+              </a:ext>
+            </a:extLst>
+          </p:cNvPr>
+          <p:cNvSpPr>
+            <a:spLocks noGrp="1"/>
+          </p:cNvSpPr>
+          <p:nvPr>
+            <p:ph sz="half" idx="1"/>
+          </p:nvPr>
+        </p:nvSpPr>
+        <p:spPr/>
+        <p:txBody>
+          <a:bodyPr>
+            <a:normAutofit fontScale="92500" lnSpcReduction="20000"/>
+          </a:bodyPr>
+          <a:lstStyle/>
+          <a:p>
+            <a:pPr>
+              <a:buSzPct val="60000"/>
+              <a:buFont typeface="Wingdings" panose="05000000000000000000" pitchFamily="2" charset="2"/>
+              <a:buChar char="§"/>
+            </a:pPr>
+            <a:r>
+              <a:rPr lang="en-US" sz="3600" dirty="0"/>
+              <a:t>Algorithms designed for balanced classes</a:t>
+            </a:r>
+          </a:p>
+          <a:p>
+            <a:pPr>
+              <a:buSzPct val="60000"/>
+              <a:buFont typeface="Wingdings" panose="05000000000000000000" pitchFamily="2" charset="2"/>
+              <a:buChar char="§"/>
+            </a:pPr>
+            <a:endParaRPr lang="en-US" sz="3600" dirty="0"/>
+          </a:p>
+          <a:p>
+            <a:pPr>
+              <a:buSzPct val="60000"/>
+              <a:buFont typeface="Wingdings" panose="05000000000000000000" pitchFamily="2" charset="2"/>
+              <a:buChar char="§"/>
+            </a:pPr>
+            <a:endParaRPr lang="en-US" sz="3600" dirty="0"/>
+          </a:p>
+          <a:p>
+            <a:pPr>
+              <a:buSzPct val="60000"/>
+              <a:buFont typeface="Wingdings" panose="05000000000000000000" pitchFamily="2" charset="2"/>
+              <a:buChar char="§"/>
+            </a:pPr>
+            <a:r>
+              <a:rPr lang="en-US" sz="3600" dirty="0"/>
+              <a:t>Minority class usually more important</a:t>
+            </a:r>
+          </a:p>
+          <a:p>
+            <a:pPr>
+              <a:buSzPct val="60000"/>
+              <a:buFont typeface="Wingdings" panose="05000000000000000000" pitchFamily="2" charset="2"/>
+              <a:buChar char="§"/>
+            </a:pPr>
+            <a:endParaRPr lang="en-US" sz="3600" dirty="0"/>
+          </a:p>
+          <a:p>
+            <a:pPr>
+              <a:buSzPct val="60000"/>
+              <a:buFont typeface="Wingdings" panose="05000000000000000000" pitchFamily="2" charset="2"/>
+              <a:buChar char="§"/>
+            </a:pPr>
+            <a:endParaRPr lang="en-US" sz="3600" dirty="0"/>
+          </a:p>
+          <a:p>
+            <a:pPr>
+              <a:buSzPct val="60000"/>
+              <a:buFont typeface="Wingdings" panose="05000000000000000000" pitchFamily="2" charset="2"/>
+              <a:buChar char="§"/>
+            </a:pPr>
+            <a:r>
+              <a:rPr lang="en-US" sz="3600" dirty="0"/>
+              <a:t>Under/Oversampling</a:t>
+            </a:r>
+          </a:p>
+        </p:txBody>
+      </p:sp>
+      <p:grpSp>
+        <p:nvGrpSpPr>
+          <p:cNvPr id="9" name="Group 8">
+            <a:extLst>
+              <a:ext uri="{FF2B5EF4-FFF2-40B4-BE49-F238E27FC236}">
+                <a16:creationId xmlns:a16="http://schemas.microsoft.com/office/drawing/2014/main" id="{B57EA2F7-ECCA-458A-968E-6E9FF215B291}"/>
+              </a:ext>
+            </a:extLst>
+          </p:cNvPr>
+          <p:cNvGrpSpPr>
+            <a:grpSpLocks noChangeAspect="1"/>
+          </p:cNvGrpSpPr>
+          <p:nvPr/>
+        </p:nvGrpSpPr>
+        <p:grpSpPr>
+          <a:xfrm>
+            <a:off x="7601527" y="1426913"/>
+            <a:ext cx="3275553" cy="5148762"/>
+            <a:chOff x="6342679" y="1313194"/>
+            <a:chExt cx="2843939" cy="4447261"/>
+          </a:xfrm>
+        </p:grpSpPr>
+        <p:pic>
+          <p:nvPicPr>
+            <p:cNvPr id="7170" name="Picture 2" descr="Scatter Plot of Imbalanced Binary Classification Problem">
+              <a:extLst>
+                <a:ext uri="{FF2B5EF4-FFF2-40B4-BE49-F238E27FC236}">
+                  <a16:creationId xmlns:a16="http://schemas.microsoft.com/office/drawing/2014/main" id="{4D90A4B9-6AC7-42A6-B669-41E604943083}"/>
+                </a:ext>
+              </a:extLst>
+            </p:cNvPr>
+            <p:cNvPicPr>
+              <a:picLocks noChangeAspect="1" noChangeArrowheads="1"/>
+            </p:cNvPicPr>
+            <p:nvPr/>
+          </p:nvPicPr>
+          <p:blipFill rotWithShape="1">
+            <a:blip r:embed="rId2">
+              <a:extLst>
+                <a:ext uri="{28A0092B-C50C-407E-A947-70E740481C1C}">
+                  <a14:useLocalDpi xmlns:a14="http://schemas.microsoft.com/office/drawing/2010/main" val="0"/>
+                </a:ext>
+              </a:extLst>
+            </a:blip>
+            <a:srcRect l="5293" t="10136" r="8372" b="5175"/>
+            <a:stretch/>
+          </p:blipFill>
+          <p:spPr bwMode="auto">
+            <a:xfrm>
+              <a:off x="6342679" y="1313194"/>
+              <a:ext cx="2843939" cy="2092272"/>
+            </a:xfrm>
+            <a:prstGeom prst="rect">
+              <a:avLst/>
+            </a:prstGeom>
+            <a:noFill/>
+            <a:extLst>
+              <a:ext uri="{909E8E84-426E-40DD-AFC4-6F175D3DCCD1}">
+                <a14:hiddenFill xmlns:a14="http://schemas.microsoft.com/office/drawing/2010/main">
+                  <a:solidFill>
+                    <a:srgbClr val="FFFFFF"/>
+                  </a:solidFill>
+                </a14:hiddenFill>
+              </a:ext>
+            </a:extLst>
+          </p:spPr>
+        </p:pic>
+        <p:pic>
+          <p:nvPicPr>
+            <p:cNvPr id="7172" name="Picture 4" descr="Scatter Plot of Imbalanced Binary Classification Problem Transformed by SMOTE">
+              <a:extLst>
+                <a:ext uri="{FF2B5EF4-FFF2-40B4-BE49-F238E27FC236}">
+                  <a16:creationId xmlns:a16="http://schemas.microsoft.com/office/drawing/2014/main" id="{643764D6-5ED1-471D-9645-0C61582470FF}"/>
+                </a:ext>
+              </a:extLst>
+            </p:cNvPr>
+            <p:cNvPicPr>
+              <a:picLocks noChangeAspect="1" noChangeArrowheads="1"/>
+            </p:cNvPicPr>
+            <p:nvPr/>
+          </p:nvPicPr>
+          <p:blipFill rotWithShape="1">
+            <a:blip r:embed="rId3">
+              <a:extLst>
+                <a:ext uri="{28A0092B-C50C-407E-A947-70E740481C1C}">
+                  <a14:useLocalDpi xmlns:a14="http://schemas.microsoft.com/office/drawing/2010/main" val="0"/>
+                </a:ext>
+              </a:extLst>
+            </a:blip>
+            <a:srcRect l="5293" t="10194" r="8372" b="5117"/>
+            <a:stretch/>
+          </p:blipFill>
+          <p:spPr bwMode="auto">
+            <a:xfrm>
+              <a:off x="6342679" y="3668184"/>
+              <a:ext cx="2843939" cy="2092271"/>
+            </a:xfrm>
+            <a:prstGeom prst="rect">
+              <a:avLst/>
+            </a:prstGeom>
+            <a:noFill/>
+            <a:extLst>
+              <a:ext uri="{909E8E84-426E-40DD-AFC4-6F175D3DCCD1}">
+                <a14:hiddenFill xmlns:a14="http://schemas.microsoft.com/office/drawing/2010/main">
+                  <a:solidFill>
+                    <a:srgbClr val="FFFFFF"/>
+                  </a:solidFill>
+                </a14:hiddenFill>
+              </a:ext>
+            </a:extLst>
+          </p:spPr>
+        </p:pic>
+      </p:grpSp>
+    </p:spTree>
+    <p:extLst>
+      <p:ext uri="{BB962C8B-B14F-4D97-AF65-F5344CB8AC3E}">
+        <p14:creationId xmlns:p14="http://schemas.microsoft.com/office/powerpoint/2010/main" val="3388842812"/>
+      </p:ext>
+    </p:extLst>
+  </p:cSld>
+  <p:clrMapOvr>
+    <a:masterClrMapping/>
+  </p:clrMapOvr>
+</p:sld>
+</file>
+
+<file path=ppt/slides/slide11.xml><?xml version="1.0" encoding="utf-8"?>
+<p:sld xmlns:a="http://schemas.openxmlformats.org/drawingml/2006/main" xmlns:r="http://schemas.openxmlformats.org/officeDocument/2006/relationships" xmlns:p="http://schemas.openxmlformats.org/presentationml/2006/main">
+  <p:cSld>
+    <p:spTree>
+      <p:nvGrpSpPr>
+        <p:cNvPr id="1" name=""/>
+        <p:cNvGrpSpPr/>
+        <p:nvPr/>
+      </p:nvGrpSpPr>
+      <p:grpSpPr>
+        <a:xfrm>
+          <a:off x="0" y="0"/>
+          <a:ext cx="0" cy="0"/>
+          <a:chOff x="0" y="0"/>
+          <a:chExt cx="0" cy="0"/>
+        </a:xfrm>
+      </p:grpSpPr>
+      <p:sp>
+        <p:nvSpPr>
+          <p:cNvPr id="2" name="Title 1">
+            <a:extLst>
+              <a:ext uri="{FF2B5EF4-FFF2-40B4-BE49-F238E27FC236}">
+                <a16:creationId xmlns:a16="http://schemas.microsoft.com/office/drawing/2014/main" id="{EC59E325-80FF-4919-967E-554E4031AF7F}"/>
+              </a:ext>
+            </a:extLst>
+          </p:cNvPr>
+          <p:cNvSpPr>
+            <a:spLocks noGrp="1"/>
+          </p:cNvSpPr>
+          <p:nvPr>
+            <p:ph type="title"/>
+          </p:nvPr>
+        </p:nvSpPr>
+        <p:spPr/>
+        <p:txBody>
+          <a:bodyPr/>
+          <a:lstStyle/>
+          <a:p>
+            <a:r>
+              <a:rPr lang="en-US" dirty="0"/>
+              <a:t>Class Imbalance and Resampling</a:t>
+            </a:r>
+          </a:p>
+        </p:txBody>
+      </p:sp>
+      <p:grpSp>
+        <p:nvGrpSpPr>
+          <p:cNvPr id="5" name="Group 4">
+            <a:extLst>
+              <a:ext uri="{FF2B5EF4-FFF2-40B4-BE49-F238E27FC236}">
+                <a16:creationId xmlns:a16="http://schemas.microsoft.com/office/drawing/2014/main" id="{6A831111-4365-49EF-A41A-E6CF3719AA54}"/>
+              </a:ext>
+            </a:extLst>
+          </p:cNvPr>
+          <p:cNvGrpSpPr/>
+          <p:nvPr/>
+        </p:nvGrpSpPr>
+        <p:grpSpPr>
+          <a:xfrm>
+            <a:off x="1656136" y="1440873"/>
+            <a:ext cx="8879727" cy="5250874"/>
+            <a:chOff x="6363854" y="3318925"/>
+            <a:chExt cx="5650580" cy="3440926"/>
+          </a:xfrm>
+        </p:grpSpPr>
+        <p:pic>
+          <p:nvPicPr>
+            <p:cNvPr id="6" name="Picture 5">
+              <a:extLst>
+                <a:ext uri="{FF2B5EF4-FFF2-40B4-BE49-F238E27FC236}">
+                  <a16:creationId xmlns:a16="http://schemas.microsoft.com/office/drawing/2014/main" id="{48157DBF-C01E-4B87-9AF4-701D9F777B57}"/>
+                </a:ext>
+              </a:extLst>
+            </p:cNvPr>
+            <p:cNvPicPr>
+              <a:picLocks noChangeAspect="1"/>
+            </p:cNvPicPr>
+            <p:nvPr/>
+          </p:nvPicPr>
+          <p:blipFill rotWithShape="1">
+            <a:blip r:embed="rId2"/>
+            <a:srcRect t="7118"/>
+            <a:stretch/>
+          </p:blipFill>
+          <p:spPr>
+            <a:xfrm>
+              <a:off x="6363854" y="3318925"/>
+              <a:ext cx="5650580" cy="1719072"/>
+            </a:xfrm>
+            <a:prstGeom prst="rect">
+              <a:avLst/>
+            </a:prstGeom>
+          </p:spPr>
+        </p:pic>
+        <p:pic>
+          <p:nvPicPr>
+            <p:cNvPr id="7" name="Picture 6">
+              <a:extLst>
+                <a:ext uri="{FF2B5EF4-FFF2-40B4-BE49-F238E27FC236}">
+                  <a16:creationId xmlns:a16="http://schemas.microsoft.com/office/drawing/2014/main" id="{5F130F86-D6C1-40A5-83D6-3AE9E3070722}"/>
+                </a:ext>
+              </a:extLst>
+            </p:cNvPr>
+            <p:cNvPicPr>
+              <a:picLocks noChangeAspect="1"/>
+            </p:cNvPicPr>
+            <p:nvPr/>
+          </p:nvPicPr>
+          <p:blipFill rotWithShape="1">
+            <a:blip r:embed="rId3"/>
+            <a:srcRect t="6317"/>
+            <a:stretch/>
+          </p:blipFill>
+          <p:spPr>
+            <a:xfrm>
+              <a:off x="6383501" y="5037997"/>
+              <a:ext cx="5611287" cy="1721854"/>
+            </a:xfrm>
+            <a:prstGeom prst="rect">
+              <a:avLst/>
+            </a:prstGeom>
+          </p:spPr>
+        </p:pic>
+      </p:grpSp>
+    </p:spTree>
+    <p:extLst>
+      <p:ext uri="{BB962C8B-B14F-4D97-AF65-F5344CB8AC3E}">
+        <p14:creationId xmlns:p14="http://schemas.microsoft.com/office/powerpoint/2010/main" val="4035389781"/>
+      </p:ext>
+    </p:extLst>
+  </p:cSld>
+  <p:clrMapOvr>
+    <a:masterClrMapping/>
+  </p:clrMapOvr>
+</p:sld>
+</file>
+
+<file path=ppt/slides/slide12.xml><?xml version="1.0" encoding="utf-8"?>
+<p:sld xmlns:a="http://schemas.openxmlformats.org/drawingml/2006/main" xmlns:r="http://schemas.openxmlformats.org/officeDocument/2006/relationships" xmlns:p="http://schemas.openxmlformats.org/presentationml/2006/main">
+  <p:cSld>
+    <p:spTree>
+      <p:nvGrpSpPr>
+        <p:cNvPr id="1" name=""/>
+        <p:cNvGrpSpPr/>
+        <p:nvPr/>
+      </p:nvGrpSpPr>
+      <p:grpSpPr>
+        <a:xfrm>
+          <a:off x="0" y="0"/>
+          <a:ext cx="0" cy="0"/>
+          <a:chOff x="0" y="0"/>
+          <a:chExt cx="0" cy="0"/>
+        </a:xfrm>
+      </p:grpSpPr>
+      <p:sp>
+        <p:nvSpPr>
+          <p:cNvPr id="2" name="Title 1">
+            <a:extLst>
+              <a:ext uri="{FF2B5EF4-FFF2-40B4-BE49-F238E27FC236}">
+                <a16:creationId xmlns:a16="http://schemas.microsoft.com/office/drawing/2014/main" id="{C4ECED8F-9E2F-45E4-88A5-B87FB79C9D5A}"/>
+              </a:ext>
+            </a:extLst>
+          </p:cNvPr>
+          <p:cNvSpPr>
+            <a:spLocks noGrp="1"/>
+          </p:cNvSpPr>
+          <p:nvPr>
+            <p:ph type="title"/>
+          </p:nvPr>
+        </p:nvSpPr>
+        <p:spPr/>
+        <p:txBody>
+          <a:bodyPr/>
+          <a:lstStyle/>
+          <a:p>
+            <a:r>
+              <a:rPr lang="en-US" dirty="0"/>
+              <a:t>Training Models</a:t>
+            </a:r>
+          </a:p>
+        </p:txBody>
+      </p:sp>
+      <p:sp>
+        <p:nvSpPr>
+          <p:cNvPr id="3" name="Content Placeholder 2">
+            <a:extLst>
+              <a:ext uri="{FF2B5EF4-FFF2-40B4-BE49-F238E27FC236}">
+                <a16:creationId xmlns:a16="http://schemas.microsoft.com/office/drawing/2014/main" id="{EB595D6A-3224-4DC4-835A-105B2D9B2AF2}"/>
+              </a:ext>
+            </a:extLst>
+          </p:cNvPr>
+          <p:cNvSpPr>
+            <a:spLocks noGrp="1"/>
+          </p:cNvSpPr>
+          <p:nvPr>
+            <p:ph sz="half" idx="1"/>
+          </p:nvPr>
+        </p:nvSpPr>
+        <p:spPr>
+          <a:xfrm>
+            <a:off x="838200" y="1825624"/>
+            <a:ext cx="5181600" cy="4575175"/>
+          </a:xfrm>
+        </p:spPr>
+        <p:txBody>
+          <a:bodyPr>
+            <a:normAutofit lnSpcReduction="10000"/>
+          </a:bodyPr>
+          <a:lstStyle/>
+          <a:p>
+            <a:pPr>
+              <a:buSzPct val="60000"/>
+              <a:buFont typeface="Wingdings" panose="05000000000000000000" pitchFamily="2" charset="2"/>
+              <a:buChar char="§"/>
+            </a:pPr>
+            <a:r>
+              <a:rPr lang="en-US" sz="3200" dirty="0"/>
+              <a:t>Problem statement</a:t>
+            </a:r>
+          </a:p>
+          <a:p>
+            <a:pPr>
+              <a:buSzPct val="60000"/>
+              <a:buFont typeface="Wingdings" panose="05000000000000000000" pitchFamily="2" charset="2"/>
+              <a:buChar char="§"/>
+            </a:pPr>
+            <a:endParaRPr lang="en-US" sz="3200" dirty="0"/>
+          </a:p>
+          <a:p>
+            <a:pPr>
+              <a:buSzPct val="60000"/>
+              <a:buFont typeface="Wingdings" panose="05000000000000000000" pitchFamily="2" charset="2"/>
+              <a:buChar char="§"/>
+            </a:pPr>
+            <a:endParaRPr lang="en-US" sz="3200" dirty="0"/>
+          </a:p>
+          <a:p>
+            <a:pPr>
+              <a:buSzPct val="60000"/>
+              <a:buFont typeface="Wingdings" panose="05000000000000000000" pitchFamily="2" charset="2"/>
+              <a:buChar char="§"/>
+            </a:pPr>
+            <a:r>
+              <a:rPr lang="en-US" sz="3200" dirty="0"/>
+              <a:t>Training data for learning, test data for evaluating</a:t>
+            </a:r>
+          </a:p>
+          <a:p>
+            <a:pPr>
+              <a:buSzPct val="60000"/>
+              <a:buFont typeface="Wingdings" panose="05000000000000000000" pitchFamily="2" charset="2"/>
+              <a:buChar char="§"/>
+            </a:pPr>
+            <a:endParaRPr lang="en-US" sz="3200" dirty="0"/>
+          </a:p>
+          <a:p>
+            <a:pPr>
+              <a:buSzPct val="60000"/>
+              <a:buFont typeface="Wingdings" panose="05000000000000000000" pitchFamily="2" charset="2"/>
+              <a:buChar char="§"/>
+            </a:pPr>
+            <a:endParaRPr lang="en-US" sz="3200" dirty="0"/>
+          </a:p>
+          <a:p>
+            <a:pPr>
+              <a:buSzPct val="60000"/>
+              <a:buFont typeface="Wingdings" panose="05000000000000000000" pitchFamily="2" charset="2"/>
+              <a:buChar char="§"/>
+            </a:pPr>
+            <a:r>
+              <a:rPr lang="en-US" sz="3200" dirty="0"/>
+              <a:t>Minimizing loss and over/underfitting</a:t>
+            </a:r>
+          </a:p>
+        </p:txBody>
+      </p:sp>
+      <p:pic>
+        <p:nvPicPr>
+          <p:cNvPr id="10242" name="Picture 2" descr="Overfitting and underfitting">
+            <a:extLst>
+              <a:ext uri="{FF2B5EF4-FFF2-40B4-BE49-F238E27FC236}">
+                <a16:creationId xmlns:a16="http://schemas.microsoft.com/office/drawing/2014/main" id="{D25C4C51-BEC0-4285-AF3D-BB4963CB2018}"/>
+              </a:ext>
+            </a:extLst>
+          </p:cNvPr>
+          <p:cNvPicPr>
+            <a:picLocks noChangeAspect="1" noChangeArrowheads="1"/>
+          </p:cNvPicPr>
+          <p:nvPr/>
+        </p:nvPicPr>
+        <p:blipFill>
+          <a:blip r:embed="rId2">
+            <a:extLst>
+              <a:ext uri="{28A0092B-C50C-407E-A947-70E740481C1C}">
+                <a14:useLocalDpi xmlns:a14="http://schemas.microsoft.com/office/drawing/2010/main" val="0"/>
+              </a:ext>
+            </a:extLst>
+          </a:blip>
+          <a:srcRect/>
+          <a:stretch>
+            <a:fillRect/>
+          </a:stretch>
+        </p:blipFill>
+        <p:spPr bwMode="auto">
+          <a:xfrm>
+            <a:off x="5495635" y="4204507"/>
+            <a:ext cx="6287367" cy="2514947"/>
+          </a:xfrm>
+          <a:prstGeom prst="rect">
+            <a:avLst/>
+          </a:prstGeom>
+          <a:noFill/>
+          <a:extLst>
+            <a:ext uri="{909E8E84-426E-40DD-AFC4-6F175D3DCCD1}">
+              <a14:hiddenFill xmlns:a14="http://schemas.microsoft.com/office/drawing/2010/main">
+                <a:solidFill>
+                  <a:srgbClr val="FFFFFF"/>
+                </a:solidFill>
+              </a14:hiddenFill>
+            </a:ext>
+          </a:extLst>
+        </p:spPr>
+      </p:pic>
+      <p:pic>
+        <p:nvPicPr>
+          <p:cNvPr id="10244" name="Picture 4" descr="Data Science Simplified Part 10: An Introduction to Classification Models - Data  Science Central">
+            <a:extLst>
+              <a:ext uri="{FF2B5EF4-FFF2-40B4-BE49-F238E27FC236}">
+                <a16:creationId xmlns:a16="http://schemas.microsoft.com/office/drawing/2014/main" id="{7F3125F1-D319-41DB-AF0B-AB47D31F73AB}"/>
+              </a:ext>
+            </a:extLst>
+          </p:cNvPr>
+          <p:cNvPicPr>
+            <a:picLocks noChangeAspect="1" noChangeArrowheads="1"/>
+          </p:cNvPicPr>
+          <p:nvPr/>
+        </p:nvPicPr>
+        <p:blipFill>
+          <a:blip r:embed="rId3">
+            <a:extLst>
+              <a:ext uri="{28A0092B-C50C-407E-A947-70E740481C1C}">
+                <a14:useLocalDpi xmlns:a14="http://schemas.microsoft.com/office/drawing/2010/main" val="0"/>
+              </a:ext>
+            </a:extLst>
+          </a:blip>
+          <a:srcRect/>
+          <a:stretch>
+            <a:fillRect/>
+          </a:stretch>
+        </p:blipFill>
+        <p:spPr bwMode="auto">
+          <a:xfrm>
+            <a:off x="5794403" y="1027906"/>
+            <a:ext cx="5408540" cy="2715491"/>
+          </a:xfrm>
+          <a:prstGeom prst="rect">
+            <a:avLst/>
+          </a:prstGeom>
+          <a:noFill/>
+          <a:extLst>
+            <a:ext uri="{909E8E84-426E-40DD-AFC4-6F175D3DCCD1}">
+              <a14:hiddenFill xmlns:a14="http://schemas.microsoft.com/office/drawing/2010/main">
+                <a:solidFill>
+                  <a:srgbClr val="FFFFFF"/>
+                </a:solidFill>
+              </a14:hiddenFill>
+            </a:ext>
+          </a:extLst>
+        </p:spPr>
+      </p:pic>
+      <p:sp>
+        <p:nvSpPr>
+          <p:cNvPr id="5" name="TextBox 4">
+            <a:extLst>
+              <a:ext uri="{FF2B5EF4-FFF2-40B4-BE49-F238E27FC236}">
+                <a16:creationId xmlns:a16="http://schemas.microsoft.com/office/drawing/2014/main" id="{7063F507-A5B2-4B75-86BA-0067207B2B55}"/>
+              </a:ext>
+            </a:extLst>
+          </p:cNvPr>
+          <p:cNvSpPr txBox="1"/>
+          <p:nvPr/>
+        </p:nvSpPr>
+        <p:spPr>
+          <a:xfrm>
+            <a:off x="5794403" y="2727702"/>
+            <a:ext cx="962858" cy="253916"/>
+          </a:xfrm>
+          <a:prstGeom prst="rect">
+            <a:avLst/>
+          </a:prstGeom>
+          <a:solidFill>
+            <a:schemeClr val="bg1"/>
+          </a:solidFill>
+        </p:spPr>
+        <p:txBody>
+          <a:bodyPr wrap="square" rtlCol="0">
+            <a:spAutoFit/>
+          </a:bodyPr>
+          <a:lstStyle/>
+          <a:p>
+            <a:r>
+              <a:rPr lang="en-US" sz="1050" dirty="0"/>
+              <a:t>US Population</a:t>
+            </a:r>
+          </a:p>
+        </p:txBody>
+      </p:sp>
+      <p:sp>
+        <p:nvSpPr>
+          <p:cNvPr id="6" name="Trapezoid 5">
+            <a:extLst>
+              <a:ext uri="{FF2B5EF4-FFF2-40B4-BE49-F238E27FC236}">
+                <a16:creationId xmlns:a16="http://schemas.microsoft.com/office/drawing/2014/main" id="{8C928915-A323-4AC3-B2FA-6982BFA2416A}"/>
+              </a:ext>
+            </a:extLst>
+          </p:cNvPr>
+          <p:cNvSpPr/>
+          <p:nvPr/>
+        </p:nvSpPr>
+        <p:spPr>
+          <a:xfrm rot="10800000">
+            <a:off x="9642761" y="2610454"/>
+            <a:ext cx="738910" cy="705384"/>
+          </a:xfrm>
+          <a:prstGeom prst="trapezoid">
+            <a:avLst/>
+          </a:prstGeom>
+          <a:solidFill>
+            <a:srgbClr val="FFFF00"/>
+          </a:solidFill>
+        </p:spPr>
+        <p:style>
+          <a:lnRef idx="2">
+            <a:schemeClr val="accent1">
+              <a:shade val="50000"/>
+            </a:schemeClr>
+          </a:lnRef>
+          <a:fillRef idx="1">
+            <a:schemeClr val="accent1"/>
+          </a:fillRef>
+          <a:effectRef idx="0">
+            <a:schemeClr val="accent1"/>
+          </a:effectRef>
+          <a:fontRef idx="minor">
+            <a:schemeClr val="lt1"/>
+          </a:fontRef>
+        </p:style>
+        <p:txBody>
+          <a:bodyPr wrap="square" rtlCol="0" anchor="ctr"/>
+          <a:lstStyle/>
+          <a:p>
+            <a:pPr algn="ctr"/>
+            <a:endParaRPr lang="en-US" dirty="0">
+              <a:solidFill>
+                <a:schemeClr val="tx1"/>
+              </a:solidFill>
+            </a:endParaRPr>
+          </a:p>
+        </p:txBody>
+      </p:sp>
+      <p:sp>
+        <p:nvSpPr>
+          <p:cNvPr id="9" name="Trapezoid 8">
+            <a:extLst>
+              <a:ext uri="{FF2B5EF4-FFF2-40B4-BE49-F238E27FC236}">
+                <a16:creationId xmlns:a16="http://schemas.microsoft.com/office/drawing/2014/main" id="{8E13F2F3-F600-4534-BC8F-59231F2F97A2}"/>
+              </a:ext>
+            </a:extLst>
+          </p:cNvPr>
+          <p:cNvSpPr/>
+          <p:nvPr/>
+        </p:nvSpPr>
+        <p:spPr>
+          <a:xfrm rot="10800000">
+            <a:off x="9615053" y="1417111"/>
+            <a:ext cx="738910" cy="705384"/>
+          </a:xfrm>
+          <a:prstGeom prst="trapezoid">
+            <a:avLst/>
+          </a:prstGeom>
+          <a:solidFill>
+            <a:srgbClr val="FFFF00"/>
+          </a:solidFill>
+        </p:spPr>
+        <p:style>
+          <a:lnRef idx="2">
+            <a:schemeClr val="accent1">
+              <a:shade val="50000"/>
+            </a:schemeClr>
+          </a:lnRef>
+          <a:fillRef idx="1">
+            <a:schemeClr val="accent1"/>
+          </a:fillRef>
+          <a:effectRef idx="0">
+            <a:schemeClr val="accent1"/>
+          </a:effectRef>
+          <a:fontRef idx="minor">
+            <a:schemeClr val="lt1"/>
+          </a:fontRef>
+        </p:style>
+        <p:txBody>
+          <a:bodyPr wrap="square" rtlCol="0" anchor="ctr"/>
+          <a:lstStyle/>
+          <a:p>
+            <a:pPr algn="ctr"/>
+            <a:endParaRPr lang="en-US" dirty="0">
+              <a:solidFill>
+                <a:schemeClr val="tx1"/>
+              </a:solidFill>
+            </a:endParaRPr>
+          </a:p>
+        </p:txBody>
+      </p:sp>
+      <p:sp>
+        <p:nvSpPr>
+          <p:cNvPr id="7" name="TextBox 6">
+            <a:extLst>
+              <a:ext uri="{FF2B5EF4-FFF2-40B4-BE49-F238E27FC236}">
+                <a16:creationId xmlns:a16="http://schemas.microsoft.com/office/drawing/2014/main" id="{7E32BE16-902A-4414-B85E-72B20489A265}"/>
+              </a:ext>
+            </a:extLst>
+          </p:cNvPr>
+          <p:cNvSpPr txBox="1"/>
+          <p:nvPr/>
+        </p:nvSpPr>
+        <p:spPr>
+          <a:xfrm>
+            <a:off x="9701221" y="1582689"/>
+            <a:ext cx="669765" cy="338554"/>
+          </a:xfrm>
+          <a:prstGeom prst="rect">
+            <a:avLst/>
+          </a:prstGeom>
+          <a:noFill/>
+        </p:spPr>
+        <p:txBody>
+          <a:bodyPr wrap="square" rtlCol="0">
+            <a:spAutoFit/>
+          </a:bodyPr>
+          <a:lstStyle/>
+          <a:p>
+            <a:r>
+              <a:rPr lang="en-US" sz="1600" dirty="0"/>
+              <a:t>≥50k</a:t>
+            </a:r>
+          </a:p>
+        </p:txBody>
+      </p:sp>
+      <p:sp>
+        <p:nvSpPr>
+          <p:cNvPr id="11" name="TextBox 10">
+            <a:extLst>
+              <a:ext uri="{FF2B5EF4-FFF2-40B4-BE49-F238E27FC236}">
+                <a16:creationId xmlns:a16="http://schemas.microsoft.com/office/drawing/2014/main" id="{370690C7-B0F9-47AF-A526-F4BCF8D643BA}"/>
+              </a:ext>
+            </a:extLst>
+          </p:cNvPr>
+          <p:cNvSpPr txBox="1"/>
+          <p:nvPr/>
+        </p:nvSpPr>
+        <p:spPr>
+          <a:xfrm>
+            <a:off x="9710457" y="2799189"/>
+            <a:ext cx="669765" cy="338554"/>
+          </a:xfrm>
+          <a:prstGeom prst="rect">
+            <a:avLst/>
+          </a:prstGeom>
+          <a:noFill/>
+        </p:spPr>
+        <p:txBody>
+          <a:bodyPr wrap="square" rtlCol="0">
+            <a:spAutoFit/>
+          </a:bodyPr>
+          <a:lstStyle/>
+          <a:p>
+            <a:r>
+              <a:rPr lang="en-US" sz="1600" dirty="0"/>
+              <a:t>&lt;50k</a:t>
+            </a:r>
+          </a:p>
+        </p:txBody>
+      </p:sp>
+    </p:spTree>
+    <p:extLst>
+      <p:ext uri="{BB962C8B-B14F-4D97-AF65-F5344CB8AC3E}">
+        <p14:creationId xmlns:p14="http://schemas.microsoft.com/office/powerpoint/2010/main" val="3086848033"/>
+      </p:ext>
+    </p:extLst>
+  </p:cSld>
+  <p:clrMapOvr>
+    <a:masterClrMapping/>
+  </p:clrMapOvr>
+</p:sld>
+</file>
+
+<file path=ppt/slides/slide13.xml><?xml version="1.0" encoding="utf-8"?>
+<p:sld xmlns:a="http://schemas.openxmlformats.org/drawingml/2006/main" xmlns:r="http://schemas.openxmlformats.org/officeDocument/2006/relationships" xmlns:p="http://schemas.openxmlformats.org/presentationml/2006/main">
+  <p:cSld>
+    <p:spTree>
+      <p:nvGrpSpPr>
+        <p:cNvPr id="1" name=""/>
+        <p:cNvGrpSpPr/>
+        <p:nvPr/>
+      </p:nvGrpSpPr>
+      <p:grpSpPr>
+        <a:xfrm>
+          <a:off x="0" y="0"/>
+          <a:ext cx="0" cy="0"/>
+          <a:chOff x="0" y="0"/>
+          <a:chExt cx="0" cy="0"/>
+        </a:xfrm>
+      </p:grpSpPr>
+      <p:sp>
+        <p:nvSpPr>
+          <p:cNvPr id="2" name="Title 1">
+            <a:extLst>
+              <a:ext uri="{FF2B5EF4-FFF2-40B4-BE49-F238E27FC236}">
+                <a16:creationId xmlns:a16="http://schemas.microsoft.com/office/drawing/2014/main" id="{D6076DDB-E44C-4BAB-9988-053CE509CA0A}"/>
+              </a:ext>
+            </a:extLst>
+          </p:cNvPr>
+          <p:cNvSpPr>
+            <a:spLocks noGrp="1"/>
+          </p:cNvSpPr>
+          <p:nvPr>
+            <p:ph type="title"/>
+          </p:nvPr>
+        </p:nvSpPr>
+        <p:spPr/>
+        <p:txBody>
+          <a:bodyPr/>
+          <a:lstStyle/>
+          <a:p>
+            <a:r>
+              <a:rPr lang="en-US" dirty="0"/>
+              <a:t>Cross Validation</a:t>
+            </a:r>
+          </a:p>
+        </p:txBody>
+      </p:sp>
+      <p:sp>
+        <p:nvSpPr>
+          <p:cNvPr id="3" name="Content Placeholder 2">
+            <a:extLst>
+              <a:ext uri="{FF2B5EF4-FFF2-40B4-BE49-F238E27FC236}">
+                <a16:creationId xmlns:a16="http://schemas.microsoft.com/office/drawing/2014/main" id="{67CD7375-A40C-44DD-BD3C-2E8B866E7568}"/>
+              </a:ext>
+            </a:extLst>
+          </p:cNvPr>
+          <p:cNvSpPr>
+            <a:spLocks noGrp="1"/>
+          </p:cNvSpPr>
+          <p:nvPr>
+            <p:ph sz="half" idx="1"/>
+          </p:nvPr>
+        </p:nvSpPr>
+        <p:spPr/>
+        <p:txBody>
+          <a:bodyPr/>
+          <a:lstStyle/>
+          <a:p>
+            <a:endParaRPr lang="en-US" dirty="0"/>
+          </a:p>
+        </p:txBody>
+      </p:sp>
+      <p:pic>
+        <p:nvPicPr>
+          <p:cNvPr id="8194" name="Picture 2" descr="Nested Cross-Validation Python Code">
+            <a:extLst>
+              <a:ext uri="{FF2B5EF4-FFF2-40B4-BE49-F238E27FC236}">
+                <a16:creationId xmlns:a16="http://schemas.microsoft.com/office/drawing/2014/main" id="{E460A03E-B068-4D98-834D-860F57672D8F}"/>
+              </a:ext>
+            </a:extLst>
+          </p:cNvPr>
+          <p:cNvPicPr>
+            <a:picLocks noChangeAspect="1" noChangeArrowheads="1"/>
+          </p:cNvPicPr>
+          <p:nvPr/>
+        </p:nvPicPr>
+        <p:blipFill>
+          <a:blip r:embed="rId2">
+            <a:extLst>
+              <a:ext uri="{28A0092B-C50C-407E-A947-70E740481C1C}">
+                <a14:useLocalDpi xmlns:a14="http://schemas.microsoft.com/office/drawing/2010/main" val="0"/>
+              </a:ext>
+            </a:extLst>
+          </a:blip>
+          <a:srcRect/>
+          <a:stretch>
+            <a:fillRect/>
+          </a:stretch>
+        </p:blipFill>
+        <p:spPr bwMode="auto">
+          <a:xfrm>
+            <a:off x="6249489" y="2152073"/>
+            <a:ext cx="5813201" cy="3196504"/>
+          </a:xfrm>
+          <a:prstGeom prst="rect">
+            <a:avLst/>
+          </a:prstGeom>
+          <a:noFill/>
+          <a:extLst>
+            <a:ext uri="{909E8E84-426E-40DD-AFC4-6F175D3DCCD1}">
+              <a14:hiddenFill xmlns:a14="http://schemas.microsoft.com/office/drawing/2010/main">
+                <a:solidFill>
+                  <a:srgbClr val="FFFFFF"/>
+                </a:solidFill>
+              </a14:hiddenFill>
+            </a:ext>
+          </a:extLst>
+        </p:spPr>
+      </p:pic>
+    </p:spTree>
+    <p:extLst>
+      <p:ext uri="{BB962C8B-B14F-4D97-AF65-F5344CB8AC3E}">
+        <p14:creationId xmlns:p14="http://schemas.microsoft.com/office/powerpoint/2010/main" val="2436664017"/>
+      </p:ext>
+    </p:extLst>
+  </p:cSld>
+  <p:clrMapOvr>
+    <a:masterClrMapping/>
+  </p:clrMapOvr>
+</p:sld>
+</file>
+
+<file path=ppt/slides/slide14.xml><?xml version="1.0" encoding="utf-8"?>
+<p:sld xmlns:a="http://schemas.openxmlformats.org/drawingml/2006/main" xmlns:r="http://schemas.openxmlformats.org/officeDocument/2006/relationships" xmlns:p="http://schemas.openxmlformats.org/presentationml/2006/main">
+  <p:cSld>
+    <p:spTree>
+      <p:nvGrpSpPr>
+        <p:cNvPr id="1" name=""/>
+        <p:cNvGrpSpPr/>
+        <p:nvPr/>
+      </p:nvGrpSpPr>
+      <p:grpSpPr>
+        <a:xfrm>
+          <a:off x="0" y="0"/>
+          <a:ext cx="0" cy="0"/>
+          <a:chOff x="0" y="0"/>
+          <a:chExt cx="0" cy="0"/>
+        </a:xfrm>
+      </p:grpSpPr>
+      <p:sp>
+        <p:nvSpPr>
+          <p:cNvPr id="2" name="Title 1">
+            <a:extLst>
+              <a:ext uri="{FF2B5EF4-FFF2-40B4-BE49-F238E27FC236}">
+                <a16:creationId xmlns:a16="http://schemas.microsoft.com/office/drawing/2014/main" id="{9C5DEF9C-EAEE-4F6D-AF9E-13B5DAB395AF}"/>
+              </a:ext>
+            </a:extLst>
+          </p:cNvPr>
+          <p:cNvSpPr>
+            <a:spLocks noGrp="1"/>
+          </p:cNvSpPr>
+          <p:nvPr>
+            <p:ph type="title"/>
+          </p:nvPr>
+        </p:nvSpPr>
+        <p:spPr/>
+        <p:txBody>
+          <a:bodyPr/>
+          <a:lstStyle/>
+          <a:p>
+            <a:r>
+              <a:rPr lang="en-US" dirty="0"/>
+              <a:t>Evaluating Algorithms</a:t>
+            </a:r>
+          </a:p>
+        </p:txBody>
+      </p:sp>
+      <p:sp>
+        <p:nvSpPr>
+          <p:cNvPr id="3" name="Content Placeholder 2">
+            <a:extLst>
+              <a:ext uri="{FF2B5EF4-FFF2-40B4-BE49-F238E27FC236}">
+                <a16:creationId xmlns:a16="http://schemas.microsoft.com/office/drawing/2014/main" id="{AF7ABAAD-38E0-4C5E-BC12-E39F5347176B}"/>
+              </a:ext>
+            </a:extLst>
+          </p:cNvPr>
+          <p:cNvSpPr>
+            <a:spLocks noGrp="1"/>
+          </p:cNvSpPr>
+          <p:nvPr>
+            <p:ph sz="half" idx="1"/>
+          </p:nvPr>
+        </p:nvSpPr>
+        <p:spPr/>
+        <p:txBody>
+          <a:bodyPr/>
+          <a:lstStyle/>
+          <a:p>
+            <a:endParaRPr lang="en-US"/>
+          </a:p>
+        </p:txBody>
+      </p:sp>
+      <p:sp>
+        <p:nvSpPr>
+          <p:cNvPr id="4" name="Content Placeholder 3">
+            <a:extLst>
+              <a:ext uri="{FF2B5EF4-FFF2-40B4-BE49-F238E27FC236}">
+                <a16:creationId xmlns:a16="http://schemas.microsoft.com/office/drawing/2014/main" id="{D9C56FD0-CDE9-4CB8-92B4-320B6A1FB23F}"/>
+              </a:ext>
+            </a:extLst>
+          </p:cNvPr>
+          <p:cNvSpPr>
+            <a:spLocks noGrp="1"/>
+          </p:cNvSpPr>
+          <p:nvPr>
+            <p:ph sz="half" idx="2"/>
+          </p:nvPr>
+        </p:nvSpPr>
+        <p:spPr/>
+        <p:txBody>
+          <a:bodyPr/>
+          <a:lstStyle/>
+          <a:p>
+            <a:endParaRPr lang="en-US" dirty="0"/>
+          </a:p>
+        </p:txBody>
+      </p:sp>
+    </p:spTree>
+    <p:extLst>
+      <p:ext uri="{BB962C8B-B14F-4D97-AF65-F5344CB8AC3E}">
+        <p14:creationId xmlns:p14="http://schemas.microsoft.com/office/powerpoint/2010/main" val="3401225847"/>
       </p:ext>
     </p:extLst>
   </p:cSld>
@@ -3517,6 +4626,1577 @@
     <p:extLst>
       <p:ext uri="{BB962C8B-B14F-4D97-AF65-F5344CB8AC3E}">
         <p14:creationId xmlns:p14="http://schemas.microsoft.com/office/powerpoint/2010/main" val="3975502519"/>
+      </p:ext>
+    </p:extLst>
+  </p:cSld>
+  <p:clrMapOvr>
+    <a:masterClrMapping/>
+  </p:clrMapOvr>
+</p:sld>
+</file>
+
+<file path=ppt/slides/slide3.xml><?xml version="1.0" encoding="utf-8"?>
+<p:sld xmlns:a="http://schemas.openxmlformats.org/drawingml/2006/main" xmlns:r="http://schemas.openxmlformats.org/officeDocument/2006/relationships" xmlns:p="http://schemas.openxmlformats.org/presentationml/2006/main">
+  <p:cSld>
+    <p:spTree>
+      <p:nvGrpSpPr>
+        <p:cNvPr id="1" name=""/>
+        <p:cNvGrpSpPr/>
+        <p:nvPr/>
+      </p:nvGrpSpPr>
+      <p:grpSpPr>
+        <a:xfrm>
+          <a:off x="0" y="0"/>
+          <a:ext cx="0" cy="0"/>
+          <a:chOff x="0" y="0"/>
+          <a:chExt cx="0" cy="0"/>
+        </a:xfrm>
+      </p:grpSpPr>
+      <p:sp>
+        <p:nvSpPr>
+          <p:cNvPr id="2" name="Title 1">
+            <a:extLst>
+              <a:ext uri="{FF2B5EF4-FFF2-40B4-BE49-F238E27FC236}">
+                <a16:creationId xmlns:a16="http://schemas.microsoft.com/office/drawing/2014/main" id="{3504E300-5C27-4433-B42C-97328405946E}"/>
+              </a:ext>
+            </a:extLst>
+          </p:cNvPr>
+          <p:cNvSpPr>
+            <a:spLocks noGrp="1"/>
+          </p:cNvSpPr>
+          <p:nvPr>
+            <p:ph type="title"/>
+          </p:nvPr>
+        </p:nvSpPr>
+        <p:spPr/>
+        <p:txBody>
+          <a:bodyPr/>
+          <a:lstStyle/>
+          <a:p>
+            <a:r>
+              <a:rPr lang="en-US" dirty="0"/>
+              <a:t>Regression, Classification, and Clustering</a:t>
+            </a:r>
+          </a:p>
+        </p:txBody>
+      </p:sp>
+      <p:sp>
+        <p:nvSpPr>
+          <p:cNvPr id="4" name="Content Placeholder 3">
+            <a:extLst>
+              <a:ext uri="{FF2B5EF4-FFF2-40B4-BE49-F238E27FC236}">
+                <a16:creationId xmlns:a16="http://schemas.microsoft.com/office/drawing/2014/main" id="{E1DC395D-A64C-452D-B6FF-1609AC110218}"/>
+              </a:ext>
+            </a:extLst>
+          </p:cNvPr>
+          <p:cNvSpPr>
+            <a:spLocks noGrp="1"/>
+          </p:cNvSpPr>
+          <p:nvPr>
+            <p:ph sz="half" idx="1"/>
+          </p:nvPr>
+        </p:nvSpPr>
+        <p:spPr>
+          <a:xfrm>
+            <a:off x="838199" y="1825625"/>
+            <a:ext cx="6144491" cy="4351338"/>
+          </a:xfrm>
+        </p:spPr>
+        <p:txBody>
+          <a:bodyPr>
+            <a:normAutofit/>
+          </a:bodyPr>
+          <a:lstStyle/>
+          <a:p>
+            <a:pPr>
+              <a:buSzPct val="60000"/>
+              <a:buFont typeface="Wingdings" panose="05000000000000000000" pitchFamily="2" charset="2"/>
+              <a:buChar char="§"/>
+            </a:pPr>
+            <a:r>
+              <a:rPr lang="en-US" sz="3600" dirty="0"/>
+              <a:t>Predict a numerical output</a:t>
+            </a:r>
+          </a:p>
+          <a:p>
+            <a:pPr>
+              <a:buSzPct val="60000"/>
+              <a:buFont typeface="Wingdings" panose="05000000000000000000" pitchFamily="2" charset="2"/>
+              <a:buChar char="§"/>
+            </a:pPr>
+            <a:endParaRPr lang="en-US" sz="3600" dirty="0"/>
+          </a:p>
+          <a:p>
+            <a:pPr>
+              <a:buSzPct val="60000"/>
+              <a:buFont typeface="Wingdings" panose="05000000000000000000" pitchFamily="2" charset="2"/>
+              <a:buChar char="§"/>
+            </a:pPr>
+            <a:endParaRPr lang="en-US" sz="3600" dirty="0"/>
+          </a:p>
+          <a:p>
+            <a:pPr>
+              <a:buSzPct val="60000"/>
+              <a:buFont typeface="Wingdings" panose="05000000000000000000" pitchFamily="2" charset="2"/>
+              <a:buChar char="§"/>
+            </a:pPr>
+            <a:r>
+              <a:rPr lang="en-US" sz="3600" dirty="0"/>
+              <a:t>Predict the class of a sample</a:t>
+            </a:r>
+          </a:p>
+          <a:p>
+            <a:pPr>
+              <a:buSzPct val="60000"/>
+              <a:buFont typeface="Wingdings" panose="05000000000000000000" pitchFamily="2" charset="2"/>
+              <a:buChar char="§"/>
+            </a:pPr>
+            <a:endParaRPr lang="en-US" sz="3600" dirty="0"/>
+          </a:p>
+          <a:p>
+            <a:pPr>
+              <a:buSzPct val="60000"/>
+              <a:buFont typeface="Wingdings" panose="05000000000000000000" pitchFamily="2" charset="2"/>
+              <a:buChar char="§"/>
+            </a:pPr>
+            <a:endParaRPr lang="en-US" sz="3600" dirty="0"/>
+          </a:p>
+          <a:p>
+            <a:pPr>
+              <a:buSzPct val="60000"/>
+              <a:buFont typeface="Wingdings" panose="05000000000000000000" pitchFamily="2" charset="2"/>
+              <a:buChar char="§"/>
+            </a:pPr>
+            <a:r>
+              <a:rPr lang="en-US" sz="3600" dirty="0"/>
+              <a:t>Create groupings of samples</a:t>
+            </a:r>
+          </a:p>
+        </p:txBody>
+      </p:sp>
+      <p:pic>
+        <p:nvPicPr>
+          <p:cNvPr id="1026" name="Picture 2" descr="In Depth Linear Regression. Understanding Algorithms starting with… | by  Mandy Gu | Towards Data Science">
+            <a:extLst>
+              <a:ext uri="{FF2B5EF4-FFF2-40B4-BE49-F238E27FC236}">
+                <a16:creationId xmlns:a16="http://schemas.microsoft.com/office/drawing/2014/main" id="{918CF61D-5FB0-41E0-9DAD-697F86AA54F9}"/>
+              </a:ext>
+            </a:extLst>
+          </p:cNvPr>
+          <p:cNvPicPr>
+            <a:picLocks noChangeAspect="1" noChangeArrowheads="1"/>
+          </p:cNvPicPr>
+          <p:nvPr/>
+        </p:nvPicPr>
+        <p:blipFill>
+          <a:blip r:embed="rId2">
+            <a:extLst>
+              <a:ext uri="{28A0092B-C50C-407E-A947-70E740481C1C}">
+                <a14:useLocalDpi xmlns:a14="http://schemas.microsoft.com/office/drawing/2010/main" val="0"/>
+              </a:ext>
+            </a:extLst>
+          </a:blip>
+          <a:srcRect/>
+          <a:stretch>
+            <a:fillRect/>
+          </a:stretch>
+        </p:blipFill>
+        <p:spPr bwMode="auto">
+          <a:xfrm>
+            <a:off x="6837220" y="1476769"/>
+            <a:ext cx="2953201" cy="1952231"/>
+          </a:xfrm>
+          <a:prstGeom prst="rect">
+            <a:avLst/>
+          </a:prstGeom>
+          <a:noFill/>
+          <a:extLst>
+            <a:ext uri="{909E8E84-426E-40DD-AFC4-6F175D3DCCD1}">
+              <a14:hiddenFill xmlns:a14="http://schemas.microsoft.com/office/drawing/2010/main">
+                <a:solidFill>
+                  <a:srgbClr val="FFFFFF"/>
+                </a:solidFill>
+              </a14:hiddenFill>
+            </a:ext>
+          </a:extLst>
+        </p:spPr>
+      </p:pic>
+      <p:pic>
+        <p:nvPicPr>
+          <p:cNvPr id="1028" name="Picture 4" descr="Understanding Data Science Classification Metrics in Scikit-Learn in Python  | by Andrew Long | Towards Data Science">
+            <a:extLst>
+              <a:ext uri="{FF2B5EF4-FFF2-40B4-BE49-F238E27FC236}">
+                <a16:creationId xmlns:a16="http://schemas.microsoft.com/office/drawing/2014/main" id="{F16C556A-5E3D-4179-B153-A6E0652C2B02}"/>
+              </a:ext>
+            </a:extLst>
+          </p:cNvPr>
+          <p:cNvPicPr>
+            <a:picLocks noChangeAspect="1" noChangeArrowheads="1"/>
+          </p:cNvPicPr>
+          <p:nvPr/>
+        </p:nvPicPr>
+        <p:blipFill>
+          <a:blip r:embed="rId3">
+            <a:extLst>
+              <a:ext uri="{28A0092B-C50C-407E-A947-70E740481C1C}">
+                <a14:useLocalDpi xmlns:a14="http://schemas.microsoft.com/office/drawing/2010/main" val="0"/>
+              </a:ext>
+            </a:extLst>
+          </a:blip>
+          <a:srcRect/>
+          <a:stretch>
+            <a:fillRect/>
+          </a:stretch>
+        </p:blipFill>
+        <p:spPr bwMode="auto">
+          <a:xfrm>
+            <a:off x="9830217" y="3128614"/>
+            <a:ext cx="2361783" cy="2147076"/>
+          </a:xfrm>
+          <a:prstGeom prst="rect">
+            <a:avLst/>
+          </a:prstGeom>
+          <a:noFill/>
+          <a:extLst>
+            <a:ext uri="{909E8E84-426E-40DD-AFC4-6F175D3DCCD1}">
+              <a14:hiddenFill xmlns:a14="http://schemas.microsoft.com/office/drawing/2010/main">
+                <a:solidFill>
+                  <a:srgbClr val="FFFFFF"/>
+                </a:solidFill>
+              </a14:hiddenFill>
+            </a:ext>
+          </a:extLst>
+        </p:spPr>
+      </p:pic>
+      <p:pic>
+        <p:nvPicPr>
+          <p:cNvPr id="1030" name="Picture 6" descr="KMeans Clustering for Classification | by Mudassir Khan | Towards Data  Science">
+            <a:extLst>
+              <a:ext uri="{FF2B5EF4-FFF2-40B4-BE49-F238E27FC236}">
+                <a16:creationId xmlns:a16="http://schemas.microsoft.com/office/drawing/2014/main" id="{E9EAE6CD-15BD-45C4-AE94-287748FAF04D}"/>
+              </a:ext>
+            </a:extLst>
+          </p:cNvPr>
+          <p:cNvPicPr>
+            <a:picLocks noChangeAspect="1" noChangeArrowheads="1"/>
+          </p:cNvPicPr>
+          <p:nvPr/>
+        </p:nvPicPr>
+        <p:blipFill>
+          <a:blip r:embed="rId4">
+            <a:extLst>
+              <a:ext uri="{28A0092B-C50C-407E-A947-70E740481C1C}">
+                <a14:useLocalDpi xmlns:a14="http://schemas.microsoft.com/office/drawing/2010/main" val="0"/>
+              </a:ext>
+            </a:extLst>
+          </a:blip>
+          <a:srcRect/>
+          <a:stretch>
+            <a:fillRect/>
+          </a:stretch>
+        </p:blipFill>
+        <p:spPr bwMode="auto">
+          <a:xfrm>
+            <a:off x="6650857" y="4780458"/>
+            <a:ext cx="3471397" cy="1952231"/>
+          </a:xfrm>
+          <a:prstGeom prst="rect">
+            <a:avLst/>
+          </a:prstGeom>
+          <a:noFill/>
+          <a:extLst>
+            <a:ext uri="{909E8E84-426E-40DD-AFC4-6F175D3DCCD1}">
+              <a14:hiddenFill xmlns:a14="http://schemas.microsoft.com/office/drawing/2010/main">
+                <a:solidFill>
+                  <a:srgbClr val="FFFFFF"/>
+                </a:solidFill>
+              </a14:hiddenFill>
+            </a:ext>
+          </a:extLst>
+        </p:spPr>
+      </p:pic>
+    </p:spTree>
+    <p:extLst>
+      <p:ext uri="{BB962C8B-B14F-4D97-AF65-F5344CB8AC3E}">
+        <p14:creationId xmlns:p14="http://schemas.microsoft.com/office/powerpoint/2010/main" val="377983896"/>
+      </p:ext>
+    </p:extLst>
+  </p:cSld>
+  <p:clrMapOvr>
+    <a:masterClrMapping/>
+  </p:clrMapOvr>
+</p:sld>
+</file>
+
+<file path=ppt/slides/slide4.xml><?xml version="1.0" encoding="utf-8"?>
+<p:sld xmlns:a="http://schemas.openxmlformats.org/drawingml/2006/main" xmlns:r="http://schemas.openxmlformats.org/officeDocument/2006/relationships" xmlns:p="http://schemas.openxmlformats.org/presentationml/2006/main">
+  <p:cSld>
+    <p:spTree>
+      <p:nvGrpSpPr>
+        <p:cNvPr id="1" name=""/>
+        <p:cNvGrpSpPr/>
+        <p:nvPr/>
+      </p:nvGrpSpPr>
+      <p:grpSpPr>
+        <a:xfrm>
+          <a:off x="0" y="0"/>
+          <a:ext cx="0" cy="0"/>
+          <a:chOff x="0" y="0"/>
+          <a:chExt cx="0" cy="0"/>
+        </a:xfrm>
+      </p:grpSpPr>
+      <p:sp>
+        <p:nvSpPr>
+          <p:cNvPr id="2" name="Title 1">
+            <a:extLst>
+              <a:ext uri="{FF2B5EF4-FFF2-40B4-BE49-F238E27FC236}">
+                <a16:creationId xmlns:a16="http://schemas.microsoft.com/office/drawing/2014/main" id="{FDE775D4-BE99-4ECB-982E-FF1D2893F96C}"/>
+              </a:ext>
+            </a:extLst>
+          </p:cNvPr>
+          <p:cNvSpPr>
+            <a:spLocks noGrp="1"/>
+          </p:cNvSpPr>
+          <p:nvPr>
+            <p:ph type="title"/>
+          </p:nvPr>
+        </p:nvSpPr>
+        <p:spPr/>
+        <p:txBody>
+          <a:bodyPr/>
+          <a:lstStyle/>
+          <a:p>
+            <a:r>
+              <a:rPr lang="en-US" dirty="0"/>
+              <a:t>Supervised Learning = “Humanistic” Learning</a:t>
+            </a:r>
+          </a:p>
+        </p:txBody>
+      </p:sp>
+      <p:grpSp>
+        <p:nvGrpSpPr>
+          <p:cNvPr id="8" name="Group 7">
+            <a:extLst>
+              <a:ext uri="{FF2B5EF4-FFF2-40B4-BE49-F238E27FC236}">
+                <a16:creationId xmlns:a16="http://schemas.microsoft.com/office/drawing/2014/main" id="{8DEBBFB5-84AA-4C22-8A04-43E53B7819C7}"/>
+              </a:ext>
+            </a:extLst>
+          </p:cNvPr>
+          <p:cNvGrpSpPr/>
+          <p:nvPr/>
+        </p:nvGrpSpPr>
+        <p:grpSpPr>
+          <a:xfrm>
+            <a:off x="2223433" y="1844346"/>
+            <a:ext cx="7745133" cy="4307073"/>
+            <a:chOff x="1727619" y="1844346"/>
+            <a:chExt cx="7309157" cy="4151207"/>
+          </a:xfrm>
+        </p:grpSpPr>
+        <p:pic>
+          <p:nvPicPr>
+            <p:cNvPr id="2050" name="Picture 2" descr="Examples of 2s in the MNIST database (first 100 examples). Note, the... |  Download Scientific Diagram">
+              <a:extLst>
+                <a:ext uri="{FF2B5EF4-FFF2-40B4-BE49-F238E27FC236}">
+                  <a16:creationId xmlns:a16="http://schemas.microsoft.com/office/drawing/2014/main" id="{B0839423-FCC4-4F46-8687-1A91EA191C76}"/>
+                </a:ext>
+              </a:extLst>
+            </p:cNvPr>
+            <p:cNvPicPr>
+              <a:picLocks noChangeAspect="1" noChangeArrowheads="1"/>
+            </p:cNvPicPr>
+            <p:nvPr/>
+          </p:nvPicPr>
+          <p:blipFill>
+            <a:blip r:embed="rId2">
+              <a:extLst>
+                <a:ext uri="{28A0092B-C50C-407E-A947-70E740481C1C}">
+                  <a14:useLocalDpi xmlns:a14="http://schemas.microsoft.com/office/drawing/2010/main" val="0"/>
+                </a:ext>
+              </a:extLst>
+            </a:blip>
+            <a:srcRect/>
+            <a:stretch>
+              <a:fillRect/>
+            </a:stretch>
+          </p:blipFill>
+          <p:spPr bwMode="auto">
+            <a:xfrm>
+              <a:off x="1727619" y="1844346"/>
+              <a:ext cx="4151207" cy="4151207"/>
+            </a:xfrm>
+            <a:prstGeom prst="rect">
+              <a:avLst/>
+            </a:prstGeom>
+            <a:noFill/>
+            <a:extLst>
+              <a:ext uri="{909E8E84-426E-40DD-AFC4-6F175D3DCCD1}">
+                <a14:hiddenFill xmlns:a14="http://schemas.microsoft.com/office/drawing/2010/main">
+                  <a:solidFill>
+                    <a:srgbClr val="FFFFFF"/>
+                  </a:solidFill>
+                </a14:hiddenFill>
+              </a:ext>
+            </a:extLst>
+          </p:spPr>
+        </p:pic>
+        <p:pic>
+          <p:nvPicPr>
+            <p:cNvPr id="2052" name="Picture 4" descr="Visualizing MNIST: An Exploration of Dimensionality Reduction - colah&amp;#39;s blog">
+              <a:extLst>
+                <a:ext uri="{FF2B5EF4-FFF2-40B4-BE49-F238E27FC236}">
+                  <a16:creationId xmlns:a16="http://schemas.microsoft.com/office/drawing/2014/main" id="{CBDDB1B3-E3AB-4D61-87C8-10C6E4398C76}"/>
+                </a:ext>
+              </a:extLst>
+            </p:cNvPr>
+            <p:cNvPicPr>
+              <a:picLocks noChangeAspect="1" noChangeArrowheads="1"/>
+            </p:cNvPicPr>
+            <p:nvPr/>
+          </p:nvPicPr>
+          <p:blipFill>
+            <a:blip r:embed="rId3">
+              <a:extLst>
+                <a:ext uri="{28A0092B-C50C-407E-A947-70E740481C1C}">
+                  <a14:useLocalDpi xmlns:a14="http://schemas.microsoft.com/office/drawing/2010/main" val="0"/>
+                </a:ext>
+              </a:extLst>
+            </a:blip>
+            <a:srcRect/>
+            <a:stretch>
+              <a:fillRect/>
+            </a:stretch>
+          </p:blipFill>
+          <p:spPr bwMode="auto">
+            <a:xfrm>
+              <a:off x="8118615" y="3457337"/>
+              <a:ext cx="918161" cy="925224"/>
+            </a:xfrm>
+            <a:prstGeom prst="rect">
+              <a:avLst/>
+            </a:prstGeom>
+            <a:noFill/>
+            <a:extLst>
+              <a:ext uri="{909E8E84-426E-40DD-AFC4-6F175D3DCCD1}">
+                <a14:hiddenFill xmlns:a14="http://schemas.microsoft.com/office/drawing/2010/main">
+                  <a:solidFill>
+                    <a:srgbClr val="FFFFFF"/>
+                  </a:solidFill>
+                </a14:hiddenFill>
+              </a:ext>
+            </a:extLst>
+          </p:spPr>
+        </p:pic>
+        <p:sp>
+          <p:nvSpPr>
+            <p:cNvPr id="5" name="Arrow: Right 4">
+              <a:extLst>
+                <a:ext uri="{FF2B5EF4-FFF2-40B4-BE49-F238E27FC236}">
+                  <a16:creationId xmlns:a16="http://schemas.microsoft.com/office/drawing/2014/main" id="{7A187B05-2AEA-4807-81C4-AB957D3E7C29}"/>
+                </a:ext>
+              </a:extLst>
+            </p:cNvPr>
+            <p:cNvSpPr/>
+            <p:nvPr/>
+          </p:nvSpPr>
+          <p:spPr>
+            <a:xfrm>
+              <a:off x="6423069" y="3664319"/>
+              <a:ext cx="1151302" cy="511260"/>
+            </a:xfrm>
+            <a:prstGeom prst="rightArrow">
+              <a:avLst/>
+            </a:prstGeom>
+          </p:spPr>
+          <p:style>
+            <a:lnRef idx="2">
+              <a:schemeClr val="accent1">
+                <a:shade val="50000"/>
+              </a:schemeClr>
+            </a:lnRef>
+            <a:fillRef idx="1">
+              <a:schemeClr val="accent1"/>
+            </a:fillRef>
+            <a:effectRef idx="0">
+              <a:schemeClr val="accent1"/>
+            </a:effectRef>
+            <a:fontRef idx="minor">
+              <a:schemeClr val="lt1"/>
+            </a:fontRef>
+          </p:style>
+          <p:txBody>
+            <a:bodyPr rtlCol="0" anchor="ctr"/>
+            <a:lstStyle/>
+            <a:p>
+              <a:pPr algn="ctr"/>
+              <a:endParaRPr lang="en-US"/>
+            </a:p>
+          </p:txBody>
+        </p:sp>
+      </p:grpSp>
+    </p:spTree>
+    <p:extLst>
+      <p:ext uri="{BB962C8B-B14F-4D97-AF65-F5344CB8AC3E}">
+        <p14:creationId xmlns:p14="http://schemas.microsoft.com/office/powerpoint/2010/main" val="3473997978"/>
+      </p:ext>
+    </p:extLst>
+  </p:cSld>
+  <p:clrMapOvr>
+    <a:masterClrMapping/>
+  </p:clrMapOvr>
+</p:sld>
+</file>
+
+<file path=ppt/slides/slide5.xml><?xml version="1.0" encoding="utf-8"?>
+<p:sld xmlns:a="http://schemas.openxmlformats.org/drawingml/2006/main" xmlns:r="http://schemas.openxmlformats.org/officeDocument/2006/relationships" xmlns:p="http://schemas.openxmlformats.org/presentationml/2006/main">
+  <p:cSld>
+    <p:spTree>
+      <p:nvGrpSpPr>
+        <p:cNvPr id="1" name=""/>
+        <p:cNvGrpSpPr/>
+        <p:nvPr/>
+      </p:nvGrpSpPr>
+      <p:grpSpPr>
+        <a:xfrm>
+          <a:off x="0" y="0"/>
+          <a:ext cx="0" cy="0"/>
+          <a:chOff x="0" y="0"/>
+          <a:chExt cx="0" cy="0"/>
+        </a:xfrm>
+      </p:grpSpPr>
+      <p:sp>
+        <p:nvSpPr>
+          <p:cNvPr id="2" name="Title 1">
+            <a:extLst>
+              <a:ext uri="{FF2B5EF4-FFF2-40B4-BE49-F238E27FC236}">
+                <a16:creationId xmlns:a16="http://schemas.microsoft.com/office/drawing/2014/main" id="{2AE14B8B-1361-49A0-B5F8-CA297EE2E3AD}"/>
+              </a:ext>
+            </a:extLst>
+          </p:cNvPr>
+          <p:cNvSpPr>
+            <a:spLocks noGrp="1"/>
+          </p:cNvSpPr>
+          <p:nvPr>
+            <p:ph type="title"/>
+          </p:nvPr>
+        </p:nvSpPr>
+        <p:spPr/>
+        <p:txBody>
+          <a:bodyPr/>
+          <a:lstStyle/>
+          <a:p>
+            <a:r>
+              <a:rPr lang="en-US" dirty="0"/>
+              <a:t>Data Quality</a:t>
+            </a:r>
+          </a:p>
+        </p:txBody>
+      </p:sp>
+      <p:grpSp>
+        <p:nvGrpSpPr>
+          <p:cNvPr id="9" name="Group 8">
+            <a:extLst>
+              <a:ext uri="{FF2B5EF4-FFF2-40B4-BE49-F238E27FC236}">
+                <a16:creationId xmlns:a16="http://schemas.microsoft.com/office/drawing/2014/main" id="{37934EEB-17C5-47C0-858D-38B9D9D1CFF3}"/>
+              </a:ext>
+            </a:extLst>
+          </p:cNvPr>
+          <p:cNvGrpSpPr/>
+          <p:nvPr/>
+        </p:nvGrpSpPr>
+        <p:grpSpPr>
+          <a:xfrm>
+            <a:off x="2895578" y="2059084"/>
+            <a:ext cx="6400843" cy="3738808"/>
+            <a:chOff x="2490355" y="2037050"/>
+            <a:chExt cx="6400843" cy="3738808"/>
+          </a:xfrm>
+        </p:grpSpPr>
+        <p:pic>
+          <p:nvPicPr>
+            <p:cNvPr id="5" name="Picture 4">
+              <a:extLst>
+                <a:ext uri="{FF2B5EF4-FFF2-40B4-BE49-F238E27FC236}">
+                  <a16:creationId xmlns:a16="http://schemas.microsoft.com/office/drawing/2014/main" id="{200EDD1A-865E-4F8E-8A40-A6A8A72FD487}"/>
+                </a:ext>
+              </a:extLst>
+            </p:cNvPr>
+            <p:cNvPicPr>
+              <a:picLocks noChangeAspect="1"/>
+            </p:cNvPicPr>
+            <p:nvPr/>
+          </p:nvPicPr>
+          <p:blipFill>
+            <a:blip r:embed="rId2"/>
+            <a:stretch>
+              <a:fillRect/>
+            </a:stretch>
+          </p:blipFill>
+          <p:spPr>
+            <a:xfrm>
+              <a:off x="2490355" y="2037050"/>
+              <a:ext cx="3605645" cy="3738808"/>
+            </a:xfrm>
+            <a:prstGeom prst="rect">
+              <a:avLst/>
+            </a:prstGeom>
+          </p:spPr>
+        </p:pic>
+        <p:pic>
+          <p:nvPicPr>
+            <p:cNvPr id="6" name="Graphic 5" descr="Question mark with solid fill">
+              <a:extLst>
+                <a:ext uri="{FF2B5EF4-FFF2-40B4-BE49-F238E27FC236}">
+                  <a16:creationId xmlns:a16="http://schemas.microsoft.com/office/drawing/2014/main" id="{4DB0C2FE-D876-43C1-844C-F26401746D5B}"/>
+                </a:ext>
+              </a:extLst>
+            </p:cNvPr>
+            <p:cNvPicPr>
+              <a:picLocks noChangeAspect="1"/>
+            </p:cNvPicPr>
+            <p:nvPr/>
+          </p:nvPicPr>
+          <p:blipFill>
+            <a:blip r:embed="rId3">
+              <a:extLst>
+                <a:ext uri="{28A0092B-C50C-407E-A947-70E740481C1C}">
+                  <a14:useLocalDpi xmlns:a14="http://schemas.microsoft.com/office/drawing/2010/main" val="0"/>
+                </a:ext>
+                <a:ext uri="{96DAC541-7B7A-43D3-8B79-37D633B846F1}">
+                  <asvg:svgBlip xmlns:asvg="http://schemas.microsoft.com/office/drawing/2016/SVG/main" r:embed="rId4"/>
+                </a:ext>
+              </a:extLst>
+            </a:blip>
+            <a:stretch>
+              <a:fillRect/>
+            </a:stretch>
+          </p:blipFill>
+          <p:spPr>
+            <a:xfrm>
+              <a:off x="7831325" y="3429000"/>
+              <a:ext cx="1059873" cy="1059873"/>
+            </a:xfrm>
+            <a:prstGeom prst="rect">
+              <a:avLst/>
+            </a:prstGeom>
+          </p:spPr>
+        </p:pic>
+        <p:sp>
+          <p:nvSpPr>
+            <p:cNvPr id="7" name="Arrow: Right 6">
+              <a:extLst>
+                <a:ext uri="{FF2B5EF4-FFF2-40B4-BE49-F238E27FC236}">
+                  <a16:creationId xmlns:a16="http://schemas.microsoft.com/office/drawing/2014/main" id="{55967CBD-4B2F-4708-AE5D-12856CA1C3E7}"/>
+                </a:ext>
+              </a:extLst>
+            </p:cNvPr>
+            <p:cNvSpPr/>
+            <p:nvPr/>
+          </p:nvSpPr>
+          <p:spPr>
+            <a:xfrm>
+              <a:off x="6353675" y="3693709"/>
+              <a:ext cx="1219975" cy="530456"/>
+            </a:xfrm>
+            <a:prstGeom prst="rightArrow">
+              <a:avLst/>
+            </a:prstGeom>
+          </p:spPr>
+          <p:style>
+            <a:lnRef idx="2">
+              <a:schemeClr val="accent1">
+                <a:shade val="50000"/>
+              </a:schemeClr>
+            </a:lnRef>
+            <a:fillRef idx="1">
+              <a:schemeClr val="accent1"/>
+            </a:fillRef>
+            <a:effectRef idx="0">
+              <a:schemeClr val="accent1"/>
+            </a:effectRef>
+            <a:fontRef idx="minor">
+              <a:schemeClr val="lt1"/>
+            </a:fontRef>
+          </p:style>
+          <p:txBody>
+            <a:bodyPr rtlCol="0" anchor="ctr"/>
+            <a:lstStyle/>
+            <a:p>
+              <a:pPr algn="ctr"/>
+              <a:endParaRPr lang="en-US"/>
+            </a:p>
+          </p:txBody>
+        </p:sp>
+      </p:grpSp>
+    </p:spTree>
+    <p:extLst>
+      <p:ext uri="{BB962C8B-B14F-4D97-AF65-F5344CB8AC3E}">
+        <p14:creationId xmlns:p14="http://schemas.microsoft.com/office/powerpoint/2010/main" val="2274653849"/>
+      </p:ext>
+    </p:extLst>
+  </p:cSld>
+  <p:clrMapOvr>
+    <a:masterClrMapping/>
+  </p:clrMapOvr>
+</p:sld>
+</file>
+
+<file path=ppt/slides/slide6.xml><?xml version="1.0" encoding="utf-8"?>
+<p:sld xmlns:a="http://schemas.openxmlformats.org/drawingml/2006/main" xmlns:r="http://schemas.openxmlformats.org/officeDocument/2006/relationships" xmlns:p="http://schemas.openxmlformats.org/presentationml/2006/main">
+  <p:cSld>
+    <p:spTree>
+      <p:nvGrpSpPr>
+        <p:cNvPr id="1" name=""/>
+        <p:cNvGrpSpPr/>
+        <p:nvPr/>
+      </p:nvGrpSpPr>
+      <p:grpSpPr>
+        <a:xfrm>
+          <a:off x="0" y="0"/>
+          <a:ext cx="0" cy="0"/>
+          <a:chOff x="0" y="0"/>
+          <a:chExt cx="0" cy="0"/>
+        </a:xfrm>
+      </p:grpSpPr>
+      <p:sp>
+        <p:nvSpPr>
+          <p:cNvPr id="2" name="Title 1">
+            <a:extLst>
+              <a:ext uri="{FF2B5EF4-FFF2-40B4-BE49-F238E27FC236}">
+                <a16:creationId xmlns:a16="http://schemas.microsoft.com/office/drawing/2014/main" id="{8C1B359E-074D-43B3-875B-57CB74C4C64A}"/>
+              </a:ext>
+            </a:extLst>
+          </p:cNvPr>
+          <p:cNvSpPr>
+            <a:spLocks noGrp="1"/>
+          </p:cNvSpPr>
+          <p:nvPr>
+            <p:ph type="title"/>
+          </p:nvPr>
+        </p:nvSpPr>
+        <p:spPr/>
+        <p:txBody>
+          <a:bodyPr/>
+          <a:lstStyle/>
+          <a:p>
+            <a:r>
+              <a:rPr lang="en-US" dirty="0"/>
+              <a:t>Data Quality</a:t>
+            </a:r>
+          </a:p>
+        </p:txBody>
+      </p:sp>
+      <p:sp>
+        <p:nvSpPr>
+          <p:cNvPr id="5" name="Content Placeholder 4">
+            <a:extLst>
+              <a:ext uri="{FF2B5EF4-FFF2-40B4-BE49-F238E27FC236}">
+                <a16:creationId xmlns:a16="http://schemas.microsoft.com/office/drawing/2014/main" id="{AC151201-1980-4D01-9EB6-441F7D667C86}"/>
+              </a:ext>
+            </a:extLst>
+          </p:cNvPr>
+          <p:cNvSpPr>
+            <a:spLocks noGrp="1"/>
+          </p:cNvSpPr>
+          <p:nvPr>
+            <p:ph sz="half" idx="1"/>
+          </p:nvPr>
+        </p:nvSpPr>
+        <p:spPr/>
+        <p:txBody>
+          <a:bodyPr>
+            <a:normAutofit/>
+          </a:bodyPr>
+          <a:lstStyle/>
+          <a:p>
+            <a:pPr>
+              <a:buSzPct val="60000"/>
+              <a:buFont typeface="Wingdings" panose="05000000000000000000" pitchFamily="2" charset="2"/>
+              <a:buChar char="§"/>
+            </a:pPr>
+            <a:r>
+              <a:rPr lang="en-US" sz="3600" dirty="0"/>
+              <a:t>Garbage in, garbage out</a:t>
+            </a:r>
+          </a:p>
+          <a:p>
+            <a:pPr>
+              <a:buSzPct val="60000"/>
+              <a:buFont typeface="Wingdings" panose="05000000000000000000" pitchFamily="2" charset="2"/>
+              <a:buChar char="§"/>
+            </a:pPr>
+            <a:endParaRPr lang="en-US" sz="3600" dirty="0"/>
+          </a:p>
+          <a:p>
+            <a:pPr>
+              <a:buSzPct val="60000"/>
+              <a:buFont typeface="Wingdings" panose="05000000000000000000" pitchFamily="2" charset="2"/>
+              <a:buChar char="§"/>
+            </a:pPr>
+            <a:endParaRPr lang="en-US" sz="3600" dirty="0"/>
+          </a:p>
+          <a:p>
+            <a:pPr>
+              <a:buSzPct val="60000"/>
+              <a:buFont typeface="Wingdings" panose="05000000000000000000" pitchFamily="2" charset="2"/>
+              <a:buChar char="§"/>
+            </a:pPr>
+            <a:r>
+              <a:rPr lang="en-US" sz="3600" dirty="0"/>
+              <a:t>Verifying your data</a:t>
+            </a:r>
+          </a:p>
+          <a:p>
+            <a:pPr>
+              <a:buSzPct val="60000"/>
+              <a:buFont typeface="Wingdings" panose="05000000000000000000" pitchFamily="2" charset="2"/>
+              <a:buChar char="§"/>
+            </a:pPr>
+            <a:endParaRPr lang="en-US" sz="3600" dirty="0"/>
+          </a:p>
+          <a:p>
+            <a:pPr>
+              <a:buSzPct val="60000"/>
+              <a:buFont typeface="Wingdings" panose="05000000000000000000" pitchFamily="2" charset="2"/>
+              <a:buChar char="§"/>
+            </a:pPr>
+            <a:endParaRPr lang="en-US" sz="3600" dirty="0"/>
+          </a:p>
+          <a:p>
+            <a:pPr>
+              <a:buSzPct val="60000"/>
+              <a:buFont typeface="Wingdings" panose="05000000000000000000" pitchFamily="2" charset="2"/>
+              <a:buChar char="§"/>
+            </a:pPr>
+            <a:r>
+              <a:rPr lang="en-US" sz="3600" dirty="0"/>
+              <a:t>Understanding your data</a:t>
+            </a:r>
+          </a:p>
+        </p:txBody>
+      </p:sp>
+      <p:pic>
+        <p:nvPicPr>
+          <p:cNvPr id="3076" name="Picture 4" descr="Census.gov">
+            <a:extLst>
+              <a:ext uri="{FF2B5EF4-FFF2-40B4-BE49-F238E27FC236}">
+                <a16:creationId xmlns:a16="http://schemas.microsoft.com/office/drawing/2014/main" id="{9B859534-CB3B-49CE-8530-CA71C8C51742}"/>
+              </a:ext>
+            </a:extLst>
+          </p:cNvPr>
+          <p:cNvPicPr>
+            <a:picLocks noChangeAspect="1" noChangeArrowheads="1"/>
+          </p:cNvPicPr>
+          <p:nvPr/>
+        </p:nvPicPr>
+        <p:blipFill>
+          <a:blip r:embed="rId2">
+            <a:extLst>
+              <a:ext uri="{28A0092B-C50C-407E-A947-70E740481C1C}">
+                <a14:useLocalDpi xmlns:a14="http://schemas.microsoft.com/office/drawing/2010/main" val="0"/>
+              </a:ext>
+            </a:extLst>
+          </a:blip>
+          <a:srcRect/>
+          <a:stretch>
+            <a:fillRect/>
+          </a:stretch>
+        </p:blipFill>
+        <p:spPr bwMode="auto">
+          <a:xfrm>
+            <a:off x="7479671" y="2842351"/>
+            <a:ext cx="3695219" cy="1931050"/>
+          </a:xfrm>
+          <a:prstGeom prst="rect">
+            <a:avLst/>
+          </a:prstGeom>
+          <a:noFill/>
+          <a:extLst>
+            <a:ext uri="{909E8E84-426E-40DD-AFC4-6F175D3DCCD1}">
+              <a14:hiddenFill xmlns:a14="http://schemas.microsoft.com/office/drawing/2010/main">
+                <a:solidFill>
+                  <a:srgbClr val="FFFFFF"/>
+                </a:solidFill>
+              </a14:hiddenFill>
+            </a:ext>
+          </a:extLst>
+        </p:spPr>
+      </p:pic>
+    </p:spTree>
+    <p:extLst>
+      <p:ext uri="{BB962C8B-B14F-4D97-AF65-F5344CB8AC3E}">
+        <p14:creationId xmlns:p14="http://schemas.microsoft.com/office/powerpoint/2010/main" val="3124933191"/>
+      </p:ext>
+    </p:extLst>
+  </p:cSld>
+  <p:clrMapOvr>
+    <a:masterClrMapping/>
+  </p:clrMapOvr>
+</p:sld>
+</file>
+
+<file path=ppt/slides/slide7.xml><?xml version="1.0" encoding="utf-8"?>
+<p:sld xmlns:a="http://schemas.openxmlformats.org/drawingml/2006/main" xmlns:r="http://schemas.openxmlformats.org/officeDocument/2006/relationships" xmlns:p="http://schemas.openxmlformats.org/presentationml/2006/main">
+  <p:cSld>
+    <p:spTree>
+      <p:nvGrpSpPr>
+        <p:cNvPr id="1" name=""/>
+        <p:cNvGrpSpPr/>
+        <p:nvPr/>
+      </p:nvGrpSpPr>
+      <p:grpSpPr>
+        <a:xfrm>
+          <a:off x="0" y="0"/>
+          <a:ext cx="0" cy="0"/>
+          <a:chOff x="0" y="0"/>
+          <a:chExt cx="0" cy="0"/>
+        </a:xfrm>
+      </p:grpSpPr>
+      <p:sp>
+        <p:nvSpPr>
+          <p:cNvPr id="2" name="Title 1">
+            <a:extLst>
+              <a:ext uri="{FF2B5EF4-FFF2-40B4-BE49-F238E27FC236}">
+                <a16:creationId xmlns:a16="http://schemas.microsoft.com/office/drawing/2014/main" id="{B3149583-92F5-48C6-B982-063AD4E02DAF}"/>
+              </a:ext>
+            </a:extLst>
+          </p:cNvPr>
+          <p:cNvSpPr>
+            <a:spLocks noGrp="1"/>
+          </p:cNvSpPr>
+          <p:nvPr>
+            <p:ph type="title"/>
+          </p:nvPr>
+        </p:nvSpPr>
+        <p:spPr/>
+        <p:txBody>
+          <a:bodyPr/>
+          <a:lstStyle/>
+          <a:p>
+            <a:r>
+              <a:rPr lang="en-US" dirty="0"/>
+              <a:t>Data Cleaning</a:t>
+            </a:r>
+          </a:p>
+        </p:txBody>
+      </p:sp>
+      <p:sp>
+        <p:nvSpPr>
+          <p:cNvPr id="3" name="Content Placeholder 2">
+            <a:extLst>
+              <a:ext uri="{FF2B5EF4-FFF2-40B4-BE49-F238E27FC236}">
+                <a16:creationId xmlns:a16="http://schemas.microsoft.com/office/drawing/2014/main" id="{6E875BD0-D5FE-483A-A2F8-4C8342E83F5E}"/>
+              </a:ext>
+            </a:extLst>
+          </p:cNvPr>
+          <p:cNvSpPr>
+            <a:spLocks noGrp="1"/>
+          </p:cNvSpPr>
+          <p:nvPr>
+            <p:ph sz="half" idx="1"/>
+          </p:nvPr>
+        </p:nvSpPr>
+        <p:spPr>
+          <a:xfrm>
+            <a:off x="838199" y="1825625"/>
+            <a:ext cx="5032665" cy="4667250"/>
+          </a:xfrm>
+        </p:spPr>
+        <p:txBody>
+          <a:bodyPr>
+            <a:normAutofit lnSpcReduction="10000"/>
+          </a:bodyPr>
+          <a:lstStyle/>
+          <a:p>
+            <a:pPr>
+              <a:buSzPct val="60000"/>
+              <a:buFont typeface="Wingdings" panose="05000000000000000000" pitchFamily="2" charset="2"/>
+              <a:buChar char="§"/>
+            </a:pPr>
+            <a:r>
+              <a:rPr lang="en-US" sz="3600" dirty="0"/>
+              <a:t>Get column names</a:t>
+            </a:r>
+          </a:p>
+          <a:p>
+            <a:pPr>
+              <a:buSzPct val="60000"/>
+              <a:buFont typeface="Wingdings" panose="05000000000000000000" pitchFamily="2" charset="2"/>
+              <a:buChar char="§"/>
+            </a:pPr>
+            <a:endParaRPr lang="en-US" sz="3600" dirty="0"/>
+          </a:p>
+          <a:p>
+            <a:pPr>
+              <a:buSzPct val="60000"/>
+              <a:buFont typeface="Wingdings" panose="05000000000000000000" pitchFamily="2" charset="2"/>
+              <a:buChar char="§"/>
+            </a:pPr>
+            <a:endParaRPr lang="en-US" sz="3600" dirty="0"/>
+          </a:p>
+          <a:p>
+            <a:pPr>
+              <a:buSzPct val="60000"/>
+              <a:buFont typeface="Wingdings" panose="05000000000000000000" pitchFamily="2" charset="2"/>
+              <a:buChar char="§"/>
+            </a:pPr>
+            <a:r>
+              <a:rPr lang="en-US" sz="3600" dirty="0"/>
+              <a:t>Descriptive statistics</a:t>
+            </a:r>
+          </a:p>
+          <a:p>
+            <a:pPr>
+              <a:buSzPct val="60000"/>
+              <a:buFont typeface="Wingdings" panose="05000000000000000000" pitchFamily="2" charset="2"/>
+              <a:buChar char="§"/>
+            </a:pPr>
+            <a:endParaRPr lang="en-US" sz="3600" dirty="0"/>
+          </a:p>
+          <a:p>
+            <a:pPr>
+              <a:buSzPct val="60000"/>
+              <a:buFont typeface="Wingdings" panose="05000000000000000000" pitchFamily="2" charset="2"/>
+              <a:buChar char="§"/>
+            </a:pPr>
+            <a:endParaRPr lang="en-US" sz="3600" dirty="0"/>
+          </a:p>
+          <a:p>
+            <a:pPr>
+              <a:buSzPct val="60000"/>
+              <a:buFont typeface="Wingdings" panose="05000000000000000000" pitchFamily="2" charset="2"/>
+              <a:buChar char="§"/>
+            </a:pPr>
+            <a:r>
+              <a:rPr lang="en-US" sz="3600" dirty="0"/>
+              <a:t>Handling placeholder values</a:t>
+            </a:r>
+          </a:p>
+          <a:p>
+            <a:endParaRPr lang="en-US" dirty="0"/>
+          </a:p>
+          <a:p>
+            <a:endParaRPr lang="en-US" dirty="0"/>
+          </a:p>
+          <a:p>
+            <a:endParaRPr lang="en-US" dirty="0"/>
+          </a:p>
+        </p:txBody>
+      </p:sp>
+      <p:pic>
+        <p:nvPicPr>
+          <p:cNvPr id="6" name="Picture 5">
+            <a:extLst>
+              <a:ext uri="{FF2B5EF4-FFF2-40B4-BE49-F238E27FC236}">
+                <a16:creationId xmlns:a16="http://schemas.microsoft.com/office/drawing/2014/main" id="{D8F3A763-6666-4503-9BFC-87D89546C2B4}"/>
+              </a:ext>
+            </a:extLst>
+          </p:cNvPr>
+          <p:cNvPicPr>
+            <a:picLocks noChangeAspect="1"/>
+          </p:cNvPicPr>
+          <p:nvPr/>
+        </p:nvPicPr>
+        <p:blipFill rotWithShape="1">
+          <a:blip r:embed="rId2"/>
+          <a:srcRect r="2578"/>
+          <a:stretch/>
+        </p:blipFill>
+        <p:spPr>
+          <a:xfrm>
+            <a:off x="5385914" y="4946074"/>
+            <a:ext cx="6806086" cy="1314842"/>
+          </a:xfrm>
+          <a:prstGeom prst="rect">
+            <a:avLst/>
+          </a:prstGeom>
+        </p:spPr>
+      </p:pic>
+      <p:pic>
+        <p:nvPicPr>
+          <p:cNvPr id="8" name="Picture 7">
+            <a:extLst>
+              <a:ext uri="{FF2B5EF4-FFF2-40B4-BE49-F238E27FC236}">
+                <a16:creationId xmlns:a16="http://schemas.microsoft.com/office/drawing/2014/main" id="{9704FDAA-4359-45E8-9E04-50A012D1EED5}"/>
+              </a:ext>
+            </a:extLst>
+          </p:cNvPr>
+          <p:cNvPicPr>
+            <a:picLocks noChangeAspect="1"/>
+          </p:cNvPicPr>
+          <p:nvPr/>
+        </p:nvPicPr>
+        <p:blipFill>
+          <a:blip r:embed="rId3"/>
+          <a:stretch>
+            <a:fillRect/>
+          </a:stretch>
+        </p:blipFill>
+        <p:spPr>
+          <a:xfrm>
+            <a:off x="5870864" y="1438926"/>
+            <a:ext cx="5667375" cy="2952750"/>
+          </a:xfrm>
+          <a:prstGeom prst="rect">
+            <a:avLst/>
+          </a:prstGeom>
+        </p:spPr>
+      </p:pic>
+    </p:spTree>
+    <p:extLst>
+      <p:ext uri="{BB962C8B-B14F-4D97-AF65-F5344CB8AC3E}">
+        <p14:creationId xmlns:p14="http://schemas.microsoft.com/office/powerpoint/2010/main" val="1612938783"/>
+      </p:ext>
+    </p:extLst>
+  </p:cSld>
+  <p:clrMapOvr>
+    <a:masterClrMapping/>
+  </p:clrMapOvr>
+</p:sld>
+</file>
+
+<file path=ppt/slides/slide8.xml><?xml version="1.0" encoding="utf-8"?>
+<p:sld xmlns:a="http://schemas.openxmlformats.org/drawingml/2006/main" xmlns:r="http://schemas.openxmlformats.org/officeDocument/2006/relationships" xmlns:p="http://schemas.openxmlformats.org/presentationml/2006/main">
+  <p:cSld>
+    <p:spTree>
+      <p:nvGrpSpPr>
+        <p:cNvPr id="1" name=""/>
+        <p:cNvGrpSpPr/>
+        <p:nvPr/>
+      </p:nvGrpSpPr>
+      <p:grpSpPr>
+        <a:xfrm>
+          <a:off x="0" y="0"/>
+          <a:ext cx="0" cy="0"/>
+          <a:chOff x="0" y="0"/>
+          <a:chExt cx="0" cy="0"/>
+        </a:xfrm>
+      </p:grpSpPr>
+      <p:sp>
+        <p:nvSpPr>
+          <p:cNvPr id="2" name="Title 1">
+            <a:extLst>
+              <a:ext uri="{FF2B5EF4-FFF2-40B4-BE49-F238E27FC236}">
+                <a16:creationId xmlns:a16="http://schemas.microsoft.com/office/drawing/2014/main" id="{ACD42A18-DFEC-4638-B11B-F65901B64937}"/>
+              </a:ext>
+            </a:extLst>
+          </p:cNvPr>
+          <p:cNvSpPr>
+            <a:spLocks noGrp="1"/>
+          </p:cNvSpPr>
+          <p:nvPr>
+            <p:ph type="title"/>
+          </p:nvPr>
+        </p:nvSpPr>
+        <p:spPr/>
+        <p:txBody>
+          <a:bodyPr/>
+          <a:lstStyle/>
+          <a:p>
+            <a:r>
+              <a:rPr lang="en-US" dirty="0"/>
+              <a:t>Feature Engineering and Encoding </a:t>
+            </a:r>
+          </a:p>
+        </p:txBody>
+      </p:sp>
+      <p:sp>
+        <p:nvSpPr>
+          <p:cNvPr id="3" name="Content Placeholder 2">
+            <a:extLst>
+              <a:ext uri="{FF2B5EF4-FFF2-40B4-BE49-F238E27FC236}">
+                <a16:creationId xmlns:a16="http://schemas.microsoft.com/office/drawing/2014/main" id="{D329B330-30CE-4DA5-A7DF-DCC0F203A9AF}"/>
+              </a:ext>
+            </a:extLst>
+          </p:cNvPr>
+          <p:cNvSpPr>
+            <a:spLocks noGrp="1"/>
+          </p:cNvSpPr>
+          <p:nvPr>
+            <p:ph sz="half" idx="1"/>
+          </p:nvPr>
+        </p:nvSpPr>
+        <p:spPr>
+          <a:xfrm>
+            <a:off x="838200" y="1825625"/>
+            <a:ext cx="6311748" cy="4351338"/>
+          </a:xfrm>
+        </p:spPr>
+        <p:txBody>
+          <a:bodyPr>
+            <a:noAutofit/>
+          </a:bodyPr>
+          <a:lstStyle/>
+          <a:p>
+            <a:pPr>
+              <a:buSzPct val="60000"/>
+              <a:buFont typeface="Wingdings" panose="05000000000000000000" pitchFamily="2" charset="2"/>
+              <a:buChar char="§"/>
+            </a:pPr>
+            <a:r>
+              <a:rPr lang="en-US" sz="3600" dirty="0"/>
+              <a:t>Reduce excess dimensions</a:t>
+            </a:r>
+          </a:p>
+          <a:p>
+            <a:pPr>
+              <a:buSzPct val="60000"/>
+              <a:buFont typeface="Wingdings" panose="05000000000000000000" pitchFamily="2" charset="2"/>
+              <a:buChar char="§"/>
+            </a:pPr>
+            <a:endParaRPr lang="en-US" sz="3600" dirty="0"/>
+          </a:p>
+          <a:p>
+            <a:pPr>
+              <a:buSzPct val="60000"/>
+              <a:buFont typeface="Wingdings" panose="05000000000000000000" pitchFamily="2" charset="2"/>
+              <a:buChar char="§"/>
+            </a:pPr>
+            <a:r>
+              <a:rPr lang="en-US" sz="3600" dirty="0"/>
+              <a:t>Encoding: the bridge from human to machine</a:t>
+            </a:r>
+          </a:p>
+          <a:p>
+            <a:pPr marL="0" indent="0">
+              <a:buSzPct val="60000"/>
+              <a:buNone/>
+            </a:pPr>
+            <a:endParaRPr lang="en-US" sz="3600" dirty="0"/>
+          </a:p>
+          <a:p>
+            <a:pPr>
+              <a:buSzPct val="60000"/>
+              <a:buFont typeface="Wingdings" panose="05000000000000000000" pitchFamily="2" charset="2"/>
+              <a:buChar char="§"/>
+            </a:pPr>
+            <a:r>
+              <a:rPr lang="en-US" sz="3600" dirty="0"/>
+              <a:t>Cardinality (unique values)</a:t>
+            </a:r>
+          </a:p>
+        </p:txBody>
+      </p:sp>
+      <p:pic>
+        <p:nvPicPr>
+          <p:cNvPr id="4098" name="Picture 2" descr="Multiple Linear Regression for Manufacturing Analysis | by Dery Kurniawan |  Towards Data Science">
+            <a:extLst>
+              <a:ext uri="{FF2B5EF4-FFF2-40B4-BE49-F238E27FC236}">
+                <a16:creationId xmlns:a16="http://schemas.microsoft.com/office/drawing/2014/main" id="{871DA8D6-5862-4247-BE3E-7C7E4160FF6F}"/>
+              </a:ext>
+            </a:extLst>
+          </p:cNvPr>
+          <p:cNvPicPr>
+            <a:picLocks noChangeAspect="1" noChangeArrowheads="1"/>
+          </p:cNvPicPr>
+          <p:nvPr/>
+        </p:nvPicPr>
+        <p:blipFill>
+          <a:blip r:embed="rId2">
+            <a:extLst>
+              <a:ext uri="{28A0092B-C50C-407E-A947-70E740481C1C}">
+                <a14:useLocalDpi xmlns:a14="http://schemas.microsoft.com/office/drawing/2010/main" val="0"/>
+              </a:ext>
+            </a:extLst>
+          </a:blip>
+          <a:srcRect/>
+          <a:stretch>
+            <a:fillRect/>
+          </a:stretch>
+        </p:blipFill>
+        <p:spPr bwMode="auto">
+          <a:xfrm>
+            <a:off x="6499951" y="1536982"/>
+            <a:ext cx="5470621" cy="1040142"/>
+          </a:xfrm>
+          <a:prstGeom prst="rect">
+            <a:avLst/>
+          </a:prstGeom>
+          <a:noFill/>
+          <a:extLst>
+            <a:ext uri="{909E8E84-426E-40DD-AFC4-6F175D3DCCD1}">
+              <a14:hiddenFill xmlns:a14="http://schemas.microsoft.com/office/drawing/2010/main">
+                <a:solidFill>
+                  <a:srgbClr val="FFFFFF"/>
+                </a:solidFill>
+              </a14:hiddenFill>
+            </a:ext>
+          </a:extLst>
+        </p:spPr>
+      </p:pic>
+      <p:pic>
+        <p:nvPicPr>
+          <p:cNvPr id="4102" name="Picture 6" descr="Stop One-Hot Encoding Your Categorical Variables.">
+            <a:extLst>
+              <a:ext uri="{FF2B5EF4-FFF2-40B4-BE49-F238E27FC236}">
+                <a16:creationId xmlns:a16="http://schemas.microsoft.com/office/drawing/2014/main" id="{8E19C06D-FA83-48A5-85C8-1E01E79A150E}"/>
+              </a:ext>
+            </a:extLst>
+          </p:cNvPr>
+          <p:cNvPicPr>
+            <a:picLocks noChangeAspect="1" noChangeArrowheads="1"/>
+          </p:cNvPicPr>
+          <p:nvPr/>
+        </p:nvPicPr>
+        <p:blipFill rotWithShape="1">
+          <a:blip r:embed="rId3">
+            <a:extLst>
+              <a:ext uri="{28A0092B-C50C-407E-A947-70E740481C1C}">
+                <a14:useLocalDpi xmlns:a14="http://schemas.microsoft.com/office/drawing/2010/main" val="0"/>
+              </a:ext>
+            </a:extLst>
+          </a:blip>
+          <a:srcRect l="16808" r="16324"/>
+          <a:stretch/>
+        </p:blipFill>
+        <p:spPr bwMode="auto">
+          <a:xfrm>
+            <a:off x="6499951" y="3319202"/>
+            <a:ext cx="5488741" cy="2607873"/>
+          </a:xfrm>
+          <a:prstGeom prst="rect">
+            <a:avLst/>
+          </a:prstGeom>
+          <a:noFill/>
+          <a:extLst>
+            <a:ext uri="{909E8E84-426E-40DD-AFC4-6F175D3DCCD1}">
+              <a14:hiddenFill xmlns:a14="http://schemas.microsoft.com/office/drawing/2010/main">
+                <a:solidFill>
+                  <a:srgbClr val="FFFFFF"/>
+                </a:solidFill>
+              </a14:hiddenFill>
+            </a:ext>
+          </a:extLst>
+        </p:spPr>
+      </p:pic>
+    </p:spTree>
+    <p:extLst>
+      <p:ext uri="{BB962C8B-B14F-4D97-AF65-F5344CB8AC3E}">
+        <p14:creationId xmlns:p14="http://schemas.microsoft.com/office/powerpoint/2010/main" val="1305872320"/>
+      </p:ext>
+    </p:extLst>
+  </p:cSld>
+  <p:clrMapOvr>
+    <a:masterClrMapping/>
+  </p:clrMapOvr>
+</p:sld>
+</file>
+
+<file path=ppt/slides/slide9.xml><?xml version="1.0" encoding="utf-8"?>
+<p:sld xmlns:a="http://schemas.openxmlformats.org/drawingml/2006/main" xmlns:r="http://schemas.openxmlformats.org/officeDocument/2006/relationships" xmlns:p="http://schemas.openxmlformats.org/presentationml/2006/main">
+  <p:cSld>
+    <p:spTree>
+      <p:nvGrpSpPr>
+        <p:cNvPr id="1" name=""/>
+        <p:cNvGrpSpPr/>
+        <p:nvPr/>
+      </p:nvGrpSpPr>
+      <p:grpSpPr>
+        <a:xfrm>
+          <a:off x="0" y="0"/>
+          <a:ext cx="0" cy="0"/>
+          <a:chOff x="0" y="0"/>
+          <a:chExt cx="0" cy="0"/>
+        </a:xfrm>
+      </p:grpSpPr>
+      <p:sp>
+        <p:nvSpPr>
+          <p:cNvPr id="2" name="Title 1">
+            <a:extLst>
+              <a:ext uri="{FF2B5EF4-FFF2-40B4-BE49-F238E27FC236}">
+                <a16:creationId xmlns:a16="http://schemas.microsoft.com/office/drawing/2014/main" id="{4180EA78-4EFB-4EF7-89AD-96F8ED906842}"/>
+              </a:ext>
+            </a:extLst>
+          </p:cNvPr>
+          <p:cNvSpPr>
+            <a:spLocks noGrp="1"/>
+          </p:cNvSpPr>
+          <p:nvPr>
+            <p:ph type="title"/>
+          </p:nvPr>
+        </p:nvSpPr>
+        <p:spPr/>
+        <p:txBody>
+          <a:bodyPr/>
+          <a:lstStyle/>
+          <a:p>
+            <a:r>
+              <a:rPr lang="en-US" dirty="0"/>
+              <a:t>Exploratory Data Analysis</a:t>
+            </a:r>
+          </a:p>
+        </p:txBody>
+      </p:sp>
+      <p:sp>
+        <p:nvSpPr>
+          <p:cNvPr id="3" name="Content Placeholder 2">
+            <a:extLst>
+              <a:ext uri="{FF2B5EF4-FFF2-40B4-BE49-F238E27FC236}">
+                <a16:creationId xmlns:a16="http://schemas.microsoft.com/office/drawing/2014/main" id="{954581F8-8FD7-453F-A1E0-5ED8FA1C0355}"/>
+              </a:ext>
+            </a:extLst>
+          </p:cNvPr>
+          <p:cNvSpPr>
+            <a:spLocks noGrp="1"/>
+          </p:cNvSpPr>
+          <p:nvPr>
+            <p:ph sz="half" idx="1"/>
+          </p:nvPr>
+        </p:nvSpPr>
+        <p:spPr/>
+        <p:txBody>
+          <a:bodyPr>
+            <a:normAutofit/>
+          </a:bodyPr>
+          <a:lstStyle/>
+          <a:p>
+            <a:pPr>
+              <a:buSzPct val="60000"/>
+              <a:buFont typeface="Wingdings" panose="05000000000000000000" pitchFamily="2" charset="2"/>
+              <a:buChar char="§"/>
+            </a:pPr>
+            <a:r>
+              <a:rPr lang="en-US" sz="3600" dirty="0"/>
+              <a:t>Feature distributions</a:t>
+            </a:r>
+          </a:p>
+          <a:p>
+            <a:pPr>
+              <a:buSzPct val="60000"/>
+              <a:buFont typeface="Wingdings" panose="05000000000000000000" pitchFamily="2" charset="2"/>
+              <a:buChar char="§"/>
+            </a:pPr>
+            <a:endParaRPr lang="en-US" sz="3600" dirty="0"/>
+          </a:p>
+          <a:p>
+            <a:pPr>
+              <a:buSzPct val="60000"/>
+              <a:buFont typeface="Wingdings" panose="05000000000000000000" pitchFamily="2" charset="2"/>
+              <a:buChar char="§"/>
+            </a:pPr>
+            <a:endParaRPr lang="en-US" sz="3600" dirty="0"/>
+          </a:p>
+          <a:p>
+            <a:pPr>
+              <a:buSzPct val="60000"/>
+              <a:buFont typeface="Wingdings" panose="05000000000000000000" pitchFamily="2" charset="2"/>
+              <a:buChar char="§"/>
+            </a:pPr>
+            <a:r>
+              <a:rPr lang="en-US" sz="3600" dirty="0"/>
+              <a:t>Feature correlation</a:t>
+            </a:r>
+          </a:p>
+          <a:p>
+            <a:pPr>
+              <a:buSzPct val="60000"/>
+              <a:buFont typeface="Wingdings" panose="05000000000000000000" pitchFamily="2" charset="2"/>
+              <a:buChar char="§"/>
+            </a:pPr>
+            <a:endParaRPr lang="en-US" sz="3600" dirty="0"/>
+          </a:p>
+          <a:p>
+            <a:pPr>
+              <a:buSzPct val="60000"/>
+              <a:buFont typeface="Wingdings" panose="05000000000000000000" pitchFamily="2" charset="2"/>
+              <a:buChar char="§"/>
+            </a:pPr>
+            <a:endParaRPr lang="en-US" sz="3600" dirty="0"/>
+          </a:p>
+          <a:p>
+            <a:pPr>
+              <a:buSzPct val="60000"/>
+              <a:buFont typeface="Wingdings" panose="05000000000000000000" pitchFamily="2" charset="2"/>
+              <a:buChar char="§"/>
+            </a:pPr>
+            <a:r>
+              <a:rPr lang="en-US" sz="3600" dirty="0"/>
+              <a:t>Multicollinearity</a:t>
+            </a:r>
+          </a:p>
+        </p:txBody>
+      </p:sp>
+      <p:pic>
+        <p:nvPicPr>
+          <p:cNvPr id="6146" name="Picture 2" descr="Annotated Heatmaps of a Correlation Matrix in 5 Simple Steps | by Julia Kho  | Towards Data Science">
+            <a:extLst>
+              <a:ext uri="{FF2B5EF4-FFF2-40B4-BE49-F238E27FC236}">
+                <a16:creationId xmlns:a16="http://schemas.microsoft.com/office/drawing/2014/main" id="{88D60E71-E772-4456-94EC-5AD2072996AA}"/>
+              </a:ext>
+            </a:extLst>
+          </p:cNvPr>
+          <p:cNvPicPr>
+            <a:picLocks noChangeAspect="1" noChangeArrowheads="1"/>
+          </p:cNvPicPr>
+          <p:nvPr/>
+        </p:nvPicPr>
+        <p:blipFill>
+          <a:blip r:embed="rId2">
+            <a:extLst>
+              <a:ext uri="{28A0092B-C50C-407E-A947-70E740481C1C}">
+                <a14:useLocalDpi xmlns:a14="http://schemas.microsoft.com/office/drawing/2010/main" val="0"/>
+              </a:ext>
+            </a:extLst>
+          </a:blip>
+          <a:srcRect/>
+          <a:stretch>
+            <a:fillRect/>
+          </a:stretch>
+        </p:blipFill>
+        <p:spPr bwMode="auto">
+          <a:xfrm>
+            <a:off x="7826719" y="3153196"/>
+            <a:ext cx="3986001" cy="3411442"/>
+          </a:xfrm>
+          <a:prstGeom prst="rect">
+            <a:avLst/>
+          </a:prstGeom>
+          <a:noFill/>
+          <a:extLst>
+            <a:ext uri="{909E8E84-426E-40DD-AFC4-6F175D3DCCD1}">
+              <a14:hiddenFill xmlns:a14="http://schemas.microsoft.com/office/drawing/2010/main">
+                <a:solidFill>
+                  <a:srgbClr val="FFFFFF"/>
+                </a:solidFill>
+              </a14:hiddenFill>
+            </a:ext>
+          </a:extLst>
+        </p:spPr>
+      </p:pic>
+      <p:pic>
+        <p:nvPicPr>
+          <p:cNvPr id="6" name="Picture 5">
+            <a:extLst>
+              <a:ext uri="{FF2B5EF4-FFF2-40B4-BE49-F238E27FC236}">
+                <a16:creationId xmlns:a16="http://schemas.microsoft.com/office/drawing/2014/main" id="{27AAA21C-87CC-4D29-BF64-1CC2FD7342A4}"/>
+              </a:ext>
+            </a:extLst>
+          </p:cNvPr>
+          <p:cNvPicPr>
+            <a:picLocks noChangeAspect="1"/>
+          </p:cNvPicPr>
+          <p:nvPr/>
+        </p:nvPicPr>
+        <p:blipFill>
+          <a:blip r:embed="rId3"/>
+          <a:stretch>
+            <a:fillRect/>
+          </a:stretch>
+        </p:blipFill>
+        <p:spPr>
+          <a:xfrm>
+            <a:off x="7826719" y="296652"/>
+            <a:ext cx="3613112" cy="2788071"/>
+          </a:xfrm>
+          <a:prstGeom prst="rect">
+            <a:avLst/>
+          </a:prstGeom>
+        </p:spPr>
+      </p:pic>
+    </p:spTree>
+    <p:extLst>
+      <p:ext uri="{BB962C8B-B14F-4D97-AF65-F5344CB8AC3E}">
+        <p14:creationId xmlns:p14="http://schemas.microsoft.com/office/powerpoint/2010/main" val="2961069710"/>
       </p:ext>
     </p:extLst>
   </p:cSld>

</xml_diff>

<commit_message>
training loop completed, test set eval in progress, significant progress on slide deck
</commit_message>
<xml_diff>
--- a/slide_deck.pptx
+++ b/slide_deck.pptx
@@ -4,21 +4,25 @@
   <p:sldMasterIdLst>
     <p:sldMasterId id="2147483648" r:id="rId1"/>
   </p:sldMasterIdLst>
+  <p:notesMasterIdLst>
+    <p:notesMasterId r:id="rId17"/>
+  </p:notesMasterIdLst>
   <p:sldIdLst>
     <p:sldId id="256" r:id="rId2"/>
     <p:sldId id="257" r:id="rId3"/>
-    <p:sldId id="258" r:id="rId4"/>
-    <p:sldId id="259" r:id="rId5"/>
-    <p:sldId id="264" r:id="rId6"/>
-    <p:sldId id="261" r:id="rId7"/>
-    <p:sldId id="260" r:id="rId8"/>
-    <p:sldId id="262" r:id="rId9"/>
-    <p:sldId id="263" r:id="rId10"/>
-    <p:sldId id="265" r:id="rId11"/>
-    <p:sldId id="266" r:id="rId12"/>
-    <p:sldId id="269" r:id="rId13"/>
-    <p:sldId id="267" r:id="rId14"/>
-    <p:sldId id="268" r:id="rId15"/>
+    <p:sldId id="270" r:id="rId4"/>
+    <p:sldId id="258" r:id="rId5"/>
+    <p:sldId id="259" r:id="rId6"/>
+    <p:sldId id="264" r:id="rId7"/>
+    <p:sldId id="261" r:id="rId8"/>
+    <p:sldId id="260" r:id="rId9"/>
+    <p:sldId id="262" r:id="rId10"/>
+    <p:sldId id="263" r:id="rId11"/>
+    <p:sldId id="265" r:id="rId12"/>
+    <p:sldId id="266" r:id="rId13"/>
+    <p:sldId id="269" r:id="rId14"/>
+    <p:sldId id="267" r:id="rId15"/>
+    <p:sldId id="268" r:id="rId16"/>
   </p:sldIdLst>
   <p:sldSz cx="12192000" cy="6858000"/>
   <p:notesSz cx="6858000" cy="9144000"/>
@@ -123,6 +127,526 @@
     </p:ext>
   </p:extLst>
 </p:presentation>
+</file>
+
+<file path=ppt/notesMasters/notesMaster1.xml><?xml version="1.0" encoding="utf-8"?>
+<p:notesMaster xmlns:a="http://schemas.openxmlformats.org/drawingml/2006/main" xmlns:r="http://schemas.openxmlformats.org/officeDocument/2006/relationships" xmlns:p="http://schemas.openxmlformats.org/presentationml/2006/main">
+  <p:cSld>
+    <p:bg>
+      <p:bgRef idx="1001">
+        <a:schemeClr val="bg1"/>
+      </p:bgRef>
+    </p:bg>
+    <p:spTree>
+      <p:nvGrpSpPr>
+        <p:cNvPr id="1" name=""/>
+        <p:cNvGrpSpPr/>
+        <p:nvPr/>
+      </p:nvGrpSpPr>
+      <p:grpSpPr>
+        <a:xfrm>
+          <a:off x="0" y="0"/>
+          <a:ext cx="0" cy="0"/>
+          <a:chOff x="0" y="0"/>
+          <a:chExt cx="0" cy="0"/>
+        </a:xfrm>
+      </p:grpSpPr>
+      <p:sp>
+        <p:nvSpPr>
+          <p:cNvPr id="2" name="Header Placeholder 1"/>
+          <p:cNvSpPr>
+            <a:spLocks noGrp="1"/>
+          </p:cNvSpPr>
+          <p:nvPr>
+            <p:ph type="hdr" sz="quarter"/>
+          </p:nvPr>
+        </p:nvSpPr>
+        <p:spPr>
+          <a:xfrm>
+            <a:off x="0" y="0"/>
+            <a:ext cx="2971800" cy="458788"/>
+          </a:xfrm>
+          <a:prstGeom prst="rect">
+            <a:avLst/>
+          </a:prstGeom>
+        </p:spPr>
+        <p:txBody>
+          <a:bodyPr vert="horz" lIns="91440" tIns="45720" rIns="91440" bIns="45720" rtlCol="0"/>
+          <a:lstStyle>
+            <a:lvl1pPr algn="l">
+              <a:defRPr sz="1200"/>
+            </a:lvl1pPr>
+          </a:lstStyle>
+          <a:p>
+            <a:endParaRPr lang="en-US"/>
+          </a:p>
+        </p:txBody>
+      </p:sp>
+      <p:sp>
+        <p:nvSpPr>
+          <p:cNvPr id="3" name="Date Placeholder 2"/>
+          <p:cNvSpPr>
+            <a:spLocks noGrp="1"/>
+          </p:cNvSpPr>
+          <p:nvPr>
+            <p:ph type="dt" idx="1"/>
+          </p:nvPr>
+        </p:nvSpPr>
+        <p:spPr>
+          <a:xfrm>
+            <a:off x="3884613" y="0"/>
+            <a:ext cx="2971800" cy="458788"/>
+          </a:xfrm>
+          <a:prstGeom prst="rect">
+            <a:avLst/>
+          </a:prstGeom>
+        </p:spPr>
+        <p:txBody>
+          <a:bodyPr vert="horz" lIns="91440" tIns="45720" rIns="91440" bIns="45720" rtlCol="0"/>
+          <a:lstStyle>
+            <a:lvl1pPr algn="r">
+              <a:defRPr sz="1200"/>
+            </a:lvl1pPr>
+          </a:lstStyle>
+          <a:p>
+            <a:fld id="{6FCF3222-AAA2-4411-90BB-5FE1452B7927}" type="datetimeFigureOut">
+              <a:rPr lang="en-US" smtClean="0"/>
+              <a:t>10/23/2021</a:t>
+            </a:fld>
+            <a:endParaRPr lang="en-US"/>
+          </a:p>
+        </p:txBody>
+      </p:sp>
+      <p:sp>
+        <p:nvSpPr>
+          <p:cNvPr id="4" name="Slide Image Placeholder 3"/>
+          <p:cNvSpPr>
+            <a:spLocks noGrp="1" noRot="1" noChangeAspect="1"/>
+          </p:cNvSpPr>
+          <p:nvPr>
+            <p:ph type="sldImg" idx="2"/>
+          </p:nvPr>
+        </p:nvSpPr>
+        <p:spPr>
+          <a:xfrm>
+            <a:off x="685800" y="1143000"/>
+            <a:ext cx="5486400" cy="3086100"/>
+          </a:xfrm>
+          <a:prstGeom prst="rect">
+            <a:avLst/>
+          </a:prstGeom>
+          <a:noFill/>
+          <a:ln w="12700">
+            <a:solidFill>
+              <a:prstClr val="black"/>
+            </a:solidFill>
+          </a:ln>
+        </p:spPr>
+        <p:txBody>
+          <a:bodyPr vert="horz" lIns="91440" tIns="45720" rIns="91440" bIns="45720" rtlCol="0" anchor="ctr"/>
+          <a:lstStyle/>
+          <a:p>
+            <a:endParaRPr lang="en-US"/>
+          </a:p>
+        </p:txBody>
+      </p:sp>
+      <p:sp>
+        <p:nvSpPr>
+          <p:cNvPr id="5" name="Notes Placeholder 4"/>
+          <p:cNvSpPr>
+            <a:spLocks noGrp="1"/>
+          </p:cNvSpPr>
+          <p:nvPr>
+            <p:ph type="body" sz="quarter" idx="3"/>
+          </p:nvPr>
+        </p:nvSpPr>
+        <p:spPr>
+          <a:xfrm>
+            <a:off x="685800" y="4400550"/>
+            <a:ext cx="5486400" cy="3600450"/>
+          </a:xfrm>
+          <a:prstGeom prst="rect">
+            <a:avLst/>
+          </a:prstGeom>
+        </p:spPr>
+        <p:txBody>
+          <a:bodyPr vert="horz" lIns="91440" tIns="45720" rIns="91440" bIns="45720" rtlCol="0"/>
+          <a:lstStyle/>
+          <a:p>
+            <a:pPr lvl="0"/>
+            <a:r>
+              <a:rPr lang="en-US"/>
+              <a:t>Click to edit Master text styles</a:t>
+            </a:r>
+          </a:p>
+          <a:p>
+            <a:pPr lvl="1"/>
+            <a:r>
+              <a:rPr lang="en-US"/>
+              <a:t>Second level</a:t>
+            </a:r>
+          </a:p>
+          <a:p>
+            <a:pPr lvl="2"/>
+            <a:r>
+              <a:rPr lang="en-US"/>
+              <a:t>Third level</a:t>
+            </a:r>
+          </a:p>
+          <a:p>
+            <a:pPr lvl="3"/>
+            <a:r>
+              <a:rPr lang="en-US"/>
+              <a:t>Fourth level</a:t>
+            </a:r>
+          </a:p>
+          <a:p>
+            <a:pPr lvl="4"/>
+            <a:r>
+              <a:rPr lang="en-US"/>
+              <a:t>Fifth level</a:t>
+            </a:r>
+          </a:p>
+        </p:txBody>
+      </p:sp>
+      <p:sp>
+        <p:nvSpPr>
+          <p:cNvPr id="6" name="Footer Placeholder 5"/>
+          <p:cNvSpPr>
+            <a:spLocks noGrp="1"/>
+          </p:cNvSpPr>
+          <p:nvPr>
+            <p:ph type="ftr" sz="quarter" idx="4"/>
+          </p:nvPr>
+        </p:nvSpPr>
+        <p:spPr>
+          <a:xfrm>
+            <a:off x="0" y="8685213"/>
+            <a:ext cx="2971800" cy="458787"/>
+          </a:xfrm>
+          <a:prstGeom prst="rect">
+            <a:avLst/>
+          </a:prstGeom>
+        </p:spPr>
+        <p:txBody>
+          <a:bodyPr vert="horz" lIns="91440" tIns="45720" rIns="91440" bIns="45720" rtlCol="0" anchor="b"/>
+          <a:lstStyle>
+            <a:lvl1pPr algn="l">
+              <a:defRPr sz="1200"/>
+            </a:lvl1pPr>
+          </a:lstStyle>
+          <a:p>
+            <a:endParaRPr lang="en-US"/>
+          </a:p>
+        </p:txBody>
+      </p:sp>
+      <p:sp>
+        <p:nvSpPr>
+          <p:cNvPr id="7" name="Slide Number Placeholder 6"/>
+          <p:cNvSpPr>
+            <a:spLocks noGrp="1"/>
+          </p:cNvSpPr>
+          <p:nvPr>
+            <p:ph type="sldNum" sz="quarter" idx="5"/>
+          </p:nvPr>
+        </p:nvSpPr>
+        <p:spPr>
+          <a:xfrm>
+            <a:off x="3884613" y="8685213"/>
+            <a:ext cx="2971800" cy="458787"/>
+          </a:xfrm>
+          <a:prstGeom prst="rect">
+            <a:avLst/>
+          </a:prstGeom>
+        </p:spPr>
+        <p:txBody>
+          <a:bodyPr vert="horz" lIns="91440" tIns="45720" rIns="91440" bIns="45720" rtlCol="0" anchor="b"/>
+          <a:lstStyle>
+            <a:lvl1pPr algn="r">
+              <a:defRPr sz="1200"/>
+            </a:lvl1pPr>
+          </a:lstStyle>
+          <a:p>
+            <a:fld id="{113894EA-6DBB-44FC-9083-4B63A67C3C45}" type="slidenum">
+              <a:rPr lang="en-US" smtClean="0"/>
+              <a:t>‹#›</a:t>
+            </a:fld>
+            <a:endParaRPr lang="en-US"/>
+          </a:p>
+        </p:txBody>
+      </p:sp>
+    </p:spTree>
+    <p:extLst>
+      <p:ext uri="{BB962C8B-B14F-4D97-AF65-F5344CB8AC3E}">
+        <p14:creationId xmlns:p14="http://schemas.microsoft.com/office/powerpoint/2010/main" val="2717860309"/>
+      </p:ext>
+    </p:extLst>
+  </p:cSld>
+  <p:clrMap bg1="lt1" tx1="dk1" bg2="lt2" tx2="dk2" accent1="accent1" accent2="accent2" accent3="accent3" accent4="accent4" accent5="accent5" accent6="accent6" hlink="hlink" folHlink="folHlink"/>
+  <p:notesStyle>
+    <a:lvl1pPr marL="0" algn="l" defTabSz="914400" rtl="0" eaLnBrk="1" latinLnBrk="0" hangingPunct="1">
+      <a:defRPr sz="1200" kern="1200">
+        <a:solidFill>
+          <a:schemeClr val="tx1"/>
+        </a:solidFill>
+        <a:latin typeface="+mn-lt"/>
+        <a:ea typeface="+mn-ea"/>
+        <a:cs typeface="+mn-cs"/>
+      </a:defRPr>
+    </a:lvl1pPr>
+    <a:lvl2pPr marL="457200" algn="l" defTabSz="914400" rtl="0" eaLnBrk="1" latinLnBrk="0" hangingPunct="1">
+      <a:defRPr sz="1200" kern="1200">
+        <a:solidFill>
+          <a:schemeClr val="tx1"/>
+        </a:solidFill>
+        <a:latin typeface="+mn-lt"/>
+        <a:ea typeface="+mn-ea"/>
+        <a:cs typeface="+mn-cs"/>
+      </a:defRPr>
+    </a:lvl2pPr>
+    <a:lvl3pPr marL="914400" algn="l" defTabSz="914400" rtl="0" eaLnBrk="1" latinLnBrk="0" hangingPunct="1">
+      <a:defRPr sz="1200" kern="1200">
+        <a:solidFill>
+          <a:schemeClr val="tx1"/>
+        </a:solidFill>
+        <a:latin typeface="+mn-lt"/>
+        <a:ea typeface="+mn-ea"/>
+        <a:cs typeface="+mn-cs"/>
+      </a:defRPr>
+    </a:lvl3pPr>
+    <a:lvl4pPr marL="1371600" algn="l" defTabSz="914400" rtl="0" eaLnBrk="1" latinLnBrk="0" hangingPunct="1">
+      <a:defRPr sz="1200" kern="1200">
+        <a:solidFill>
+          <a:schemeClr val="tx1"/>
+        </a:solidFill>
+        <a:latin typeface="+mn-lt"/>
+        <a:ea typeface="+mn-ea"/>
+        <a:cs typeface="+mn-cs"/>
+      </a:defRPr>
+    </a:lvl4pPr>
+    <a:lvl5pPr marL="1828800" algn="l" defTabSz="914400" rtl="0" eaLnBrk="1" latinLnBrk="0" hangingPunct="1">
+      <a:defRPr sz="1200" kern="1200">
+        <a:solidFill>
+          <a:schemeClr val="tx1"/>
+        </a:solidFill>
+        <a:latin typeface="+mn-lt"/>
+        <a:ea typeface="+mn-ea"/>
+        <a:cs typeface="+mn-cs"/>
+      </a:defRPr>
+    </a:lvl5pPr>
+    <a:lvl6pPr marL="2286000" algn="l" defTabSz="914400" rtl="0" eaLnBrk="1" latinLnBrk="0" hangingPunct="1">
+      <a:defRPr sz="1200" kern="1200">
+        <a:solidFill>
+          <a:schemeClr val="tx1"/>
+        </a:solidFill>
+        <a:latin typeface="+mn-lt"/>
+        <a:ea typeface="+mn-ea"/>
+        <a:cs typeface="+mn-cs"/>
+      </a:defRPr>
+    </a:lvl6pPr>
+    <a:lvl7pPr marL="2743200" algn="l" defTabSz="914400" rtl="0" eaLnBrk="1" latinLnBrk="0" hangingPunct="1">
+      <a:defRPr sz="1200" kern="1200">
+        <a:solidFill>
+          <a:schemeClr val="tx1"/>
+        </a:solidFill>
+        <a:latin typeface="+mn-lt"/>
+        <a:ea typeface="+mn-ea"/>
+        <a:cs typeface="+mn-cs"/>
+      </a:defRPr>
+    </a:lvl7pPr>
+    <a:lvl8pPr marL="3200400" algn="l" defTabSz="914400" rtl="0" eaLnBrk="1" latinLnBrk="0" hangingPunct="1">
+      <a:defRPr sz="1200" kern="1200">
+        <a:solidFill>
+          <a:schemeClr val="tx1"/>
+        </a:solidFill>
+        <a:latin typeface="+mn-lt"/>
+        <a:ea typeface="+mn-ea"/>
+        <a:cs typeface="+mn-cs"/>
+      </a:defRPr>
+    </a:lvl8pPr>
+    <a:lvl9pPr marL="3657600" algn="l" defTabSz="914400" rtl="0" eaLnBrk="1" latinLnBrk="0" hangingPunct="1">
+      <a:defRPr sz="1200" kern="1200">
+        <a:solidFill>
+          <a:schemeClr val="tx1"/>
+        </a:solidFill>
+        <a:latin typeface="+mn-lt"/>
+        <a:ea typeface="+mn-ea"/>
+        <a:cs typeface="+mn-cs"/>
+      </a:defRPr>
+    </a:lvl9pPr>
+  </p:notesStyle>
+</p:notesMaster>
+</file>
+
+<file path=ppt/notesSlides/notesSlide1.xml><?xml version="1.0" encoding="utf-8"?>
+<p:notes xmlns:a="http://schemas.openxmlformats.org/drawingml/2006/main" xmlns:r="http://schemas.openxmlformats.org/officeDocument/2006/relationships" xmlns:p="http://schemas.openxmlformats.org/presentationml/2006/main">
+  <p:cSld>
+    <p:spTree>
+      <p:nvGrpSpPr>
+        <p:cNvPr id="1" name=""/>
+        <p:cNvGrpSpPr/>
+        <p:nvPr/>
+      </p:nvGrpSpPr>
+      <p:grpSpPr>
+        <a:xfrm>
+          <a:off x="0" y="0"/>
+          <a:ext cx="0" cy="0"/>
+          <a:chOff x="0" y="0"/>
+          <a:chExt cx="0" cy="0"/>
+        </a:xfrm>
+      </p:grpSpPr>
+      <p:sp>
+        <p:nvSpPr>
+          <p:cNvPr id="2" name="Slide Image Placeholder 1"/>
+          <p:cNvSpPr>
+            <a:spLocks noGrp="1" noRot="1" noChangeAspect="1"/>
+          </p:cNvSpPr>
+          <p:nvPr>
+            <p:ph type="sldImg"/>
+          </p:nvPr>
+        </p:nvSpPr>
+        <p:spPr/>
+      </p:sp>
+      <p:sp>
+        <p:nvSpPr>
+          <p:cNvPr id="3" name="Notes Placeholder 2"/>
+          <p:cNvSpPr>
+            <a:spLocks noGrp="1"/>
+          </p:cNvSpPr>
+          <p:nvPr>
+            <p:ph type="body" idx="1"/>
+          </p:nvPr>
+        </p:nvSpPr>
+        <p:spPr/>
+        <p:txBody>
+          <a:bodyPr/>
+          <a:lstStyle/>
+          <a:p>
+            <a:endParaRPr lang="en-US" dirty="0"/>
+          </a:p>
+        </p:txBody>
+      </p:sp>
+      <p:sp>
+        <p:nvSpPr>
+          <p:cNvPr id="4" name="Slide Number Placeholder 3"/>
+          <p:cNvSpPr>
+            <a:spLocks noGrp="1"/>
+          </p:cNvSpPr>
+          <p:nvPr>
+            <p:ph type="sldNum" sz="quarter" idx="5"/>
+          </p:nvPr>
+        </p:nvSpPr>
+        <p:spPr/>
+        <p:txBody>
+          <a:bodyPr/>
+          <a:lstStyle/>
+          <a:p>
+            <a:fld id="{113894EA-6DBB-44FC-9083-4B63A67C3C45}" type="slidenum">
+              <a:rPr lang="en-US" smtClean="0"/>
+              <a:t>1</a:t>
+            </a:fld>
+            <a:endParaRPr lang="en-US"/>
+          </a:p>
+        </p:txBody>
+      </p:sp>
+    </p:spTree>
+    <p:extLst>
+      <p:ext uri="{BB962C8B-B14F-4D97-AF65-F5344CB8AC3E}">
+        <p14:creationId xmlns:p14="http://schemas.microsoft.com/office/powerpoint/2010/main" val="2334105449"/>
+      </p:ext>
+    </p:extLst>
+  </p:cSld>
+  <p:clrMapOvr>
+    <a:masterClrMapping/>
+  </p:clrMapOvr>
+</p:notes>
+</file>
+
+<file path=ppt/notesSlides/notesSlide2.xml><?xml version="1.0" encoding="utf-8"?>
+<p:notes xmlns:a="http://schemas.openxmlformats.org/drawingml/2006/main" xmlns:r="http://schemas.openxmlformats.org/officeDocument/2006/relationships" xmlns:p="http://schemas.openxmlformats.org/presentationml/2006/main">
+  <p:cSld>
+    <p:spTree>
+      <p:nvGrpSpPr>
+        <p:cNvPr id="1" name=""/>
+        <p:cNvGrpSpPr/>
+        <p:nvPr/>
+      </p:nvGrpSpPr>
+      <p:grpSpPr>
+        <a:xfrm>
+          <a:off x="0" y="0"/>
+          <a:ext cx="0" cy="0"/>
+          <a:chOff x="0" y="0"/>
+          <a:chExt cx="0" cy="0"/>
+        </a:xfrm>
+      </p:grpSpPr>
+      <p:sp>
+        <p:nvSpPr>
+          <p:cNvPr id="2" name="Slide Image Placeholder 1"/>
+          <p:cNvSpPr>
+            <a:spLocks noGrp="1" noRot="1" noChangeAspect="1"/>
+          </p:cNvSpPr>
+          <p:nvPr>
+            <p:ph type="sldImg"/>
+          </p:nvPr>
+        </p:nvSpPr>
+        <p:spPr/>
+      </p:sp>
+      <p:sp>
+        <p:nvSpPr>
+          <p:cNvPr id="3" name="Notes Placeholder 2"/>
+          <p:cNvSpPr>
+            <a:spLocks noGrp="1"/>
+          </p:cNvSpPr>
+          <p:nvPr>
+            <p:ph type="body" idx="1"/>
+          </p:nvPr>
+        </p:nvSpPr>
+        <p:spPr/>
+        <p:txBody>
+          <a:bodyPr/>
+          <a:lstStyle/>
+          <a:p>
+            <a:r>
+              <a:rPr lang="en-US" dirty="0"/>
+              <a:t>these are the results, here’s how I got there, and this is how you can get there yourself</a:t>
+            </a:r>
+          </a:p>
+        </p:txBody>
+      </p:sp>
+      <p:sp>
+        <p:nvSpPr>
+          <p:cNvPr id="4" name="Slide Number Placeholder 3"/>
+          <p:cNvSpPr>
+            <a:spLocks noGrp="1"/>
+          </p:cNvSpPr>
+          <p:nvPr>
+            <p:ph type="sldNum" sz="quarter" idx="5"/>
+          </p:nvPr>
+        </p:nvSpPr>
+        <p:spPr/>
+        <p:txBody>
+          <a:bodyPr/>
+          <a:lstStyle/>
+          <a:p>
+            <a:fld id="{113894EA-6DBB-44FC-9083-4B63A67C3C45}" type="slidenum">
+              <a:rPr lang="en-US" smtClean="0"/>
+              <a:t>3</a:t>
+            </a:fld>
+            <a:endParaRPr lang="en-US"/>
+          </a:p>
+        </p:txBody>
+      </p:sp>
+    </p:spTree>
+    <p:extLst>
+      <p:ext uri="{BB962C8B-B14F-4D97-AF65-F5344CB8AC3E}">
+        <p14:creationId xmlns:p14="http://schemas.microsoft.com/office/powerpoint/2010/main" val="535706501"/>
+      </p:ext>
+    </p:extLst>
+  </p:cSld>
+  <p:clrMapOvr>
+    <a:masterClrMapping/>
+  </p:clrMapOvr>
+</p:notes>
 </file>
 
 <file path=ppt/slideLayouts/slideLayout1.xml><?xml version="1.0" encoding="utf-8"?>
@@ -3441,7 +3965,7 @@
           <p:cNvPr id="2" name="Title 1">
             <a:extLst>
               <a:ext uri="{FF2B5EF4-FFF2-40B4-BE49-F238E27FC236}">
-                <a16:creationId xmlns:a16="http://schemas.microsoft.com/office/drawing/2014/main" id="{21360BA8-EACD-4308-8246-3BC796668913}"/>
+                <a16:creationId xmlns:a16="http://schemas.microsoft.com/office/drawing/2014/main" id="{4180EA78-4EFB-4EF7-89AD-96F8ED906842}"/>
               </a:ext>
             </a:extLst>
           </p:cNvPr>
@@ -3459,7 +3983,7 @@
           <a:p>
             <a:r>
               <a:rPr lang="en-US" dirty="0"/>
-              <a:t>Class Imbalance and Resampling</a:t>
+              <a:t>Exploratory Data Analysis</a:t>
             </a:r>
           </a:p>
         </p:txBody>
@@ -3469,7 +3993,7 @@
           <p:cNvPr id="3" name="Content Placeholder 2">
             <a:extLst>
               <a:ext uri="{FF2B5EF4-FFF2-40B4-BE49-F238E27FC236}">
-                <a16:creationId xmlns:a16="http://schemas.microsoft.com/office/drawing/2014/main" id="{4BA42800-6156-4F3F-A810-901C5908E5CE}"/>
+                <a16:creationId xmlns:a16="http://schemas.microsoft.com/office/drawing/2014/main" id="{954581F8-8FD7-453F-A1E0-5ED8FA1C0355}"/>
               </a:ext>
             </a:extLst>
           </p:cNvPr>
@@ -3483,7 +4007,7 @@
         <p:spPr/>
         <p:txBody>
           <a:bodyPr>
-            <a:normAutofit fontScale="92500" lnSpcReduction="20000"/>
+            <a:normAutofit/>
           </a:bodyPr>
           <a:lstStyle/>
           <a:p>
@@ -3494,7 +4018,7 @@
             </a:pPr>
             <a:r>
               <a:rPr lang="en-US" sz="3600" dirty="0"/>
-              <a:t>Algorithms designed for balanced classes</a:t>
+              <a:t>Feature distributions</a:t>
             </a:r>
           </a:p>
           <a:p>
@@ -3521,7 +4045,7 @@
             </a:pPr>
             <a:r>
               <a:rPr lang="en-US" sz="3600" dirty="0"/>
-              <a:t>Minority class usually more important</a:t>
+              <a:t>Feature correlation</a:t>
             </a:r>
           </a:p>
           <a:p>
@@ -3548,7 +4072,231 @@
             </a:pPr>
             <a:r>
               <a:rPr lang="en-US" sz="3600" dirty="0"/>
-              <a:t>Under/Oversampling</a:t>
+              <a:t>Multicollinearity</a:t>
+            </a:r>
+          </a:p>
+        </p:txBody>
+      </p:sp>
+      <p:pic>
+        <p:nvPicPr>
+          <p:cNvPr id="6146" name="Picture 2" descr="Annotated Heatmaps of a Correlation Matrix in 5 Simple Steps | by Julia Kho  | Towards Data Science">
+            <a:extLst>
+              <a:ext uri="{FF2B5EF4-FFF2-40B4-BE49-F238E27FC236}">
+                <a16:creationId xmlns:a16="http://schemas.microsoft.com/office/drawing/2014/main" id="{88D60E71-E772-4456-94EC-5AD2072996AA}"/>
+              </a:ext>
+            </a:extLst>
+          </p:cNvPr>
+          <p:cNvPicPr>
+            <a:picLocks noChangeAspect="1" noChangeArrowheads="1"/>
+          </p:cNvPicPr>
+          <p:nvPr/>
+        </p:nvPicPr>
+        <p:blipFill>
+          <a:blip r:embed="rId2">
+            <a:extLst>
+              <a:ext uri="{28A0092B-C50C-407E-A947-70E740481C1C}">
+                <a14:useLocalDpi xmlns:a14="http://schemas.microsoft.com/office/drawing/2010/main" val="0"/>
+              </a:ext>
+            </a:extLst>
+          </a:blip>
+          <a:srcRect/>
+          <a:stretch>
+            <a:fillRect/>
+          </a:stretch>
+        </p:blipFill>
+        <p:spPr bwMode="auto">
+          <a:xfrm>
+            <a:off x="7826719" y="3153196"/>
+            <a:ext cx="3986001" cy="3411442"/>
+          </a:xfrm>
+          <a:prstGeom prst="rect">
+            <a:avLst/>
+          </a:prstGeom>
+          <a:noFill/>
+          <a:extLst>
+            <a:ext uri="{909E8E84-426E-40DD-AFC4-6F175D3DCCD1}">
+              <a14:hiddenFill xmlns:a14="http://schemas.microsoft.com/office/drawing/2010/main">
+                <a:solidFill>
+                  <a:srgbClr val="FFFFFF"/>
+                </a:solidFill>
+              </a14:hiddenFill>
+            </a:ext>
+          </a:extLst>
+        </p:spPr>
+      </p:pic>
+      <p:pic>
+        <p:nvPicPr>
+          <p:cNvPr id="6" name="Picture 5">
+            <a:extLst>
+              <a:ext uri="{FF2B5EF4-FFF2-40B4-BE49-F238E27FC236}">
+                <a16:creationId xmlns:a16="http://schemas.microsoft.com/office/drawing/2014/main" id="{27AAA21C-87CC-4D29-BF64-1CC2FD7342A4}"/>
+              </a:ext>
+            </a:extLst>
+          </p:cNvPr>
+          <p:cNvPicPr>
+            <a:picLocks noChangeAspect="1"/>
+          </p:cNvPicPr>
+          <p:nvPr/>
+        </p:nvPicPr>
+        <p:blipFill>
+          <a:blip r:embed="rId3"/>
+          <a:stretch>
+            <a:fillRect/>
+          </a:stretch>
+        </p:blipFill>
+        <p:spPr>
+          <a:xfrm>
+            <a:off x="7826719" y="296652"/>
+            <a:ext cx="3613112" cy="2788071"/>
+          </a:xfrm>
+          <a:prstGeom prst="rect">
+            <a:avLst/>
+          </a:prstGeom>
+        </p:spPr>
+      </p:pic>
+    </p:spTree>
+    <p:extLst>
+      <p:ext uri="{BB962C8B-B14F-4D97-AF65-F5344CB8AC3E}">
+        <p14:creationId xmlns:p14="http://schemas.microsoft.com/office/powerpoint/2010/main" val="2961069710"/>
+      </p:ext>
+    </p:extLst>
+  </p:cSld>
+  <p:clrMapOvr>
+    <a:masterClrMapping/>
+  </p:clrMapOvr>
+</p:sld>
+</file>
+
+<file path=ppt/slides/slide11.xml><?xml version="1.0" encoding="utf-8"?>
+<p:sld xmlns:a="http://schemas.openxmlformats.org/drawingml/2006/main" xmlns:r="http://schemas.openxmlformats.org/officeDocument/2006/relationships" xmlns:p="http://schemas.openxmlformats.org/presentationml/2006/main">
+  <p:cSld>
+    <p:spTree>
+      <p:nvGrpSpPr>
+        <p:cNvPr id="1" name=""/>
+        <p:cNvGrpSpPr/>
+        <p:nvPr/>
+      </p:nvGrpSpPr>
+      <p:grpSpPr>
+        <a:xfrm>
+          <a:off x="0" y="0"/>
+          <a:ext cx="0" cy="0"/>
+          <a:chOff x="0" y="0"/>
+          <a:chExt cx="0" cy="0"/>
+        </a:xfrm>
+      </p:grpSpPr>
+      <p:sp>
+        <p:nvSpPr>
+          <p:cNvPr id="2" name="Title 1">
+            <a:extLst>
+              <a:ext uri="{FF2B5EF4-FFF2-40B4-BE49-F238E27FC236}">
+                <a16:creationId xmlns:a16="http://schemas.microsoft.com/office/drawing/2014/main" id="{21360BA8-EACD-4308-8246-3BC796668913}"/>
+              </a:ext>
+            </a:extLst>
+          </p:cNvPr>
+          <p:cNvSpPr>
+            <a:spLocks noGrp="1"/>
+          </p:cNvSpPr>
+          <p:nvPr>
+            <p:ph type="title"/>
+          </p:nvPr>
+        </p:nvSpPr>
+        <p:spPr/>
+        <p:txBody>
+          <a:bodyPr/>
+          <a:lstStyle/>
+          <a:p>
+            <a:r>
+              <a:rPr lang="en-US" dirty="0"/>
+              <a:t>Class Imbalance and Resampling</a:t>
+            </a:r>
+          </a:p>
+        </p:txBody>
+      </p:sp>
+      <p:sp>
+        <p:nvSpPr>
+          <p:cNvPr id="3" name="Content Placeholder 2">
+            <a:extLst>
+              <a:ext uri="{FF2B5EF4-FFF2-40B4-BE49-F238E27FC236}">
+                <a16:creationId xmlns:a16="http://schemas.microsoft.com/office/drawing/2014/main" id="{4BA42800-6156-4F3F-A810-901C5908E5CE}"/>
+              </a:ext>
+            </a:extLst>
+          </p:cNvPr>
+          <p:cNvSpPr>
+            <a:spLocks noGrp="1"/>
+          </p:cNvSpPr>
+          <p:nvPr>
+            <p:ph sz="half" idx="1"/>
+          </p:nvPr>
+        </p:nvSpPr>
+        <p:spPr/>
+        <p:txBody>
+          <a:bodyPr>
+            <a:normAutofit fontScale="85000" lnSpcReduction="20000"/>
+          </a:bodyPr>
+          <a:lstStyle/>
+          <a:p>
+            <a:pPr>
+              <a:buSzPct val="60000"/>
+              <a:buFont typeface="Wingdings" panose="05000000000000000000" pitchFamily="2" charset="2"/>
+              <a:buChar char="§"/>
+            </a:pPr>
+            <a:r>
+              <a:rPr lang="en-US" sz="3600" dirty="0"/>
+              <a:t>Algorithms designed for balanced classes</a:t>
+            </a:r>
+          </a:p>
+          <a:p>
+            <a:pPr>
+              <a:buSzPct val="60000"/>
+              <a:buFont typeface="Wingdings" panose="05000000000000000000" pitchFamily="2" charset="2"/>
+              <a:buChar char="§"/>
+            </a:pPr>
+            <a:endParaRPr lang="en-US" sz="3600" dirty="0"/>
+          </a:p>
+          <a:p>
+            <a:pPr>
+              <a:buSzPct val="60000"/>
+              <a:buFont typeface="Wingdings" panose="05000000000000000000" pitchFamily="2" charset="2"/>
+              <a:buChar char="§"/>
+            </a:pPr>
+            <a:endParaRPr lang="en-US" sz="3600" dirty="0"/>
+          </a:p>
+          <a:p>
+            <a:pPr>
+              <a:buSzPct val="60000"/>
+              <a:buFont typeface="Wingdings" panose="05000000000000000000" pitchFamily="2" charset="2"/>
+              <a:buChar char="§"/>
+            </a:pPr>
+            <a:r>
+              <a:rPr lang="en-US" sz="3600" dirty="0"/>
+              <a:t>Minority class usually more important</a:t>
+            </a:r>
+          </a:p>
+          <a:p>
+            <a:pPr>
+              <a:buSzPct val="60000"/>
+              <a:buFont typeface="Wingdings" panose="05000000000000000000" pitchFamily="2" charset="2"/>
+              <a:buChar char="§"/>
+            </a:pPr>
+            <a:endParaRPr lang="en-US" sz="3600" dirty="0"/>
+          </a:p>
+          <a:p>
+            <a:pPr>
+              <a:buSzPct val="60000"/>
+              <a:buFont typeface="Wingdings" panose="05000000000000000000" pitchFamily="2" charset="2"/>
+              <a:buChar char="§"/>
+            </a:pPr>
+            <a:endParaRPr lang="en-US" sz="3600" dirty="0"/>
+          </a:p>
+          <a:p>
+            <a:pPr>
+              <a:buSzPct val="60000"/>
+              <a:buFont typeface="Wingdings" panose="05000000000000000000" pitchFamily="2" charset="2"/>
+              <a:buChar char="§"/>
+            </a:pPr>
+            <a:r>
+              <a:rPr lang="en-US" sz="3600" dirty="0"/>
+              <a:t>Under/Oversampling (Random, SMOTE, ROSE)</a:t>
             </a:r>
           </a:p>
         </p:txBody>
@@ -3679,7 +4427,7 @@
 </p:sld>
 </file>
 
-<file path=ppt/slides/slide11.xml><?xml version="1.0" encoding="utf-8"?>
+<file path=ppt/slides/slide12.xml><?xml version="1.0" encoding="utf-8"?>
 <p:sld xmlns:a="http://schemas.openxmlformats.org/drawingml/2006/main" xmlns:r="http://schemas.openxmlformats.org/officeDocument/2006/relationships" xmlns:p="http://schemas.openxmlformats.org/presentationml/2006/main">
   <p:cSld>
     <p:spTree>
@@ -3816,7 +4564,7 @@
 </p:sld>
 </file>
 
-<file path=ppt/slides/slide12.xml><?xml version="1.0" encoding="utf-8"?>
+<file path=ppt/slides/slide13.xml><?xml version="1.0" encoding="utf-8"?>
 <p:sld xmlns:a="http://schemas.openxmlformats.org/drawingml/2006/main" xmlns:r="http://schemas.openxmlformats.org/officeDocument/2006/relationships" xmlns:p="http://schemas.openxmlformats.org/presentationml/2006/main">
   <p:cSld>
     <p:spTree>
@@ -4002,266 +4750,287 @@
           </a:extLst>
         </p:spPr>
       </p:pic>
-      <p:pic>
-        <p:nvPicPr>
-          <p:cNvPr id="10244" name="Picture 4" descr="Data Science Simplified Part 10: An Introduction to Classification Models - Data  Science Central">
-            <a:extLst>
-              <a:ext uri="{FF2B5EF4-FFF2-40B4-BE49-F238E27FC236}">
-                <a16:creationId xmlns:a16="http://schemas.microsoft.com/office/drawing/2014/main" id="{7F3125F1-D319-41DB-AF0B-AB47D31F73AB}"/>
-              </a:ext>
-            </a:extLst>
-          </p:cNvPr>
-          <p:cNvPicPr>
-            <a:picLocks noChangeAspect="1" noChangeArrowheads="1"/>
-          </p:cNvPicPr>
+      <p:grpSp>
+        <p:nvGrpSpPr>
+          <p:cNvPr id="10" name="Group 9">
+            <a:extLst>
+              <a:ext uri="{FF2B5EF4-FFF2-40B4-BE49-F238E27FC236}">
+                <a16:creationId xmlns:a16="http://schemas.microsoft.com/office/drawing/2014/main" id="{8E4A9E1F-D561-4B0C-A695-3FBED6883F96}"/>
+              </a:ext>
+            </a:extLst>
+          </p:cNvPr>
+          <p:cNvGrpSpPr/>
           <p:nvPr/>
-        </p:nvPicPr>
-        <p:blipFill>
-          <a:blip r:embed="rId3">
-            <a:extLst>
-              <a:ext uri="{28A0092B-C50C-407E-A947-70E740481C1C}">
-                <a14:useLocalDpi xmlns:a14="http://schemas.microsoft.com/office/drawing/2010/main" val="0"/>
-              </a:ext>
-            </a:extLst>
-          </a:blip>
-          <a:srcRect/>
-          <a:stretch>
-            <a:fillRect/>
-          </a:stretch>
-        </p:blipFill>
-        <p:spPr bwMode="auto">
+        </p:nvGrpSpPr>
+        <p:grpSpPr>
           <a:xfrm>
             <a:off x="5794403" y="1027906"/>
             <a:ext cx="5408540" cy="2715491"/>
+            <a:chOff x="5794403" y="1027906"/>
+            <a:chExt cx="5408540" cy="2715491"/>
           </a:xfrm>
-          <a:prstGeom prst="rect">
-            <a:avLst/>
-          </a:prstGeom>
-          <a:noFill/>
-          <a:extLst>
-            <a:ext uri="{909E8E84-426E-40DD-AFC4-6F175D3DCCD1}">
-              <a14:hiddenFill xmlns:a14="http://schemas.microsoft.com/office/drawing/2010/main">
+        </p:grpSpPr>
+        <p:pic>
+          <p:nvPicPr>
+            <p:cNvPr id="10244" name="Picture 4" descr="Data Science Simplified Part 10: An Introduction to Classification Models - Data  Science Central">
+              <a:extLst>
+                <a:ext uri="{FF2B5EF4-FFF2-40B4-BE49-F238E27FC236}">
+                  <a16:creationId xmlns:a16="http://schemas.microsoft.com/office/drawing/2014/main" id="{7F3125F1-D319-41DB-AF0B-AB47D31F73AB}"/>
+                </a:ext>
+              </a:extLst>
+            </p:cNvPr>
+            <p:cNvPicPr>
+              <a:picLocks noChangeAspect="1" noChangeArrowheads="1"/>
+            </p:cNvPicPr>
+            <p:nvPr/>
+          </p:nvPicPr>
+          <p:blipFill>
+            <a:blip r:embed="rId3">
+              <a:extLst>
+                <a:ext uri="{28A0092B-C50C-407E-A947-70E740481C1C}">
+                  <a14:useLocalDpi xmlns:a14="http://schemas.microsoft.com/office/drawing/2010/main" val="0"/>
+                </a:ext>
+              </a:extLst>
+            </a:blip>
+            <a:srcRect/>
+            <a:stretch>
+              <a:fillRect/>
+            </a:stretch>
+          </p:blipFill>
+          <p:spPr bwMode="auto">
+            <a:xfrm>
+              <a:off x="5794403" y="1027906"/>
+              <a:ext cx="5408540" cy="2715491"/>
+            </a:xfrm>
+            <a:prstGeom prst="rect">
+              <a:avLst/>
+            </a:prstGeom>
+            <a:noFill/>
+            <a:extLst>
+              <a:ext uri="{909E8E84-426E-40DD-AFC4-6F175D3DCCD1}">
+                <a14:hiddenFill xmlns:a14="http://schemas.microsoft.com/office/drawing/2010/main">
+                  <a:solidFill>
+                    <a:srgbClr val="FFFFFF"/>
+                  </a:solidFill>
+                </a14:hiddenFill>
+              </a:ext>
+            </a:extLst>
+          </p:spPr>
+        </p:pic>
+        <p:sp>
+          <p:nvSpPr>
+            <p:cNvPr id="5" name="TextBox 4">
+              <a:extLst>
+                <a:ext uri="{FF2B5EF4-FFF2-40B4-BE49-F238E27FC236}">
+                  <a16:creationId xmlns:a16="http://schemas.microsoft.com/office/drawing/2014/main" id="{7063F507-A5B2-4B75-86BA-0067207B2B55}"/>
+                </a:ext>
+              </a:extLst>
+            </p:cNvPr>
+            <p:cNvSpPr txBox="1"/>
+            <p:nvPr/>
+          </p:nvSpPr>
+          <p:spPr>
+            <a:xfrm>
+              <a:off x="5794403" y="2727702"/>
+              <a:ext cx="962858" cy="253916"/>
+            </a:xfrm>
+            <a:prstGeom prst="rect">
+              <a:avLst/>
+            </a:prstGeom>
+            <a:solidFill>
+              <a:schemeClr val="bg1"/>
+            </a:solidFill>
+          </p:spPr>
+          <p:txBody>
+            <a:bodyPr wrap="square" rtlCol="0">
+              <a:spAutoFit/>
+            </a:bodyPr>
+            <a:lstStyle/>
+            <a:p>
+              <a:r>
+                <a:rPr lang="en-US" sz="1050" dirty="0"/>
+                <a:t>US Population</a:t>
+              </a:r>
+            </a:p>
+          </p:txBody>
+        </p:sp>
+        <p:sp>
+          <p:nvSpPr>
+            <p:cNvPr id="6" name="Trapezoid 5">
+              <a:extLst>
+                <a:ext uri="{FF2B5EF4-FFF2-40B4-BE49-F238E27FC236}">
+                  <a16:creationId xmlns:a16="http://schemas.microsoft.com/office/drawing/2014/main" id="{8C928915-A323-4AC3-B2FA-6982BFA2416A}"/>
+                </a:ext>
+              </a:extLst>
+            </p:cNvPr>
+            <p:cNvSpPr/>
+            <p:nvPr/>
+          </p:nvSpPr>
+          <p:spPr>
+            <a:xfrm rot="10800000">
+              <a:off x="9642761" y="2610454"/>
+              <a:ext cx="738910" cy="705384"/>
+            </a:xfrm>
+            <a:prstGeom prst="trapezoid">
+              <a:avLst/>
+            </a:prstGeom>
+            <a:solidFill>
+              <a:srgbClr val="FFFF00"/>
+            </a:solidFill>
+          </p:spPr>
+          <p:style>
+            <a:lnRef idx="2">
+              <a:schemeClr val="accent1">
+                <a:shade val="50000"/>
+              </a:schemeClr>
+            </a:lnRef>
+            <a:fillRef idx="1">
+              <a:schemeClr val="accent1"/>
+            </a:fillRef>
+            <a:effectRef idx="0">
+              <a:schemeClr val="accent1"/>
+            </a:effectRef>
+            <a:fontRef idx="minor">
+              <a:schemeClr val="lt1"/>
+            </a:fontRef>
+          </p:style>
+          <p:txBody>
+            <a:bodyPr wrap="square" rtlCol="0" anchor="ctr"/>
+            <a:lstStyle/>
+            <a:p>
+              <a:pPr algn="ctr"/>
+              <a:endParaRPr lang="en-US" dirty="0">
                 <a:solidFill>
-                  <a:srgbClr val="FFFFFF"/>
+                  <a:schemeClr val="tx1"/>
                 </a:solidFill>
-              </a14:hiddenFill>
-            </a:ext>
-          </a:extLst>
-        </p:spPr>
-      </p:pic>
-      <p:sp>
-        <p:nvSpPr>
-          <p:cNvPr id="5" name="TextBox 4">
-            <a:extLst>
-              <a:ext uri="{FF2B5EF4-FFF2-40B4-BE49-F238E27FC236}">
-                <a16:creationId xmlns:a16="http://schemas.microsoft.com/office/drawing/2014/main" id="{7063F507-A5B2-4B75-86BA-0067207B2B55}"/>
-              </a:ext>
-            </a:extLst>
-          </p:cNvPr>
-          <p:cNvSpPr txBox="1"/>
-          <p:nvPr/>
-        </p:nvSpPr>
-        <p:spPr>
-          <a:xfrm>
-            <a:off x="5794403" y="2727702"/>
-            <a:ext cx="962858" cy="253916"/>
-          </a:xfrm>
-          <a:prstGeom prst="rect">
-            <a:avLst/>
-          </a:prstGeom>
-          <a:solidFill>
-            <a:schemeClr val="bg1"/>
-          </a:solidFill>
-        </p:spPr>
-        <p:txBody>
-          <a:bodyPr wrap="square" rtlCol="0">
-            <a:spAutoFit/>
-          </a:bodyPr>
-          <a:lstStyle/>
-          <a:p>
-            <a:r>
-              <a:rPr lang="en-US" sz="1050" dirty="0"/>
-              <a:t>US Population</a:t>
-            </a:r>
-          </a:p>
-        </p:txBody>
-      </p:sp>
-      <p:sp>
-        <p:nvSpPr>
-          <p:cNvPr id="6" name="Trapezoid 5">
-            <a:extLst>
-              <a:ext uri="{FF2B5EF4-FFF2-40B4-BE49-F238E27FC236}">
-                <a16:creationId xmlns:a16="http://schemas.microsoft.com/office/drawing/2014/main" id="{8C928915-A323-4AC3-B2FA-6982BFA2416A}"/>
-              </a:ext>
-            </a:extLst>
-          </p:cNvPr>
-          <p:cNvSpPr/>
-          <p:nvPr/>
-        </p:nvSpPr>
-        <p:spPr>
-          <a:xfrm rot="10800000">
-            <a:off x="9642761" y="2610454"/>
-            <a:ext cx="738910" cy="705384"/>
-          </a:xfrm>
-          <a:prstGeom prst="trapezoid">
-            <a:avLst/>
-          </a:prstGeom>
-          <a:solidFill>
-            <a:srgbClr val="FFFF00"/>
-          </a:solidFill>
-        </p:spPr>
-        <p:style>
-          <a:lnRef idx="2">
-            <a:schemeClr val="accent1">
-              <a:shade val="50000"/>
-            </a:schemeClr>
-          </a:lnRef>
-          <a:fillRef idx="1">
-            <a:schemeClr val="accent1"/>
-          </a:fillRef>
-          <a:effectRef idx="0">
-            <a:schemeClr val="accent1"/>
-          </a:effectRef>
-          <a:fontRef idx="minor">
-            <a:schemeClr val="lt1"/>
-          </a:fontRef>
-        </p:style>
-        <p:txBody>
-          <a:bodyPr wrap="square" rtlCol="0" anchor="ctr"/>
-          <a:lstStyle/>
-          <a:p>
-            <a:pPr algn="ctr"/>
-            <a:endParaRPr lang="en-US" dirty="0">
-              <a:solidFill>
-                <a:schemeClr val="tx1"/>
-              </a:solidFill>
-            </a:endParaRPr>
-          </a:p>
-        </p:txBody>
-      </p:sp>
-      <p:sp>
-        <p:nvSpPr>
-          <p:cNvPr id="9" name="Trapezoid 8">
-            <a:extLst>
-              <a:ext uri="{FF2B5EF4-FFF2-40B4-BE49-F238E27FC236}">
-                <a16:creationId xmlns:a16="http://schemas.microsoft.com/office/drawing/2014/main" id="{8E13F2F3-F600-4534-BC8F-59231F2F97A2}"/>
-              </a:ext>
-            </a:extLst>
-          </p:cNvPr>
-          <p:cNvSpPr/>
-          <p:nvPr/>
-        </p:nvSpPr>
-        <p:spPr>
-          <a:xfrm rot="10800000">
-            <a:off x="9615053" y="1417111"/>
-            <a:ext cx="738910" cy="705384"/>
-          </a:xfrm>
-          <a:prstGeom prst="trapezoid">
-            <a:avLst/>
-          </a:prstGeom>
-          <a:solidFill>
-            <a:srgbClr val="FFFF00"/>
-          </a:solidFill>
-        </p:spPr>
-        <p:style>
-          <a:lnRef idx="2">
-            <a:schemeClr val="accent1">
-              <a:shade val="50000"/>
-            </a:schemeClr>
-          </a:lnRef>
-          <a:fillRef idx="1">
-            <a:schemeClr val="accent1"/>
-          </a:fillRef>
-          <a:effectRef idx="0">
-            <a:schemeClr val="accent1"/>
-          </a:effectRef>
-          <a:fontRef idx="minor">
-            <a:schemeClr val="lt1"/>
-          </a:fontRef>
-        </p:style>
-        <p:txBody>
-          <a:bodyPr wrap="square" rtlCol="0" anchor="ctr"/>
-          <a:lstStyle/>
-          <a:p>
-            <a:pPr algn="ctr"/>
-            <a:endParaRPr lang="en-US" dirty="0">
-              <a:solidFill>
-                <a:schemeClr val="tx1"/>
-              </a:solidFill>
-            </a:endParaRPr>
-          </a:p>
-        </p:txBody>
-      </p:sp>
-      <p:sp>
-        <p:nvSpPr>
-          <p:cNvPr id="7" name="TextBox 6">
-            <a:extLst>
-              <a:ext uri="{FF2B5EF4-FFF2-40B4-BE49-F238E27FC236}">
-                <a16:creationId xmlns:a16="http://schemas.microsoft.com/office/drawing/2014/main" id="{7E32BE16-902A-4414-B85E-72B20489A265}"/>
-              </a:ext>
-            </a:extLst>
-          </p:cNvPr>
-          <p:cNvSpPr txBox="1"/>
-          <p:nvPr/>
-        </p:nvSpPr>
-        <p:spPr>
-          <a:xfrm>
-            <a:off x="9701221" y="1582689"/>
-            <a:ext cx="669765" cy="338554"/>
-          </a:xfrm>
-          <a:prstGeom prst="rect">
-            <a:avLst/>
-          </a:prstGeom>
-          <a:noFill/>
-        </p:spPr>
-        <p:txBody>
-          <a:bodyPr wrap="square" rtlCol="0">
-            <a:spAutoFit/>
-          </a:bodyPr>
-          <a:lstStyle/>
-          <a:p>
-            <a:r>
-              <a:rPr lang="en-US" sz="1600" dirty="0"/>
-              <a:t>≥50k</a:t>
-            </a:r>
-          </a:p>
-        </p:txBody>
-      </p:sp>
-      <p:sp>
-        <p:nvSpPr>
-          <p:cNvPr id="11" name="TextBox 10">
-            <a:extLst>
-              <a:ext uri="{FF2B5EF4-FFF2-40B4-BE49-F238E27FC236}">
-                <a16:creationId xmlns:a16="http://schemas.microsoft.com/office/drawing/2014/main" id="{370690C7-B0F9-47AF-A526-F4BCF8D643BA}"/>
-              </a:ext>
-            </a:extLst>
-          </p:cNvPr>
-          <p:cNvSpPr txBox="1"/>
-          <p:nvPr/>
-        </p:nvSpPr>
-        <p:spPr>
-          <a:xfrm>
-            <a:off x="9710457" y="2799189"/>
-            <a:ext cx="669765" cy="338554"/>
-          </a:xfrm>
-          <a:prstGeom prst="rect">
-            <a:avLst/>
-          </a:prstGeom>
-          <a:noFill/>
-        </p:spPr>
-        <p:txBody>
-          <a:bodyPr wrap="square" rtlCol="0">
-            <a:spAutoFit/>
-          </a:bodyPr>
-          <a:lstStyle/>
-          <a:p>
-            <a:r>
-              <a:rPr lang="en-US" sz="1600" dirty="0"/>
-              <a:t>&lt;50k</a:t>
-            </a:r>
-          </a:p>
-        </p:txBody>
-      </p:sp>
+              </a:endParaRPr>
+            </a:p>
+          </p:txBody>
+        </p:sp>
+        <p:sp>
+          <p:nvSpPr>
+            <p:cNvPr id="9" name="Trapezoid 8">
+              <a:extLst>
+                <a:ext uri="{FF2B5EF4-FFF2-40B4-BE49-F238E27FC236}">
+                  <a16:creationId xmlns:a16="http://schemas.microsoft.com/office/drawing/2014/main" id="{8E13F2F3-F600-4534-BC8F-59231F2F97A2}"/>
+                </a:ext>
+              </a:extLst>
+            </p:cNvPr>
+            <p:cNvSpPr/>
+            <p:nvPr/>
+          </p:nvSpPr>
+          <p:spPr>
+            <a:xfrm rot="10800000">
+              <a:off x="9615053" y="1417111"/>
+              <a:ext cx="738910" cy="705384"/>
+            </a:xfrm>
+            <a:prstGeom prst="trapezoid">
+              <a:avLst/>
+            </a:prstGeom>
+            <a:solidFill>
+              <a:srgbClr val="FFFF00"/>
+            </a:solidFill>
+          </p:spPr>
+          <p:style>
+            <a:lnRef idx="2">
+              <a:schemeClr val="accent1">
+                <a:shade val="50000"/>
+              </a:schemeClr>
+            </a:lnRef>
+            <a:fillRef idx="1">
+              <a:schemeClr val="accent1"/>
+            </a:fillRef>
+            <a:effectRef idx="0">
+              <a:schemeClr val="accent1"/>
+            </a:effectRef>
+            <a:fontRef idx="minor">
+              <a:schemeClr val="lt1"/>
+            </a:fontRef>
+          </p:style>
+          <p:txBody>
+            <a:bodyPr wrap="square" rtlCol="0" anchor="ctr"/>
+            <a:lstStyle/>
+            <a:p>
+              <a:pPr algn="ctr"/>
+              <a:endParaRPr lang="en-US" dirty="0">
+                <a:solidFill>
+                  <a:schemeClr val="tx1"/>
+                </a:solidFill>
+              </a:endParaRPr>
+            </a:p>
+          </p:txBody>
+        </p:sp>
+        <p:sp>
+          <p:nvSpPr>
+            <p:cNvPr id="7" name="TextBox 6">
+              <a:extLst>
+                <a:ext uri="{FF2B5EF4-FFF2-40B4-BE49-F238E27FC236}">
+                  <a16:creationId xmlns:a16="http://schemas.microsoft.com/office/drawing/2014/main" id="{7E32BE16-902A-4414-B85E-72B20489A265}"/>
+                </a:ext>
+              </a:extLst>
+            </p:cNvPr>
+            <p:cNvSpPr txBox="1"/>
+            <p:nvPr/>
+          </p:nvSpPr>
+          <p:spPr>
+            <a:xfrm>
+              <a:off x="9701221" y="1582689"/>
+              <a:ext cx="669765" cy="338554"/>
+            </a:xfrm>
+            <a:prstGeom prst="rect">
+              <a:avLst/>
+            </a:prstGeom>
+            <a:noFill/>
+          </p:spPr>
+          <p:txBody>
+            <a:bodyPr wrap="square" rtlCol="0">
+              <a:spAutoFit/>
+            </a:bodyPr>
+            <a:lstStyle/>
+            <a:p>
+              <a:r>
+                <a:rPr lang="en-US" sz="1600" dirty="0"/>
+                <a:t>≥50k</a:t>
+              </a:r>
+            </a:p>
+          </p:txBody>
+        </p:sp>
+        <p:sp>
+          <p:nvSpPr>
+            <p:cNvPr id="11" name="TextBox 10">
+              <a:extLst>
+                <a:ext uri="{FF2B5EF4-FFF2-40B4-BE49-F238E27FC236}">
+                  <a16:creationId xmlns:a16="http://schemas.microsoft.com/office/drawing/2014/main" id="{370690C7-B0F9-47AF-A526-F4BCF8D643BA}"/>
+                </a:ext>
+              </a:extLst>
+            </p:cNvPr>
+            <p:cNvSpPr txBox="1"/>
+            <p:nvPr/>
+          </p:nvSpPr>
+          <p:spPr>
+            <a:xfrm>
+              <a:off x="9710457" y="2799189"/>
+              <a:ext cx="669765" cy="338554"/>
+            </a:xfrm>
+            <a:prstGeom prst="rect">
+              <a:avLst/>
+            </a:prstGeom>
+            <a:noFill/>
+          </p:spPr>
+          <p:txBody>
+            <a:bodyPr wrap="square" rtlCol="0">
+              <a:spAutoFit/>
+            </a:bodyPr>
+            <a:lstStyle/>
+            <a:p>
+              <a:r>
+                <a:rPr lang="en-US" sz="1600" dirty="0"/>
+                <a:t>&lt;50k</a:t>
+              </a:r>
+            </a:p>
+          </p:txBody>
+        </p:sp>
+      </p:grpSp>
     </p:spTree>
     <p:extLst>
       <p:ext uri="{BB962C8B-B14F-4D97-AF65-F5344CB8AC3E}">
@@ -4275,7 +5044,7 @@
 </p:sld>
 </file>
 
-<file path=ppt/slides/slide13.xml><?xml version="1.0" encoding="utf-8"?>
+<file path=ppt/slides/slide14.xml><?xml version="1.0" encoding="utf-8"?>
 <p:sld xmlns:a="http://schemas.openxmlformats.org/drawingml/2006/main" xmlns:r="http://schemas.openxmlformats.org/officeDocument/2006/relationships" xmlns:p="http://schemas.openxmlformats.org/presentationml/2006/main">
   <p:cSld>
     <p:spTree>
@@ -4405,7 +5174,7 @@
 </p:sld>
 </file>
 
-<file path=ppt/slides/slide14.xml><?xml version="1.0" encoding="utf-8"?>
+<file path=ppt/slides/slide15.xml><?xml version="1.0" encoding="utf-8"?>
 <p:sld xmlns:a="http://schemas.openxmlformats.org/drawingml/2006/main" xmlns:r="http://schemas.openxmlformats.org/officeDocument/2006/relationships" xmlns:p="http://schemas.openxmlformats.org/presentationml/2006/main">
   <p:cSld>
     <p:spTree>
@@ -4657,7 +5426,7 @@
           <p:cNvPr id="2" name="Title 1">
             <a:extLst>
               <a:ext uri="{FF2B5EF4-FFF2-40B4-BE49-F238E27FC236}">
-                <a16:creationId xmlns:a16="http://schemas.microsoft.com/office/drawing/2014/main" id="{3504E300-5C27-4433-B42C-97328405946E}"/>
+                <a16:creationId xmlns:a16="http://schemas.microsoft.com/office/drawing/2014/main" id="{6FF20C90-5F05-40D8-986E-76CC4FCE38DC}"/>
               </a:ext>
             </a:extLst>
           </p:cNvPr>
@@ -4675,250 +5444,40 @@
           <a:p>
             <a:r>
               <a:rPr lang="en-US" dirty="0"/>
-              <a:t>Regression, Classification, and Clustering</a:t>
-            </a:r>
-          </a:p>
-        </p:txBody>
-      </p:sp>
-      <p:sp>
-        <p:nvSpPr>
-          <p:cNvPr id="4" name="Content Placeholder 3">
-            <a:extLst>
-              <a:ext uri="{FF2B5EF4-FFF2-40B4-BE49-F238E27FC236}">
-                <a16:creationId xmlns:a16="http://schemas.microsoft.com/office/drawing/2014/main" id="{E1DC395D-A64C-452D-B6FF-1609AC110218}"/>
-              </a:ext>
-            </a:extLst>
-          </p:cNvPr>
-          <p:cNvSpPr>
-            <a:spLocks noGrp="1"/>
-          </p:cNvSpPr>
-          <p:nvPr>
-            <p:ph sz="half" idx="1"/>
-          </p:nvPr>
-        </p:nvSpPr>
-        <p:spPr>
-          <a:xfrm>
-            <a:off x="838199" y="1825625"/>
-            <a:ext cx="6144491" cy="4351338"/>
-          </a:xfrm>
-        </p:spPr>
-        <p:txBody>
-          <a:bodyPr>
-            <a:normAutofit/>
-          </a:bodyPr>
-          <a:lstStyle/>
-          <a:p>
-            <a:pPr>
-              <a:buSzPct val="60000"/>
-              <a:buFont typeface="Wingdings" panose="05000000000000000000" pitchFamily="2" charset="2"/>
-              <a:buChar char="§"/>
-            </a:pPr>
-            <a:r>
-              <a:rPr lang="en-US" sz="3600" dirty="0"/>
-              <a:t>Predict a numerical output</a:t>
-            </a:r>
-          </a:p>
-          <a:p>
-            <a:pPr>
-              <a:buSzPct val="60000"/>
-              <a:buFont typeface="Wingdings" panose="05000000000000000000" pitchFamily="2" charset="2"/>
-              <a:buChar char="§"/>
-            </a:pPr>
-            <a:endParaRPr lang="en-US" sz="3600" dirty="0"/>
-          </a:p>
-          <a:p>
-            <a:pPr>
-              <a:buSzPct val="60000"/>
-              <a:buFont typeface="Wingdings" panose="05000000000000000000" pitchFamily="2" charset="2"/>
-              <a:buChar char="§"/>
-            </a:pPr>
-            <a:endParaRPr lang="en-US" sz="3600" dirty="0"/>
-          </a:p>
-          <a:p>
-            <a:pPr>
-              <a:buSzPct val="60000"/>
-              <a:buFont typeface="Wingdings" panose="05000000000000000000" pitchFamily="2" charset="2"/>
-              <a:buChar char="§"/>
-            </a:pPr>
-            <a:r>
-              <a:rPr lang="en-US" sz="3600" dirty="0"/>
-              <a:t>Predict the class of a sample</a:t>
-            </a:r>
-          </a:p>
-          <a:p>
-            <a:pPr>
-              <a:buSzPct val="60000"/>
-              <a:buFont typeface="Wingdings" panose="05000000000000000000" pitchFamily="2" charset="2"/>
-              <a:buChar char="§"/>
-            </a:pPr>
-            <a:endParaRPr lang="en-US" sz="3600" dirty="0"/>
-          </a:p>
-          <a:p>
-            <a:pPr>
-              <a:buSzPct val="60000"/>
-              <a:buFont typeface="Wingdings" panose="05000000000000000000" pitchFamily="2" charset="2"/>
-              <a:buChar char="§"/>
-            </a:pPr>
-            <a:endParaRPr lang="en-US" sz="3600" dirty="0"/>
-          </a:p>
-          <a:p>
-            <a:pPr>
-              <a:buSzPct val="60000"/>
-              <a:buFont typeface="Wingdings" panose="05000000000000000000" pitchFamily="2" charset="2"/>
-              <a:buChar char="§"/>
-            </a:pPr>
-            <a:r>
-              <a:rPr lang="en-US" sz="3600" dirty="0"/>
-              <a:t>Create groupings of samples</a:t>
-            </a:r>
-          </a:p>
-        </p:txBody>
-      </p:sp>
-      <p:pic>
-        <p:nvPicPr>
-          <p:cNvPr id="1026" name="Picture 2" descr="In Depth Linear Regression. Understanding Algorithms starting with… | by  Mandy Gu | Towards Data Science">
-            <a:extLst>
-              <a:ext uri="{FF2B5EF4-FFF2-40B4-BE49-F238E27FC236}">
-                <a16:creationId xmlns:a16="http://schemas.microsoft.com/office/drawing/2014/main" id="{918CF61D-5FB0-41E0-9DAD-697F86AA54F9}"/>
-              </a:ext>
-            </a:extLst>
-          </p:cNvPr>
-          <p:cNvPicPr>
-            <a:picLocks noChangeAspect="1" noChangeArrowheads="1"/>
-          </p:cNvPicPr>
-          <p:nvPr/>
-        </p:nvPicPr>
-        <p:blipFill>
-          <a:blip r:embed="rId2">
-            <a:extLst>
-              <a:ext uri="{28A0092B-C50C-407E-A947-70E740481C1C}">
-                <a14:useLocalDpi xmlns:a14="http://schemas.microsoft.com/office/drawing/2010/main" val="0"/>
-              </a:ext>
-            </a:extLst>
-          </a:blip>
-          <a:srcRect/>
-          <a:stretch>
-            <a:fillRect/>
-          </a:stretch>
-        </p:blipFill>
-        <p:spPr bwMode="auto">
-          <a:xfrm>
-            <a:off x="6837220" y="1476769"/>
-            <a:ext cx="2953201" cy="1952231"/>
-          </a:xfrm>
-          <a:prstGeom prst="rect">
-            <a:avLst/>
-          </a:prstGeom>
-          <a:noFill/>
-          <a:extLst>
-            <a:ext uri="{909E8E84-426E-40DD-AFC4-6F175D3DCCD1}">
-              <a14:hiddenFill xmlns:a14="http://schemas.microsoft.com/office/drawing/2010/main">
-                <a:solidFill>
-                  <a:srgbClr val="FFFFFF"/>
-                </a:solidFill>
-              </a14:hiddenFill>
-            </a:ext>
-          </a:extLst>
-        </p:spPr>
-      </p:pic>
-      <p:pic>
-        <p:nvPicPr>
-          <p:cNvPr id="1028" name="Picture 4" descr="Understanding Data Science Classification Metrics in Scikit-Learn in Python  | by Andrew Long | Towards Data Science">
-            <a:extLst>
-              <a:ext uri="{FF2B5EF4-FFF2-40B4-BE49-F238E27FC236}">
-                <a16:creationId xmlns:a16="http://schemas.microsoft.com/office/drawing/2014/main" id="{F16C556A-5E3D-4179-B153-A6E0652C2B02}"/>
-              </a:ext>
-            </a:extLst>
-          </p:cNvPr>
-          <p:cNvPicPr>
-            <a:picLocks noChangeAspect="1" noChangeArrowheads="1"/>
-          </p:cNvPicPr>
-          <p:nvPr/>
-        </p:nvPicPr>
-        <p:blipFill>
-          <a:blip r:embed="rId3">
-            <a:extLst>
-              <a:ext uri="{28A0092B-C50C-407E-A947-70E740481C1C}">
-                <a14:useLocalDpi xmlns:a14="http://schemas.microsoft.com/office/drawing/2010/main" val="0"/>
-              </a:ext>
-            </a:extLst>
-          </a:blip>
-          <a:srcRect/>
-          <a:stretch>
-            <a:fillRect/>
-          </a:stretch>
-        </p:blipFill>
-        <p:spPr bwMode="auto">
-          <a:xfrm>
-            <a:off x="9830217" y="3128614"/>
-            <a:ext cx="2361783" cy="2147076"/>
-          </a:xfrm>
-          <a:prstGeom prst="rect">
-            <a:avLst/>
-          </a:prstGeom>
-          <a:noFill/>
-          <a:extLst>
-            <a:ext uri="{909E8E84-426E-40DD-AFC4-6F175D3DCCD1}">
-              <a14:hiddenFill xmlns:a14="http://schemas.microsoft.com/office/drawing/2010/main">
-                <a:solidFill>
-                  <a:srgbClr val="FFFFFF"/>
-                </a:solidFill>
-              </a14:hiddenFill>
-            </a:ext>
-          </a:extLst>
-        </p:spPr>
-      </p:pic>
-      <p:pic>
-        <p:nvPicPr>
-          <p:cNvPr id="1030" name="Picture 6" descr="KMeans Clustering for Classification | by Mudassir Khan | Towards Data  Science">
-            <a:extLst>
-              <a:ext uri="{FF2B5EF4-FFF2-40B4-BE49-F238E27FC236}">
-                <a16:creationId xmlns:a16="http://schemas.microsoft.com/office/drawing/2014/main" id="{E9EAE6CD-15BD-45C4-AE94-287748FAF04D}"/>
-              </a:ext>
-            </a:extLst>
-          </p:cNvPr>
-          <p:cNvPicPr>
-            <a:picLocks noChangeAspect="1" noChangeArrowheads="1"/>
-          </p:cNvPicPr>
-          <p:nvPr/>
-        </p:nvPicPr>
-        <p:blipFill>
-          <a:blip r:embed="rId4">
-            <a:extLst>
-              <a:ext uri="{28A0092B-C50C-407E-A947-70E740481C1C}">
-                <a14:useLocalDpi xmlns:a14="http://schemas.microsoft.com/office/drawing/2010/main" val="0"/>
-              </a:ext>
-            </a:extLst>
-          </a:blip>
-          <a:srcRect/>
-          <a:stretch>
-            <a:fillRect/>
-          </a:stretch>
-        </p:blipFill>
-        <p:spPr bwMode="auto">
-          <a:xfrm>
-            <a:off x="6650857" y="4780458"/>
-            <a:ext cx="3471397" cy="1952231"/>
-          </a:xfrm>
-          <a:prstGeom prst="rect">
-            <a:avLst/>
-          </a:prstGeom>
-          <a:noFill/>
-          <a:extLst>
-            <a:ext uri="{909E8E84-426E-40DD-AFC4-6F175D3DCCD1}">
-              <a14:hiddenFill xmlns:a14="http://schemas.microsoft.com/office/drawing/2010/main">
-                <a:solidFill>
-                  <a:srgbClr val="FFFFFF"/>
-                </a:solidFill>
-              </a14:hiddenFill>
-            </a:ext>
-          </a:extLst>
-        </p:spPr>
-      </p:pic>
+              <a:t>Results first</a:t>
+            </a:r>
+          </a:p>
+        </p:txBody>
+      </p:sp>
+      <p:sp>
+        <p:nvSpPr>
+          <p:cNvPr id="3" name="Content Placeholder 2">
+            <a:extLst>
+              <a:ext uri="{FF2B5EF4-FFF2-40B4-BE49-F238E27FC236}">
+                <a16:creationId xmlns:a16="http://schemas.microsoft.com/office/drawing/2014/main" id="{1B3D6663-4E19-4788-82C7-3C1ACA2C9B97}"/>
+              </a:ext>
+            </a:extLst>
+          </p:cNvPr>
+          <p:cNvSpPr>
+            <a:spLocks noGrp="1"/>
+          </p:cNvSpPr>
+          <p:nvPr>
+            <p:ph idx="1"/>
+          </p:nvPr>
+        </p:nvSpPr>
+        <p:spPr/>
+        <p:txBody>
+          <a:bodyPr/>
+          <a:lstStyle/>
+          <a:p>
+            <a:endParaRPr lang="en-US"/>
+          </a:p>
+        </p:txBody>
+      </p:sp>
     </p:spTree>
     <p:extLst>
       <p:ext uri="{BB962C8B-B14F-4D97-AF65-F5344CB8AC3E}">
-        <p14:creationId xmlns:p14="http://schemas.microsoft.com/office/powerpoint/2010/main" val="377983896"/>
+        <p14:creationId xmlns:p14="http://schemas.microsoft.com/office/powerpoint/2010/main" val="1087919869"/>
       </p:ext>
     </p:extLst>
   </p:cSld>
@@ -4950,6 +5509,349 @@
           <p:cNvPr id="2" name="Title 1">
             <a:extLst>
               <a:ext uri="{FF2B5EF4-FFF2-40B4-BE49-F238E27FC236}">
+                <a16:creationId xmlns:a16="http://schemas.microsoft.com/office/drawing/2014/main" id="{3504E300-5C27-4433-B42C-97328405946E}"/>
+              </a:ext>
+            </a:extLst>
+          </p:cNvPr>
+          <p:cNvSpPr>
+            <a:spLocks noGrp="1"/>
+          </p:cNvSpPr>
+          <p:nvPr>
+            <p:ph type="title"/>
+          </p:nvPr>
+        </p:nvSpPr>
+        <p:spPr/>
+        <p:txBody>
+          <a:bodyPr>
+            <a:normAutofit/>
+          </a:bodyPr>
+          <a:lstStyle/>
+          <a:p>
+            <a:r>
+              <a:rPr lang="en-US" sz="4000" dirty="0"/>
+              <a:t>Classification – Predicting the class of a sample</a:t>
+            </a:r>
+          </a:p>
+        </p:txBody>
+      </p:sp>
+      <p:grpSp>
+        <p:nvGrpSpPr>
+          <p:cNvPr id="13" name="Group 12">
+            <a:extLst>
+              <a:ext uri="{FF2B5EF4-FFF2-40B4-BE49-F238E27FC236}">
+                <a16:creationId xmlns:a16="http://schemas.microsoft.com/office/drawing/2014/main" id="{63CC29EC-2837-4688-8F48-558BA8B2D19D}"/>
+              </a:ext>
+            </a:extLst>
+          </p:cNvPr>
+          <p:cNvGrpSpPr>
+            <a:grpSpLocks noChangeAspect="1"/>
+          </p:cNvGrpSpPr>
+          <p:nvPr/>
+        </p:nvGrpSpPr>
+        <p:grpSpPr>
+          <a:xfrm>
+            <a:off x="1911252" y="1847706"/>
+            <a:ext cx="8369496" cy="4202112"/>
+            <a:chOff x="5794403" y="1027906"/>
+            <a:chExt cx="5408540" cy="2715491"/>
+          </a:xfrm>
+        </p:grpSpPr>
+        <p:pic>
+          <p:nvPicPr>
+            <p:cNvPr id="14" name="Picture 4" descr="Data Science Simplified Part 10: An Introduction to Classification Models - Data  Science Central">
+              <a:extLst>
+                <a:ext uri="{FF2B5EF4-FFF2-40B4-BE49-F238E27FC236}">
+                  <a16:creationId xmlns:a16="http://schemas.microsoft.com/office/drawing/2014/main" id="{002F2DA3-C176-445D-93D1-9244CA54C185}"/>
+                </a:ext>
+              </a:extLst>
+            </p:cNvPr>
+            <p:cNvPicPr>
+              <a:picLocks noChangeAspect="1" noChangeArrowheads="1"/>
+            </p:cNvPicPr>
+            <p:nvPr/>
+          </p:nvPicPr>
+          <p:blipFill>
+            <a:blip r:embed="rId2">
+              <a:extLst>
+                <a:ext uri="{28A0092B-C50C-407E-A947-70E740481C1C}">
+                  <a14:useLocalDpi xmlns:a14="http://schemas.microsoft.com/office/drawing/2010/main" val="0"/>
+                </a:ext>
+              </a:extLst>
+            </a:blip>
+            <a:srcRect/>
+            <a:stretch>
+              <a:fillRect/>
+            </a:stretch>
+          </p:blipFill>
+          <p:spPr bwMode="auto">
+            <a:xfrm>
+              <a:off x="5794403" y="1027906"/>
+              <a:ext cx="5408540" cy="2715491"/>
+            </a:xfrm>
+            <a:prstGeom prst="rect">
+              <a:avLst/>
+            </a:prstGeom>
+            <a:noFill/>
+            <a:extLst>
+              <a:ext uri="{909E8E84-426E-40DD-AFC4-6F175D3DCCD1}">
+                <a14:hiddenFill xmlns:a14="http://schemas.microsoft.com/office/drawing/2010/main">
+                  <a:solidFill>
+                    <a:srgbClr val="FFFFFF"/>
+                  </a:solidFill>
+                </a14:hiddenFill>
+              </a:ext>
+            </a:extLst>
+          </p:spPr>
+        </p:pic>
+        <p:sp>
+          <p:nvSpPr>
+            <p:cNvPr id="15" name="TextBox 14">
+              <a:extLst>
+                <a:ext uri="{FF2B5EF4-FFF2-40B4-BE49-F238E27FC236}">
+                  <a16:creationId xmlns:a16="http://schemas.microsoft.com/office/drawing/2014/main" id="{6CA1E5F5-4AF6-434B-BB5D-81140EE9C72E}"/>
+                </a:ext>
+              </a:extLst>
+            </p:cNvPr>
+            <p:cNvSpPr txBox="1"/>
+            <p:nvPr/>
+          </p:nvSpPr>
+          <p:spPr>
+            <a:xfrm>
+              <a:off x="5823232" y="2733100"/>
+              <a:ext cx="962858" cy="218781"/>
+            </a:xfrm>
+            <a:prstGeom prst="rect">
+              <a:avLst/>
+            </a:prstGeom>
+            <a:solidFill>
+              <a:schemeClr val="bg1"/>
+            </a:solidFill>
+          </p:spPr>
+          <p:txBody>
+            <a:bodyPr wrap="square" rtlCol="0">
+              <a:spAutoFit/>
+            </a:bodyPr>
+            <a:lstStyle/>
+            <a:p>
+              <a:r>
+                <a:rPr lang="en-US" sz="1600" dirty="0"/>
+                <a:t>US Population</a:t>
+              </a:r>
+            </a:p>
+          </p:txBody>
+        </p:sp>
+        <p:sp>
+          <p:nvSpPr>
+            <p:cNvPr id="16" name="Trapezoid 15">
+              <a:extLst>
+                <a:ext uri="{FF2B5EF4-FFF2-40B4-BE49-F238E27FC236}">
+                  <a16:creationId xmlns:a16="http://schemas.microsoft.com/office/drawing/2014/main" id="{DC31C1E0-8CAF-4CE5-AE29-9B8265ED71B6}"/>
+                </a:ext>
+              </a:extLst>
+            </p:cNvPr>
+            <p:cNvSpPr/>
+            <p:nvPr/>
+          </p:nvSpPr>
+          <p:spPr>
+            <a:xfrm rot="10800000">
+              <a:off x="9642761" y="2610454"/>
+              <a:ext cx="738910" cy="705384"/>
+            </a:xfrm>
+            <a:prstGeom prst="trapezoid">
+              <a:avLst/>
+            </a:prstGeom>
+            <a:solidFill>
+              <a:srgbClr val="FFFF00"/>
+            </a:solidFill>
+          </p:spPr>
+          <p:style>
+            <a:lnRef idx="2">
+              <a:schemeClr val="accent1">
+                <a:shade val="50000"/>
+              </a:schemeClr>
+            </a:lnRef>
+            <a:fillRef idx="1">
+              <a:schemeClr val="accent1"/>
+            </a:fillRef>
+            <a:effectRef idx="0">
+              <a:schemeClr val="accent1"/>
+            </a:effectRef>
+            <a:fontRef idx="minor">
+              <a:schemeClr val="lt1"/>
+            </a:fontRef>
+          </p:style>
+          <p:txBody>
+            <a:bodyPr wrap="square" rtlCol="0" anchor="ctr"/>
+            <a:lstStyle/>
+            <a:p>
+              <a:pPr algn="ctr"/>
+              <a:endParaRPr lang="en-US" dirty="0">
+                <a:solidFill>
+                  <a:schemeClr val="tx1"/>
+                </a:solidFill>
+              </a:endParaRPr>
+            </a:p>
+          </p:txBody>
+        </p:sp>
+        <p:sp>
+          <p:nvSpPr>
+            <p:cNvPr id="17" name="Trapezoid 16">
+              <a:extLst>
+                <a:ext uri="{FF2B5EF4-FFF2-40B4-BE49-F238E27FC236}">
+                  <a16:creationId xmlns:a16="http://schemas.microsoft.com/office/drawing/2014/main" id="{8EB3BB83-9065-49B8-AD2C-4EE08599E637}"/>
+                </a:ext>
+              </a:extLst>
+            </p:cNvPr>
+            <p:cNvSpPr/>
+            <p:nvPr/>
+          </p:nvSpPr>
+          <p:spPr>
+            <a:xfrm rot="10800000">
+              <a:off x="9615053" y="1417111"/>
+              <a:ext cx="738910" cy="705384"/>
+            </a:xfrm>
+            <a:prstGeom prst="trapezoid">
+              <a:avLst/>
+            </a:prstGeom>
+            <a:solidFill>
+              <a:srgbClr val="FFFF00"/>
+            </a:solidFill>
+          </p:spPr>
+          <p:style>
+            <a:lnRef idx="2">
+              <a:schemeClr val="accent1">
+                <a:shade val="50000"/>
+              </a:schemeClr>
+            </a:lnRef>
+            <a:fillRef idx="1">
+              <a:schemeClr val="accent1"/>
+            </a:fillRef>
+            <a:effectRef idx="0">
+              <a:schemeClr val="accent1"/>
+            </a:effectRef>
+            <a:fontRef idx="minor">
+              <a:schemeClr val="lt1"/>
+            </a:fontRef>
+          </p:style>
+          <p:txBody>
+            <a:bodyPr wrap="square" rtlCol="0" anchor="ctr"/>
+            <a:lstStyle/>
+            <a:p>
+              <a:pPr algn="ctr"/>
+              <a:endParaRPr lang="en-US" dirty="0">
+                <a:solidFill>
+                  <a:schemeClr val="tx1"/>
+                </a:solidFill>
+              </a:endParaRPr>
+            </a:p>
+          </p:txBody>
+        </p:sp>
+        <p:sp>
+          <p:nvSpPr>
+            <p:cNvPr id="18" name="TextBox 17">
+              <a:extLst>
+                <a:ext uri="{FF2B5EF4-FFF2-40B4-BE49-F238E27FC236}">
+                  <a16:creationId xmlns:a16="http://schemas.microsoft.com/office/drawing/2014/main" id="{506A44CD-30FB-4776-82A2-CEDBBB233814}"/>
+                </a:ext>
+              </a:extLst>
+            </p:cNvPr>
+            <p:cNvSpPr txBox="1"/>
+            <p:nvPr/>
+          </p:nvSpPr>
+          <p:spPr>
+            <a:xfrm>
+              <a:off x="9773806" y="1600525"/>
+              <a:ext cx="669765" cy="338554"/>
+            </a:xfrm>
+            <a:prstGeom prst="rect">
+              <a:avLst/>
+            </a:prstGeom>
+            <a:noFill/>
+          </p:spPr>
+          <p:txBody>
+            <a:bodyPr wrap="square" rtlCol="0">
+              <a:spAutoFit/>
+            </a:bodyPr>
+            <a:lstStyle/>
+            <a:p>
+              <a:r>
+                <a:rPr lang="en-US" sz="1600" dirty="0"/>
+                <a:t>≥50k</a:t>
+              </a:r>
+            </a:p>
+          </p:txBody>
+        </p:sp>
+        <p:sp>
+          <p:nvSpPr>
+            <p:cNvPr id="19" name="TextBox 18">
+              <a:extLst>
+                <a:ext uri="{FF2B5EF4-FFF2-40B4-BE49-F238E27FC236}">
+                  <a16:creationId xmlns:a16="http://schemas.microsoft.com/office/drawing/2014/main" id="{4B25C4C3-874A-41D5-BCF9-264CF44DAB3C}"/>
+                </a:ext>
+              </a:extLst>
+            </p:cNvPr>
+            <p:cNvSpPr txBox="1"/>
+            <p:nvPr/>
+          </p:nvSpPr>
+          <p:spPr>
+            <a:xfrm>
+              <a:off x="9829832" y="2860059"/>
+              <a:ext cx="669765" cy="338554"/>
+            </a:xfrm>
+            <a:prstGeom prst="rect">
+              <a:avLst/>
+            </a:prstGeom>
+            <a:noFill/>
+          </p:spPr>
+          <p:txBody>
+            <a:bodyPr wrap="square" rtlCol="0">
+              <a:spAutoFit/>
+            </a:bodyPr>
+            <a:lstStyle/>
+            <a:p>
+              <a:r>
+                <a:rPr lang="en-US" sz="1600" dirty="0"/>
+                <a:t>&lt;50k</a:t>
+              </a:r>
+            </a:p>
+          </p:txBody>
+        </p:sp>
+      </p:grpSp>
+    </p:spTree>
+    <p:extLst>
+      <p:ext uri="{BB962C8B-B14F-4D97-AF65-F5344CB8AC3E}">
+        <p14:creationId xmlns:p14="http://schemas.microsoft.com/office/powerpoint/2010/main" val="377983896"/>
+      </p:ext>
+    </p:extLst>
+  </p:cSld>
+  <p:clrMapOvr>
+    <a:masterClrMapping/>
+  </p:clrMapOvr>
+</p:sld>
+</file>
+
+<file path=ppt/slides/slide5.xml><?xml version="1.0" encoding="utf-8"?>
+<p:sld xmlns:a="http://schemas.openxmlformats.org/drawingml/2006/main" xmlns:r="http://schemas.openxmlformats.org/officeDocument/2006/relationships" xmlns:p="http://schemas.openxmlformats.org/presentationml/2006/main">
+  <p:cSld>
+    <p:spTree>
+      <p:nvGrpSpPr>
+        <p:cNvPr id="1" name=""/>
+        <p:cNvGrpSpPr/>
+        <p:nvPr/>
+      </p:nvGrpSpPr>
+      <p:grpSpPr>
+        <a:xfrm>
+          <a:off x="0" y="0"/>
+          <a:ext cx="0" cy="0"/>
+          <a:chOff x="0" y="0"/>
+          <a:chExt cx="0" cy="0"/>
+        </a:xfrm>
+      </p:grpSpPr>
+      <p:sp>
+        <p:nvSpPr>
+          <p:cNvPr id="2" name="Title 1">
+            <a:extLst>
+              <a:ext uri="{FF2B5EF4-FFF2-40B4-BE49-F238E27FC236}">
                 <a16:creationId xmlns:a16="http://schemas.microsoft.com/office/drawing/2014/main" id="{FDE775D4-BE99-4ECB-982E-FF1D2893F96C}"/>
               </a:ext>
             </a:extLst>
@@ -4988,9 +5890,9 @@
         <p:grpSpPr>
           <a:xfrm>
             <a:off x="2223433" y="1844346"/>
-            <a:ext cx="7745133" cy="4307073"/>
+            <a:ext cx="6195499" cy="4307073"/>
             <a:chOff x="1727619" y="1844346"/>
-            <a:chExt cx="7309157" cy="4151207"/>
+            <a:chExt cx="5846752" cy="4151207"/>
           </a:xfrm>
         </p:grpSpPr>
         <p:pic>
@@ -5024,53 +5926,6 @@
             <a:xfrm>
               <a:off x="1727619" y="1844346"/>
               <a:ext cx="4151207" cy="4151207"/>
-            </a:xfrm>
-            <a:prstGeom prst="rect">
-              <a:avLst/>
-            </a:prstGeom>
-            <a:noFill/>
-            <a:extLst>
-              <a:ext uri="{909E8E84-426E-40DD-AFC4-6F175D3DCCD1}">
-                <a14:hiddenFill xmlns:a14="http://schemas.microsoft.com/office/drawing/2010/main">
-                  <a:solidFill>
-                    <a:srgbClr val="FFFFFF"/>
-                  </a:solidFill>
-                </a14:hiddenFill>
-              </a:ext>
-            </a:extLst>
-          </p:spPr>
-        </p:pic>
-        <p:pic>
-          <p:nvPicPr>
-            <p:cNvPr id="2052" name="Picture 4" descr="Visualizing MNIST: An Exploration of Dimensionality Reduction - colah&amp;#39;s blog">
-              <a:extLst>
-                <a:ext uri="{FF2B5EF4-FFF2-40B4-BE49-F238E27FC236}">
-                  <a16:creationId xmlns:a16="http://schemas.microsoft.com/office/drawing/2014/main" id="{CBDDB1B3-E3AB-4D61-87C8-10C6E4398C76}"/>
-                </a:ext>
-              </a:extLst>
-            </p:cNvPr>
-            <p:cNvPicPr>
-              <a:picLocks noChangeAspect="1" noChangeArrowheads="1"/>
-            </p:cNvPicPr>
-            <p:nvPr/>
-          </p:nvPicPr>
-          <p:blipFill>
-            <a:blip r:embed="rId3">
-              <a:extLst>
-                <a:ext uri="{28A0092B-C50C-407E-A947-70E740481C1C}">
-                  <a14:useLocalDpi xmlns:a14="http://schemas.microsoft.com/office/drawing/2010/main" val="0"/>
-                </a:ext>
-              </a:extLst>
-            </a:blip>
-            <a:srcRect/>
-            <a:stretch>
-              <a:fillRect/>
-            </a:stretch>
-          </p:blipFill>
-          <p:spPr bwMode="auto">
-            <a:xfrm>
-              <a:off x="8118615" y="3457337"/>
-              <a:ext cx="918161" cy="925224"/>
             </a:xfrm>
             <a:prstGeom prst="rect">
               <a:avLst/>
@@ -5134,6 +5989,42 @@
           </p:txBody>
         </p:sp>
       </p:grpSp>
+      <p:sp>
+        <p:nvSpPr>
+          <p:cNvPr id="9" name="TextBox 8">
+            <a:extLst>
+              <a:ext uri="{FF2B5EF4-FFF2-40B4-BE49-F238E27FC236}">
+                <a16:creationId xmlns:a16="http://schemas.microsoft.com/office/drawing/2014/main" id="{127EE946-099C-40D5-B9B4-15EB7426C6FF}"/>
+              </a:ext>
+            </a:extLst>
+          </p:cNvPr>
+          <p:cNvSpPr txBox="1"/>
+          <p:nvPr/>
+        </p:nvSpPr>
+        <p:spPr>
+          <a:xfrm>
+            <a:off x="8793018" y="3613161"/>
+            <a:ext cx="1175549" cy="769441"/>
+          </a:xfrm>
+          <a:prstGeom prst="rect">
+            <a:avLst/>
+          </a:prstGeom>
+          <a:noFill/>
+        </p:spPr>
+        <p:txBody>
+          <a:bodyPr wrap="square" rtlCol="0">
+            <a:spAutoFit/>
+          </a:bodyPr>
+          <a:lstStyle/>
+          <a:p>
+            <a:r>
+              <a:rPr lang="en-US" sz="4400" dirty="0"/>
+              <a:t>2</a:t>
+            </a:r>
+            <a:endParaRPr lang="en-US" dirty="0"/>
+          </a:p>
+        </p:txBody>
+      </p:sp>
     </p:spTree>
     <p:extLst>
       <p:ext uri="{BB962C8B-B14F-4D97-AF65-F5344CB8AC3E}">
@@ -5147,7 +6038,7 @@
 </p:sld>
 </file>
 
-<file path=ppt/slides/slide5.xml><?xml version="1.0" encoding="utf-8"?>
+<file path=ppt/slides/slide6.xml><?xml version="1.0" encoding="utf-8"?>
 <p:sld xmlns:a="http://schemas.openxmlformats.org/drawingml/2006/main" xmlns:r="http://schemas.openxmlformats.org/officeDocument/2006/relationships" xmlns:p="http://schemas.openxmlformats.org/presentationml/2006/main">
   <p:cSld>
     <p:spTree>
@@ -5207,9 +6098,9 @@
         <p:grpSpPr>
           <a:xfrm>
             <a:off x="2895578" y="2059084"/>
-            <a:ext cx="6400843" cy="3738808"/>
+            <a:ext cx="5203367" cy="3738808"/>
             <a:chOff x="2490355" y="2037050"/>
-            <a:chExt cx="6400843" cy="3738808"/>
+            <a:chExt cx="5203367" cy="3738808"/>
           </a:xfrm>
         </p:grpSpPr>
         <p:pic>
@@ -5242,45 +6133,6 @@
             </a:prstGeom>
           </p:spPr>
         </p:pic>
-        <p:pic>
-          <p:nvPicPr>
-            <p:cNvPr id="6" name="Graphic 5" descr="Question mark with solid fill">
-              <a:extLst>
-                <a:ext uri="{FF2B5EF4-FFF2-40B4-BE49-F238E27FC236}">
-                  <a16:creationId xmlns:a16="http://schemas.microsoft.com/office/drawing/2014/main" id="{4DB0C2FE-D876-43C1-844C-F26401746D5B}"/>
-                </a:ext>
-              </a:extLst>
-            </p:cNvPr>
-            <p:cNvPicPr>
-              <a:picLocks noChangeAspect="1"/>
-            </p:cNvPicPr>
-            <p:nvPr/>
-          </p:nvPicPr>
-          <p:blipFill>
-            <a:blip r:embed="rId3">
-              <a:extLst>
-                <a:ext uri="{28A0092B-C50C-407E-A947-70E740481C1C}">
-                  <a14:useLocalDpi xmlns:a14="http://schemas.microsoft.com/office/drawing/2010/main" val="0"/>
-                </a:ext>
-                <a:ext uri="{96DAC541-7B7A-43D3-8B79-37D633B846F1}">
-                  <asvg:svgBlip xmlns:asvg="http://schemas.microsoft.com/office/drawing/2016/SVG/main" r:embed="rId4"/>
-                </a:ext>
-              </a:extLst>
-            </a:blip>
-            <a:stretch>
-              <a:fillRect/>
-            </a:stretch>
-          </p:blipFill>
-          <p:spPr>
-            <a:xfrm>
-              <a:off x="7831325" y="3429000"/>
-              <a:ext cx="1059873" cy="1059873"/>
-            </a:xfrm>
-            <a:prstGeom prst="rect">
-              <a:avLst/>
-            </a:prstGeom>
-          </p:spPr>
-        </p:pic>
         <p:sp>
           <p:nvSpPr>
             <p:cNvPr id="7" name="Arrow: Right 6">
@@ -5295,7 +6147,7 @@
           </p:nvSpPr>
           <p:spPr>
             <a:xfrm>
-              <a:off x="6353675" y="3693709"/>
+              <a:off x="6473747" y="3644844"/>
               <a:ext cx="1219975" cy="530456"/>
             </a:xfrm>
             <a:prstGeom prst="rightArrow">
@@ -5328,6 +6180,41 @@
           </p:txBody>
         </p:sp>
       </p:grpSp>
+      <p:sp>
+        <p:nvSpPr>
+          <p:cNvPr id="10" name="TextBox 9">
+            <a:extLst>
+              <a:ext uri="{FF2B5EF4-FFF2-40B4-BE49-F238E27FC236}">
+                <a16:creationId xmlns:a16="http://schemas.microsoft.com/office/drawing/2014/main" id="{E236471E-6C89-47D6-82AA-E41BEB287144}"/>
+              </a:ext>
+            </a:extLst>
+          </p:cNvPr>
+          <p:cNvSpPr txBox="1"/>
+          <p:nvPr/>
+        </p:nvSpPr>
+        <p:spPr>
+          <a:xfrm>
+            <a:off x="8236548" y="3666878"/>
+            <a:ext cx="1819564" cy="523220"/>
+          </a:xfrm>
+          <a:prstGeom prst="rect">
+            <a:avLst/>
+          </a:prstGeom>
+          <a:noFill/>
+        </p:spPr>
+        <p:txBody>
+          <a:bodyPr wrap="square" rtlCol="0">
+            <a:spAutoFit/>
+          </a:bodyPr>
+          <a:lstStyle/>
+          <a:p>
+            <a:r>
+              <a:rPr lang="en-US" sz="2800" dirty="0"/>
+              <a:t>“what?”</a:t>
+            </a:r>
+          </a:p>
+        </p:txBody>
+      </p:sp>
     </p:spTree>
     <p:extLst>
       <p:ext uri="{BB962C8B-B14F-4D97-AF65-F5344CB8AC3E}">
@@ -5341,7 +6228,7 @@
 </p:sld>
 </file>
 
-<file path=ppt/slides/slide6.xml><?xml version="1.0" encoding="utf-8"?>
+<file path=ppt/slides/slide7.xml><?xml version="1.0" encoding="utf-8"?>
 <p:sld xmlns:a="http://schemas.openxmlformats.org/drawingml/2006/main" xmlns:r="http://schemas.openxmlformats.org/officeDocument/2006/relationships" xmlns:p="http://schemas.openxmlformats.org/presentationml/2006/main">
   <p:cSld>
     <p:spTree>
@@ -5402,7 +6289,12 @@
             <p:ph sz="half" idx="1"/>
           </p:nvPr>
         </p:nvSpPr>
-        <p:spPr/>
+        <p:spPr>
+          <a:xfrm>
+            <a:off x="838200" y="1825625"/>
+            <a:ext cx="5553364" cy="4351338"/>
+          </a:xfrm>
+        </p:spPr>
         <p:txBody>
           <a:bodyPr>
             <a:normAutofit/>
@@ -5416,7 +6308,7 @@
             </a:pPr>
             <a:r>
               <a:rPr lang="en-US" sz="3600" dirty="0"/>
-              <a:t>Garbage in, garbage out</a:t>
+              <a:t>“Garbage in, garbage out”</a:t>
             </a:r>
           </a:p>
           <a:p>
@@ -5535,7 +6427,7 @@
 </p:sld>
 </file>
 
-<file path=ppt/slides/slide7.xml><?xml version="1.0" encoding="utf-8"?>
+<file path=ppt/slides/slide8.xml><?xml version="1.0" encoding="utf-8"?>
 <p:sld xmlns:a="http://schemas.openxmlformats.org/drawingml/2006/main" xmlns:r="http://schemas.openxmlformats.org/officeDocument/2006/relationships" xmlns:p="http://schemas.openxmlformats.org/presentationml/2006/main">
   <p:cSld>
     <p:spTree>
@@ -5742,6 +6634,58 @@
           </a:prstGeom>
         </p:spPr>
       </p:pic>
+      <p:sp>
+        <p:nvSpPr>
+          <p:cNvPr id="9" name="Rectangle 8">
+            <a:extLst>
+              <a:ext uri="{FF2B5EF4-FFF2-40B4-BE49-F238E27FC236}">
+                <a16:creationId xmlns:a16="http://schemas.microsoft.com/office/drawing/2014/main" id="{8E412A1C-C456-4F4B-A5E3-01EAF958CC8E}"/>
+              </a:ext>
+            </a:extLst>
+          </p:cNvPr>
+          <p:cNvSpPr/>
+          <p:nvPr/>
+        </p:nvSpPr>
+        <p:spPr>
+          <a:xfrm>
+            <a:off x="10160000" y="2207491"/>
+            <a:ext cx="683492" cy="738909"/>
+          </a:xfrm>
+          <a:prstGeom prst="rect">
+            <a:avLst/>
+          </a:prstGeom>
+          <a:noFill/>
+          <a:ln w="28575">
+            <a:solidFill>
+              <a:srgbClr val="FF0000"/>
+            </a:solidFill>
+          </a:ln>
+        </p:spPr>
+        <p:style>
+          <a:lnRef idx="2">
+            <a:schemeClr val="accent1">
+              <a:shade val="50000"/>
+            </a:schemeClr>
+          </a:lnRef>
+          <a:fillRef idx="1">
+            <a:schemeClr val="accent1"/>
+          </a:fillRef>
+          <a:effectRef idx="0">
+            <a:schemeClr val="accent1"/>
+          </a:effectRef>
+          <a:fontRef idx="minor">
+            <a:schemeClr val="lt1"/>
+          </a:fontRef>
+        </p:style>
+        <p:txBody>
+          <a:bodyPr rtlCol="0" anchor="ctr"/>
+          <a:lstStyle/>
+          <a:p>
+            <a:pPr algn="ctr"/>
+            <a:endParaRPr lang="en-US"/>
+          </a:p>
+        </p:txBody>
+      </p:sp>
     </p:spTree>
     <p:extLst>
       <p:ext uri="{BB962C8B-B14F-4D97-AF65-F5344CB8AC3E}">
@@ -5755,7 +6699,7 @@
 </p:sld>
 </file>
 
-<file path=ppt/slides/slide8.xml><?xml version="1.0" encoding="utf-8"?>
+<file path=ppt/slides/slide9.xml><?xml version="1.0" encoding="utf-8"?>
 <p:sld xmlns:a="http://schemas.openxmlformats.org/drawingml/2006/main" xmlns:r="http://schemas.openxmlformats.org/officeDocument/2006/relationships" xmlns:p="http://schemas.openxmlformats.org/presentationml/2006/main">
   <p:cSld>
     <p:spTree>
@@ -5973,230 +6917,6 @@
     <p:extLst>
       <p:ext uri="{BB962C8B-B14F-4D97-AF65-F5344CB8AC3E}">
         <p14:creationId xmlns:p14="http://schemas.microsoft.com/office/powerpoint/2010/main" val="1305872320"/>
-      </p:ext>
-    </p:extLst>
-  </p:cSld>
-  <p:clrMapOvr>
-    <a:masterClrMapping/>
-  </p:clrMapOvr>
-</p:sld>
-</file>
-
-<file path=ppt/slides/slide9.xml><?xml version="1.0" encoding="utf-8"?>
-<p:sld xmlns:a="http://schemas.openxmlformats.org/drawingml/2006/main" xmlns:r="http://schemas.openxmlformats.org/officeDocument/2006/relationships" xmlns:p="http://schemas.openxmlformats.org/presentationml/2006/main">
-  <p:cSld>
-    <p:spTree>
-      <p:nvGrpSpPr>
-        <p:cNvPr id="1" name=""/>
-        <p:cNvGrpSpPr/>
-        <p:nvPr/>
-      </p:nvGrpSpPr>
-      <p:grpSpPr>
-        <a:xfrm>
-          <a:off x="0" y="0"/>
-          <a:ext cx="0" cy="0"/>
-          <a:chOff x="0" y="0"/>
-          <a:chExt cx="0" cy="0"/>
-        </a:xfrm>
-      </p:grpSpPr>
-      <p:sp>
-        <p:nvSpPr>
-          <p:cNvPr id="2" name="Title 1">
-            <a:extLst>
-              <a:ext uri="{FF2B5EF4-FFF2-40B4-BE49-F238E27FC236}">
-                <a16:creationId xmlns:a16="http://schemas.microsoft.com/office/drawing/2014/main" id="{4180EA78-4EFB-4EF7-89AD-96F8ED906842}"/>
-              </a:ext>
-            </a:extLst>
-          </p:cNvPr>
-          <p:cNvSpPr>
-            <a:spLocks noGrp="1"/>
-          </p:cNvSpPr>
-          <p:nvPr>
-            <p:ph type="title"/>
-          </p:nvPr>
-        </p:nvSpPr>
-        <p:spPr/>
-        <p:txBody>
-          <a:bodyPr/>
-          <a:lstStyle/>
-          <a:p>
-            <a:r>
-              <a:rPr lang="en-US" dirty="0"/>
-              <a:t>Exploratory Data Analysis</a:t>
-            </a:r>
-          </a:p>
-        </p:txBody>
-      </p:sp>
-      <p:sp>
-        <p:nvSpPr>
-          <p:cNvPr id="3" name="Content Placeholder 2">
-            <a:extLst>
-              <a:ext uri="{FF2B5EF4-FFF2-40B4-BE49-F238E27FC236}">
-                <a16:creationId xmlns:a16="http://schemas.microsoft.com/office/drawing/2014/main" id="{954581F8-8FD7-453F-A1E0-5ED8FA1C0355}"/>
-              </a:ext>
-            </a:extLst>
-          </p:cNvPr>
-          <p:cNvSpPr>
-            <a:spLocks noGrp="1"/>
-          </p:cNvSpPr>
-          <p:nvPr>
-            <p:ph sz="half" idx="1"/>
-          </p:nvPr>
-        </p:nvSpPr>
-        <p:spPr/>
-        <p:txBody>
-          <a:bodyPr>
-            <a:normAutofit/>
-          </a:bodyPr>
-          <a:lstStyle/>
-          <a:p>
-            <a:pPr>
-              <a:buSzPct val="60000"/>
-              <a:buFont typeface="Wingdings" panose="05000000000000000000" pitchFamily="2" charset="2"/>
-              <a:buChar char="§"/>
-            </a:pPr>
-            <a:r>
-              <a:rPr lang="en-US" sz="3600" dirty="0"/>
-              <a:t>Feature distributions</a:t>
-            </a:r>
-          </a:p>
-          <a:p>
-            <a:pPr>
-              <a:buSzPct val="60000"/>
-              <a:buFont typeface="Wingdings" panose="05000000000000000000" pitchFamily="2" charset="2"/>
-              <a:buChar char="§"/>
-            </a:pPr>
-            <a:endParaRPr lang="en-US" sz="3600" dirty="0"/>
-          </a:p>
-          <a:p>
-            <a:pPr>
-              <a:buSzPct val="60000"/>
-              <a:buFont typeface="Wingdings" panose="05000000000000000000" pitchFamily="2" charset="2"/>
-              <a:buChar char="§"/>
-            </a:pPr>
-            <a:endParaRPr lang="en-US" sz="3600" dirty="0"/>
-          </a:p>
-          <a:p>
-            <a:pPr>
-              <a:buSzPct val="60000"/>
-              <a:buFont typeface="Wingdings" panose="05000000000000000000" pitchFamily="2" charset="2"/>
-              <a:buChar char="§"/>
-            </a:pPr>
-            <a:r>
-              <a:rPr lang="en-US" sz="3600" dirty="0"/>
-              <a:t>Feature correlation</a:t>
-            </a:r>
-          </a:p>
-          <a:p>
-            <a:pPr>
-              <a:buSzPct val="60000"/>
-              <a:buFont typeface="Wingdings" panose="05000000000000000000" pitchFamily="2" charset="2"/>
-              <a:buChar char="§"/>
-            </a:pPr>
-            <a:endParaRPr lang="en-US" sz="3600" dirty="0"/>
-          </a:p>
-          <a:p>
-            <a:pPr>
-              <a:buSzPct val="60000"/>
-              <a:buFont typeface="Wingdings" panose="05000000000000000000" pitchFamily="2" charset="2"/>
-              <a:buChar char="§"/>
-            </a:pPr>
-            <a:endParaRPr lang="en-US" sz="3600" dirty="0"/>
-          </a:p>
-          <a:p>
-            <a:pPr>
-              <a:buSzPct val="60000"/>
-              <a:buFont typeface="Wingdings" panose="05000000000000000000" pitchFamily="2" charset="2"/>
-              <a:buChar char="§"/>
-            </a:pPr>
-            <a:r>
-              <a:rPr lang="en-US" sz="3600" dirty="0"/>
-              <a:t>Multicollinearity</a:t>
-            </a:r>
-          </a:p>
-        </p:txBody>
-      </p:sp>
-      <p:pic>
-        <p:nvPicPr>
-          <p:cNvPr id="6146" name="Picture 2" descr="Annotated Heatmaps of a Correlation Matrix in 5 Simple Steps | by Julia Kho  | Towards Data Science">
-            <a:extLst>
-              <a:ext uri="{FF2B5EF4-FFF2-40B4-BE49-F238E27FC236}">
-                <a16:creationId xmlns:a16="http://schemas.microsoft.com/office/drawing/2014/main" id="{88D60E71-E772-4456-94EC-5AD2072996AA}"/>
-              </a:ext>
-            </a:extLst>
-          </p:cNvPr>
-          <p:cNvPicPr>
-            <a:picLocks noChangeAspect="1" noChangeArrowheads="1"/>
-          </p:cNvPicPr>
-          <p:nvPr/>
-        </p:nvPicPr>
-        <p:blipFill>
-          <a:blip r:embed="rId2">
-            <a:extLst>
-              <a:ext uri="{28A0092B-C50C-407E-A947-70E740481C1C}">
-                <a14:useLocalDpi xmlns:a14="http://schemas.microsoft.com/office/drawing/2010/main" val="0"/>
-              </a:ext>
-            </a:extLst>
-          </a:blip>
-          <a:srcRect/>
-          <a:stretch>
-            <a:fillRect/>
-          </a:stretch>
-        </p:blipFill>
-        <p:spPr bwMode="auto">
-          <a:xfrm>
-            <a:off x="7826719" y="3153196"/>
-            <a:ext cx="3986001" cy="3411442"/>
-          </a:xfrm>
-          <a:prstGeom prst="rect">
-            <a:avLst/>
-          </a:prstGeom>
-          <a:noFill/>
-          <a:extLst>
-            <a:ext uri="{909E8E84-426E-40DD-AFC4-6F175D3DCCD1}">
-              <a14:hiddenFill xmlns:a14="http://schemas.microsoft.com/office/drawing/2010/main">
-                <a:solidFill>
-                  <a:srgbClr val="FFFFFF"/>
-                </a:solidFill>
-              </a14:hiddenFill>
-            </a:ext>
-          </a:extLst>
-        </p:spPr>
-      </p:pic>
-      <p:pic>
-        <p:nvPicPr>
-          <p:cNvPr id="6" name="Picture 5">
-            <a:extLst>
-              <a:ext uri="{FF2B5EF4-FFF2-40B4-BE49-F238E27FC236}">
-                <a16:creationId xmlns:a16="http://schemas.microsoft.com/office/drawing/2014/main" id="{27AAA21C-87CC-4D29-BF64-1CC2FD7342A4}"/>
-              </a:ext>
-            </a:extLst>
-          </p:cNvPr>
-          <p:cNvPicPr>
-            <a:picLocks noChangeAspect="1"/>
-          </p:cNvPicPr>
-          <p:nvPr/>
-        </p:nvPicPr>
-        <p:blipFill>
-          <a:blip r:embed="rId3"/>
-          <a:stretch>
-            <a:fillRect/>
-          </a:stretch>
-        </p:blipFill>
-        <p:spPr>
-          <a:xfrm>
-            <a:off x="7826719" y="296652"/>
-            <a:ext cx="3613112" cy="2788071"/>
-          </a:xfrm>
-          <a:prstGeom prst="rect">
-            <a:avLst/>
-          </a:prstGeom>
-        </p:spPr>
-      </p:pic>
-    </p:spTree>
-    <p:extLst>
-      <p:ext uri="{BB962C8B-B14F-4D97-AF65-F5344CB8AC3E}">
-        <p14:creationId xmlns:p14="http://schemas.microsoft.com/office/powerpoint/2010/main" val="2961069710"/>
       </p:ext>
     </p:extLst>
   </p:cSld>
@@ -6499,4 +7219,299 @@
     </a:ext>
   </a:extLst>
 </a:theme>
+</file>
+
+<file path=ppt/theme/theme2.xml><?xml version="1.0" encoding="utf-8"?>
+<a:theme xmlns:a="http://schemas.openxmlformats.org/drawingml/2006/main" name="Office Theme">
+  <a:themeElements>
+    <a:clrScheme name="Office">
+      <a:dk1>
+        <a:sysClr val="windowText" lastClr="000000"/>
+      </a:dk1>
+      <a:lt1>
+        <a:sysClr val="window" lastClr="FFFFFF"/>
+      </a:lt1>
+      <a:dk2>
+        <a:srgbClr val="44546A"/>
+      </a:dk2>
+      <a:lt2>
+        <a:srgbClr val="E7E6E6"/>
+      </a:lt2>
+      <a:accent1>
+        <a:srgbClr val="4472C4"/>
+      </a:accent1>
+      <a:accent2>
+        <a:srgbClr val="ED7D31"/>
+      </a:accent2>
+      <a:accent3>
+        <a:srgbClr val="A5A5A5"/>
+      </a:accent3>
+      <a:accent4>
+        <a:srgbClr val="FFC000"/>
+      </a:accent4>
+      <a:accent5>
+        <a:srgbClr val="5B9BD5"/>
+      </a:accent5>
+      <a:accent6>
+        <a:srgbClr val="70AD47"/>
+      </a:accent6>
+      <a:hlink>
+        <a:srgbClr val="0563C1"/>
+      </a:hlink>
+      <a:folHlink>
+        <a:srgbClr val="954F72"/>
+      </a:folHlink>
+    </a:clrScheme>
+    <a:fontScheme name="Office">
+      <a:majorFont>
+        <a:latin typeface="Calibri Light" panose="020F0302020204030204"/>
+        <a:ea typeface=""/>
+        <a:cs typeface=""/>
+        <a:font script="Jpan" typeface="游ゴシック Light"/>
+        <a:font script="Hang" typeface="맑은 고딕"/>
+        <a:font script="Hans" typeface="等线 Light"/>
+        <a:font script="Hant" typeface="新細明體"/>
+        <a:font script="Arab" typeface="Times New Roman"/>
+        <a:font script="Hebr" typeface="Times New Roman"/>
+        <a:font script="Thai" typeface="Angsana New"/>
+        <a:font script="Ethi" typeface="Nyala"/>
+        <a:font script="Beng" typeface="Vrinda"/>
+        <a:font script="Gujr" typeface="Shruti"/>
+        <a:font script="Khmr" typeface="MoolBoran"/>
+        <a:font script="Knda" typeface="Tunga"/>
+        <a:font script="Guru" typeface="Raavi"/>
+        <a:font script="Cans" typeface="Euphemia"/>
+        <a:font script="Cher" typeface="Plantagenet Cherokee"/>
+        <a:font script="Yiii" typeface="Microsoft Yi Baiti"/>
+        <a:font script="Tibt" typeface="Microsoft Himalaya"/>
+        <a:font script="Thaa" typeface="MV Boli"/>
+        <a:font script="Deva" typeface="Mangal"/>
+        <a:font script="Telu" typeface="Gautami"/>
+        <a:font script="Taml" typeface="Latha"/>
+        <a:font script="Syrc" typeface="Estrangelo Edessa"/>
+        <a:font script="Orya" typeface="Kalinga"/>
+        <a:font script="Mlym" typeface="Kartika"/>
+        <a:font script="Laoo" typeface="DokChampa"/>
+        <a:font script="Sinh" typeface="Iskoola Pota"/>
+        <a:font script="Mong" typeface="Mongolian Baiti"/>
+        <a:font script="Viet" typeface="Times New Roman"/>
+        <a:font script="Uigh" typeface="Microsoft Uighur"/>
+        <a:font script="Geor" typeface="Sylfaen"/>
+        <a:font script="Armn" typeface="Arial"/>
+        <a:font script="Bugi" typeface="Leelawadee UI"/>
+        <a:font script="Bopo" typeface="Microsoft JhengHei"/>
+        <a:font script="Java" typeface="Javanese Text"/>
+        <a:font script="Lisu" typeface="Segoe UI"/>
+        <a:font script="Mymr" typeface="Myanmar Text"/>
+        <a:font script="Nkoo" typeface="Ebrima"/>
+        <a:font script="Olck" typeface="Nirmala UI"/>
+        <a:font script="Osma" typeface="Ebrima"/>
+        <a:font script="Phag" typeface="Phagspa"/>
+        <a:font script="Syrn" typeface="Estrangelo Edessa"/>
+        <a:font script="Syrj" typeface="Estrangelo Edessa"/>
+        <a:font script="Syre" typeface="Estrangelo Edessa"/>
+        <a:font script="Sora" typeface="Nirmala UI"/>
+        <a:font script="Tale" typeface="Microsoft Tai Le"/>
+        <a:font script="Talu" typeface="Microsoft New Tai Lue"/>
+        <a:font script="Tfng" typeface="Ebrima"/>
+      </a:majorFont>
+      <a:minorFont>
+        <a:latin typeface="Calibri" panose="020F0502020204030204"/>
+        <a:ea typeface=""/>
+        <a:cs typeface=""/>
+        <a:font script="Jpan" typeface="游ゴシック"/>
+        <a:font script="Hang" typeface="맑은 고딕"/>
+        <a:font script="Hans" typeface="等线"/>
+        <a:font script="Hant" typeface="新細明體"/>
+        <a:font script="Arab" typeface="Arial"/>
+        <a:font script="Hebr" typeface="Arial"/>
+        <a:font script="Thai" typeface="Cordia New"/>
+        <a:font script="Ethi" typeface="Nyala"/>
+        <a:font script="Beng" typeface="Vrinda"/>
+        <a:font script="Gujr" typeface="Shruti"/>
+        <a:font script="Khmr" typeface="DaunPenh"/>
+        <a:font script="Knda" typeface="Tunga"/>
+        <a:font script="Guru" typeface="Raavi"/>
+        <a:font script="Cans" typeface="Euphemia"/>
+        <a:font script="Cher" typeface="Plantagenet Cherokee"/>
+        <a:font script="Yiii" typeface="Microsoft Yi Baiti"/>
+        <a:font script="Tibt" typeface="Microsoft Himalaya"/>
+        <a:font script="Thaa" typeface="MV Boli"/>
+        <a:font script="Deva" typeface="Mangal"/>
+        <a:font script="Telu" typeface="Gautami"/>
+        <a:font script="Taml" typeface="Latha"/>
+        <a:font script="Syrc" typeface="Estrangelo Edessa"/>
+        <a:font script="Orya" typeface="Kalinga"/>
+        <a:font script="Mlym" typeface="Kartika"/>
+        <a:font script="Laoo" typeface="DokChampa"/>
+        <a:font script="Sinh" typeface="Iskoola Pota"/>
+        <a:font script="Mong" typeface="Mongolian Baiti"/>
+        <a:font script="Viet" typeface="Arial"/>
+        <a:font script="Uigh" typeface="Microsoft Uighur"/>
+        <a:font script="Geor" typeface="Sylfaen"/>
+        <a:font script="Armn" typeface="Arial"/>
+        <a:font script="Bugi" typeface="Leelawadee UI"/>
+        <a:font script="Bopo" typeface="Microsoft JhengHei"/>
+        <a:font script="Java" typeface="Javanese Text"/>
+        <a:font script="Lisu" typeface="Segoe UI"/>
+        <a:font script="Mymr" typeface="Myanmar Text"/>
+        <a:font script="Nkoo" typeface="Ebrima"/>
+        <a:font script="Olck" typeface="Nirmala UI"/>
+        <a:font script="Osma" typeface="Ebrima"/>
+        <a:font script="Phag" typeface="Phagspa"/>
+        <a:font script="Syrn" typeface="Estrangelo Edessa"/>
+        <a:font script="Syrj" typeface="Estrangelo Edessa"/>
+        <a:font script="Syre" typeface="Estrangelo Edessa"/>
+        <a:font script="Sora" typeface="Nirmala UI"/>
+        <a:font script="Tale" typeface="Microsoft Tai Le"/>
+        <a:font script="Talu" typeface="Microsoft New Tai Lue"/>
+        <a:font script="Tfng" typeface="Ebrima"/>
+      </a:minorFont>
+    </a:fontScheme>
+    <a:fmtScheme name="Office">
+      <a:fillStyleLst>
+        <a:solidFill>
+          <a:schemeClr val="phClr"/>
+        </a:solidFill>
+        <a:gradFill rotWithShape="1">
+          <a:gsLst>
+            <a:gs pos="0">
+              <a:schemeClr val="phClr">
+                <a:lumMod val="110000"/>
+                <a:satMod val="105000"/>
+                <a:tint val="67000"/>
+              </a:schemeClr>
+            </a:gs>
+            <a:gs pos="50000">
+              <a:schemeClr val="phClr">
+                <a:lumMod val="105000"/>
+                <a:satMod val="103000"/>
+                <a:tint val="73000"/>
+              </a:schemeClr>
+            </a:gs>
+            <a:gs pos="100000">
+              <a:schemeClr val="phClr">
+                <a:lumMod val="105000"/>
+                <a:satMod val="109000"/>
+                <a:tint val="81000"/>
+              </a:schemeClr>
+            </a:gs>
+          </a:gsLst>
+          <a:lin ang="5400000" scaled="0"/>
+        </a:gradFill>
+        <a:gradFill rotWithShape="1">
+          <a:gsLst>
+            <a:gs pos="0">
+              <a:schemeClr val="phClr">
+                <a:satMod val="103000"/>
+                <a:lumMod val="102000"/>
+                <a:tint val="94000"/>
+              </a:schemeClr>
+            </a:gs>
+            <a:gs pos="50000">
+              <a:schemeClr val="phClr">
+                <a:satMod val="110000"/>
+                <a:lumMod val="100000"/>
+                <a:shade val="100000"/>
+              </a:schemeClr>
+            </a:gs>
+            <a:gs pos="100000">
+              <a:schemeClr val="phClr">
+                <a:lumMod val="99000"/>
+                <a:satMod val="120000"/>
+                <a:shade val="78000"/>
+              </a:schemeClr>
+            </a:gs>
+          </a:gsLst>
+          <a:lin ang="5400000" scaled="0"/>
+        </a:gradFill>
+      </a:fillStyleLst>
+      <a:lnStyleLst>
+        <a:ln w="6350" cap="flat" cmpd="sng" algn="ctr">
+          <a:solidFill>
+            <a:schemeClr val="phClr"/>
+          </a:solidFill>
+          <a:prstDash val="solid"/>
+          <a:miter lim="800000"/>
+        </a:ln>
+        <a:ln w="12700" cap="flat" cmpd="sng" algn="ctr">
+          <a:solidFill>
+            <a:schemeClr val="phClr"/>
+          </a:solidFill>
+          <a:prstDash val="solid"/>
+          <a:miter lim="800000"/>
+        </a:ln>
+        <a:ln w="19050" cap="flat" cmpd="sng" algn="ctr">
+          <a:solidFill>
+            <a:schemeClr val="phClr"/>
+          </a:solidFill>
+          <a:prstDash val="solid"/>
+          <a:miter lim="800000"/>
+        </a:ln>
+      </a:lnStyleLst>
+      <a:effectStyleLst>
+        <a:effectStyle>
+          <a:effectLst/>
+        </a:effectStyle>
+        <a:effectStyle>
+          <a:effectLst/>
+        </a:effectStyle>
+        <a:effectStyle>
+          <a:effectLst>
+            <a:outerShdw blurRad="57150" dist="19050" dir="5400000" algn="ctr" rotWithShape="0">
+              <a:srgbClr val="000000">
+                <a:alpha val="63000"/>
+              </a:srgbClr>
+            </a:outerShdw>
+          </a:effectLst>
+        </a:effectStyle>
+      </a:effectStyleLst>
+      <a:bgFillStyleLst>
+        <a:solidFill>
+          <a:schemeClr val="phClr"/>
+        </a:solidFill>
+        <a:solidFill>
+          <a:schemeClr val="phClr">
+            <a:tint val="95000"/>
+            <a:satMod val="170000"/>
+          </a:schemeClr>
+        </a:solidFill>
+        <a:gradFill rotWithShape="1">
+          <a:gsLst>
+            <a:gs pos="0">
+              <a:schemeClr val="phClr">
+                <a:tint val="93000"/>
+                <a:satMod val="150000"/>
+                <a:shade val="98000"/>
+                <a:lumMod val="102000"/>
+              </a:schemeClr>
+            </a:gs>
+            <a:gs pos="50000">
+              <a:schemeClr val="phClr">
+                <a:tint val="98000"/>
+                <a:satMod val="130000"/>
+                <a:shade val="90000"/>
+                <a:lumMod val="103000"/>
+              </a:schemeClr>
+            </a:gs>
+            <a:gs pos="100000">
+              <a:schemeClr val="phClr">
+                <a:shade val="63000"/>
+                <a:satMod val="120000"/>
+              </a:schemeClr>
+            </a:gs>
+          </a:gsLst>
+          <a:lin ang="5400000" scaled="0"/>
+        </a:gradFill>
+      </a:bgFillStyleLst>
+    </a:fmtScheme>
+  </a:themeElements>
+  <a:objectDefaults/>
+  <a:extraClrSchemeLst/>
+  <a:extLst>
+    <a:ext uri="{05A4C25C-085E-4340-85A3-A5531E510DB2}">
+      <thm15:themeFamily xmlns:thm15="http://schemas.microsoft.com/office/thememl/2012/main" name="Office Theme" id="{62F939B6-93AF-4DB8-9C6B-D6C7DFDC589F}" vid="{4A3C46E8-61CC-4603-A589-7422A47A8E4A}"/>
+    </a:ext>
+  </a:extLst>
+</a:theme>
 </file>
</xml_diff>

<commit_message>
began adding more details to powerpoint slides
</commit_message>
<xml_diff>
--- a/slide_deck.pptx
+++ b/slide_deck.pptx
@@ -5,24 +5,23 @@
     <p:sldMasterId id="2147483648" r:id="rId1"/>
   </p:sldMasterIdLst>
   <p:notesMasterIdLst>
-    <p:notesMasterId r:id="rId17"/>
+    <p:notesMasterId r:id="rId16"/>
   </p:notesMasterIdLst>
   <p:sldIdLst>
     <p:sldId id="256" r:id="rId2"/>
-    <p:sldId id="257" r:id="rId3"/>
-    <p:sldId id="270" r:id="rId4"/>
-    <p:sldId id="258" r:id="rId5"/>
-    <p:sldId id="259" r:id="rId6"/>
-    <p:sldId id="264" r:id="rId7"/>
-    <p:sldId id="261" r:id="rId8"/>
-    <p:sldId id="260" r:id="rId9"/>
+    <p:sldId id="270" r:id="rId3"/>
+    <p:sldId id="258" r:id="rId4"/>
+    <p:sldId id="259" r:id="rId5"/>
+    <p:sldId id="264" r:id="rId6"/>
+    <p:sldId id="261" r:id="rId7"/>
+    <p:sldId id="260" r:id="rId8"/>
+    <p:sldId id="263" r:id="rId9"/>
     <p:sldId id="262" r:id="rId10"/>
-    <p:sldId id="263" r:id="rId11"/>
-    <p:sldId id="265" r:id="rId12"/>
-    <p:sldId id="266" r:id="rId13"/>
-    <p:sldId id="269" r:id="rId14"/>
-    <p:sldId id="267" r:id="rId15"/>
-    <p:sldId id="268" r:id="rId16"/>
+    <p:sldId id="265" r:id="rId11"/>
+    <p:sldId id="266" r:id="rId12"/>
+    <p:sldId id="269" r:id="rId13"/>
+    <p:sldId id="267" r:id="rId14"/>
+    <p:sldId id="268" r:id="rId15"/>
   </p:sldIdLst>
   <p:sldSz cx="12192000" cy="6858000"/>
   <p:notesSz cx="6858000" cy="9144000"/>
@@ -630,7 +629,7 @@
           <a:p>
             <a:fld id="{113894EA-6DBB-44FC-9083-4B63A67C3C45}" type="slidenum">
               <a:rPr lang="en-US" smtClean="0"/>
-              <a:t>3</a:t>
+              <a:t>2</a:t>
             </a:fld>
             <a:endParaRPr lang="en-US"/>
           </a:p>
@@ -640,6 +639,281 @@
     <p:extLst>
       <p:ext uri="{BB962C8B-B14F-4D97-AF65-F5344CB8AC3E}">
         <p14:creationId xmlns:p14="http://schemas.microsoft.com/office/powerpoint/2010/main" val="535706501"/>
+      </p:ext>
+    </p:extLst>
+  </p:cSld>
+  <p:clrMapOvr>
+    <a:masterClrMapping/>
+  </p:clrMapOvr>
+</p:notes>
+</file>
+
+<file path=ppt/notesSlides/notesSlide3.xml><?xml version="1.0" encoding="utf-8"?>
+<p:notes xmlns:a="http://schemas.openxmlformats.org/drawingml/2006/main" xmlns:r="http://schemas.openxmlformats.org/officeDocument/2006/relationships" xmlns:p="http://schemas.openxmlformats.org/presentationml/2006/main">
+  <p:cSld>
+    <p:spTree>
+      <p:nvGrpSpPr>
+        <p:cNvPr id="1" name=""/>
+        <p:cNvGrpSpPr/>
+        <p:nvPr/>
+      </p:nvGrpSpPr>
+      <p:grpSpPr>
+        <a:xfrm>
+          <a:off x="0" y="0"/>
+          <a:ext cx="0" cy="0"/>
+          <a:chOff x="0" y="0"/>
+          <a:chExt cx="0" cy="0"/>
+        </a:xfrm>
+      </p:grpSpPr>
+      <p:sp>
+        <p:nvSpPr>
+          <p:cNvPr id="2" name="Slide Image Placeholder 1"/>
+          <p:cNvSpPr>
+            <a:spLocks noGrp="1" noRot="1" noChangeAspect="1"/>
+          </p:cNvSpPr>
+          <p:nvPr>
+            <p:ph type="sldImg"/>
+          </p:nvPr>
+        </p:nvSpPr>
+        <p:spPr/>
+      </p:sp>
+      <p:sp>
+        <p:nvSpPr>
+          <p:cNvPr id="3" name="Notes Placeholder 2"/>
+          <p:cNvSpPr>
+            <a:spLocks noGrp="1"/>
+          </p:cNvSpPr>
+          <p:nvPr>
+            <p:ph type="body" idx="1"/>
+          </p:nvPr>
+        </p:nvSpPr>
+        <p:spPr/>
+        <p:txBody>
+          <a:bodyPr/>
+          <a:lstStyle/>
+          <a:p>
+            <a:r>
+              <a:rPr lang="en-US" dirty="0"/>
+              <a:t>Data quality</a:t>
+            </a:r>
+          </a:p>
+          <a:p>
+            <a:endParaRPr lang="en-US" dirty="0"/>
+          </a:p>
+          <a:p>
+            <a:r>
+              <a:rPr lang="en-US" dirty="0"/>
+              <a:t>- before doing anything, we need to examine the quality of the data. always remember: "garbage in, garbage out". can we trust this data? does it come from a quality source? don't be misled by missing values. good data sources can be both verifiably accurate and also incomplete</a:t>
+            </a:r>
+          </a:p>
+        </p:txBody>
+      </p:sp>
+      <p:sp>
+        <p:nvSpPr>
+          <p:cNvPr id="4" name="Slide Number Placeholder 3"/>
+          <p:cNvSpPr>
+            <a:spLocks noGrp="1"/>
+          </p:cNvSpPr>
+          <p:nvPr>
+            <p:ph type="sldNum" sz="quarter" idx="5"/>
+          </p:nvPr>
+        </p:nvSpPr>
+        <p:spPr/>
+        <p:txBody>
+          <a:bodyPr/>
+          <a:lstStyle/>
+          <a:p>
+            <a:fld id="{113894EA-6DBB-44FC-9083-4B63A67C3C45}" type="slidenum">
+              <a:rPr lang="en-US" smtClean="0"/>
+              <a:t>6</a:t>
+            </a:fld>
+            <a:endParaRPr lang="en-US"/>
+          </a:p>
+        </p:txBody>
+      </p:sp>
+    </p:spTree>
+    <p:extLst>
+      <p:ext uri="{BB962C8B-B14F-4D97-AF65-F5344CB8AC3E}">
+        <p14:creationId xmlns:p14="http://schemas.microsoft.com/office/powerpoint/2010/main" val="1847883934"/>
+      </p:ext>
+    </p:extLst>
+  </p:cSld>
+  <p:clrMapOvr>
+    <a:masterClrMapping/>
+  </p:clrMapOvr>
+</p:notes>
+</file>
+
+<file path=ppt/notesSlides/notesSlide4.xml><?xml version="1.0" encoding="utf-8"?>
+<p:notes xmlns:a="http://schemas.openxmlformats.org/drawingml/2006/main" xmlns:r="http://schemas.openxmlformats.org/officeDocument/2006/relationships" xmlns:p="http://schemas.openxmlformats.org/presentationml/2006/main">
+  <p:cSld>
+    <p:spTree>
+      <p:nvGrpSpPr>
+        <p:cNvPr id="1" name=""/>
+        <p:cNvGrpSpPr/>
+        <p:nvPr/>
+      </p:nvGrpSpPr>
+      <p:grpSpPr>
+        <a:xfrm>
+          <a:off x="0" y="0"/>
+          <a:ext cx="0" cy="0"/>
+          <a:chOff x="0" y="0"/>
+          <a:chExt cx="0" cy="0"/>
+        </a:xfrm>
+      </p:grpSpPr>
+      <p:sp>
+        <p:nvSpPr>
+          <p:cNvPr id="2" name="Slide Image Placeholder 1"/>
+          <p:cNvSpPr>
+            <a:spLocks noGrp="1" noRot="1" noChangeAspect="1"/>
+          </p:cNvSpPr>
+          <p:nvPr>
+            <p:ph type="sldImg"/>
+          </p:nvPr>
+        </p:nvSpPr>
+        <p:spPr/>
+      </p:sp>
+      <p:sp>
+        <p:nvSpPr>
+          <p:cNvPr id="3" name="Notes Placeholder 2"/>
+          <p:cNvSpPr>
+            <a:spLocks noGrp="1"/>
+          </p:cNvSpPr>
+          <p:nvPr>
+            <p:ph type="body" idx="1"/>
+          </p:nvPr>
+        </p:nvSpPr>
+        <p:spPr/>
+        <p:txBody>
+          <a:bodyPr/>
+          <a:lstStyle/>
+          <a:p>
+            <a:r>
+              <a:rPr lang="en-US" dirty="0"/>
+              <a:t>- in the case of making the features more machine-friendly, let's look at the feature 'education'. we know as humans that earning a higher level of degree, like a master's or </a:t>
+            </a:r>
+            <a:r>
+              <a:rPr lang="en-US" dirty="0" err="1"/>
+              <a:t>phd</a:t>
+            </a:r>
+            <a:r>
+              <a:rPr lang="en-US" dirty="0"/>
+              <a:t>, will increase the probability that you make more money. a computer isn't a human and only understands 0's and 1's. thus, it's useful to turn those types of categorical variables into a number of some sort, which is a process called encoding. there are lots of possible encoding schemes, the most popular of which are label encoding and one-hot encoding. each of these has their own strengths and weaknesses, which we can discuss</a:t>
+            </a:r>
+          </a:p>
+        </p:txBody>
+      </p:sp>
+      <p:sp>
+        <p:nvSpPr>
+          <p:cNvPr id="4" name="Slide Number Placeholder 3"/>
+          <p:cNvSpPr>
+            <a:spLocks noGrp="1"/>
+          </p:cNvSpPr>
+          <p:nvPr>
+            <p:ph type="sldNum" sz="quarter" idx="5"/>
+          </p:nvPr>
+        </p:nvSpPr>
+        <p:spPr/>
+        <p:txBody>
+          <a:bodyPr/>
+          <a:lstStyle/>
+          <a:p>
+            <a:fld id="{113894EA-6DBB-44FC-9083-4B63A67C3C45}" type="slidenum">
+              <a:rPr lang="en-US" smtClean="0"/>
+              <a:t>9</a:t>
+            </a:fld>
+            <a:endParaRPr lang="en-US"/>
+          </a:p>
+        </p:txBody>
+      </p:sp>
+    </p:spTree>
+    <p:extLst>
+      <p:ext uri="{BB962C8B-B14F-4D97-AF65-F5344CB8AC3E}">
+        <p14:creationId xmlns:p14="http://schemas.microsoft.com/office/powerpoint/2010/main" val="896369216"/>
+      </p:ext>
+    </p:extLst>
+  </p:cSld>
+  <p:clrMapOvr>
+    <a:masterClrMapping/>
+  </p:clrMapOvr>
+</p:notes>
+</file>
+
+<file path=ppt/notesSlides/notesSlide5.xml><?xml version="1.0" encoding="utf-8"?>
+<p:notes xmlns:a="http://schemas.openxmlformats.org/drawingml/2006/main" xmlns:r="http://schemas.openxmlformats.org/officeDocument/2006/relationships" xmlns:p="http://schemas.openxmlformats.org/presentationml/2006/main">
+  <p:cSld>
+    <p:spTree>
+      <p:nvGrpSpPr>
+        <p:cNvPr id="1" name=""/>
+        <p:cNvGrpSpPr/>
+        <p:nvPr/>
+      </p:nvGrpSpPr>
+      <p:grpSpPr>
+        <a:xfrm>
+          <a:off x="0" y="0"/>
+          <a:ext cx="0" cy="0"/>
+          <a:chOff x="0" y="0"/>
+          <a:chExt cx="0" cy="0"/>
+        </a:xfrm>
+      </p:grpSpPr>
+      <p:sp>
+        <p:nvSpPr>
+          <p:cNvPr id="2" name="Slide Image Placeholder 1"/>
+          <p:cNvSpPr>
+            <a:spLocks noGrp="1" noRot="1" noChangeAspect="1"/>
+          </p:cNvSpPr>
+          <p:nvPr>
+            <p:ph type="sldImg"/>
+          </p:nvPr>
+        </p:nvSpPr>
+        <p:spPr/>
+      </p:sp>
+      <p:sp>
+        <p:nvSpPr>
+          <p:cNvPr id="3" name="Notes Placeholder 2"/>
+          <p:cNvSpPr>
+            <a:spLocks noGrp="1"/>
+          </p:cNvSpPr>
+          <p:nvPr>
+            <p:ph type="body" idx="1"/>
+          </p:nvPr>
+        </p:nvSpPr>
+        <p:spPr/>
+        <p:txBody>
+          <a:bodyPr/>
+          <a:lstStyle/>
+          <a:p>
+            <a:endParaRPr lang="en-US" dirty="0"/>
+          </a:p>
+        </p:txBody>
+      </p:sp>
+      <p:sp>
+        <p:nvSpPr>
+          <p:cNvPr id="4" name="Slide Number Placeholder 3"/>
+          <p:cNvSpPr>
+            <a:spLocks noGrp="1"/>
+          </p:cNvSpPr>
+          <p:nvPr>
+            <p:ph type="sldNum" sz="quarter" idx="5"/>
+          </p:nvPr>
+        </p:nvSpPr>
+        <p:spPr/>
+        <p:txBody>
+          <a:bodyPr/>
+          <a:lstStyle/>
+          <a:p>
+            <a:fld id="{113894EA-6DBB-44FC-9083-4B63A67C3C45}" type="slidenum">
+              <a:rPr lang="en-US" smtClean="0"/>
+              <a:t>13</a:t>
+            </a:fld>
+            <a:endParaRPr lang="en-US"/>
+          </a:p>
+        </p:txBody>
+      </p:sp>
+    </p:spTree>
+    <p:extLst>
+      <p:ext uri="{BB962C8B-B14F-4D97-AF65-F5344CB8AC3E}">
+        <p14:creationId xmlns:p14="http://schemas.microsoft.com/office/powerpoint/2010/main" val="484914754"/>
       </p:ext>
     </p:extLst>
   </p:cSld>
@@ -3965,230 +4239,6 @@
           <p:cNvPr id="2" name="Title 1">
             <a:extLst>
               <a:ext uri="{FF2B5EF4-FFF2-40B4-BE49-F238E27FC236}">
-                <a16:creationId xmlns:a16="http://schemas.microsoft.com/office/drawing/2014/main" id="{4180EA78-4EFB-4EF7-89AD-96F8ED906842}"/>
-              </a:ext>
-            </a:extLst>
-          </p:cNvPr>
-          <p:cNvSpPr>
-            <a:spLocks noGrp="1"/>
-          </p:cNvSpPr>
-          <p:nvPr>
-            <p:ph type="title"/>
-          </p:nvPr>
-        </p:nvSpPr>
-        <p:spPr/>
-        <p:txBody>
-          <a:bodyPr/>
-          <a:lstStyle/>
-          <a:p>
-            <a:r>
-              <a:rPr lang="en-US" dirty="0"/>
-              <a:t>Exploratory Data Analysis</a:t>
-            </a:r>
-          </a:p>
-        </p:txBody>
-      </p:sp>
-      <p:sp>
-        <p:nvSpPr>
-          <p:cNvPr id="3" name="Content Placeholder 2">
-            <a:extLst>
-              <a:ext uri="{FF2B5EF4-FFF2-40B4-BE49-F238E27FC236}">
-                <a16:creationId xmlns:a16="http://schemas.microsoft.com/office/drawing/2014/main" id="{954581F8-8FD7-453F-A1E0-5ED8FA1C0355}"/>
-              </a:ext>
-            </a:extLst>
-          </p:cNvPr>
-          <p:cNvSpPr>
-            <a:spLocks noGrp="1"/>
-          </p:cNvSpPr>
-          <p:nvPr>
-            <p:ph sz="half" idx="1"/>
-          </p:nvPr>
-        </p:nvSpPr>
-        <p:spPr/>
-        <p:txBody>
-          <a:bodyPr>
-            <a:normAutofit/>
-          </a:bodyPr>
-          <a:lstStyle/>
-          <a:p>
-            <a:pPr>
-              <a:buSzPct val="60000"/>
-              <a:buFont typeface="Wingdings" panose="05000000000000000000" pitchFamily="2" charset="2"/>
-              <a:buChar char="§"/>
-            </a:pPr>
-            <a:r>
-              <a:rPr lang="en-US" sz="3600" dirty="0"/>
-              <a:t>Feature distributions</a:t>
-            </a:r>
-          </a:p>
-          <a:p>
-            <a:pPr>
-              <a:buSzPct val="60000"/>
-              <a:buFont typeface="Wingdings" panose="05000000000000000000" pitchFamily="2" charset="2"/>
-              <a:buChar char="§"/>
-            </a:pPr>
-            <a:endParaRPr lang="en-US" sz="3600" dirty="0"/>
-          </a:p>
-          <a:p>
-            <a:pPr>
-              <a:buSzPct val="60000"/>
-              <a:buFont typeface="Wingdings" panose="05000000000000000000" pitchFamily="2" charset="2"/>
-              <a:buChar char="§"/>
-            </a:pPr>
-            <a:endParaRPr lang="en-US" sz="3600" dirty="0"/>
-          </a:p>
-          <a:p>
-            <a:pPr>
-              <a:buSzPct val="60000"/>
-              <a:buFont typeface="Wingdings" panose="05000000000000000000" pitchFamily="2" charset="2"/>
-              <a:buChar char="§"/>
-            </a:pPr>
-            <a:r>
-              <a:rPr lang="en-US" sz="3600" dirty="0"/>
-              <a:t>Feature correlation</a:t>
-            </a:r>
-          </a:p>
-          <a:p>
-            <a:pPr>
-              <a:buSzPct val="60000"/>
-              <a:buFont typeface="Wingdings" panose="05000000000000000000" pitchFamily="2" charset="2"/>
-              <a:buChar char="§"/>
-            </a:pPr>
-            <a:endParaRPr lang="en-US" sz="3600" dirty="0"/>
-          </a:p>
-          <a:p>
-            <a:pPr>
-              <a:buSzPct val="60000"/>
-              <a:buFont typeface="Wingdings" panose="05000000000000000000" pitchFamily="2" charset="2"/>
-              <a:buChar char="§"/>
-            </a:pPr>
-            <a:endParaRPr lang="en-US" sz="3600" dirty="0"/>
-          </a:p>
-          <a:p>
-            <a:pPr>
-              <a:buSzPct val="60000"/>
-              <a:buFont typeface="Wingdings" panose="05000000000000000000" pitchFamily="2" charset="2"/>
-              <a:buChar char="§"/>
-            </a:pPr>
-            <a:r>
-              <a:rPr lang="en-US" sz="3600" dirty="0"/>
-              <a:t>Multicollinearity</a:t>
-            </a:r>
-          </a:p>
-        </p:txBody>
-      </p:sp>
-      <p:pic>
-        <p:nvPicPr>
-          <p:cNvPr id="6146" name="Picture 2" descr="Annotated Heatmaps of a Correlation Matrix in 5 Simple Steps | by Julia Kho  | Towards Data Science">
-            <a:extLst>
-              <a:ext uri="{FF2B5EF4-FFF2-40B4-BE49-F238E27FC236}">
-                <a16:creationId xmlns:a16="http://schemas.microsoft.com/office/drawing/2014/main" id="{88D60E71-E772-4456-94EC-5AD2072996AA}"/>
-              </a:ext>
-            </a:extLst>
-          </p:cNvPr>
-          <p:cNvPicPr>
-            <a:picLocks noChangeAspect="1" noChangeArrowheads="1"/>
-          </p:cNvPicPr>
-          <p:nvPr/>
-        </p:nvPicPr>
-        <p:blipFill>
-          <a:blip r:embed="rId2">
-            <a:extLst>
-              <a:ext uri="{28A0092B-C50C-407E-A947-70E740481C1C}">
-                <a14:useLocalDpi xmlns:a14="http://schemas.microsoft.com/office/drawing/2010/main" val="0"/>
-              </a:ext>
-            </a:extLst>
-          </a:blip>
-          <a:srcRect/>
-          <a:stretch>
-            <a:fillRect/>
-          </a:stretch>
-        </p:blipFill>
-        <p:spPr bwMode="auto">
-          <a:xfrm>
-            <a:off x="7826719" y="3153196"/>
-            <a:ext cx="3986001" cy="3411442"/>
-          </a:xfrm>
-          <a:prstGeom prst="rect">
-            <a:avLst/>
-          </a:prstGeom>
-          <a:noFill/>
-          <a:extLst>
-            <a:ext uri="{909E8E84-426E-40DD-AFC4-6F175D3DCCD1}">
-              <a14:hiddenFill xmlns:a14="http://schemas.microsoft.com/office/drawing/2010/main">
-                <a:solidFill>
-                  <a:srgbClr val="FFFFFF"/>
-                </a:solidFill>
-              </a14:hiddenFill>
-            </a:ext>
-          </a:extLst>
-        </p:spPr>
-      </p:pic>
-      <p:pic>
-        <p:nvPicPr>
-          <p:cNvPr id="6" name="Picture 5">
-            <a:extLst>
-              <a:ext uri="{FF2B5EF4-FFF2-40B4-BE49-F238E27FC236}">
-                <a16:creationId xmlns:a16="http://schemas.microsoft.com/office/drawing/2014/main" id="{27AAA21C-87CC-4D29-BF64-1CC2FD7342A4}"/>
-              </a:ext>
-            </a:extLst>
-          </p:cNvPr>
-          <p:cNvPicPr>
-            <a:picLocks noChangeAspect="1"/>
-          </p:cNvPicPr>
-          <p:nvPr/>
-        </p:nvPicPr>
-        <p:blipFill>
-          <a:blip r:embed="rId3"/>
-          <a:stretch>
-            <a:fillRect/>
-          </a:stretch>
-        </p:blipFill>
-        <p:spPr>
-          <a:xfrm>
-            <a:off x="7826719" y="296652"/>
-            <a:ext cx="3613112" cy="2788071"/>
-          </a:xfrm>
-          <a:prstGeom prst="rect">
-            <a:avLst/>
-          </a:prstGeom>
-        </p:spPr>
-      </p:pic>
-    </p:spTree>
-    <p:extLst>
-      <p:ext uri="{BB962C8B-B14F-4D97-AF65-F5344CB8AC3E}">
-        <p14:creationId xmlns:p14="http://schemas.microsoft.com/office/powerpoint/2010/main" val="2961069710"/>
-      </p:ext>
-    </p:extLst>
-  </p:cSld>
-  <p:clrMapOvr>
-    <a:masterClrMapping/>
-  </p:clrMapOvr>
-</p:sld>
-</file>
-
-<file path=ppt/slides/slide11.xml><?xml version="1.0" encoding="utf-8"?>
-<p:sld xmlns:a="http://schemas.openxmlformats.org/drawingml/2006/main" xmlns:r="http://schemas.openxmlformats.org/officeDocument/2006/relationships" xmlns:p="http://schemas.openxmlformats.org/presentationml/2006/main">
-  <p:cSld>
-    <p:spTree>
-      <p:nvGrpSpPr>
-        <p:cNvPr id="1" name=""/>
-        <p:cNvGrpSpPr/>
-        <p:nvPr/>
-      </p:nvGrpSpPr>
-      <p:grpSpPr>
-        <a:xfrm>
-          <a:off x="0" y="0"/>
-          <a:ext cx="0" cy="0"/>
-          <a:chOff x="0" y="0"/>
-          <a:chExt cx="0" cy="0"/>
-        </a:xfrm>
-      </p:grpSpPr>
-      <p:sp>
-        <p:nvSpPr>
-          <p:cNvPr id="2" name="Title 1">
-            <a:extLst>
-              <a:ext uri="{FF2B5EF4-FFF2-40B4-BE49-F238E27FC236}">
                 <a16:creationId xmlns:a16="http://schemas.microsoft.com/office/drawing/2014/main" id="{21360BA8-EACD-4308-8246-3BC796668913}"/>
               </a:ext>
             </a:extLst>
@@ -4427,7 +4477,7 @@
 </p:sld>
 </file>
 
-<file path=ppt/slides/slide12.xml><?xml version="1.0" encoding="utf-8"?>
+<file path=ppt/slides/slide11.xml><?xml version="1.0" encoding="utf-8"?>
 <p:sld xmlns:a="http://schemas.openxmlformats.org/drawingml/2006/main" xmlns:r="http://schemas.openxmlformats.org/officeDocument/2006/relationships" xmlns:p="http://schemas.openxmlformats.org/presentationml/2006/main">
   <p:cSld>
     <p:spTree>
@@ -4564,7 +4614,7 @@
 </p:sld>
 </file>
 
-<file path=ppt/slides/slide13.xml><?xml version="1.0" encoding="utf-8"?>
+<file path=ppt/slides/slide12.xml><?xml version="1.0" encoding="utf-8"?>
 <p:sld xmlns:a="http://schemas.openxmlformats.org/drawingml/2006/main" xmlns:r="http://schemas.openxmlformats.org/officeDocument/2006/relationships" xmlns:p="http://schemas.openxmlformats.org/presentationml/2006/main">
   <p:cSld>
     <p:spTree>
@@ -5044,7 +5094,7 @@
 </p:sld>
 </file>
 
-<file path=ppt/slides/slide14.xml><?xml version="1.0" encoding="utf-8"?>
+<file path=ppt/slides/slide13.xml><?xml version="1.0" encoding="utf-8"?>
 <p:sld xmlns:a="http://schemas.openxmlformats.org/drawingml/2006/main" xmlns:r="http://schemas.openxmlformats.org/officeDocument/2006/relationships" xmlns:p="http://schemas.openxmlformats.org/presentationml/2006/main">
   <p:cSld>
     <p:spTree>
@@ -5107,10 +5157,17 @@
         </p:nvSpPr>
         <p:spPr/>
         <p:txBody>
-          <a:bodyPr/>
-          <a:lstStyle/>
-          <a:p>
-            <a:endParaRPr lang="en-US" dirty="0"/>
+          <a:bodyPr>
+            <a:normAutofit/>
+          </a:bodyPr>
+          <a:lstStyle/>
+          <a:p>
+            <a:pPr>
+              <a:buSzPct val="60000"/>
+              <a:buFont typeface="Wingdings" panose="05000000000000000000" pitchFamily="2" charset="2"/>
+              <a:buChar char="§"/>
+            </a:pPr>
+            <a:endParaRPr lang="en-US" sz="3600" dirty="0"/>
           </a:p>
         </p:txBody>
       </p:sp>
@@ -5129,7 +5186,7 @@
           <p:nvPr/>
         </p:nvPicPr>
         <p:blipFill>
-          <a:blip r:embed="rId2">
+          <a:blip r:embed="rId3">
             <a:extLst>
               <a:ext uri="{28A0092B-C50C-407E-A947-70E740481C1C}">
                 <a14:useLocalDpi xmlns:a14="http://schemas.microsoft.com/office/drawing/2010/main" val="0"/>
@@ -5174,7 +5231,7 @@
 </p:sld>
 </file>
 
-<file path=ppt/slides/slide15.xml><?xml version="1.0" encoding="utf-8"?>
+<file path=ppt/slides/slide14.xml><?xml version="1.0" encoding="utf-8"?>
 <p:sld xmlns:a="http://schemas.openxmlformats.org/drawingml/2006/main" xmlns:r="http://schemas.openxmlformats.org/officeDocument/2006/relationships" xmlns:p="http://schemas.openxmlformats.org/presentationml/2006/main">
   <p:cSld>
     <p:spTree>
@@ -5240,7 +5297,12 @@
           <a:bodyPr/>
           <a:lstStyle/>
           <a:p>
-            <a:endParaRPr lang="en-US"/>
+            <a:pPr>
+              <a:buSzPct val="60000"/>
+              <a:buFont typeface="Wingdings" panose="05000000000000000000" pitchFamily="2" charset="2"/>
+              <a:buChar char="§"/>
+            </a:pPr>
+            <a:endParaRPr lang="en-US" dirty="0"/>
           </a:p>
         </p:txBody>
       </p:sp>
@@ -5304,7 +5366,7 @@
           <p:cNvPr id="2" name="Title 1">
             <a:extLst>
               <a:ext uri="{FF2B5EF4-FFF2-40B4-BE49-F238E27FC236}">
-                <a16:creationId xmlns:a16="http://schemas.microsoft.com/office/drawing/2014/main" id="{3074C960-152A-4E78-A939-1FE90181DF69}"/>
+                <a16:creationId xmlns:a16="http://schemas.microsoft.com/office/drawing/2014/main" id="{6FF20C90-5F05-40D8-986E-76CC4FCE38DC}"/>
               </a:ext>
             </a:extLst>
           </p:cNvPr>
@@ -5319,70 +5381,6 @@
         <p:txBody>
           <a:bodyPr/>
           <a:lstStyle/>
-          <a:p>
-            <a:r>
-              <a:rPr lang="en-US" dirty="0"/>
-              <a:t>Topics</a:t>
-            </a:r>
-          </a:p>
-        </p:txBody>
-      </p:sp>
-      <p:sp>
-        <p:nvSpPr>
-          <p:cNvPr id="3" name="Content Placeholder 2">
-            <a:extLst>
-              <a:ext uri="{FF2B5EF4-FFF2-40B4-BE49-F238E27FC236}">
-                <a16:creationId xmlns:a16="http://schemas.microsoft.com/office/drawing/2014/main" id="{F2204E7E-23B9-493A-BA60-336C2A3A4018}"/>
-              </a:ext>
-            </a:extLst>
-          </p:cNvPr>
-          <p:cNvSpPr>
-            <a:spLocks noGrp="1"/>
-          </p:cNvSpPr>
-          <p:nvPr>
-            <p:ph idx="1"/>
-          </p:nvPr>
-        </p:nvSpPr>
-        <p:spPr/>
-        <p:txBody>
-          <a:bodyPr/>
-          <a:lstStyle/>
-          <a:p>
-            <a:r>
-              <a:rPr lang="en-US" dirty="0"/>
-              <a:t>Problem overview, prototypical types of DS problems</a:t>
-            </a:r>
-          </a:p>
-          <a:p>
-            <a:r>
-              <a:rPr lang="en-US" dirty="0"/>
-              <a:t>Supervised learning, machine has the answers, can learn how to determine the answer from learned experience</a:t>
-            </a:r>
-          </a:p>
-          <a:p>
-            <a:r>
-              <a:rPr lang="en-US" dirty="0"/>
-              <a:t>Data cleaning, feature engineering, encoding</a:t>
-            </a:r>
-          </a:p>
-          <a:p>
-            <a:r>
-              <a:rPr lang="en-US" dirty="0"/>
-              <a:t>EDA, class imbalance, resampling</a:t>
-            </a:r>
-          </a:p>
-          <a:p>
-            <a:r>
-              <a:rPr lang="en-US" dirty="0"/>
-              <a:t>Cross validation, holding out sets</a:t>
-            </a:r>
-          </a:p>
-          <a:p>
-            <a:r>
-              <a:rPr lang="en-US" dirty="0"/>
-              <a:t>Models</a:t>
-            </a:r>
-          </a:p>
           <a:p>
             <a:r>
               <a:rPr lang="en-US" dirty="0"/>
@@ -5391,50 +5389,20 @@
           </a:p>
         </p:txBody>
       </p:sp>
-    </p:spTree>
-    <p:extLst>
-      <p:ext uri="{BB962C8B-B14F-4D97-AF65-F5344CB8AC3E}">
-        <p14:creationId xmlns:p14="http://schemas.microsoft.com/office/powerpoint/2010/main" val="3975502519"/>
-      </p:ext>
-    </p:extLst>
-  </p:cSld>
-  <p:clrMapOvr>
-    <a:masterClrMapping/>
-  </p:clrMapOvr>
-</p:sld>
-</file>
-
-<file path=ppt/slides/slide3.xml><?xml version="1.0" encoding="utf-8"?>
-<p:sld xmlns:a="http://schemas.openxmlformats.org/drawingml/2006/main" xmlns:r="http://schemas.openxmlformats.org/officeDocument/2006/relationships" xmlns:p="http://schemas.openxmlformats.org/presentationml/2006/main">
-  <p:cSld>
-    <p:spTree>
-      <p:nvGrpSpPr>
-        <p:cNvPr id="1" name=""/>
-        <p:cNvGrpSpPr/>
-        <p:nvPr/>
-      </p:nvGrpSpPr>
-      <p:grpSpPr>
-        <a:xfrm>
-          <a:off x="0" y="0"/>
-          <a:ext cx="0" cy="0"/>
-          <a:chOff x="0" y="0"/>
-          <a:chExt cx="0" cy="0"/>
-        </a:xfrm>
-      </p:grpSpPr>
-      <p:sp>
-        <p:nvSpPr>
-          <p:cNvPr id="2" name="Title 1">
-            <a:extLst>
-              <a:ext uri="{FF2B5EF4-FFF2-40B4-BE49-F238E27FC236}">
-                <a16:creationId xmlns:a16="http://schemas.microsoft.com/office/drawing/2014/main" id="{6FF20C90-5F05-40D8-986E-76CC4FCE38DC}"/>
-              </a:ext>
-            </a:extLst>
-          </p:cNvPr>
-          <p:cNvSpPr>
-            <a:spLocks noGrp="1"/>
-          </p:cNvSpPr>
-          <p:nvPr>
-            <p:ph type="title"/>
+      <p:sp>
+        <p:nvSpPr>
+          <p:cNvPr id="3" name="Content Placeholder 2">
+            <a:extLst>
+              <a:ext uri="{FF2B5EF4-FFF2-40B4-BE49-F238E27FC236}">
+                <a16:creationId xmlns:a16="http://schemas.microsoft.com/office/drawing/2014/main" id="{1B3D6663-4E19-4788-82C7-3C1ACA2C9B97}"/>
+              </a:ext>
+            </a:extLst>
+          </p:cNvPr>
+          <p:cNvSpPr>
+            <a:spLocks noGrp="1"/>
+          </p:cNvSpPr>
+          <p:nvPr>
+            <p:ph idx="1"/>
           </p:nvPr>
         </p:nvSpPr>
         <p:spPr/>
@@ -5442,35 +5410,12 @@
           <a:bodyPr/>
           <a:lstStyle/>
           <a:p>
-            <a:r>
-              <a:rPr lang="en-US" dirty="0"/>
-              <a:t>Results first</a:t>
-            </a:r>
-          </a:p>
-        </p:txBody>
-      </p:sp>
-      <p:sp>
-        <p:nvSpPr>
-          <p:cNvPr id="3" name="Content Placeholder 2">
-            <a:extLst>
-              <a:ext uri="{FF2B5EF4-FFF2-40B4-BE49-F238E27FC236}">
-                <a16:creationId xmlns:a16="http://schemas.microsoft.com/office/drawing/2014/main" id="{1B3D6663-4E19-4788-82C7-3C1ACA2C9B97}"/>
-              </a:ext>
-            </a:extLst>
-          </p:cNvPr>
-          <p:cNvSpPr>
-            <a:spLocks noGrp="1"/>
-          </p:cNvSpPr>
-          <p:nvPr>
-            <p:ph idx="1"/>
-          </p:nvPr>
-        </p:nvSpPr>
-        <p:spPr/>
-        <p:txBody>
-          <a:bodyPr/>
-          <a:lstStyle/>
-          <a:p>
-            <a:endParaRPr lang="en-US"/>
+            <a:pPr>
+              <a:buSzPct val="60000"/>
+              <a:buFont typeface="Wingdings" panose="05000000000000000000" pitchFamily="2" charset="2"/>
+              <a:buChar char="§"/>
+            </a:pPr>
+            <a:endParaRPr lang="en-US" dirty="0"/>
           </a:p>
         </p:txBody>
       </p:sp>
@@ -5487,7 +5432,7 @@
 </p:sld>
 </file>
 
-<file path=ppt/slides/slide4.xml><?xml version="1.0" encoding="utf-8"?>
+<file path=ppt/slides/slide3.xml><?xml version="1.0" encoding="utf-8"?>
 <p:sld xmlns:a="http://schemas.openxmlformats.org/drawingml/2006/main" xmlns:r="http://schemas.openxmlformats.org/officeDocument/2006/relationships" xmlns:p="http://schemas.openxmlformats.org/presentationml/2006/main">
   <p:cSld>
     <p:spTree>
@@ -5830,7 +5775,7 @@
 </p:sld>
 </file>
 
-<file path=ppt/slides/slide5.xml><?xml version="1.0" encoding="utf-8"?>
+<file path=ppt/slides/slide4.xml><?xml version="1.0" encoding="utf-8"?>
 <p:sld xmlns:a="http://schemas.openxmlformats.org/drawingml/2006/main" xmlns:r="http://schemas.openxmlformats.org/officeDocument/2006/relationships" xmlns:p="http://schemas.openxmlformats.org/presentationml/2006/main">
   <p:cSld>
     <p:spTree>
@@ -6038,7 +5983,7 @@
 </p:sld>
 </file>
 
-<file path=ppt/slides/slide6.xml><?xml version="1.0" encoding="utf-8"?>
+<file path=ppt/slides/slide5.xml><?xml version="1.0" encoding="utf-8"?>
 <p:sld xmlns:a="http://schemas.openxmlformats.org/drawingml/2006/main" xmlns:r="http://schemas.openxmlformats.org/officeDocument/2006/relationships" xmlns:p="http://schemas.openxmlformats.org/presentationml/2006/main">
   <p:cSld>
     <p:spTree>
@@ -6228,7 +6173,7 @@
 </p:sld>
 </file>
 
-<file path=ppt/slides/slide7.xml><?xml version="1.0" encoding="utf-8"?>
+<file path=ppt/slides/slide6.xml><?xml version="1.0" encoding="utf-8"?>
 <p:sld xmlns:a="http://schemas.openxmlformats.org/drawingml/2006/main" xmlns:r="http://schemas.openxmlformats.org/officeDocument/2006/relationships" xmlns:p="http://schemas.openxmlformats.org/presentationml/2006/main">
   <p:cSld>
     <p:spTree>
@@ -6382,7 +6327,7 @@
           <p:nvPr/>
         </p:nvPicPr>
         <p:blipFill>
-          <a:blip r:embed="rId2">
+          <a:blip r:embed="rId3">
             <a:extLst>
               <a:ext uri="{28A0092B-C50C-407E-A947-70E740481C1C}">
                 <a14:useLocalDpi xmlns:a14="http://schemas.microsoft.com/office/drawing/2010/main" val="0"/>
@@ -6427,7 +6372,7 @@
 </p:sld>
 </file>
 
-<file path=ppt/slides/slide8.xml><?xml version="1.0" encoding="utf-8"?>
+<file path=ppt/slides/slide7.xml><?xml version="1.0" encoding="utf-8"?>
 <p:sld xmlns:a="http://schemas.openxmlformats.org/drawingml/2006/main" xmlns:r="http://schemas.openxmlformats.org/officeDocument/2006/relationships" xmlns:p="http://schemas.openxmlformats.org/presentationml/2006/main">
   <p:cSld>
     <p:spTree>
@@ -6596,8 +6541,8 @@
         </p:blipFill>
         <p:spPr>
           <a:xfrm>
-            <a:off x="5385914" y="4946074"/>
-            <a:ext cx="6806086" cy="1314842"/>
+            <a:off x="5506065" y="4676053"/>
+            <a:ext cx="6601530" cy="1314842"/>
           </a:xfrm>
           <a:prstGeom prst="rect">
             <a:avLst/>
@@ -6626,7 +6571,7 @@
         </p:blipFill>
         <p:spPr>
           <a:xfrm>
-            <a:off x="5870864" y="1438926"/>
+            <a:off x="5870864" y="1206500"/>
             <a:ext cx="5667375" cy="2952750"/>
           </a:xfrm>
           <a:prstGeom prst="rect">
@@ -6699,7 +6644,7 @@
 </p:sld>
 </file>
 
-<file path=ppt/slides/slide9.xml><?xml version="1.0" encoding="utf-8"?>
+<file path=ppt/slides/slide8.xml><?xml version="1.0" encoding="utf-8"?>
 <p:sld xmlns:a="http://schemas.openxmlformats.org/drawingml/2006/main" xmlns:r="http://schemas.openxmlformats.org/officeDocument/2006/relationships" xmlns:p="http://schemas.openxmlformats.org/presentationml/2006/main">
   <p:cSld>
     <p:spTree>
@@ -6721,7 +6666,7 @@
           <p:cNvPr id="2" name="Title 1">
             <a:extLst>
               <a:ext uri="{FF2B5EF4-FFF2-40B4-BE49-F238E27FC236}">
-                <a16:creationId xmlns:a16="http://schemas.microsoft.com/office/drawing/2014/main" id="{ACD42A18-DFEC-4638-B11B-F65901B64937}"/>
+                <a16:creationId xmlns:a16="http://schemas.microsoft.com/office/drawing/2014/main" id="{4180EA78-4EFB-4EF7-89AD-96F8ED906842}"/>
               </a:ext>
             </a:extLst>
           </p:cNvPr>
@@ -6739,7 +6684,7 @@
           <a:p>
             <a:r>
               <a:rPr lang="en-US" dirty="0"/>
-              <a:t>Feature Engineering and Encoding </a:t>
+              <a:t>Exploratory Data Analysis</a:t>
             </a:r>
           </a:p>
         </p:txBody>
@@ -6749,7 +6694,7 @@
           <p:cNvPr id="3" name="Content Placeholder 2">
             <a:extLst>
               <a:ext uri="{FF2B5EF4-FFF2-40B4-BE49-F238E27FC236}">
-                <a16:creationId xmlns:a16="http://schemas.microsoft.com/office/drawing/2014/main" id="{D329B330-30CE-4DA5-A7DF-DCC0F203A9AF}"/>
+                <a16:creationId xmlns:a16="http://schemas.microsoft.com/office/drawing/2014/main" id="{954581F8-8FD7-453F-A1E0-5ED8FA1C0355}"/>
               </a:ext>
             </a:extLst>
           </p:cNvPr>
@@ -6760,15 +6705,10 @@
             <p:ph sz="half" idx="1"/>
           </p:nvPr>
         </p:nvSpPr>
-        <p:spPr>
-          <a:xfrm>
-            <a:off x="838200" y="1825625"/>
-            <a:ext cx="6311748" cy="4351338"/>
-          </a:xfrm>
-        </p:spPr>
+        <p:spPr/>
         <p:txBody>
           <a:bodyPr>
-            <a:noAutofit/>
+            <a:normAutofit/>
           </a:bodyPr>
           <a:lstStyle/>
           <a:p>
@@ -6779,7 +6719,7 @@
             </a:pPr>
             <a:r>
               <a:rPr lang="en-US" sz="3600" dirty="0"/>
-              <a:t>Reduce excess dimensions</a:t>
+              <a:t>Feature distributions</a:t>
             </a:r>
           </a:p>
           <a:p>
@@ -6796,16 +6736,6 @@
               <a:buFont typeface="Wingdings" panose="05000000000000000000" pitchFamily="2" charset="2"/>
               <a:buChar char="§"/>
             </a:pPr>
-            <a:r>
-              <a:rPr lang="en-US" sz="3600" dirty="0"/>
-              <a:t>Encoding: the bridge from human to machine</a:t>
-            </a:r>
-          </a:p>
-          <a:p>
-            <a:pPr marL="0" indent="0">
-              <a:buSzPct val="60000"/>
-              <a:buNone/>
-            </a:pPr>
             <a:endParaRPr lang="en-US" sz="3600" dirty="0"/>
           </a:p>
           <a:p>
@@ -6816,17 +6746,44 @@
             </a:pPr>
             <a:r>
               <a:rPr lang="en-US" sz="3600" dirty="0"/>
-              <a:t>Cardinality (unique values)</a:t>
+              <a:t>Feature correlation</a:t>
+            </a:r>
+          </a:p>
+          <a:p>
+            <a:pPr>
+              <a:buSzPct val="60000"/>
+              <a:buFont typeface="Wingdings" panose="05000000000000000000" pitchFamily="2" charset="2"/>
+              <a:buChar char="§"/>
+            </a:pPr>
+            <a:endParaRPr lang="en-US" sz="3600" dirty="0"/>
+          </a:p>
+          <a:p>
+            <a:pPr>
+              <a:buSzPct val="60000"/>
+              <a:buFont typeface="Wingdings" panose="05000000000000000000" pitchFamily="2" charset="2"/>
+              <a:buChar char="§"/>
+            </a:pPr>
+            <a:endParaRPr lang="en-US" sz="3600" dirty="0"/>
+          </a:p>
+          <a:p>
+            <a:pPr>
+              <a:buSzPct val="60000"/>
+              <a:buFont typeface="Wingdings" panose="05000000000000000000" pitchFamily="2" charset="2"/>
+              <a:buChar char="§"/>
+            </a:pPr>
+            <a:r>
+              <a:rPr lang="en-US" sz="3600" dirty="0"/>
+              <a:t>Multicollinearity</a:t>
             </a:r>
           </a:p>
         </p:txBody>
       </p:sp>
       <p:pic>
         <p:nvPicPr>
-          <p:cNvPr id="4098" name="Picture 2" descr="Multiple Linear Regression for Manufacturing Analysis | by Dery Kurniawan |  Towards Data Science">
-            <a:extLst>
-              <a:ext uri="{FF2B5EF4-FFF2-40B4-BE49-F238E27FC236}">
-                <a16:creationId xmlns:a16="http://schemas.microsoft.com/office/drawing/2014/main" id="{871DA8D6-5862-4247-BE3E-7C7E4160FF6F}"/>
+          <p:cNvPr id="6146" name="Picture 2" descr="Annotated Heatmaps of a Correlation Matrix in 5 Simple Steps | by Julia Kho  | Towards Data Science">
+            <a:extLst>
+              <a:ext uri="{FF2B5EF4-FFF2-40B4-BE49-F238E27FC236}">
+                <a16:creationId xmlns:a16="http://schemas.microsoft.com/office/drawing/2014/main" id="{88D60E71-E772-4456-94EC-5AD2072996AA}"/>
               </a:ext>
             </a:extLst>
           </p:cNvPr>
@@ -6850,8 +6807,8 @@
         </p:blipFill>
         <p:spPr bwMode="auto">
           <a:xfrm>
-            <a:off x="6499951" y="1536982"/>
-            <a:ext cx="5470621" cy="1040142"/>
+            <a:off x="7826719" y="3153196"/>
+            <a:ext cx="3986001" cy="3411442"/>
           </a:xfrm>
           <a:prstGeom prst="rect">
             <a:avLst/>
@@ -6870,6 +6827,185 @@
       </p:pic>
       <p:pic>
         <p:nvPicPr>
+          <p:cNvPr id="6" name="Picture 5">
+            <a:extLst>
+              <a:ext uri="{FF2B5EF4-FFF2-40B4-BE49-F238E27FC236}">
+                <a16:creationId xmlns:a16="http://schemas.microsoft.com/office/drawing/2014/main" id="{27AAA21C-87CC-4D29-BF64-1CC2FD7342A4}"/>
+              </a:ext>
+            </a:extLst>
+          </p:cNvPr>
+          <p:cNvPicPr>
+            <a:picLocks noChangeAspect="1"/>
+          </p:cNvPicPr>
+          <p:nvPr/>
+        </p:nvPicPr>
+        <p:blipFill>
+          <a:blip r:embed="rId3"/>
+          <a:stretch>
+            <a:fillRect/>
+          </a:stretch>
+        </p:blipFill>
+        <p:spPr>
+          <a:xfrm>
+            <a:off x="7826719" y="296652"/>
+            <a:ext cx="3613112" cy="2788071"/>
+          </a:xfrm>
+          <a:prstGeom prst="rect">
+            <a:avLst/>
+          </a:prstGeom>
+        </p:spPr>
+      </p:pic>
+    </p:spTree>
+    <p:extLst>
+      <p:ext uri="{BB962C8B-B14F-4D97-AF65-F5344CB8AC3E}">
+        <p14:creationId xmlns:p14="http://schemas.microsoft.com/office/powerpoint/2010/main" val="2961069710"/>
+      </p:ext>
+    </p:extLst>
+  </p:cSld>
+  <p:clrMapOvr>
+    <a:masterClrMapping/>
+  </p:clrMapOvr>
+</p:sld>
+</file>
+
+<file path=ppt/slides/slide9.xml><?xml version="1.0" encoding="utf-8"?>
+<p:sld xmlns:a="http://schemas.openxmlformats.org/drawingml/2006/main" xmlns:r="http://schemas.openxmlformats.org/officeDocument/2006/relationships" xmlns:p="http://schemas.openxmlformats.org/presentationml/2006/main">
+  <p:cSld>
+    <p:spTree>
+      <p:nvGrpSpPr>
+        <p:cNvPr id="1" name=""/>
+        <p:cNvGrpSpPr/>
+        <p:nvPr/>
+      </p:nvGrpSpPr>
+      <p:grpSpPr>
+        <a:xfrm>
+          <a:off x="0" y="0"/>
+          <a:ext cx="0" cy="0"/>
+          <a:chOff x="0" y="0"/>
+          <a:chExt cx="0" cy="0"/>
+        </a:xfrm>
+      </p:grpSpPr>
+      <p:sp>
+        <p:nvSpPr>
+          <p:cNvPr id="2" name="Title 1">
+            <a:extLst>
+              <a:ext uri="{FF2B5EF4-FFF2-40B4-BE49-F238E27FC236}">
+                <a16:creationId xmlns:a16="http://schemas.microsoft.com/office/drawing/2014/main" id="{ACD42A18-DFEC-4638-B11B-F65901B64937}"/>
+              </a:ext>
+            </a:extLst>
+          </p:cNvPr>
+          <p:cNvSpPr>
+            <a:spLocks noGrp="1"/>
+          </p:cNvSpPr>
+          <p:nvPr>
+            <p:ph type="title"/>
+          </p:nvPr>
+        </p:nvSpPr>
+        <p:spPr/>
+        <p:txBody>
+          <a:bodyPr/>
+          <a:lstStyle/>
+          <a:p>
+            <a:r>
+              <a:rPr lang="en-US" dirty="0"/>
+              <a:t>Encoding: the bridge from human to machine</a:t>
+            </a:r>
+          </a:p>
+        </p:txBody>
+      </p:sp>
+      <p:sp>
+        <p:nvSpPr>
+          <p:cNvPr id="3" name="Content Placeholder 2">
+            <a:extLst>
+              <a:ext uri="{FF2B5EF4-FFF2-40B4-BE49-F238E27FC236}">
+                <a16:creationId xmlns:a16="http://schemas.microsoft.com/office/drawing/2014/main" id="{D329B330-30CE-4DA5-A7DF-DCC0F203A9AF}"/>
+              </a:ext>
+            </a:extLst>
+          </p:cNvPr>
+          <p:cNvSpPr>
+            <a:spLocks noGrp="1"/>
+          </p:cNvSpPr>
+          <p:nvPr>
+            <p:ph sz="half" idx="1"/>
+          </p:nvPr>
+        </p:nvSpPr>
+        <p:spPr>
+          <a:xfrm>
+            <a:off x="838200" y="1825625"/>
+            <a:ext cx="6311748" cy="4351338"/>
+          </a:xfrm>
+        </p:spPr>
+        <p:txBody>
+          <a:bodyPr>
+            <a:noAutofit/>
+          </a:bodyPr>
+          <a:lstStyle/>
+          <a:p>
+            <a:pPr>
+              <a:buSzPct val="60000"/>
+              <a:buFont typeface="Wingdings" panose="05000000000000000000" pitchFamily="2" charset="2"/>
+              <a:buChar char="§"/>
+            </a:pPr>
+            <a:r>
+              <a:rPr lang="en-US" sz="3600" dirty="0"/>
+              <a:t>Cardinality (unique values)</a:t>
+            </a:r>
+          </a:p>
+          <a:p>
+            <a:pPr>
+              <a:buSzPct val="60000"/>
+              <a:buFont typeface="Wingdings" panose="05000000000000000000" pitchFamily="2" charset="2"/>
+              <a:buChar char="§"/>
+            </a:pPr>
+            <a:endParaRPr lang="en-US" sz="3600" dirty="0"/>
+          </a:p>
+          <a:p>
+            <a:pPr>
+              <a:buSzPct val="60000"/>
+              <a:buFont typeface="Wingdings" panose="05000000000000000000" pitchFamily="2" charset="2"/>
+              <a:buChar char="§"/>
+            </a:pPr>
+            <a:endParaRPr lang="en-US" sz="3600" dirty="0"/>
+          </a:p>
+          <a:p>
+            <a:pPr>
+              <a:buSzPct val="60000"/>
+              <a:buFont typeface="Wingdings" panose="05000000000000000000" pitchFamily="2" charset="2"/>
+              <a:buChar char="§"/>
+            </a:pPr>
+            <a:r>
+              <a:rPr lang="en-US" sz="3600" dirty="0"/>
+              <a:t>Dimensionality</a:t>
+            </a:r>
+          </a:p>
+          <a:p>
+            <a:pPr>
+              <a:buSzPct val="60000"/>
+              <a:buFont typeface="Wingdings" panose="05000000000000000000" pitchFamily="2" charset="2"/>
+              <a:buChar char="§"/>
+            </a:pPr>
+            <a:endParaRPr lang="en-US" sz="3600" dirty="0"/>
+          </a:p>
+          <a:p>
+            <a:pPr>
+              <a:buSzPct val="60000"/>
+              <a:buFont typeface="Wingdings" panose="05000000000000000000" pitchFamily="2" charset="2"/>
+              <a:buChar char="§"/>
+            </a:pPr>
+            <a:endParaRPr lang="en-US" sz="3600" dirty="0"/>
+          </a:p>
+          <a:p>
+            <a:pPr>
+              <a:buSzPct val="60000"/>
+              <a:buFont typeface="Wingdings" panose="05000000000000000000" pitchFamily="2" charset="2"/>
+              <a:buChar char="§"/>
+            </a:pPr>
+            <a:endParaRPr lang="en-US" sz="3600" dirty="0"/>
+          </a:p>
+        </p:txBody>
+      </p:sp>
+      <p:pic>
+        <p:nvPicPr>
           <p:cNvPr id="4102" name="Picture 6" descr="Stop One-Hot Encoding Your Categorical Variables.">
             <a:extLst>
               <a:ext uri="{FF2B5EF4-FFF2-40B4-BE49-F238E27FC236}">
@@ -6895,7 +7031,7 @@
         </p:blipFill>
         <p:spPr bwMode="auto">
           <a:xfrm>
-            <a:off x="6499951" y="3319202"/>
+            <a:off x="6490118" y="2955409"/>
             <a:ext cx="5488741" cy="2607873"/>
           </a:xfrm>
           <a:prstGeom prst="rect">

</xml_diff>

<commit_message>
added significant detail to the slide deck notes
</commit_message>
<xml_diff>
--- a/slide_deck.pptx
+++ b/slide_deck.pptx
@@ -5,7 +5,7 @@
     <p:sldMasterId id="2147483648" r:id="rId1"/>
   </p:sldMasterIdLst>
   <p:notesMasterIdLst>
-    <p:notesMasterId r:id="rId16"/>
+    <p:notesMasterId r:id="rId17"/>
   </p:notesMasterIdLst>
   <p:sldIdLst>
     <p:sldId id="256" r:id="rId2"/>
@@ -22,6 +22,7 @@
     <p:sldId id="269" r:id="rId13"/>
     <p:sldId id="267" r:id="rId14"/>
     <p:sldId id="268" r:id="rId15"/>
+    <p:sldId id="271" r:id="rId16"/>
   </p:sldIdLst>
   <p:sldSz cx="12192000" cy="6858000"/>
   <p:notesSz cx="6858000" cy="9144000"/>
@@ -561,6 +562,627 @@
 </p:notes>
 </file>
 
+<file path=ppt/notesSlides/notesSlide10.xml><?xml version="1.0" encoding="utf-8"?>
+<p:notes xmlns:a="http://schemas.openxmlformats.org/drawingml/2006/main" xmlns:r="http://schemas.openxmlformats.org/officeDocument/2006/relationships" xmlns:p="http://schemas.openxmlformats.org/presentationml/2006/main">
+  <p:cSld>
+    <p:spTree>
+      <p:nvGrpSpPr>
+        <p:cNvPr id="1" name=""/>
+        <p:cNvGrpSpPr/>
+        <p:nvPr/>
+      </p:nvGrpSpPr>
+      <p:grpSpPr>
+        <a:xfrm>
+          <a:off x="0" y="0"/>
+          <a:ext cx="0" cy="0"/>
+          <a:chOff x="0" y="0"/>
+          <a:chExt cx="0" cy="0"/>
+        </a:xfrm>
+      </p:grpSpPr>
+      <p:sp>
+        <p:nvSpPr>
+          <p:cNvPr id="2" name="Slide Image Placeholder 1"/>
+          <p:cNvSpPr>
+            <a:spLocks noGrp="1" noRot="1" noChangeAspect="1"/>
+          </p:cNvSpPr>
+          <p:nvPr>
+            <p:ph type="sldImg"/>
+          </p:nvPr>
+        </p:nvSpPr>
+        <p:spPr/>
+      </p:sp>
+      <p:sp>
+        <p:nvSpPr>
+          <p:cNvPr id="3" name="Notes Placeholder 2"/>
+          <p:cNvSpPr>
+            <a:spLocks noGrp="1"/>
+          </p:cNvSpPr>
+          <p:nvPr>
+            <p:ph type="body" idx="1"/>
+          </p:nvPr>
+        </p:nvSpPr>
+        <p:spPr/>
+        <p:txBody>
+          <a:bodyPr/>
+          <a:lstStyle/>
+          <a:p>
+            <a:r>
+              <a:rPr lang="en-US" dirty="0"/>
+              <a:t>Class imbalance</a:t>
+            </a:r>
+          </a:p>
+          <a:p>
+            <a:endParaRPr lang="en-US" dirty="0"/>
+          </a:p>
+          <a:p>
+            <a:pPr marL="171450" indent="-171450">
+              <a:buFontTx/>
+              <a:buChar char="-"/>
+            </a:pPr>
+            <a:r>
+              <a:rPr lang="en-US" dirty="0"/>
+              <a:t>most modern data science algorithms are built for balanced datasets, or datasets with a nearly equal representation of the output classes</a:t>
+            </a:r>
+          </a:p>
+          <a:p>
+            <a:pPr marL="171450" indent="-171450">
+              <a:buFontTx/>
+              <a:buChar char="-"/>
+            </a:pPr>
+            <a:r>
+              <a:rPr lang="en-US" dirty="0"/>
+              <a:t>as we saw a couple slides ago, we are working with a very unbalanced dataset (96-4 in favor of &lt;50k), so we need to take some action to try to make the classes more </a:t>
+            </a:r>
+            <a:r>
+              <a:rPr lang="en-US" dirty="0" err="1"/>
+              <a:t>balanaced</a:t>
+            </a:r>
+            <a:endParaRPr lang="en-US" dirty="0"/>
+          </a:p>
+          <a:p>
+            <a:pPr marL="0" indent="0">
+              <a:buFontTx/>
+              <a:buNone/>
+            </a:pPr>
+            <a:endParaRPr lang="en-US" dirty="0"/>
+          </a:p>
+          <a:p>
+            <a:pPr marL="0" indent="0">
+              <a:buFontTx/>
+              <a:buNone/>
+            </a:pPr>
+            <a:r>
+              <a:rPr lang="en-US" dirty="0"/>
+              <a:t>Minority class importance</a:t>
+            </a:r>
+          </a:p>
+          <a:p>
+            <a:pPr marL="171450" indent="-171450">
+              <a:buFontTx/>
+              <a:buChar char="-"/>
+            </a:pPr>
+            <a:r>
+              <a:rPr lang="en-US" dirty="0"/>
+              <a:t>the other big problem is that in class imbalance problems, the minority class is usually of higher importance to us than the majority</a:t>
+            </a:r>
+          </a:p>
+          <a:p>
+            <a:pPr marL="171450" indent="-171450">
+              <a:buFontTx/>
+              <a:buChar char="-"/>
+            </a:pPr>
+            <a:r>
+              <a:rPr lang="en-US" dirty="0"/>
+              <a:t>for instance, look at credit card fraud detection.  hundreds of millions of valid transactions are happening on a daily basis while only a small number are fraudulent</a:t>
+            </a:r>
+          </a:p>
+          <a:p>
+            <a:pPr marL="171450" indent="-171450">
+              <a:buFontTx/>
+              <a:buChar char="-"/>
+            </a:pPr>
+            <a:r>
+              <a:rPr lang="en-US" dirty="0"/>
+              <a:t>the credit card company doesn’t care about the valid transactions, they don’t lose money on those.  the ones they need to understand are the fraudulent transactions</a:t>
+            </a:r>
+          </a:p>
+          <a:p>
+            <a:pPr marL="171450" indent="-171450">
+              <a:buFontTx/>
+              <a:buChar char="-"/>
+            </a:pPr>
+            <a:r>
+              <a:rPr lang="en-US" dirty="0"/>
+              <a:t>the same thing with our dataset, we understand that the vast majority of people have &lt;50k in income, we want to identify what goes into the &gt;50k samples</a:t>
+            </a:r>
+          </a:p>
+          <a:p>
+            <a:pPr marL="0" indent="0">
+              <a:buFontTx/>
+              <a:buNone/>
+            </a:pPr>
+            <a:endParaRPr lang="en-US" dirty="0"/>
+          </a:p>
+          <a:p>
+            <a:pPr marL="0" indent="0">
+              <a:buFontTx/>
+              <a:buNone/>
+            </a:pPr>
+            <a:r>
+              <a:rPr lang="en-US" dirty="0"/>
+              <a:t>Resampling</a:t>
+            </a:r>
+          </a:p>
+          <a:p>
+            <a:pPr marL="171450" indent="-171450">
+              <a:buFontTx/>
+              <a:buChar char="-"/>
+            </a:pPr>
+            <a:r>
+              <a:rPr lang="en-US" dirty="0"/>
+              <a:t>there are loads of different techniques that try to address class imbalance by resampling the data</a:t>
+            </a:r>
+          </a:p>
+          <a:p>
+            <a:pPr marL="171450" indent="-171450">
+              <a:buFontTx/>
+              <a:buChar char="-"/>
+            </a:pPr>
+            <a:r>
+              <a:rPr lang="en-US" sz="1200" dirty="0"/>
+              <a:t>SMOTE and ROSE are two commonly used oversampling techniques that generate synthetic data that is roughly similar to that of the existing minority samples</a:t>
+            </a:r>
+          </a:p>
+          <a:p>
+            <a:pPr marL="171450" indent="-171450">
+              <a:buFontTx/>
+              <a:buChar char="-"/>
+            </a:pPr>
+            <a:r>
+              <a:rPr lang="en-US" sz="1200" dirty="0"/>
+              <a:t>additionally, </a:t>
+            </a:r>
+            <a:r>
+              <a:rPr lang="en-US" sz="1200" dirty="0" err="1"/>
+              <a:t>undersampling</a:t>
+            </a:r>
+            <a:r>
+              <a:rPr lang="en-US" sz="1200" dirty="0"/>
+              <a:t> may be paired to the approach by specifically or randomly dropping instances of the overrepresented class</a:t>
+            </a:r>
+            <a:endParaRPr lang="en-US" dirty="0"/>
+          </a:p>
+        </p:txBody>
+      </p:sp>
+      <p:sp>
+        <p:nvSpPr>
+          <p:cNvPr id="4" name="Slide Number Placeholder 3"/>
+          <p:cNvSpPr>
+            <a:spLocks noGrp="1"/>
+          </p:cNvSpPr>
+          <p:nvPr>
+            <p:ph type="sldNum" sz="quarter" idx="5"/>
+          </p:nvPr>
+        </p:nvSpPr>
+        <p:spPr/>
+        <p:txBody>
+          <a:bodyPr/>
+          <a:lstStyle/>
+          <a:p>
+            <a:fld id="{113894EA-6DBB-44FC-9083-4B63A67C3C45}" type="slidenum">
+              <a:rPr lang="en-US" smtClean="0"/>
+              <a:t>10</a:t>
+            </a:fld>
+            <a:endParaRPr lang="en-US"/>
+          </a:p>
+        </p:txBody>
+      </p:sp>
+    </p:spTree>
+    <p:extLst>
+      <p:ext uri="{BB962C8B-B14F-4D97-AF65-F5344CB8AC3E}">
+        <p14:creationId xmlns:p14="http://schemas.microsoft.com/office/powerpoint/2010/main" val="2604827145"/>
+      </p:ext>
+    </p:extLst>
+  </p:cSld>
+  <p:clrMapOvr>
+    <a:masterClrMapping/>
+  </p:clrMapOvr>
+</p:notes>
+</file>
+
+<file path=ppt/notesSlides/notesSlide11.xml><?xml version="1.0" encoding="utf-8"?>
+<p:notes xmlns:a="http://schemas.openxmlformats.org/drawingml/2006/main" xmlns:r="http://schemas.openxmlformats.org/officeDocument/2006/relationships" xmlns:p="http://schemas.openxmlformats.org/presentationml/2006/main">
+  <p:cSld>
+    <p:spTree>
+      <p:nvGrpSpPr>
+        <p:cNvPr id="1" name=""/>
+        <p:cNvGrpSpPr/>
+        <p:nvPr/>
+      </p:nvGrpSpPr>
+      <p:grpSpPr>
+        <a:xfrm>
+          <a:off x="0" y="0"/>
+          <a:ext cx="0" cy="0"/>
+          <a:chOff x="0" y="0"/>
+          <a:chExt cx="0" cy="0"/>
+        </a:xfrm>
+      </p:grpSpPr>
+      <p:sp>
+        <p:nvSpPr>
+          <p:cNvPr id="2" name="Slide Image Placeholder 1"/>
+          <p:cNvSpPr>
+            <a:spLocks noGrp="1" noRot="1" noChangeAspect="1"/>
+          </p:cNvSpPr>
+          <p:nvPr>
+            <p:ph type="sldImg"/>
+          </p:nvPr>
+        </p:nvSpPr>
+        <p:spPr/>
+      </p:sp>
+      <p:sp>
+        <p:nvSpPr>
+          <p:cNvPr id="3" name="Notes Placeholder 2"/>
+          <p:cNvSpPr>
+            <a:spLocks noGrp="1"/>
+          </p:cNvSpPr>
+          <p:nvPr>
+            <p:ph type="body" idx="1"/>
+          </p:nvPr>
+        </p:nvSpPr>
+        <p:spPr/>
+        <p:txBody>
+          <a:bodyPr/>
+          <a:lstStyle/>
+          <a:p>
+            <a:r>
+              <a:rPr lang="en-US" dirty="0"/>
+              <a:t>Examples of class balancing outputs</a:t>
+            </a:r>
+          </a:p>
+        </p:txBody>
+      </p:sp>
+      <p:sp>
+        <p:nvSpPr>
+          <p:cNvPr id="4" name="Slide Number Placeholder 3"/>
+          <p:cNvSpPr>
+            <a:spLocks noGrp="1"/>
+          </p:cNvSpPr>
+          <p:nvPr>
+            <p:ph type="sldNum" sz="quarter" idx="5"/>
+          </p:nvPr>
+        </p:nvSpPr>
+        <p:spPr/>
+        <p:txBody>
+          <a:bodyPr/>
+          <a:lstStyle/>
+          <a:p>
+            <a:fld id="{113894EA-6DBB-44FC-9083-4B63A67C3C45}" type="slidenum">
+              <a:rPr lang="en-US" smtClean="0"/>
+              <a:t>11</a:t>
+            </a:fld>
+            <a:endParaRPr lang="en-US"/>
+          </a:p>
+        </p:txBody>
+      </p:sp>
+    </p:spTree>
+    <p:extLst>
+      <p:ext uri="{BB962C8B-B14F-4D97-AF65-F5344CB8AC3E}">
+        <p14:creationId xmlns:p14="http://schemas.microsoft.com/office/powerpoint/2010/main" val="4189740102"/>
+      </p:ext>
+    </p:extLst>
+  </p:cSld>
+  <p:clrMapOvr>
+    <a:masterClrMapping/>
+  </p:clrMapOvr>
+</p:notes>
+</file>
+
+<file path=ppt/notesSlides/notesSlide12.xml><?xml version="1.0" encoding="utf-8"?>
+<p:notes xmlns:a="http://schemas.openxmlformats.org/drawingml/2006/main" xmlns:r="http://schemas.openxmlformats.org/officeDocument/2006/relationships" xmlns:p="http://schemas.openxmlformats.org/presentationml/2006/main">
+  <p:cSld>
+    <p:spTree>
+      <p:nvGrpSpPr>
+        <p:cNvPr id="1" name=""/>
+        <p:cNvGrpSpPr/>
+        <p:nvPr/>
+      </p:nvGrpSpPr>
+      <p:grpSpPr>
+        <a:xfrm>
+          <a:off x="0" y="0"/>
+          <a:ext cx="0" cy="0"/>
+          <a:chOff x="0" y="0"/>
+          <a:chExt cx="0" cy="0"/>
+        </a:xfrm>
+      </p:grpSpPr>
+      <p:sp>
+        <p:nvSpPr>
+          <p:cNvPr id="2" name="Slide Image Placeholder 1"/>
+          <p:cNvSpPr>
+            <a:spLocks noGrp="1" noRot="1" noChangeAspect="1"/>
+          </p:cNvSpPr>
+          <p:nvPr>
+            <p:ph type="sldImg"/>
+          </p:nvPr>
+        </p:nvSpPr>
+        <p:spPr/>
+      </p:sp>
+      <p:sp>
+        <p:nvSpPr>
+          <p:cNvPr id="3" name="Notes Placeholder 2"/>
+          <p:cNvSpPr>
+            <a:spLocks noGrp="1"/>
+          </p:cNvSpPr>
+          <p:nvPr>
+            <p:ph type="body" idx="1"/>
+          </p:nvPr>
+        </p:nvSpPr>
+        <p:spPr/>
+        <p:txBody>
+          <a:bodyPr/>
+          <a:lstStyle/>
+          <a:p>
+            <a:r>
+              <a:rPr lang="en-US" dirty="0"/>
+              <a:t>Cross validation helps the user choose a model in an unbiased way</a:t>
+            </a:r>
+          </a:p>
+          <a:p>
+            <a:endParaRPr lang="en-US" dirty="0"/>
+          </a:p>
+          <a:p>
+            <a:r>
+              <a:rPr lang="en-US" dirty="0"/>
+              <a:t>Train, validation, test sets:</a:t>
+            </a:r>
+          </a:p>
+          <a:p>
+            <a:pPr marL="171450" marR="0" lvl="0" indent="-171450" algn="l" defTabSz="914400" rtl="0" eaLnBrk="1" fontAlgn="auto" latinLnBrk="0" hangingPunct="1">
+              <a:lnSpc>
+                <a:spcPct val="100000"/>
+              </a:lnSpc>
+              <a:spcBef>
+                <a:spcPts val="0"/>
+              </a:spcBef>
+              <a:spcAft>
+                <a:spcPts val="0"/>
+              </a:spcAft>
+              <a:buClrTx/>
+              <a:buSzTx/>
+              <a:buFontTx/>
+              <a:buChar char="-"/>
+              <a:tabLst/>
+              <a:defRPr/>
+            </a:pPr>
+            <a:r>
+              <a:rPr lang="en-US" dirty="0"/>
+              <a:t>first split your data into a train and test set, where the test set is supposed to represent “new data” or unseen handwritten images of the number 2</a:t>
+            </a:r>
+          </a:p>
+          <a:p>
+            <a:pPr marL="171450" marR="0" lvl="0" indent="-171450" algn="l" defTabSz="914400" rtl="0" eaLnBrk="1" fontAlgn="auto" latinLnBrk="0" hangingPunct="1">
+              <a:lnSpc>
+                <a:spcPct val="100000"/>
+              </a:lnSpc>
+              <a:spcBef>
+                <a:spcPts val="0"/>
+              </a:spcBef>
+              <a:spcAft>
+                <a:spcPts val="0"/>
+              </a:spcAft>
+              <a:buClrTx/>
+              <a:buSzTx/>
+              <a:buFontTx/>
+              <a:buChar char="-"/>
+              <a:tabLst/>
+              <a:defRPr/>
+            </a:pPr>
+            <a:r>
+              <a:rPr lang="en-US" dirty="0"/>
+              <a:t>within your training data, it’s useful to split the data again into a train and validation sets</a:t>
+            </a:r>
+          </a:p>
+          <a:p>
+            <a:pPr marL="171450" marR="0" lvl="0" indent="-171450" algn="l" defTabSz="914400" rtl="0" eaLnBrk="1" fontAlgn="auto" latinLnBrk="0" hangingPunct="1">
+              <a:lnSpc>
+                <a:spcPct val="100000"/>
+              </a:lnSpc>
+              <a:spcBef>
+                <a:spcPts val="0"/>
+              </a:spcBef>
+              <a:spcAft>
+                <a:spcPts val="0"/>
+              </a:spcAft>
+              <a:buClrTx/>
+              <a:buSzTx/>
+              <a:buFontTx/>
+              <a:buChar char="-"/>
+              <a:tabLst/>
+              <a:defRPr/>
+            </a:pPr>
+            <a:r>
+              <a:rPr lang="en-US" dirty="0"/>
+              <a:t>once your model has seen the training set, you can test it on the validation set to understand how it performs on unseen data</a:t>
+            </a:r>
+          </a:p>
+          <a:p>
+            <a:pPr marL="171450" marR="0" lvl="0" indent="-171450" algn="l" defTabSz="914400" rtl="0" eaLnBrk="1" fontAlgn="auto" latinLnBrk="0" hangingPunct="1">
+              <a:lnSpc>
+                <a:spcPct val="100000"/>
+              </a:lnSpc>
+              <a:spcBef>
+                <a:spcPts val="0"/>
+              </a:spcBef>
+              <a:spcAft>
+                <a:spcPts val="0"/>
+              </a:spcAft>
+              <a:buClrTx/>
+              <a:buSzTx/>
+              <a:buFontTx/>
+              <a:buChar char="-"/>
+              <a:tabLst/>
+              <a:defRPr/>
+            </a:pPr>
+            <a:r>
+              <a:rPr lang="en-US" dirty="0"/>
+              <a:t>maximize the performance of your model against the validation set and then test it on the test set to get an understanding of how the model would perform in the wild</a:t>
+            </a:r>
+          </a:p>
+          <a:p>
+            <a:endParaRPr lang="en-US" dirty="0"/>
+          </a:p>
+          <a:p>
+            <a:endParaRPr lang="en-US" dirty="0"/>
+          </a:p>
+          <a:p>
+            <a:r>
+              <a:rPr lang="en-US" dirty="0"/>
+              <a:t>Nested k-fold:</a:t>
+            </a:r>
+          </a:p>
+          <a:p>
+            <a:pPr marL="171450" indent="-171450">
+              <a:buFontTx/>
+              <a:buChar char="-"/>
+            </a:pPr>
+            <a:r>
+              <a:rPr lang="en-US" dirty="0"/>
+              <a:t>cross validating your cross validation</a:t>
+            </a:r>
+          </a:p>
+          <a:p>
+            <a:pPr marL="171450" indent="-171450">
+              <a:buFontTx/>
+              <a:buChar char="-"/>
+            </a:pPr>
+            <a:r>
+              <a:rPr lang="en-US" dirty="0"/>
+              <a:t>create training, validation, and test sets out of just your training data</a:t>
+            </a:r>
+          </a:p>
+          <a:p>
+            <a:pPr marL="171450" marR="0" lvl="0" indent="-171450" algn="l" defTabSz="914400" rtl="0" eaLnBrk="1" fontAlgn="auto" latinLnBrk="0" hangingPunct="1">
+              <a:lnSpc>
+                <a:spcPct val="100000"/>
+              </a:lnSpc>
+              <a:spcBef>
+                <a:spcPts val="0"/>
+              </a:spcBef>
+              <a:spcAft>
+                <a:spcPts val="0"/>
+              </a:spcAft>
+              <a:buClrTx/>
+              <a:buSzTx/>
+              <a:buFontTx/>
+              <a:buChar char="-"/>
+              <a:tabLst/>
+              <a:defRPr/>
+            </a:pPr>
+            <a:r>
+              <a:rPr lang="en-US" sz="1200" dirty="0"/>
+              <a:t>helps with both model selection and model scoring</a:t>
+            </a:r>
+            <a:endParaRPr lang="en-US" dirty="0"/>
+          </a:p>
+          <a:p>
+            <a:pPr marL="171450" indent="-171450">
+              <a:buFontTx/>
+              <a:buChar char="-"/>
+            </a:pPr>
+            <a:r>
+              <a:rPr lang="en-US" sz="1200" dirty="0"/>
+              <a:t>in this example (image 2), for each row on the left, you get five trained models, or 25 training models for all 5 left rows.  select the best model for each left row, reducing the number to 5 models. test those models on the remaining test dataset (scoring) and choose the model with the best performance on the test datasets</a:t>
+            </a:r>
+          </a:p>
+          <a:p>
+            <a:pPr marL="171450" indent="-171450">
+              <a:buFontTx/>
+              <a:buChar char="-"/>
+            </a:pPr>
+            <a:r>
+              <a:rPr lang="en-US" dirty="0"/>
+              <a:t>provides the user with an understanding of over/underfitting before the test set is ever encountered</a:t>
+            </a:r>
+          </a:p>
+          <a:p>
+            <a:endParaRPr lang="en-US" dirty="0"/>
+          </a:p>
+          <a:p>
+            <a:endParaRPr lang="en-US" dirty="0"/>
+          </a:p>
+          <a:p>
+            <a:r>
+              <a:rPr lang="en-US" dirty="0"/>
+              <a:t>Parameters and Hyperparameters:</a:t>
+            </a:r>
+          </a:p>
+          <a:p>
+            <a:pPr marL="171450" indent="-171450">
+              <a:buFontTx/>
+              <a:buChar char="-"/>
+            </a:pPr>
+            <a:r>
+              <a:rPr lang="en-US" dirty="0"/>
+              <a:t>parameters are like the spices or ingredients, hyperparameters are like the pots and pans or the stove type</a:t>
+            </a:r>
+          </a:p>
+          <a:p>
+            <a:pPr marL="171450" indent="-171450">
+              <a:buFontTx/>
+              <a:buChar char="-"/>
+            </a:pPr>
+            <a:r>
+              <a:rPr lang="en-US" dirty="0"/>
+              <a:t>you need both to cook a meal but they’re fundamentally different to one another</a:t>
+            </a:r>
+          </a:p>
+          <a:p>
+            <a:pPr marL="171450" indent="-171450">
+              <a:buFontTx/>
+              <a:buChar char="-"/>
+            </a:pPr>
+            <a:r>
+              <a:rPr lang="en-US" dirty="0"/>
+              <a:t>a cook can vary the amounts of salt, pepper, and garlic whenever they’re cooking, while changing from a pan to a wok or from the stove to the oven changes the whole meal</a:t>
+            </a:r>
+          </a:p>
+        </p:txBody>
+      </p:sp>
+      <p:sp>
+        <p:nvSpPr>
+          <p:cNvPr id="4" name="Slide Number Placeholder 3"/>
+          <p:cNvSpPr>
+            <a:spLocks noGrp="1"/>
+          </p:cNvSpPr>
+          <p:nvPr>
+            <p:ph type="sldNum" sz="quarter" idx="5"/>
+          </p:nvPr>
+        </p:nvSpPr>
+        <p:spPr/>
+        <p:txBody>
+          <a:bodyPr/>
+          <a:lstStyle/>
+          <a:p>
+            <a:fld id="{113894EA-6DBB-44FC-9083-4B63A67C3C45}" type="slidenum">
+              <a:rPr lang="en-US" smtClean="0"/>
+              <a:t>13</a:t>
+            </a:fld>
+            <a:endParaRPr lang="en-US"/>
+          </a:p>
+        </p:txBody>
+      </p:sp>
+    </p:spTree>
+    <p:extLst>
+      <p:ext uri="{BB962C8B-B14F-4D97-AF65-F5344CB8AC3E}">
+        <p14:creationId xmlns:p14="http://schemas.microsoft.com/office/powerpoint/2010/main" val="484914754"/>
+      </p:ext>
+    </p:extLst>
+  </p:cSld>
+  <p:clrMapOvr>
+    <a:masterClrMapping/>
+  </p:clrMapOvr>
+</p:notes>
+</file>
+
 <file path=ppt/notesSlides/notesSlide2.xml><?xml version="1.0" encoding="utf-8"?>
 <p:notes xmlns:a="http://schemas.openxmlformats.org/drawingml/2006/main" xmlns:r="http://schemas.openxmlformats.org/officeDocument/2006/relationships" xmlns:p="http://schemas.openxmlformats.org/presentationml/2006/main">
   <p:cSld>
@@ -694,16 +1316,87 @@
           <a:p>
             <a:r>
               <a:rPr lang="en-US" dirty="0"/>
-              <a:t>Data quality</a:t>
+              <a:t>Classification</a:t>
             </a:r>
           </a:p>
           <a:p>
             <a:endParaRPr lang="en-US" dirty="0"/>
           </a:p>
           <a:p>
+            <a:pPr marL="171450" indent="-171450">
+              <a:buFontTx/>
+              <a:buChar char="-"/>
+            </a:pPr>
             <a:r>
               <a:rPr lang="en-US" dirty="0"/>
-              <a:t>- before doing anything, we need to examine the quality of the data. always remember: "garbage in, garbage out". can we trust this data? does it come from a quality source? don't be misled by missing values. good data sources can be both verifiably accurate and also incomplete</a:t>
+              <a:t>the idea behind classification is that the user wants to bin their sample data into unique groups that help convey some larger point</a:t>
+            </a:r>
+          </a:p>
+          <a:p>
+            <a:pPr marL="171450" indent="-171450">
+              <a:buFontTx/>
+              <a:buChar char="-"/>
+            </a:pPr>
+            <a:r>
+              <a:rPr lang="en-US" dirty="0"/>
+              <a:t>each person in the US population has a unique collection of traits (education, age, industry, etc.) that lead to earning a given income</a:t>
+            </a:r>
+          </a:p>
+          <a:p>
+            <a:pPr marL="171450" indent="-171450">
+              <a:buFontTx/>
+              <a:buChar char="-"/>
+            </a:pPr>
+            <a:r>
+              <a:rPr lang="en-US" dirty="0"/>
+              <a:t>classification can help us understand what recipe of person will most likely lead to higher or lower income levels</a:t>
+            </a:r>
+          </a:p>
+          <a:p>
+            <a:pPr marL="171450" indent="-171450">
+              <a:buFontTx/>
+              <a:buChar char="-"/>
+            </a:pPr>
+            <a:endParaRPr lang="en-US" dirty="0"/>
+          </a:p>
+          <a:p>
+            <a:pPr marL="171450" indent="-171450">
+              <a:buFontTx/>
+              <a:buChar char="-"/>
+            </a:pPr>
+            <a:r>
+              <a:rPr lang="en-US" dirty="0"/>
+              <a:t>the two other most common types of data science problems are regression and clustering</a:t>
+            </a:r>
+          </a:p>
+          <a:p>
+            <a:pPr marL="171450" indent="-171450">
+              <a:buFontTx/>
+              <a:buChar char="-"/>
+            </a:pPr>
+            <a:r>
+              <a:rPr lang="en-US" dirty="0"/>
+              <a:t>regression problems seek to provide a numerical output, like the sale price of a new house on the market</a:t>
+            </a:r>
+          </a:p>
+          <a:p>
+            <a:pPr marL="171450" indent="-171450">
+              <a:buFontTx/>
+              <a:buChar char="-"/>
+            </a:pPr>
+            <a:r>
+              <a:rPr lang="en-US" dirty="0"/>
+              <a:t>clustering problems seek to classify “unstructured” data into groups, like the topics for a corpus COVID research papers (PPE, vaccinations, public health, disease transmission, etc.)</a:t>
+            </a:r>
+          </a:p>
+          <a:p>
+            <a:pPr marL="171450" indent="-171450">
+              <a:buFontTx/>
+              <a:buChar char="-"/>
+            </a:pPr>
+            <a:r>
+              <a:rPr lang="en-US" dirty="0"/>
+              <a:t>these are simply context details for you, they won’t be relevant in this analysis</a:t>
             </a:r>
           </a:p>
         </p:txBody>
@@ -725,7 +1418,7 @@
           <a:p>
             <a:fld id="{113894EA-6DBB-44FC-9083-4B63A67C3C45}" type="slidenum">
               <a:rPr lang="en-US" smtClean="0"/>
-              <a:t>6</a:t>
+              <a:t>3</a:t>
             </a:fld>
             <a:endParaRPr lang="en-US"/>
           </a:p>
@@ -734,7 +1427,7 @@
     </p:spTree>
     <p:extLst>
       <p:ext uri="{BB962C8B-B14F-4D97-AF65-F5344CB8AC3E}">
-        <p14:creationId xmlns:p14="http://schemas.microsoft.com/office/powerpoint/2010/main" val="1847883934"/>
+        <p14:creationId xmlns:p14="http://schemas.microsoft.com/office/powerpoint/2010/main" val="3165213002"/>
       </p:ext>
     </p:extLst>
   </p:cSld>
@@ -790,15 +1483,87 @@
           <a:p>
             <a:r>
               <a:rPr lang="en-US" dirty="0"/>
-              <a:t>- in the case of making the features more machine-friendly, let's look at the feature 'education'. we know as humans that earning a higher level of degree, like a master's or </a:t>
-            </a:r>
-            <a:r>
-              <a:rPr lang="en-US" dirty="0" err="1"/>
-              <a:t>phd</a:t>
-            </a:r>
+              <a:t>Supervised learning</a:t>
+            </a:r>
+          </a:p>
+          <a:p>
+            <a:endParaRPr lang="en-US" dirty="0"/>
+          </a:p>
+          <a:p>
+            <a:pPr marL="171450" indent="-171450">
+              <a:buFontTx/>
+              <a:buChar char="-"/>
+            </a:pPr>
             <a:r>
               <a:rPr lang="en-US" dirty="0"/>
-              <a:t>, will increase the probability that you make more money. a computer isn't a human and only understands 0's and 1's. thus, it's useful to turn those types of categorical variables into a number of some sort, which is a process called encoding. there are lots of possible encoding schemes, the most popular of which are label encoding and one-hot encoding. each of these has their own strengths and weaknesses, which we can discuss</a:t>
+              <a:t>supervised learning is the machine analog for the way humans learn</a:t>
+            </a:r>
+          </a:p>
+          <a:p>
+            <a:pPr marL="171450" indent="-171450">
+              <a:buFontTx/>
+              <a:buChar char="-"/>
+            </a:pPr>
+            <a:r>
+              <a:rPr lang="en-US" dirty="0"/>
+              <a:t>when you’re born, you don’t inherently know what an apple is, but once you’ve been told “this thing on the left” is an apple and you’ve experienced enough apples in your life, you learn what’s identifiable about them, whether it’s their weight, color, shape, smell, etc.</a:t>
+            </a:r>
+          </a:p>
+          <a:p>
+            <a:pPr marL="171450" indent="-171450">
+              <a:buFontTx/>
+              <a:buChar char="-"/>
+            </a:pPr>
+            <a:r>
+              <a:rPr lang="en-US" dirty="0"/>
+              <a:t>a machine can learn in the same sort of way</a:t>
+            </a:r>
+          </a:p>
+          <a:p>
+            <a:pPr marL="171450" indent="-171450">
+              <a:buFontTx/>
+              <a:buChar char="-"/>
+            </a:pPr>
+            <a:endParaRPr lang="en-US" dirty="0"/>
+          </a:p>
+          <a:p>
+            <a:pPr marL="0" indent="0">
+              <a:buFontTx/>
+              <a:buNone/>
+            </a:pPr>
+            <a:r>
+              <a:rPr lang="en-US" dirty="0"/>
+              <a:t>MNIST dataset</a:t>
+            </a:r>
+          </a:p>
+          <a:p>
+            <a:pPr marL="171450" indent="-171450">
+              <a:buFontTx/>
+              <a:buChar char="-"/>
+            </a:pPr>
+            <a:r>
+              <a:rPr lang="en-US" dirty="0"/>
+              <a:t>if you provide a machine many instances of the number 2 and you tell the machine “this thing you’re observing is a 2”, the machine can learn what makes a two identifiable</a:t>
+            </a:r>
+          </a:p>
+          <a:p>
+            <a:pPr marL="171450" indent="-171450">
+              <a:buFontTx/>
+              <a:buChar char="-"/>
+            </a:pPr>
+            <a:r>
+              <a:rPr lang="en-US" dirty="0"/>
+              <a:t>the bend of the shape, the swirl at the bottom, etc.</a:t>
+            </a:r>
+          </a:p>
+          <a:p>
+            <a:pPr marL="171450" indent="-171450">
+              <a:buFontTx/>
+              <a:buChar char="-"/>
+            </a:pPr>
+            <a:r>
+              <a:rPr lang="en-US" dirty="0"/>
+              <a:t>learning these features can allow a computer to recognize a 2 in the same way that it can recognize the attributes of a person making more or less than 50k</a:t>
             </a:r>
           </a:p>
         </p:txBody>
@@ -820,7 +1585,7 @@
           <a:p>
             <a:fld id="{113894EA-6DBB-44FC-9083-4B63A67C3C45}" type="slidenum">
               <a:rPr lang="en-US" smtClean="0"/>
-              <a:t>9</a:t>
+              <a:t>4</a:t>
             </a:fld>
             <a:endParaRPr lang="en-US"/>
           </a:p>
@@ -829,7 +1594,7 @@
     </p:spTree>
     <p:extLst>
       <p:ext uri="{BB962C8B-B14F-4D97-AF65-F5344CB8AC3E}">
-        <p14:creationId xmlns:p14="http://schemas.microsoft.com/office/powerpoint/2010/main" val="896369216"/>
+        <p14:creationId xmlns:p14="http://schemas.microsoft.com/office/powerpoint/2010/main" val="990020014"/>
       </p:ext>
     </p:extLst>
   </p:cSld>
@@ -883,7 +1648,10 @@
           <a:bodyPr/>
           <a:lstStyle/>
           <a:p>
-            <a:endParaRPr lang="en-US" dirty="0"/>
+            <a:r>
+              <a:rPr lang="en-US" dirty="0"/>
+              <a:t>Bad data, good luck learning anything from this ugly mess</a:t>
+            </a:r>
           </a:p>
         </p:txBody>
       </p:sp>
@@ -904,7 +1672,7 @@
           <a:p>
             <a:fld id="{113894EA-6DBB-44FC-9083-4B63A67C3C45}" type="slidenum">
               <a:rPr lang="en-US" smtClean="0"/>
-              <a:t>13</a:t>
+              <a:t>5</a:t>
             </a:fld>
             <a:endParaRPr lang="en-US"/>
           </a:p>
@@ -913,7 +1681,820 @@
     </p:spTree>
     <p:extLst>
       <p:ext uri="{BB962C8B-B14F-4D97-AF65-F5344CB8AC3E}">
-        <p14:creationId xmlns:p14="http://schemas.microsoft.com/office/powerpoint/2010/main" val="484914754"/>
+        <p14:creationId xmlns:p14="http://schemas.microsoft.com/office/powerpoint/2010/main" val="2402659687"/>
+      </p:ext>
+    </p:extLst>
+  </p:cSld>
+  <p:clrMapOvr>
+    <a:masterClrMapping/>
+  </p:clrMapOvr>
+</p:notes>
+</file>
+
+<file path=ppt/notesSlides/notesSlide6.xml><?xml version="1.0" encoding="utf-8"?>
+<p:notes xmlns:a="http://schemas.openxmlformats.org/drawingml/2006/main" xmlns:r="http://schemas.openxmlformats.org/officeDocument/2006/relationships" xmlns:p="http://schemas.openxmlformats.org/presentationml/2006/main">
+  <p:cSld>
+    <p:spTree>
+      <p:nvGrpSpPr>
+        <p:cNvPr id="1" name=""/>
+        <p:cNvGrpSpPr/>
+        <p:nvPr/>
+      </p:nvGrpSpPr>
+      <p:grpSpPr>
+        <a:xfrm>
+          <a:off x="0" y="0"/>
+          <a:ext cx="0" cy="0"/>
+          <a:chOff x="0" y="0"/>
+          <a:chExt cx="0" cy="0"/>
+        </a:xfrm>
+      </p:grpSpPr>
+      <p:sp>
+        <p:nvSpPr>
+          <p:cNvPr id="2" name="Slide Image Placeholder 1"/>
+          <p:cNvSpPr>
+            <a:spLocks noGrp="1" noRot="1" noChangeAspect="1"/>
+          </p:cNvSpPr>
+          <p:nvPr>
+            <p:ph type="sldImg"/>
+          </p:nvPr>
+        </p:nvSpPr>
+        <p:spPr/>
+      </p:sp>
+      <p:sp>
+        <p:nvSpPr>
+          <p:cNvPr id="3" name="Notes Placeholder 2"/>
+          <p:cNvSpPr>
+            <a:spLocks noGrp="1"/>
+          </p:cNvSpPr>
+          <p:nvPr>
+            <p:ph type="body" idx="1"/>
+          </p:nvPr>
+        </p:nvSpPr>
+        <p:spPr/>
+        <p:txBody>
+          <a:bodyPr/>
+          <a:lstStyle/>
+          <a:p>
+            <a:r>
+              <a:rPr lang="en-US" dirty="0"/>
+              <a:t>Data quality</a:t>
+            </a:r>
+          </a:p>
+          <a:p>
+            <a:endParaRPr lang="en-US" dirty="0"/>
+          </a:p>
+          <a:p>
+            <a:pPr marL="171450" indent="-171450">
+              <a:buFontTx/>
+              <a:buChar char="-"/>
+            </a:pPr>
+            <a:r>
+              <a:rPr lang="en-US" dirty="0"/>
+              <a:t>before doing anything, we need to examine the quality of the data. always remember: "garbage in, garbage out“</a:t>
+            </a:r>
+          </a:p>
+          <a:p>
+            <a:pPr marL="171450" indent="-171450">
+              <a:buFontTx/>
+              <a:buChar char="-"/>
+            </a:pPr>
+            <a:r>
+              <a:rPr lang="en-US" dirty="0"/>
+              <a:t>your model outputs are only as good as the data that is fed to it, so data quality is of paramount importance</a:t>
+            </a:r>
+          </a:p>
+          <a:p>
+            <a:pPr marL="0" indent="0">
+              <a:buFontTx/>
+              <a:buNone/>
+            </a:pPr>
+            <a:endParaRPr lang="en-US" dirty="0"/>
+          </a:p>
+          <a:p>
+            <a:pPr marL="0" indent="0">
+              <a:buFontTx/>
+              <a:buNone/>
+            </a:pPr>
+            <a:endParaRPr lang="en-US" dirty="0"/>
+          </a:p>
+          <a:p>
+            <a:pPr marL="0" indent="0">
+              <a:buFontTx/>
+              <a:buNone/>
+            </a:pPr>
+            <a:r>
+              <a:rPr lang="en-US" dirty="0"/>
+              <a:t>understanding your data</a:t>
+            </a:r>
+          </a:p>
+          <a:p>
+            <a:pPr marL="171450" indent="-171450">
+              <a:buFontTx/>
+              <a:buChar char="-"/>
+            </a:pPr>
+            <a:r>
+              <a:rPr lang="en-US" dirty="0"/>
+              <a:t>what sort of data do you have?  numerical and categorical data in tabular form?  video data?  images?</a:t>
+            </a:r>
+          </a:p>
+          <a:p>
+            <a:pPr marL="171450" indent="-171450">
+              <a:buFontTx/>
+              <a:buChar char="-"/>
+            </a:pPr>
+            <a:r>
+              <a:rPr lang="en-US" dirty="0"/>
+              <a:t>don't be misled by missing values. good data sources can be both verifiably accurate and also incomplete</a:t>
+            </a:r>
+          </a:p>
+          <a:p>
+            <a:pPr marL="171450" indent="-171450">
+              <a:buFontTx/>
+              <a:buChar char="-"/>
+            </a:pPr>
+            <a:endParaRPr lang="en-US" dirty="0"/>
+          </a:p>
+          <a:p>
+            <a:pPr marL="171450" indent="-171450">
+              <a:buFontTx/>
+              <a:buChar char="-"/>
+            </a:pPr>
+            <a:endParaRPr lang="en-US" dirty="0"/>
+          </a:p>
+          <a:p>
+            <a:pPr marL="0" indent="0">
+              <a:buFontTx/>
+              <a:buNone/>
+            </a:pPr>
+            <a:r>
+              <a:rPr lang="en-US" dirty="0"/>
+              <a:t>verifying your data</a:t>
+            </a:r>
+          </a:p>
+          <a:p>
+            <a:pPr marL="171450" indent="-171450">
+              <a:buFontTx/>
+              <a:buChar char="-"/>
+            </a:pPr>
+            <a:r>
+              <a:rPr lang="en-US" dirty="0"/>
+              <a:t>can we trust this data? does it come from a quality source? who collected it?</a:t>
+            </a:r>
+          </a:p>
+          <a:p>
+            <a:pPr marL="171450" indent="-171450">
+              <a:buFontTx/>
+              <a:buChar char="-"/>
+            </a:pPr>
+            <a:r>
+              <a:rPr lang="en-US" dirty="0"/>
+              <a:t>in this case, the census bureau is the authority on high level demographic data in the US so we have to have some faith that their collection processes are solid and that the data is trustworthy</a:t>
+            </a:r>
+          </a:p>
+        </p:txBody>
+      </p:sp>
+      <p:sp>
+        <p:nvSpPr>
+          <p:cNvPr id="4" name="Slide Number Placeholder 3"/>
+          <p:cNvSpPr>
+            <a:spLocks noGrp="1"/>
+          </p:cNvSpPr>
+          <p:nvPr>
+            <p:ph type="sldNum" sz="quarter" idx="5"/>
+          </p:nvPr>
+        </p:nvSpPr>
+        <p:spPr/>
+        <p:txBody>
+          <a:bodyPr/>
+          <a:lstStyle/>
+          <a:p>
+            <a:fld id="{113894EA-6DBB-44FC-9083-4B63A67C3C45}" type="slidenum">
+              <a:rPr lang="en-US" smtClean="0"/>
+              <a:t>6</a:t>
+            </a:fld>
+            <a:endParaRPr lang="en-US"/>
+          </a:p>
+        </p:txBody>
+      </p:sp>
+    </p:spTree>
+    <p:extLst>
+      <p:ext uri="{BB962C8B-B14F-4D97-AF65-F5344CB8AC3E}">
+        <p14:creationId xmlns:p14="http://schemas.microsoft.com/office/powerpoint/2010/main" val="1847883934"/>
+      </p:ext>
+    </p:extLst>
+  </p:cSld>
+  <p:clrMapOvr>
+    <a:masterClrMapping/>
+  </p:clrMapOvr>
+</p:notes>
+</file>
+
+<file path=ppt/notesSlides/notesSlide7.xml><?xml version="1.0" encoding="utf-8"?>
+<p:notes xmlns:a="http://schemas.openxmlformats.org/drawingml/2006/main" xmlns:r="http://schemas.openxmlformats.org/officeDocument/2006/relationships" xmlns:p="http://schemas.openxmlformats.org/presentationml/2006/main">
+  <p:cSld>
+    <p:spTree>
+      <p:nvGrpSpPr>
+        <p:cNvPr id="1" name=""/>
+        <p:cNvGrpSpPr/>
+        <p:nvPr/>
+      </p:nvGrpSpPr>
+      <p:grpSpPr>
+        <a:xfrm>
+          <a:off x="0" y="0"/>
+          <a:ext cx="0" cy="0"/>
+          <a:chOff x="0" y="0"/>
+          <a:chExt cx="0" cy="0"/>
+        </a:xfrm>
+      </p:grpSpPr>
+      <p:sp>
+        <p:nvSpPr>
+          <p:cNvPr id="2" name="Slide Image Placeholder 1"/>
+          <p:cNvSpPr>
+            <a:spLocks noGrp="1" noRot="1" noChangeAspect="1"/>
+          </p:cNvSpPr>
+          <p:nvPr>
+            <p:ph type="sldImg"/>
+          </p:nvPr>
+        </p:nvSpPr>
+        <p:spPr/>
+      </p:sp>
+      <p:sp>
+        <p:nvSpPr>
+          <p:cNvPr id="3" name="Notes Placeholder 2"/>
+          <p:cNvSpPr>
+            <a:spLocks noGrp="1"/>
+          </p:cNvSpPr>
+          <p:nvPr>
+            <p:ph type="body" idx="1"/>
+          </p:nvPr>
+        </p:nvSpPr>
+        <p:spPr/>
+        <p:txBody>
+          <a:bodyPr/>
+          <a:lstStyle/>
+          <a:p>
+            <a:r>
+              <a:rPr lang="en-US" dirty="0"/>
+              <a:t>Data Cleaning</a:t>
+            </a:r>
+          </a:p>
+          <a:p>
+            <a:endParaRPr lang="en-US" dirty="0"/>
+          </a:p>
+          <a:p>
+            <a:pPr marL="171450" indent="-171450">
+              <a:buFontTx/>
+              <a:buChar char="-"/>
+            </a:pPr>
+            <a:r>
+              <a:rPr lang="en-US" dirty="0"/>
+              <a:t>once we have verified that our data is trustworthy, we can start working on cleaning and preparing it</a:t>
+            </a:r>
+          </a:p>
+          <a:p>
+            <a:pPr marL="171450" indent="-171450">
+              <a:buFontTx/>
+              <a:buChar char="-"/>
+            </a:pPr>
+            <a:r>
+              <a:rPr lang="en-US" dirty="0"/>
+              <a:t>for our dataset, the first thing we need to establish are the names for our features, so that we know column A is “age” and column B is “class of worker” etc.</a:t>
+            </a:r>
+          </a:p>
+          <a:p>
+            <a:pPr marL="171450" indent="-171450">
+              <a:buFontTx/>
+              <a:buChar char="-"/>
+            </a:pPr>
+            <a:r>
+              <a:rPr lang="en-US" dirty="0"/>
+              <a:t>we can then quickly pull some descriptive statistics about the dataset, like finding null values or looking at the mean and standard deviation of each column of data</a:t>
+            </a:r>
+          </a:p>
+          <a:p>
+            <a:pPr marL="171450" indent="-171450">
+              <a:buFontTx/>
+              <a:buChar char="-"/>
+            </a:pPr>
+            <a:r>
+              <a:rPr lang="en-US" dirty="0"/>
+              <a:t>lastly it’s important to have  look at your data and see what it looks like, otherwise you wouldn’t know these strange values like “not in universe” were in your data</a:t>
+            </a:r>
+          </a:p>
+          <a:p>
+            <a:endParaRPr lang="en-US" dirty="0"/>
+          </a:p>
+        </p:txBody>
+      </p:sp>
+      <p:sp>
+        <p:nvSpPr>
+          <p:cNvPr id="4" name="Slide Number Placeholder 3"/>
+          <p:cNvSpPr>
+            <a:spLocks noGrp="1"/>
+          </p:cNvSpPr>
+          <p:nvPr>
+            <p:ph type="sldNum" sz="quarter" idx="5"/>
+          </p:nvPr>
+        </p:nvSpPr>
+        <p:spPr/>
+        <p:txBody>
+          <a:bodyPr/>
+          <a:lstStyle/>
+          <a:p>
+            <a:fld id="{113894EA-6DBB-44FC-9083-4B63A67C3C45}" type="slidenum">
+              <a:rPr lang="en-US" smtClean="0"/>
+              <a:t>7</a:t>
+            </a:fld>
+            <a:endParaRPr lang="en-US"/>
+          </a:p>
+        </p:txBody>
+      </p:sp>
+    </p:spTree>
+    <p:extLst>
+      <p:ext uri="{BB962C8B-B14F-4D97-AF65-F5344CB8AC3E}">
+        <p14:creationId xmlns:p14="http://schemas.microsoft.com/office/powerpoint/2010/main" val="1229934544"/>
+      </p:ext>
+    </p:extLst>
+  </p:cSld>
+  <p:clrMapOvr>
+    <a:masterClrMapping/>
+  </p:clrMapOvr>
+</p:notes>
+</file>
+
+<file path=ppt/notesSlides/notesSlide8.xml><?xml version="1.0" encoding="utf-8"?>
+<p:notes xmlns:a="http://schemas.openxmlformats.org/drawingml/2006/main" xmlns:r="http://schemas.openxmlformats.org/officeDocument/2006/relationships" xmlns:p="http://schemas.openxmlformats.org/presentationml/2006/main">
+  <p:cSld>
+    <p:spTree>
+      <p:nvGrpSpPr>
+        <p:cNvPr id="1" name=""/>
+        <p:cNvGrpSpPr/>
+        <p:nvPr/>
+      </p:nvGrpSpPr>
+      <p:grpSpPr>
+        <a:xfrm>
+          <a:off x="0" y="0"/>
+          <a:ext cx="0" cy="0"/>
+          <a:chOff x="0" y="0"/>
+          <a:chExt cx="0" cy="0"/>
+        </a:xfrm>
+      </p:grpSpPr>
+      <p:sp>
+        <p:nvSpPr>
+          <p:cNvPr id="2" name="Slide Image Placeholder 1"/>
+          <p:cNvSpPr>
+            <a:spLocks noGrp="1" noRot="1" noChangeAspect="1"/>
+          </p:cNvSpPr>
+          <p:nvPr>
+            <p:ph type="sldImg"/>
+          </p:nvPr>
+        </p:nvSpPr>
+        <p:spPr/>
+      </p:sp>
+      <p:sp>
+        <p:nvSpPr>
+          <p:cNvPr id="3" name="Notes Placeholder 2"/>
+          <p:cNvSpPr>
+            <a:spLocks noGrp="1"/>
+          </p:cNvSpPr>
+          <p:nvPr>
+            <p:ph type="body" idx="1"/>
+          </p:nvPr>
+        </p:nvSpPr>
+        <p:spPr/>
+        <p:txBody>
+          <a:bodyPr/>
+          <a:lstStyle/>
+          <a:p>
+            <a:r>
+              <a:rPr lang="en-US" dirty="0"/>
+              <a:t>EDA</a:t>
+            </a:r>
+          </a:p>
+          <a:p>
+            <a:endParaRPr lang="en-US" dirty="0"/>
+          </a:p>
+          <a:p>
+            <a:pPr marL="171450" indent="-171450">
+              <a:buFontTx/>
+              <a:buChar char="-"/>
+            </a:pPr>
+            <a:r>
+              <a:rPr lang="en-US" dirty="0"/>
+              <a:t>EDA is an exercise in gaining a deeper understanding of your data, trying to identify patterns, and performing any necessary transformations to your data before modeling begins</a:t>
+            </a:r>
+          </a:p>
+          <a:p>
+            <a:pPr marL="171450" indent="-171450">
+              <a:buFontTx/>
+              <a:buChar char="-"/>
+            </a:pPr>
+            <a:r>
+              <a:rPr lang="en-US" dirty="0"/>
+              <a:t>EDA is an open-ended process of exploring the patterns in your data, there’s no right or wrong way to go about it</a:t>
+            </a:r>
+          </a:p>
+          <a:p>
+            <a:pPr marL="0" indent="0">
+              <a:buFontTx/>
+              <a:buNone/>
+            </a:pPr>
+            <a:endParaRPr lang="en-US" dirty="0"/>
+          </a:p>
+          <a:p>
+            <a:pPr marL="171450" marR="0" lvl="0" indent="-171450" algn="l" defTabSz="914400" rtl="0" eaLnBrk="1" fontAlgn="auto" latinLnBrk="0" hangingPunct="1">
+              <a:lnSpc>
+                <a:spcPct val="100000"/>
+              </a:lnSpc>
+              <a:spcBef>
+                <a:spcPts val="0"/>
+              </a:spcBef>
+              <a:spcAft>
+                <a:spcPts val="0"/>
+              </a:spcAft>
+              <a:buClrTx/>
+              <a:buSzTx/>
+              <a:buFontTx/>
+              <a:buChar char="-"/>
+              <a:tabLst/>
+              <a:defRPr/>
+            </a:pPr>
+            <a:r>
+              <a:rPr lang="en-US" dirty="0"/>
+              <a:t>the EDA is a good place to examine the distributions of your features.  are your numerical features really numerical?  the “detailed industry recode” feature is numerical, but don’t those numerical values really represent categories?</a:t>
+            </a:r>
+          </a:p>
+          <a:p>
+            <a:pPr marL="171450" marR="0" lvl="0" indent="-171450" algn="l" defTabSz="914400" rtl="0" eaLnBrk="1" fontAlgn="auto" latinLnBrk="0" hangingPunct="1">
+              <a:lnSpc>
+                <a:spcPct val="100000"/>
+              </a:lnSpc>
+              <a:spcBef>
+                <a:spcPts val="0"/>
+              </a:spcBef>
+              <a:spcAft>
+                <a:spcPts val="0"/>
+              </a:spcAft>
+              <a:buClrTx/>
+              <a:buSzTx/>
+              <a:buFontTx/>
+              <a:buChar char="-"/>
+              <a:tabLst/>
+              <a:defRPr/>
+            </a:pPr>
+            <a:r>
+              <a:rPr lang="en-US" dirty="0"/>
+              <a:t>in our case, we can see that the distribution of our target is highly imbalanced, where the instances of &lt;50k income samples far outnumber those of &gt;50k</a:t>
+            </a:r>
+          </a:p>
+          <a:p>
+            <a:pPr marL="171450" marR="0" lvl="0" indent="-171450" algn="l" defTabSz="914400" rtl="0" eaLnBrk="1" fontAlgn="auto" latinLnBrk="0" hangingPunct="1">
+              <a:lnSpc>
+                <a:spcPct val="100000"/>
+              </a:lnSpc>
+              <a:spcBef>
+                <a:spcPts val="0"/>
+              </a:spcBef>
+              <a:spcAft>
+                <a:spcPts val="0"/>
+              </a:spcAft>
+              <a:buClrTx/>
+              <a:buSzTx/>
+              <a:buFontTx/>
+              <a:buChar char="-"/>
+              <a:tabLst/>
+              <a:defRPr/>
+            </a:pPr>
+            <a:r>
+              <a:rPr lang="en-US" dirty="0"/>
+              <a:t>we will have to deal with that later</a:t>
+            </a:r>
+          </a:p>
+          <a:p>
+            <a:pPr marL="171450" marR="0" lvl="0" indent="-171450" algn="l" defTabSz="914400" rtl="0" eaLnBrk="1" fontAlgn="auto" latinLnBrk="0" hangingPunct="1">
+              <a:lnSpc>
+                <a:spcPct val="100000"/>
+              </a:lnSpc>
+              <a:spcBef>
+                <a:spcPts val="0"/>
+              </a:spcBef>
+              <a:spcAft>
+                <a:spcPts val="0"/>
+              </a:spcAft>
+              <a:buClrTx/>
+              <a:buSzTx/>
+              <a:buFontTx/>
+              <a:buChar char="-"/>
+              <a:tabLst/>
+              <a:defRPr/>
+            </a:pPr>
+            <a:endParaRPr lang="en-US" dirty="0"/>
+          </a:p>
+          <a:p>
+            <a:pPr marL="171450" marR="0" lvl="0" indent="-171450" algn="l" defTabSz="914400" rtl="0" eaLnBrk="1" fontAlgn="auto" latinLnBrk="0" hangingPunct="1">
+              <a:lnSpc>
+                <a:spcPct val="100000"/>
+              </a:lnSpc>
+              <a:spcBef>
+                <a:spcPts val="0"/>
+              </a:spcBef>
+              <a:spcAft>
+                <a:spcPts val="0"/>
+              </a:spcAft>
+              <a:buClrTx/>
+              <a:buSzTx/>
+              <a:buFontTx/>
+              <a:buChar char="-"/>
+              <a:tabLst/>
+              <a:defRPr/>
+            </a:pPr>
+            <a:r>
+              <a:rPr lang="en-US" dirty="0"/>
+              <a:t>also, the EDA is a good place to example feature correlation, or in other words, the linear relationships between features. if I change the value for feature 1, does that likely change the value of feature 2?</a:t>
+            </a:r>
+          </a:p>
+          <a:p>
+            <a:pPr marL="171450" marR="0" lvl="0" indent="-171450" algn="l" defTabSz="914400" rtl="0" eaLnBrk="1" fontAlgn="auto" latinLnBrk="0" hangingPunct="1">
+              <a:lnSpc>
+                <a:spcPct val="100000"/>
+              </a:lnSpc>
+              <a:spcBef>
+                <a:spcPts val="0"/>
+              </a:spcBef>
+              <a:spcAft>
+                <a:spcPts val="0"/>
+              </a:spcAft>
+              <a:buClrTx/>
+              <a:buSzTx/>
+              <a:buFontTx/>
+              <a:buChar char="-"/>
+              <a:tabLst/>
+              <a:defRPr/>
+            </a:pPr>
+            <a:r>
+              <a:rPr lang="en-US" dirty="0"/>
+              <a:t>this information is very important because multicollinearity can really obfuscate the outcome of your model</a:t>
+            </a:r>
+          </a:p>
+          <a:p>
+            <a:pPr marL="171450" marR="0" lvl="0" indent="-171450" algn="l" defTabSz="914400" rtl="0" eaLnBrk="1" fontAlgn="auto" latinLnBrk="0" hangingPunct="1">
+              <a:lnSpc>
+                <a:spcPct val="100000"/>
+              </a:lnSpc>
+              <a:spcBef>
+                <a:spcPts val="0"/>
+              </a:spcBef>
+              <a:spcAft>
+                <a:spcPts val="0"/>
+              </a:spcAft>
+              <a:buClrTx/>
+              <a:buSzTx/>
+              <a:buFontTx/>
+              <a:buChar char="-"/>
+              <a:tabLst/>
+              <a:defRPr/>
+            </a:pPr>
+            <a:r>
+              <a:rPr lang="en-US" dirty="0"/>
+              <a:t>let’s say two features are highly correlated, so a change in feature 1 elicits the same exact change in feature 2.  how will we know whether a change in feature 1 really affects the model performance?  how do we know feature 2 is not responsible for affecting the model?</a:t>
+            </a:r>
+          </a:p>
+          <a:p>
+            <a:pPr marL="171450" indent="-171450">
+              <a:buFontTx/>
+              <a:buChar char="-"/>
+            </a:pPr>
+            <a:endParaRPr lang="en-US" dirty="0"/>
+          </a:p>
+        </p:txBody>
+      </p:sp>
+      <p:sp>
+        <p:nvSpPr>
+          <p:cNvPr id="4" name="Slide Number Placeholder 3"/>
+          <p:cNvSpPr>
+            <a:spLocks noGrp="1"/>
+          </p:cNvSpPr>
+          <p:nvPr>
+            <p:ph type="sldNum" sz="quarter" idx="5"/>
+          </p:nvPr>
+        </p:nvSpPr>
+        <p:spPr/>
+        <p:txBody>
+          <a:bodyPr/>
+          <a:lstStyle/>
+          <a:p>
+            <a:fld id="{113894EA-6DBB-44FC-9083-4B63A67C3C45}" type="slidenum">
+              <a:rPr lang="en-US" smtClean="0"/>
+              <a:t>8</a:t>
+            </a:fld>
+            <a:endParaRPr lang="en-US"/>
+          </a:p>
+        </p:txBody>
+      </p:sp>
+    </p:spTree>
+    <p:extLst>
+      <p:ext uri="{BB962C8B-B14F-4D97-AF65-F5344CB8AC3E}">
+        <p14:creationId xmlns:p14="http://schemas.microsoft.com/office/powerpoint/2010/main" val="3743104152"/>
+      </p:ext>
+    </p:extLst>
+  </p:cSld>
+  <p:clrMapOvr>
+    <a:masterClrMapping/>
+  </p:clrMapOvr>
+</p:notes>
+</file>
+
+<file path=ppt/notesSlides/notesSlide9.xml><?xml version="1.0" encoding="utf-8"?>
+<p:notes xmlns:a="http://schemas.openxmlformats.org/drawingml/2006/main" xmlns:r="http://schemas.openxmlformats.org/officeDocument/2006/relationships" xmlns:p="http://schemas.openxmlformats.org/presentationml/2006/main">
+  <p:cSld>
+    <p:spTree>
+      <p:nvGrpSpPr>
+        <p:cNvPr id="1" name=""/>
+        <p:cNvGrpSpPr/>
+        <p:nvPr/>
+      </p:nvGrpSpPr>
+      <p:grpSpPr>
+        <a:xfrm>
+          <a:off x="0" y="0"/>
+          <a:ext cx="0" cy="0"/>
+          <a:chOff x="0" y="0"/>
+          <a:chExt cx="0" cy="0"/>
+        </a:xfrm>
+      </p:grpSpPr>
+      <p:sp>
+        <p:nvSpPr>
+          <p:cNvPr id="2" name="Slide Image Placeholder 1"/>
+          <p:cNvSpPr>
+            <a:spLocks noGrp="1" noRot="1" noChangeAspect="1"/>
+          </p:cNvSpPr>
+          <p:nvPr>
+            <p:ph type="sldImg"/>
+          </p:nvPr>
+        </p:nvSpPr>
+        <p:spPr/>
+      </p:sp>
+      <p:sp>
+        <p:nvSpPr>
+          <p:cNvPr id="3" name="Notes Placeholder 2"/>
+          <p:cNvSpPr>
+            <a:spLocks noGrp="1"/>
+          </p:cNvSpPr>
+          <p:nvPr>
+            <p:ph type="body" idx="1"/>
+          </p:nvPr>
+        </p:nvSpPr>
+        <p:spPr/>
+        <p:txBody>
+          <a:bodyPr/>
+          <a:lstStyle/>
+          <a:p>
+            <a:r>
+              <a:rPr lang="en-US" dirty="0"/>
+              <a:t>Encoding</a:t>
+            </a:r>
+          </a:p>
+          <a:p>
+            <a:endParaRPr lang="en-US" dirty="0"/>
+          </a:p>
+          <a:p>
+            <a:pPr marL="171450" indent="-171450">
+              <a:buFontTx/>
+              <a:buChar char="-"/>
+            </a:pPr>
+            <a:r>
+              <a:rPr lang="en-US" dirty="0"/>
+              <a:t>as if you needed reminding, machines don’t understand things like we do, they’re built of transistors that only exist as 0’s and 1’s</a:t>
+            </a:r>
+          </a:p>
+          <a:p>
+            <a:pPr marL="171450" indent="-171450">
+              <a:buFontTx/>
+              <a:buChar char="-"/>
+            </a:pPr>
+            <a:r>
+              <a:rPr lang="en-US" dirty="0"/>
+              <a:t>thus, a machine cannot learn what a “dog” or “cat” is, but merely a numerical representation of these things</a:t>
+            </a:r>
+          </a:p>
+          <a:p>
+            <a:pPr marL="171450" indent="-171450">
+              <a:buFontTx/>
+              <a:buChar char="-"/>
+            </a:pPr>
+            <a:r>
+              <a:rPr lang="en-US" dirty="0"/>
+              <a:t>encoding is the means by which we can turn this categorical data with rich meanings into the 0’s and 1’s that a machine understands</a:t>
+            </a:r>
+          </a:p>
+          <a:p>
+            <a:pPr marL="171450" indent="-171450">
+              <a:buFontTx/>
+              <a:buChar char="-"/>
+            </a:pPr>
+            <a:endParaRPr lang="en-US" dirty="0"/>
+          </a:p>
+          <a:p>
+            <a:pPr marL="171450" marR="0" lvl="0" indent="-171450" algn="l" defTabSz="914400" rtl="0" eaLnBrk="1" fontAlgn="auto" latinLnBrk="0" hangingPunct="1">
+              <a:lnSpc>
+                <a:spcPct val="100000"/>
+              </a:lnSpc>
+              <a:spcBef>
+                <a:spcPts val="0"/>
+              </a:spcBef>
+              <a:spcAft>
+                <a:spcPts val="0"/>
+              </a:spcAft>
+              <a:buClrTx/>
+              <a:buSzTx/>
+              <a:buFontTx/>
+              <a:buChar char="-"/>
+              <a:tabLst/>
+              <a:defRPr/>
+            </a:pPr>
+            <a:r>
+              <a:rPr lang="en-US" dirty="0"/>
+              <a:t>there are numerous ways in which we can encode our data and picking an appropriate method is very important</a:t>
+            </a:r>
+          </a:p>
+          <a:p>
+            <a:pPr marL="171450" indent="-171450">
+              <a:buFontTx/>
+              <a:buChar char="-"/>
+            </a:pPr>
+            <a:r>
+              <a:rPr lang="en-US" dirty="0"/>
+              <a:t>the image on the right is an example of an encoding method called “one-hot encoding”, where each feature gets a unique column</a:t>
+            </a:r>
+          </a:p>
+          <a:p>
+            <a:pPr marL="171450" indent="-171450">
+              <a:buFontTx/>
+              <a:buChar char="-"/>
+            </a:pPr>
+            <a:r>
+              <a:rPr lang="en-US" dirty="0"/>
+              <a:t>while this technique can be highly effective, we need to understand the cardinality of each feature, which really just means how many unique values are in the column</a:t>
+            </a:r>
+          </a:p>
+          <a:p>
+            <a:pPr marL="171450" indent="-171450">
+              <a:buFontTx/>
+              <a:buChar char="-"/>
+            </a:pPr>
+            <a:endParaRPr lang="en-US" dirty="0"/>
+          </a:p>
+          <a:p>
+            <a:pPr marL="171450" indent="-171450">
+              <a:buFontTx/>
+              <a:buChar char="-"/>
+            </a:pPr>
+            <a:r>
+              <a:rPr lang="en-US" dirty="0"/>
+              <a:t>the </a:t>
+            </a:r>
+          </a:p>
+          <a:p>
+            <a:endParaRPr lang="en-US" dirty="0"/>
+          </a:p>
+          <a:p>
+            <a:pPr marL="171450" indent="-171450">
+              <a:buFontTx/>
+              <a:buChar char="-"/>
+            </a:pPr>
+            <a:r>
+              <a:rPr lang="en-US" dirty="0"/>
+              <a:t>circle back to the example about the “detailed industry recode” feature. we know now that that field, even though it’s numerical, is actually a categorical feature hiding in plain sight</a:t>
+            </a:r>
+          </a:p>
+        </p:txBody>
+      </p:sp>
+      <p:sp>
+        <p:nvSpPr>
+          <p:cNvPr id="4" name="Slide Number Placeholder 3"/>
+          <p:cNvSpPr>
+            <a:spLocks noGrp="1"/>
+          </p:cNvSpPr>
+          <p:nvPr>
+            <p:ph type="sldNum" sz="quarter" idx="5"/>
+          </p:nvPr>
+        </p:nvSpPr>
+        <p:spPr/>
+        <p:txBody>
+          <a:bodyPr/>
+          <a:lstStyle/>
+          <a:p>
+            <a:fld id="{113894EA-6DBB-44FC-9083-4B63A67C3C45}" type="slidenum">
+              <a:rPr lang="en-US" smtClean="0"/>
+              <a:t>9</a:t>
+            </a:fld>
+            <a:endParaRPr lang="en-US"/>
+          </a:p>
+        </p:txBody>
+      </p:sp>
+    </p:spTree>
+    <p:extLst>
+      <p:ext uri="{BB962C8B-B14F-4D97-AF65-F5344CB8AC3E}">
+        <p14:creationId xmlns:p14="http://schemas.microsoft.com/office/powerpoint/2010/main" val="896369216"/>
       </p:ext>
     </p:extLst>
   </p:cSld>
@@ -4281,7 +5862,7 @@
         <p:spPr/>
         <p:txBody>
           <a:bodyPr>
-            <a:normAutofit fontScale="85000" lnSpcReduction="20000"/>
+            <a:normAutofit fontScale="92500" lnSpcReduction="20000"/>
           </a:bodyPr>
           <a:lstStyle/>
           <a:p>
@@ -4346,7 +5927,7 @@
             </a:pPr>
             <a:r>
               <a:rPr lang="en-US" sz="3600" dirty="0"/>
-              <a:t>Under/Oversampling (Random, SMOTE, ROSE)</a:t>
+              <a:t>Under/Oversampling</a:t>
             </a:r>
           </a:p>
         </p:txBody>
@@ -4388,7 +5969,7 @@
             <p:nvPr/>
           </p:nvPicPr>
           <p:blipFill rotWithShape="1">
-            <a:blip r:embed="rId2">
+            <a:blip r:embed="rId3">
               <a:extLst>
                 <a:ext uri="{28A0092B-C50C-407E-A947-70E740481C1C}">
                   <a14:useLocalDpi xmlns:a14="http://schemas.microsoft.com/office/drawing/2010/main" val="0"/>
@@ -4433,7 +6014,7 @@
             <p:nvPr/>
           </p:nvPicPr>
           <p:blipFill rotWithShape="1">
-            <a:blip r:embed="rId3">
+            <a:blip r:embed="rId4">
               <a:extLst>
                 <a:ext uri="{28A0092B-C50C-407E-A947-70E740481C1C}">
                   <a14:useLocalDpi xmlns:a14="http://schemas.microsoft.com/office/drawing/2010/main" val="0"/>
@@ -4464,6 +6045,114 @@
           </p:spPr>
         </p:pic>
       </p:grpSp>
+      <p:sp>
+        <p:nvSpPr>
+          <p:cNvPr id="13" name="Oval 12">
+            <a:extLst>
+              <a:ext uri="{FF2B5EF4-FFF2-40B4-BE49-F238E27FC236}">
+                <a16:creationId xmlns:a16="http://schemas.microsoft.com/office/drawing/2014/main" id="{A358B081-C01F-49AE-A25D-30D9E9E98163}"/>
+              </a:ext>
+            </a:extLst>
+          </p:cNvPr>
+          <p:cNvSpPr/>
+          <p:nvPr/>
+        </p:nvSpPr>
+        <p:spPr>
+          <a:xfrm>
+            <a:off x="7010197" y="1479294"/>
+            <a:ext cx="454538" cy="422787"/>
+          </a:xfrm>
+          <a:prstGeom prst="ellipse">
+            <a:avLst/>
+          </a:prstGeom>
+          <a:noFill/>
+        </p:spPr>
+        <p:style>
+          <a:lnRef idx="2">
+            <a:schemeClr val="accent1">
+              <a:shade val="50000"/>
+            </a:schemeClr>
+          </a:lnRef>
+          <a:fillRef idx="1">
+            <a:schemeClr val="accent1"/>
+          </a:fillRef>
+          <a:effectRef idx="0">
+            <a:schemeClr val="accent1"/>
+          </a:effectRef>
+          <a:fontRef idx="minor">
+            <a:schemeClr val="lt1"/>
+          </a:fontRef>
+        </p:style>
+        <p:txBody>
+          <a:bodyPr rtlCol="0" anchor="ctr"/>
+          <a:lstStyle/>
+          <a:p>
+            <a:pPr algn="ctr"/>
+            <a:r>
+              <a:rPr lang="en-US" dirty="0">
+                <a:solidFill>
+                  <a:schemeClr val="tx1"/>
+                </a:solidFill>
+              </a:rPr>
+              <a:t>1</a:t>
+            </a:r>
+          </a:p>
+        </p:txBody>
+      </p:sp>
+      <p:sp>
+        <p:nvSpPr>
+          <p:cNvPr id="14" name="Oval 13">
+            <a:extLst>
+              <a:ext uri="{FF2B5EF4-FFF2-40B4-BE49-F238E27FC236}">
+                <a16:creationId xmlns:a16="http://schemas.microsoft.com/office/drawing/2014/main" id="{983D6E42-EAF2-4E48-8625-FEB4A9FA1855}"/>
+              </a:ext>
+            </a:extLst>
+          </p:cNvPr>
+          <p:cNvSpPr/>
+          <p:nvPr/>
+        </p:nvSpPr>
+        <p:spPr>
+          <a:xfrm>
+            <a:off x="7010197" y="4153374"/>
+            <a:ext cx="454538" cy="422787"/>
+          </a:xfrm>
+          <a:prstGeom prst="ellipse">
+            <a:avLst/>
+          </a:prstGeom>
+          <a:noFill/>
+        </p:spPr>
+        <p:style>
+          <a:lnRef idx="2">
+            <a:schemeClr val="accent1">
+              <a:shade val="50000"/>
+            </a:schemeClr>
+          </a:lnRef>
+          <a:fillRef idx="1">
+            <a:schemeClr val="accent1"/>
+          </a:fillRef>
+          <a:effectRef idx="0">
+            <a:schemeClr val="accent1"/>
+          </a:effectRef>
+          <a:fontRef idx="minor">
+            <a:schemeClr val="lt1"/>
+          </a:fontRef>
+        </p:style>
+        <p:txBody>
+          <a:bodyPr rtlCol="0" anchor="ctr"/>
+          <a:lstStyle/>
+          <a:p>
+            <a:pPr algn="ctr"/>
+            <a:r>
+              <a:rPr lang="en-US" dirty="0">
+                <a:solidFill>
+                  <a:schemeClr val="tx1"/>
+                </a:solidFill>
+              </a:rPr>
+              <a:t>2</a:t>
+            </a:r>
+          </a:p>
+        </p:txBody>
+      </p:sp>
     </p:spTree>
     <p:extLst>
       <p:ext uri="{BB962C8B-B14F-4D97-AF65-F5344CB8AC3E}">
@@ -4557,7 +6246,7 @@
             <p:nvPr/>
           </p:nvPicPr>
           <p:blipFill rotWithShape="1">
-            <a:blip r:embed="rId2"/>
+            <a:blip r:embed="rId3"/>
             <a:srcRect t="7118"/>
             <a:stretch/>
           </p:blipFill>
@@ -4586,7 +6275,7 @@
             <p:nvPr/>
           </p:nvPicPr>
           <p:blipFill rotWithShape="1">
-            <a:blip r:embed="rId3"/>
+            <a:blip r:embed="rId4"/>
             <a:srcRect t="6317"/>
             <a:stretch/>
           </p:blipFill>
@@ -5155,12 +6844,98 @@
             <p:ph sz="half" idx="1"/>
           </p:nvPr>
         </p:nvSpPr>
-        <p:spPr/>
+        <p:spPr>
+          <a:xfrm>
+            <a:off x="838200" y="1825624"/>
+            <a:ext cx="5181600" cy="4486685"/>
+          </a:xfrm>
+        </p:spPr>
         <p:txBody>
           <a:bodyPr>
-            <a:normAutofit/>
+            <a:normAutofit lnSpcReduction="10000"/>
           </a:bodyPr>
           <a:lstStyle/>
+          <a:p>
+            <a:pPr>
+              <a:buSzPct val="60000"/>
+              <a:buFont typeface="Wingdings" panose="05000000000000000000" pitchFamily="2" charset="2"/>
+              <a:buChar char="§"/>
+            </a:pPr>
+            <a:r>
+              <a:rPr lang="en-US" sz="3600" dirty="0"/>
+              <a:t>Train, validation, test sets</a:t>
+            </a:r>
+          </a:p>
+          <a:p>
+            <a:pPr>
+              <a:buSzPct val="60000"/>
+              <a:buFont typeface="Wingdings" panose="05000000000000000000" pitchFamily="2" charset="2"/>
+              <a:buChar char="§"/>
+            </a:pPr>
+            <a:endParaRPr lang="en-US" sz="3600" dirty="0"/>
+          </a:p>
+          <a:p>
+            <a:pPr>
+              <a:buSzPct val="60000"/>
+              <a:buFont typeface="Wingdings" panose="05000000000000000000" pitchFamily="2" charset="2"/>
+              <a:buChar char="§"/>
+            </a:pPr>
+            <a:endParaRPr lang="en-US" sz="3600" dirty="0"/>
+          </a:p>
+          <a:p>
+            <a:pPr>
+              <a:buSzPct val="60000"/>
+              <a:buFont typeface="Wingdings" panose="05000000000000000000" pitchFamily="2" charset="2"/>
+              <a:buChar char="§"/>
+            </a:pPr>
+            <a:r>
+              <a:rPr lang="en-US" sz="3600" dirty="0"/>
+              <a:t>Nested k-fold</a:t>
+            </a:r>
+          </a:p>
+          <a:p>
+            <a:pPr>
+              <a:buSzPct val="60000"/>
+              <a:buFont typeface="Wingdings" panose="05000000000000000000" pitchFamily="2" charset="2"/>
+              <a:buChar char="§"/>
+            </a:pPr>
+            <a:endParaRPr lang="en-US" sz="3600" dirty="0"/>
+          </a:p>
+          <a:p>
+            <a:pPr>
+              <a:buSzPct val="60000"/>
+              <a:buFont typeface="Wingdings" panose="05000000000000000000" pitchFamily="2" charset="2"/>
+              <a:buChar char="§"/>
+            </a:pPr>
+            <a:endParaRPr lang="en-US" sz="3600" dirty="0"/>
+          </a:p>
+          <a:p>
+            <a:pPr>
+              <a:buSzPct val="60000"/>
+              <a:buFont typeface="Wingdings" panose="05000000000000000000" pitchFamily="2" charset="2"/>
+              <a:buChar char="§"/>
+            </a:pPr>
+            <a:r>
+              <a:rPr lang="en-US" sz="3600" dirty="0"/>
+              <a:t>Parameters and hyperparameters</a:t>
+            </a:r>
+          </a:p>
+          <a:p>
+            <a:pPr>
+              <a:buSzPct val="60000"/>
+              <a:buFont typeface="Wingdings" panose="05000000000000000000" pitchFamily="2" charset="2"/>
+              <a:buChar char="§"/>
+            </a:pPr>
+            <a:endParaRPr lang="en-US" sz="3600" dirty="0"/>
+          </a:p>
+          <a:p>
+            <a:pPr>
+              <a:buSzPct val="60000"/>
+              <a:buFont typeface="Wingdings" panose="05000000000000000000" pitchFamily="2" charset="2"/>
+              <a:buChar char="§"/>
+            </a:pPr>
+            <a:endParaRPr lang="en-US" sz="3600" dirty="0"/>
+          </a:p>
           <a:p>
             <a:pPr>
               <a:buSzPct val="60000"/>
@@ -5200,7 +6975,7 @@
         </p:blipFill>
         <p:spPr bwMode="auto">
           <a:xfrm>
-            <a:off x="6249489" y="2152073"/>
+            <a:off x="6249487" y="3334111"/>
             <a:ext cx="5813201" cy="3196504"/>
           </a:xfrm>
           <a:prstGeom prst="rect">
@@ -5218,6 +6993,161 @@
           </a:extLst>
         </p:spPr>
       </p:pic>
+      <p:pic>
+        <p:nvPicPr>
+          <p:cNvPr id="8196" name="Picture 4" descr="Train/Test Split and Cross Validation - A Python Tutorial - AlgoTrading101  Blog">
+            <a:extLst>
+              <a:ext uri="{FF2B5EF4-FFF2-40B4-BE49-F238E27FC236}">
+                <a16:creationId xmlns:a16="http://schemas.microsoft.com/office/drawing/2014/main" id="{B1F76AB8-0934-4633-9743-964D10FB9B72}"/>
+              </a:ext>
+            </a:extLst>
+          </p:cNvPr>
+          <p:cNvPicPr>
+            <a:picLocks noChangeAspect="1" noChangeArrowheads="1"/>
+          </p:cNvPicPr>
+          <p:nvPr/>
+        </p:nvPicPr>
+        <p:blipFill>
+          <a:blip r:embed="rId4">
+            <a:extLst>
+              <a:ext uri="{28A0092B-C50C-407E-A947-70E740481C1C}">
+                <a14:useLocalDpi xmlns:a14="http://schemas.microsoft.com/office/drawing/2010/main" val="0"/>
+              </a:ext>
+            </a:extLst>
+          </a:blip>
+          <a:srcRect/>
+          <a:stretch>
+            <a:fillRect/>
+          </a:stretch>
+        </p:blipFill>
+        <p:spPr bwMode="auto">
+          <a:xfrm>
+            <a:off x="7076564" y="570508"/>
+            <a:ext cx="4159045" cy="2240360"/>
+          </a:xfrm>
+          <a:prstGeom prst="rect">
+            <a:avLst/>
+          </a:prstGeom>
+          <a:noFill/>
+          <a:extLst>
+            <a:ext uri="{909E8E84-426E-40DD-AFC4-6F175D3DCCD1}">
+              <a14:hiddenFill xmlns:a14="http://schemas.microsoft.com/office/drawing/2010/main">
+                <a:solidFill>
+                  <a:srgbClr val="FFFFFF"/>
+                </a:solidFill>
+              </a14:hiddenFill>
+            </a:ext>
+          </a:extLst>
+        </p:spPr>
+      </p:pic>
+      <p:sp>
+        <p:nvSpPr>
+          <p:cNvPr id="5" name="Oval 4">
+            <a:extLst>
+              <a:ext uri="{FF2B5EF4-FFF2-40B4-BE49-F238E27FC236}">
+                <a16:creationId xmlns:a16="http://schemas.microsoft.com/office/drawing/2014/main" id="{80B63880-D97A-4A6C-93B5-C6ADCB86BC9B}"/>
+              </a:ext>
+            </a:extLst>
+          </p:cNvPr>
+          <p:cNvSpPr/>
+          <p:nvPr/>
+        </p:nvSpPr>
+        <p:spPr>
+          <a:xfrm>
+            <a:off x="5680106" y="3217606"/>
+            <a:ext cx="454538" cy="422787"/>
+          </a:xfrm>
+          <a:prstGeom prst="ellipse">
+            <a:avLst/>
+          </a:prstGeom>
+          <a:noFill/>
+        </p:spPr>
+        <p:style>
+          <a:lnRef idx="2">
+            <a:schemeClr val="accent1">
+              <a:shade val="50000"/>
+            </a:schemeClr>
+          </a:lnRef>
+          <a:fillRef idx="1">
+            <a:schemeClr val="accent1"/>
+          </a:fillRef>
+          <a:effectRef idx="0">
+            <a:schemeClr val="accent1"/>
+          </a:effectRef>
+          <a:fontRef idx="minor">
+            <a:schemeClr val="lt1"/>
+          </a:fontRef>
+        </p:style>
+        <p:txBody>
+          <a:bodyPr rtlCol="0" anchor="ctr"/>
+          <a:lstStyle/>
+          <a:p>
+            <a:pPr algn="ctr"/>
+            <a:r>
+              <a:rPr lang="en-US" dirty="0">
+                <a:solidFill>
+                  <a:schemeClr val="tx1"/>
+                </a:solidFill>
+              </a:rPr>
+              <a:t>2</a:t>
+            </a:r>
+          </a:p>
+        </p:txBody>
+      </p:sp>
+      <p:sp>
+        <p:nvSpPr>
+          <p:cNvPr id="8" name="Oval 7">
+            <a:extLst>
+              <a:ext uri="{FF2B5EF4-FFF2-40B4-BE49-F238E27FC236}">
+                <a16:creationId xmlns:a16="http://schemas.microsoft.com/office/drawing/2014/main" id="{B41733D1-1E36-4016-B1ED-8550922041D9}"/>
+              </a:ext>
+            </a:extLst>
+          </p:cNvPr>
+          <p:cNvSpPr/>
+          <p:nvPr/>
+        </p:nvSpPr>
+        <p:spPr>
+          <a:xfrm>
+            <a:off x="6626739" y="757519"/>
+            <a:ext cx="454538" cy="422787"/>
+          </a:xfrm>
+          <a:prstGeom prst="ellipse">
+            <a:avLst/>
+          </a:prstGeom>
+          <a:noFill/>
+        </p:spPr>
+        <p:style>
+          <a:lnRef idx="2">
+            <a:schemeClr val="accent1">
+              <a:shade val="50000"/>
+            </a:schemeClr>
+          </a:lnRef>
+          <a:fillRef idx="1">
+            <a:schemeClr val="accent1"/>
+          </a:fillRef>
+          <a:effectRef idx="0">
+            <a:schemeClr val="accent1"/>
+          </a:effectRef>
+          <a:fontRef idx="minor">
+            <a:schemeClr val="lt1"/>
+          </a:fontRef>
+        </p:style>
+        <p:txBody>
+          <a:bodyPr rtlCol="0" anchor="ctr"/>
+          <a:lstStyle/>
+          <a:p>
+            <a:pPr algn="ctr"/>
+            <a:r>
+              <a:rPr lang="en-US" dirty="0">
+                <a:solidFill>
+                  <a:schemeClr val="tx1"/>
+                </a:solidFill>
+              </a:rPr>
+              <a:t>1</a:t>
+            </a:r>
+          </a:p>
+        </p:txBody>
+      </p:sp>
     </p:spTree>
     <p:extLst>
       <p:ext uri="{BB962C8B-B14F-4D97-AF65-F5344CB8AC3E}">
@@ -5344,6 +7274,114 @@
 </p:sld>
 </file>
 
+<file path=ppt/slides/slide15.xml><?xml version="1.0" encoding="utf-8"?>
+<p:sld xmlns:a="http://schemas.openxmlformats.org/drawingml/2006/main" xmlns:r="http://schemas.openxmlformats.org/officeDocument/2006/relationships" xmlns:p="http://schemas.openxmlformats.org/presentationml/2006/main">
+  <p:cSld>
+    <p:spTree>
+      <p:nvGrpSpPr>
+        <p:cNvPr id="1" name=""/>
+        <p:cNvGrpSpPr/>
+        <p:nvPr/>
+      </p:nvGrpSpPr>
+      <p:grpSpPr>
+        <a:xfrm>
+          <a:off x="0" y="0"/>
+          <a:ext cx="0" cy="0"/>
+          <a:chOff x="0" y="0"/>
+          <a:chExt cx="0" cy="0"/>
+        </a:xfrm>
+      </p:grpSpPr>
+      <p:sp>
+        <p:nvSpPr>
+          <p:cNvPr id="2" name="Title 1">
+            <a:extLst>
+              <a:ext uri="{FF2B5EF4-FFF2-40B4-BE49-F238E27FC236}">
+                <a16:creationId xmlns:a16="http://schemas.microsoft.com/office/drawing/2014/main" id="{F63A57D7-AB2D-4202-ABA8-3D27FC4D929A}"/>
+              </a:ext>
+            </a:extLst>
+          </p:cNvPr>
+          <p:cNvSpPr>
+            <a:spLocks noGrp="1"/>
+          </p:cNvSpPr>
+          <p:nvPr>
+            <p:ph type="title"/>
+          </p:nvPr>
+        </p:nvSpPr>
+        <p:spPr/>
+        <p:txBody>
+          <a:bodyPr/>
+          <a:lstStyle/>
+          <a:p>
+            <a:r>
+              <a:rPr lang="en-US" dirty="0"/>
+              <a:t>Next Steps/Improvements</a:t>
+            </a:r>
+          </a:p>
+        </p:txBody>
+      </p:sp>
+      <p:sp>
+        <p:nvSpPr>
+          <p:cNvPr id="3" name="Content Placeholder 2">
+            <a:extLst>
+              <a:ext uri="{FF2B5EF4-FFF2-40B4-BE49-F238E27FC236}">
+                <a16:creationId xmlns:a16="http://schemas.microsoft.com/office/drawing/2014/main" id="{D2BB2DBD-AE8C-4004-BBA7-E7451726EBD8}"/>
+              </a:ext>
+            </a:extLst>
+          </p:cNvPr>
+          <p:cNvSpPr>
+            <a:spLocks noGrp="1"/>
+          </p:cNvSpPr>
+          <p:nvPr>
+            <p:ph sz="half" idx="1"/>
+          </p:nvPr>
+        </p:nvSpPr>
+        <p:spPr/>
+        <p:txBody>
+          <a:bodyPr/>
+          <a:lstStyle/>
+          <a:p>
+            <a:endParaRPr lang="en-US"/>
+          </a:p>
+        </p:txBody>
+      </p:sp>
+      <p:sp>
+        <p:nvSpPr>
+          <p:cNvPr id="4" name="Content Placeholder 3">
+            <a:extLst>
+              <a:ext uri="{FF2B5EF4-FFF2-40B4-BE49-F238E27FC236}">
+                <a16:creationId xmlns:a16="http://schemas.microsoft.com/office/drawing/2014/main" id="{0AB7953D-2A78-44A4-A770-BD0A443F49C7}"/>
+              </a:ext>
+            </a:extLst>
+          </p:cNvPr>
+          <p:cNvSpPr>
+            <a:spLocks noGrp="1"/>
+          </p:cNvSpPr>
+          <p:nvPr>
+            <p:ph sz="half" idx="2"/>
+          </p:nvPr>
+        </p:nvSpPr>
+        <p:spPr/>
+        <p:txBody>
+          <a:bodyPr/>
+          <a:lstStyle/>
+          <a:p>
+            <a:endParaRPr lang="en-US"/>
+          </a:p>
+        </p:txBody>
+      </p:sp>
+    </p:spTree>
+    <p:extLst>
+      <p:ext uri="{BB962C8B-B14F-4D97-AF65-F5344CB8AC3E}">
+        <p14:creationId xmlns:p14="http://schemas.microsoft.com/office/powerpoint/2010/main" val="2041325864"/>
+      </p:ext>
+    </p:extLst>
+  </p:cSld>
+  <p:clrMapOvr>
+    <a:masterClrMapping/>
+  </p:clrMapOvr>
+</p:sld>
+</file>
+
 <file path=ppt/slides/slide2.xml><?xml version="1.0" encoding="utf-8"?>
 <p:sld xmlns:a="http://schemas.openxmlformats.org/drawingml/2006/main" xmlns:r="http://schemas.openxmlformats.org/officeDocument/2006/relationships" xmlns:p="http://schemas.openxmlformats.org/presentationml/2006/main">
   <p:cSld>
@@ -5516,7 +7554,7 @@
             <p:nvPr/>
           </p:nvPicPr>
           <p:blipFill>
-            <a:blip r:embed="rId2">
+            <a:blip r:embed="rId3">
               <a:extLst>
                 <a:ext uri="{28A0092B-C50C-407E-A947-70E740481C1C}">
                   <a14:useLocalDpi xmlns:a14="http://schemas.microsoft.com/office/drawing/2010/main" val="0"/>
@@ -5822,10 +7860,10 @@
       </p:sp>
       <p:grpSp>
         <p:nvGrpSpPr>
-          <p:cNvPr id="8" name="Group 7">
-            <a:extLst>
-              <a:ext uri="{FF2B5EF4-FFF2-40B4-BE49-F238E27FC236}">
-                <a16:creationId xmlns:a16="http://schemas.microsoft.com/office/drawing/2014/main" id="{8DEBBFB5-84AA-4C22-8A04-43E53B7819C7}"/>
+          <p:cNvPr id="10" name="Group 9">
+            <a:extLst>
+              <a:ext uri="{FF2B5EF4-FFF2-40B4-BE49-F238E27FC236}">
+                <a16:creationId xmlns:a16="http://schemas.microsoft.com/office/drawing/2014/main" id="{0EAEC0C2-54FF-47CD-B910-AD6142EC50C1}"/>
               </a:ext>
             </a:extLst>
           </p:cNvPr>
@@ -5834,112 +7872,257 @@
         </p:nvGrpSpPr>
         <p:grpSpPr>
           <a:xfrm>
-            <a:off x="2223433" y="1844346"/>
-            <a:ext cx="6195499" cy="4307073"/>
-            <a:chOff x="1727619" y="1844346"/>
-            <a:chExt cx="5846752" cy="4151207"/>
+            <a:off x="4681498" y="1775521"/>
+            <a:ext cx="7075426" cy="4307073"/>
+            <a:chOff x="2223433" y="1844346"/>
+            <a:chExt cx="7075426" cy="4307073"/>
           </a:xfrm>
         </p:grpSpPr>
-        <p:pic>
-          <p:nvPicPr>
-            <p:cNvPr id="2050" name="Picture 2" descr="Examples of 2s in the MNIST database (first 100 examples). Note, the... |  Download Scientific Diagram">
+        <p:grpSp>
+          <p:nvGrpSpPr>
+            <p:cNvPr id="8" name="Group 7">
               <a:extLst>
                 <a:ext uri="{FF2B5EF4-FFF2-40B4-BE49-F238E27FC236}">
-                  <a16:creationId xmlns:a16="http://schemas.microsoft.com/office/drawing/2014/main" id="{B0839423-FCC4-4F46-8687-1A91EA191C76}"/>
+                  <a16:creationId xmlns:a16="http://schemas.microsoft.com/office/drawing/2014/main" id="{8DEBBFB5-84AA-4C22-8A04-43E53B7819C7}"/>
                 </a:ext>
               </a:extLst>
             </p:cNvPr>
-            <p:cNvPicPr>
-              <a:picLocks noChangeAspect="1" noChangeArrowheads="1"/>
-            </p:cNvPicPr>
+            <p:cNvGrpSpPr/>
             <p:nvPr/>
-          </p:nvPicPr>
-          <p:blipFill>
-            <a:blip r:embed="rId2">
+          </p:nvGrpSpPr>
+          <p:grpSpPr>
+            <a:xfrm>
+              <a:off x="2223433" y="1844346"/>
+              <a:ext cx="6195499" cy="4307073"/>
+              <a:chOff x="1727619" y="1844346"/>
+              <a:chExt cx="5846752" cy="4151207"/>
+            </a:xfrm>
+          </p:grpSpPr>
+          <p:pic>
+            <p:nvPicPr>
+              <p:cNvPr id="2050" name="Picture 2" descr="Examples of 2s in the MNIST database (first 100 examples). Note, the... |  Download Scientific Diagram">
+                <a:extLst>
+                  <a:ext uri="{FF2B5EF4-FFF2-40B4-BE49-F238E27FC236}">
+                    <a16:creationId xmlns:a16="http://schemas.microsoft.com/office/drawing/2014/main" id="{B0839423-FCC4-4F46-8687-1A91EA191C76}"/>
+                  </a:ext>
+                </a:extLst>
+              </p:cNvPr>
+              <p:cNvPicPr>
+                <a:picLocks noChangeAspect="1" noChangeArrowheads="1"/>
+              </p:cNvPicPr>
+              <p:nvPr/>
+            </p:nvPicPr>
+            <p:blipFill>
+              <a:blip r:embed="rId3">
+                <a:extLst>
+                  <a:ext uri="{28A0092B-C50C-407E-A947-70E740481C1C}">
+                    <a14:useLocalDpi xmlns:a14="http://schemas.microsoft.com/office/drawing/2010/main" val="0"/>
+                  </a:ext>
+                </a:extLst>
+              </a:blip>
+              <a:srcRect/>
+              <a:stretch>
+                <a:fillRect/>
+              </a:stretch>
+            </p:blipFill>
+            <p:spPr bwMode="auto">
+              <a:xfrm>
+                <a:off x="1727619" y="1844346"/>
+                <a:ext cx="4151207" cy="4151207"/>
+              </a:xfrm>
+              <a:prstGeom prst="rect">
+                <a:avLst/>
+              </a:prstGeom>
+              <a:noFill/>
               <a:extLst>
-                <a:ext uri="{28A0092B-C50C-407E-A947-70E740481C1C}">
-                  <a14:useLocalDpi xmlns:a14="http://schemas.microsoft.com/office/drawing/2010/main" val="0"/>
+                <a:ext uri="{909E8E84-426E-40DD-AFC4-6F175D3DCCD1}">
+                  <a14:hiddenFill xmlns:a14="http://schemas.microsoft.com/office/drawing/2010/main">
+                    <a:solidFill>
+                      <a:srgbClr val="FFFFFF"/>
+                    </a:solidFill>
+                  </a14:hiddenFill>
                 </a:ext>
               </a:extLst>
-            </a:blip>
-            <a:srcRect/>
-            <a:stretch>
-              <a:fillRect/>
-            </a:stretch>
-          </p:blipFill>
-          <p:spPr bwMode="auto">
+            </p:spPr>
+          </p:pic>
+          <p:sp>
+            <p:nvSpPr>
+              <p:cNvPr id="5" name="Arrow: Right 4">
+                <a:extLst>
+                  <a:ext uri="{FF2B5EF4-FFF2-40B4-BE49-F238E27FC236}">
+                    <a16:creationId xmlns:a16="http://schemas.microsoft.com/office/drawing/2014/main" id="{7A187B05-2AEA-4807-81C4-AB957D3E7C29}"/>
+                  </a:ext>
+                </a:extLst>
+              </p:cNvPr>
+              <p:cNvSpPr/>
+              <p:nvPr/>
+            </p:nvSpPr>
+            <p:spPr>
+              <a:xfrm>
+                <a:off x="6423069" y="3664319"/>
+                <a:ext cx="1151302" cy="511260"/>
+              </a:xfrm>
+              <a:prstGeom prst="rightArrow">
+                <a:avLst/>
+              </a:prstGeom>
+            </p:spPr>
+            <p:style>
+              <a:lnRef idx="2">
+                <a:schemeClr val="accent1">
+                  <a:shade val="50000"/>
+                </a:schemeClr>
+              </a:lnRef>
+              <a:fillRef idx="1">
+                <a:schemeClr val="accent1"/>
+              </a:fillRef>
+              <a:effectRef idx="0">
+                <a:schemeClr val="accent1"/>
+              </a:effectRef>
+              <a:fontRef idx="minor">
+                <a:schemeClr val="lt1"/>
+              </a:fontRef>
+            </p:style>
+            <p:txBody>
+              <a:bodyPr rtlCol="0" anchor="ctr"/>
+              <a:lstStyle/>
+              <a:p>
+                <a:pPr algn="ctr"/>
+                <a:endParaRPr lang="en-US"/>
+              </a:p>
+            </p:txBody>
+          </p:sp>
+        </p:grpSp>
+        <p:sp>
+          <p:nvSpPr>
+            <p:cNvPr id="9" name="TextBox 8">
+              <a:extLst>
+                <a:ext uri="{FF2B5EF4-FFF2-40B4-BE49-F238E27FC236}">
+                  <a16:creationId xmlns:a16="http://schemas.microsoft.com/office/drawing/2014/main" id="{127EE946-099C-40D5-B9B4-15EB7426C6FF}"/>
+                </a:ext>
+              </a:extLst>
+            </p:cNvPr>
+            <p:cNvSpPr txBox="1"/>
+            <p:nvPr/>
+          </p:nvSpPr>
+          <p:spPr>
             <a:xfrm>
-              <a:off x="1727619" y="1844346"/>
-              <a:ext cx="4151207" cy="4151207"/>
+              <a:off x="8793019" y="3613161"/>
+              <a:ext cx="505840" cy="769441"/>
             </a:xfrm>
             <a:prstGeom prst="rect">
               <a:avLst/>
             </a:prstGeom>
             <a:noFill/>
-            <a:extLst>
-              <a:ext uri="{909E8E84-426E-40DD-AFC4-6F175D3DCCD1}">
-                <a14:hiddenFill xmlns:a14="http://schemas.microsoft.com/office/drawing/2010/main">
-                  <a:solidFill>
-                    <a:srgbClr val="FFFFFF"/>
-                  </a:solidFill>
-                </a14:hiddenFill>
-              </a:ext>
-            </a:extLst>
           </p:spPr>
-        </p:pic>
-        <p:sp>
-          <p:nvSpPr>
-            <p:cNvPr id="5" name="Arrow: Right 4">
-              <a:extLst>
-                <a:ext uri="{FF2B5EF4-FFF2-40B4-BE49-F238E27FC236}">
-                  <a16:creationId xmlns:a16="http://schemas.microsoft.com/office/drawing/2014/main" id="{7A187B05-2AEA-4807-81C4-AB957D3E7C29}"/>
-                </a:ext>
-              </a:extLst>
-            </p:cNvPr>
-            <p:cNvSpPr/>
-            <p:nvPr/>
-          </p:nvSpPr>
-          <p:spPr>
-            <a:xfrm>
-              <a:off x="6423069" y="3664319"/>
-              <a:ext cx="1151302" cy="511260"/>
-            </a:xfrm>
-            <a:prstGeom prst="rightArrow">
-              <a:avLst/>
-            </a:prstGeom>
-          </p:spPr>
-          <p:style>
-            <a:lnRef idx="2">
-              <a:schemeClr val="accent1">
-                <a:shade val="50000"/>
-              </a:schemeClr>
-            </a:lnRef>
-            <a:fillRef idx="1">
-              <a:schemeClr val="accent1"/>
-            </a:fillRef>
-            <a:effectRef idx="0">
-              <a:schemeClr val="accent1"/>
-            </a:effectRef>
-            <a:fontRef idx="minor">
-              <a:schemeClr val="lt1"/>
-            </a:fontRef>
-          </p:style>
           <p:txBody>
-            <a:bodyPr rtlCol="0" anchor="ctr"/>
+            <a:bodyPr wrap="square" rtlCol="0">
+              <a:spAutoFit/>
+            </a:bodyPr>
             <a:lstStyle/>
             <a:p>
-              <a:pPr algn="ctr"/>
-              <a:endParaRPr lang="en-US"/>
+              <a:r>
+                <a:rPr lang="en-US" sz="4400" dirty="0"/>
+                <a:t>2</a:t>
+              </a:r>
+              <a:endParaRPr lang="en-US" dirty="0"/>
             </a:p>
           </p:txBody>
         </p:sp>
       </p:grpSp>
-      <p:sp>
-        <p:nvSpPr>
-          <p:cNvPr id="9" name="TextBox 8">
-            <a:extLst>
-              <a:ext uri="{FF2B5EF4-FFF2-40B4-BE49-F238E27FC236}">
-                <a16:creationId xmlns:a16="http://schemas.microsoft.com/office/drawing/2014/main" id="{127EE946-099C-40D5-B9B4-15EB7426C6FF}"/>
+      <p:pic>
+        <p:nvPicPr>
+          <p:cNvPr id="2054" name="Picture 6" descr="Jonagold - New York Apple Association">
+            <a:extLst>
+              <a:ext uri="{FF2B5EF4-FFF2-40B4-BE49-F238E27FC236}">
+                <a16:creationId xmlns:a16="http://schemas.microsoft.com/office/drawing/2014/main" id="{F0DD726C-24A7-4069-A42B-E2232CA4F4B4}"/>
+              </a:ext>
+            </a:extLst>
+          </p:cNvPr>
+          <p:cNvPicPr>
+            <a:picLocks noChangeAspect="1" noChangeArrowheads="1"/>
+          </p:cNvPicPr>
+          <p:nvPr/>
+        </p:nvPicPr>
+        <p:blipFill>
+          <a:blip r:embed="rId4">
+            <a:extLst>
+              <a:ext uri="{28A0092B-C50C-407E-A947-70E740481C1C}">
+                <a14:useLocalDpi xmlns:a14="http://schemas.microsoft.com/office/drawing/2010/main" val="0"/>
+              </a:ext>
+            </a:extLst>
+          </a:blip>
+          <a:srcRect/>
+          <a:stretch>
+            <a:fillRect/>
+          </a:stretch>
+        </p:blipFill>
+        <p:spPr bwMode="auto">
+          <a:xfrm>
+            <a:off x="194361" y="1892054"/>
+            <a:ext cx="4198784" cy="3304563"/>
+          </a:xfrm>
+          <a:prstGeom prst="rect">
+            <a:avLst/>
+          </a:prstGeom>
+          <a:noFill/>
+          <a:extLst>
+            <a:ext uri="{909E8E84-426E-40DD-AFC4-6F175D3DCCD1}">
+              <a14:hiddenFill xmlns:a14="http://schemas.microsoft.com/office/drawing/2010/main">
+                <a:solidFill>
+                  <a:srgbClr val="FFFFFF"/>
+                </a:solidFill>
+              </a14:hiddenFill>
+            </a:ext>
+          </a:extLst>
+        </p:spPr>
+      </p:pic>
+      <p:cxnSp>
+        <p:nvCxnSpPr>
+          <p:cNvPr id="12" name="Straight Connector 11">
+            <a:extLst>
+              <a:ext uri="{FF2B5EF4-FFF2-40B4-BE49-F238E27FC236}">
+                <a16:creationId xmlns:a16="http://schemas.microsoft.com/office/drawing/2014/main" id="{30D57EF0-19E8-471F-9305-3E3AD0EBCB8C}"/>
+              </a:ext>
+            </a:extLst>
+          </p:cNvPr>
+          <p:cNvCxnSpPr/>
+          <p:nvPr/>
+        </p:nvCxnSpPr>
+        <p:spPr>
+          <a:xfrm>
+            <a:off x="3962400" y="1775521"/>
+            <a:ext cx="0" cy="4307073"/>
+          </a:xfrm>
+          <a:prstGeom prst="line">
+            <a:avLst/>
+          </a:prstGeom>
+          <a:ln w="38100">
+            <a:solidFill>
+              <a:srgbClr val="00B050"/>
+            </a:solidFill>
+          </a:ln>
+        </p:spPr>
+        <p:style>
+          <a:lnRef idx="1">
+            <a:schemeClr val="accent1"/>
+          </a:lnRef>
+          <a:fillRef idx="0">
+            <a:schemeClr val="accent1"/>
+          </a:fillRef>
+          <a:effectRef idx="0">
+            <a:schemeClr val="accent1"/>
+          </a:effectRef>
+          <a:fontRef idx="minor">
+            <a:schemeClr val="tx1"/>
+          </a:fontRef>
+        </p:style>
+      </p:cxnSp>
+      <p:sp>
+        <p:nvSpPr>
+          <p:cNvPr id="13" name="TextBox 12">
+            <a:extLst>
+              <a:ext uri="{FF2B5EF4-FFF2-40B4-BE49-F238E27FC236}">
+                <a16:creationId xmlns:a16="http://schemas.microsoft.com/office/drawing/2014/main" id="{78604786-A195-45BD-BDA0-6E619CE65328}"/>
               </a:ext>
             </a:extLst>
           </p:cNvPr>
@@ -5948,8 +8131,8 @@
         </p:nvSpPr>
         <p:spPr>
           <a:xfrm>
-            <a:off x="8793018" y="3613161"/>
-            <a:ext cx="1175549" cy="769441"/>
+            <a:off x="1493363" y="5196617"/>
+            <a:ext cx="1170036" cy="461665"/>
           </a:xfrm>
           <a:prstGeom prst="rect">
             <a:avLst/>
@@ -5963,10 +8146,17 @@
           <a:lstStyle/>
           <a:p>
             <a:r>
-              <a:rPr lang="en-US" sz="4400" dirty="0"/>
-              <a:t>2</a:t>
-            </a:r>
-            <a:endParaRPr lang="en-US" dirty="0"/>
+              <a:rPr lang="en-US" dirty="0"/>
+              <a:t>“</a:t>
+            </a:r>
+            <a:r>
+              <a:rPr lang="en-US" sz="2400" dirty="0"/>
+              <a:t>Apple</a:t>
+            </a:r>
+            <a:r>
+              <a:rPr lang="en-US" dirty="0"/>
+              <a:t>”</a:t>
+            </a:r>
           </a:p>
         </p:txBody>
       </p:sp>
@@ -6063,7 +8253,7 @@
             <p:nvPr/>
           </p:nvPicPr>
           <p:blipFill>
-            <a:blip r:embed="rId2"/>
+            <a:blip r:embed="rId3"/>
             <a:stretch>
               <a:fillRect/>
             </a:stretch>
@@ -6280,7 +8470,7 @@
             </a:pPr>
             <a:r>
               <a:rPr lang="en-US" sz="3600" dirty="0"/>
-              <a:t>Verifying your data</a:t>
+              <a:t>Understanding your data</a:t>
             </a:r>
           </a:p>
           <a:p>
@@ -6307,8 +8497,24 @@
             </a:pPr>
             <a:r>
               <a:rPr lang="en-US" sz="3600" dirty="0"/>
-              <a:t>Understanding your data</a:t>
-            </a:r>
+              <a:t>Verifying your data</a:t>
+            </a:r>
+          </a:p>
+          <a:p>
+            <a:pPr>
+              <a:buSzPct val="60000"/>
+              <a:buFont typeface="Wingdings" panose="05000000000000000000" pitchFamily="2" charset="2"/>
+              <a:buChar char="§"/>
+            </a:pPr>
+            <a:endParaRPr lang="en-US" sz="3600" dirty="0"/>
+          </a:p>
+          <a:p>
+            <a:pPr>
+              <a:buSzPct val="60000"/>
+              <a:buFont typeface="Wingdings" panose="05000000000000000000" pitchFamily="2" charset="2"/>
+              <a:buChar char="§"/>
+            </a:pPr>
+            <a:endParaRPr lang="en-US" sz="3600" dirty="0"/>
           </a:p>
         </p:txBody>
       </p:sp>
@@ -6535,7 +8741,7 @@
           <p:nvPr/>
         </p:nvPicPr>
         <p:blipFill rotWithShape="1">
-          <a:blip r:embed="rId2"/>
+          <a:blip r:embed="rId3"/>
           <a:srcRect r="2578"/>
           <a:stretch/>
         </p:blipFill>
@@ -6564,7 +8770,7 @@
           <p:nvPr/>
         </p:nvPicPr>
         <p:blipFill>
-          <a:blip r:embed="rId3"/>
+          <a:blip r:embed="rId4"/>
           <a:stretch>
             <a:fillRect/>
           </a:stretch>
@@ -6793,7 +8999,7 @@
           <p:nvPr/>
         </p:nvPicPr>
         <p:blipFill>
-          <a:blip r:embed="rId2">
+          <a:blip r:embed="rId3">
             <a:extLst>
               <a:ext uri="{28A0092B-C50C-407E-A947-70E740481C1C}">
                 <a14:useLocalDpi xmlns:a14="http://schemas.microsoft.com/office/drawing/2010/main" val="0"/>
@@ -6840,7 +9046,7 @@
           <p:nvPr/>
         </p:nvPicPr>
         <p:blipFill>
-          <a:blip r:embed="rId3"/>
+          <a:blip r:embed="rId4"/>
           <a:stretch>
             <a:fillRect/>
           </a:stretch>
@@ -6931,8 +9137,8 @@
         </p:nvSpPr>
         <p:spPr>
           <a:xfrm>
-            <a:off x="838200" y="1825625"/>
-            <a:ext cx="6311748" cy="4351338"/>
+            <a:off x="838200" y="2041935"/>
+            <a:ext cx="6311748" cy="4073730"/>
           </a:xfrm>
         </p:spPr>
         <p:txBody>
@@ -6940,6 +9146,13 @@
             <a:noAutofit/>
           </a:bodyPr>
           <a:lstStyle/>
+          <a:p>
+            <a:pPr marL="0" indent="0">
+              <a:buSzPct val="60000"/>
+              <a:buNone/>
+            </a:pPr>
+            <a:endParaRPr lang="en-US" sz="3600" dirty="0"/>
+          </a:p>
           <a:p>
             <a:pPr>
               <a:buSzPct val="60000"/>
@@ -7031,7 +9244,7 @@
         </p:blipFill>
         <p:spPr bwMode="auto">
           <a:xfrm>
-            <a:off x="6490118" y="2955409"/>
+            <a:off x="6549112" y="2473627"/>
             <a:ext cx="5488741" cy="2607873"/>
           </a:xfrm>
           <a:prstGeom prst="rect">

</xml_diff>